<commit_message>
relecture et complément sur steam. Soucis avec les features importance de conv rate.
</commit_message>
<xml_diff>
--- a/05_supervised_ML/99_Project_Conversion_rate_challenge/01_conversion_rate_challenge.pptx
+++ b/05_supervised_ML/99_Project_Conversion_rate_challenge/01_conversion_rate_challenge.pptx
@@ -5,13 +5,20 @@
     <p:sldMasterId id="2147483660" r:id="rId1"/>
   </p:sldMasterIdLst>
   <p:notesMasterIdLst>
-    <p:notesMasterId r:id="rId6"/>
+    <p:notesMasterId r:id="rId13"/>
   </p:notesMasterIdLst>
   <p:sldIdLst>
     <p:sldId id="256" r:id="rId2"/>
     <p:sldId id="258" r:id="rId3"/>
-    <p:sldId id="257" r:id="rId4"/>
-    <p:sldId id="263" r:id="rId5"/>
+    <p:sldId id="266" r:id="rId4"/>
+    <p:sldId id="264" r:id="rId5"/>
+    <p:sldId id="267" r:id="rId6"/>
+    <p:sldId id="287" r:id="rId7"/>
+    <p:sldId id="286" r:id="rId8"/>
+    <p:sldId id="268" r:id="rId9"/>
+    <p:sldId id="288" r:id="rId10"/>
+    <p:sldId id="257" r:id="rId11"/>
+    <p:sldId id="263" r:id="rId12"/>
   </p:sldIdLst>
   <p:sldSz cx="12192000" cy="6858000"/>
   <p:notesSz cx="6858000" cy="9144000"/>
@@ -121,8 +128,7 @@
 <file path=ppt/revisionInfo.xml><?xml version="1.0" encoding="utf-8"?>
 <p1510:revInfo xmlns:a="http://schemas.openxmlformats.org/drawingml/2006/main" xmlns:r="http://schemas.openxmlformats.org/officeDocument/2006/relationships" xmlns:p1510="http://schemas.microsoft.com/office/powerpoint/2015/10/main">
   <p1510:revLst>
-    <p1510:client id="{1601E6E7-CA79-4409-AD99-5386FB3F24AE}" v="2" dt="2024-08-22T06:21:13.436"/>
-    <p1510:client id="{FB309223-E9E0-44D1-8A29-32821B1882E7}" v="10" dt="2024-08-21T09:47:36.906"/>
+    <p1510:client id="{1601E6E7-CA79-4409-AD99-5386FB3F24AE}" v="24" dt="2024-08-23T07:22:25.246"/>
   </p1510:revLst>
 </p1510:revInfo>
 </file>
@@ -1560,8 +1566,8 @@
   </pc:docChgLst>
   <pc:docChgLst>
     <pc:chgData name="Philippe Baucour" userId="5102170ae7533958" providerId="LiveId" clId="{1601E6E7-CA79-4409-AD99-5386FB3F24AE}"/>
-    <pc:docChg chg="custSel modSld sldOrd">
-      <pc:chgData name="Philippe Baucour" userId="5102170ae7533958" providerId="LiveId" clId="{1601E6E7-CA79-4409-AD99-5386FB3F24AE}" dt="2024-08-22T08:19:27.546" v="137"/>
+    <pc:docChg chg="undo custSel addSld delSld modSld sldOrd">
+      <pc:chgData name="Philippe Baucour" userId="5102170ae7533958" providerId="LiveId" clId="{1601E6E7-CA79-4409-AD99-5386FB3F24AE}" dt="2024-08-23T07:22:29.340" v="731" actId="20577"/>
       <pc:docMkLst>
         <pc:docMk/>
       </pc:docMkLst>
@@ -1597,6 +1603,21 @@
         </pc:picChg>
       </pc:sldChg>
       <pc:sldChg chg="addSp delSp modSp mod">
+        <pc:chgData name="Philippe Baucour" userId="5102170ae7533958" providerId="LiveId" clId="{1601E6E7-CA79-4409-AD99-5386FB3F24AE}" dt="2024-08-22T14:19:42.487" v="237" actId="21"/>
+        <pc:sldMkLst>
+          <pc:docMk/>
+          <pc:sldMk cId="3201622378" sldId="257"/>
+        </pc:sldMkLst>
+        <pc:picChg chg="add del mod">
+          <ac:chgData name="Philippe Baucour" userId="5102170ae7533958" providerId="LiveId" clId="{1601E6E7-CA79-4409-AD99-5386FB3F24AE}" dt="2024-08-22T14:19:42.487" v="237" actId="21"/>
+          <ac:picMkLst>
+            <pc:docMk/>
+            <pc:sldMk cId="3201622378" sldId="257"/>
+            <ac:picMk id="5" creationId="{D0C443D2-D44B-2CF1-CB78-C08A25DDC951}"/>
+          </ac:picMkLst>
+        </pc:picChg>
+      </pc:sldChg>
+      <pc:sldChg chg="addSp delSp modSp mod">
         <pc:chgData name="Philippe Baucour" userId="5102170ae7533958" providerId="LiveId" clId="{1601E6E7-CA79-4409-AD99-5386FB3F24AE}" dt="2024-08-22T06:30:42.611" v="135" actId="9405"/>
         <pc:sldMkLst>
           <pc:docMk/>
@@ -1665,6 +1686,515 @@
           <pc:docMk/>
           <pc:sldMk cId="312535264" sldId="263"/>
         </pc:sldMkLst>
+      </pc:sldChg>
+      <pc:sldChg chg="addSp delSp modSp new mod modNotesTx">
+        <pc:chgData name="Philippe Baucour" userId="5102170ae7533958" providerId="LiveId" clId="{1601E6E7-CA79-4409-AD99-5386FB3F24AE}" dt="2024-08-22T15:02:01.250" v="664" actId="20577"/>
+        <pc:sldMkLst>
+          <pc:docMk/>
+          <pc:sldMk cId="209198843" sldId="264"/>
+        </pc:sldMkLst>
+        <pc:spChg chg="mod">
+          <ac:chgData name="Philippe Baucour" userId="5102170ae7533958" providerId="LiveId" clId="{1601E6E7-CA79-4409-AD99-5386FB3F24AE}" dt="2024-08-22T15:02:01.250" v="664" actId="20577"/>
+          <ac:spMkLst>
+            <pc:docMk/>
+            <pc:sldMk cId="209198843" sldId="264"/>
+            <ac:spMk id="2" creationId="{CA29B263-F466-620B-D79F-98E1228B9780}"/>
+          </ac:spMkLst>
+        </pc:spChg>
+        <pc:spChg chg="del">
+          <ac:chgData name="Philippe Baucour" userId="5102170ae7533958" providerId="LiveId" clId="{1601E6E7-CA79-4409-AD99-5386FB3F24AE}" dt="2024-08-22T14:12:28.646" v="159" actId="931"/>
+          <ac:spMkLst>
+            <pc:docMk/>
+            <pc:sldMk cId="209198843" sldId="264"/>
+            <ac:spMk id="3" creationId="{E684E7CE-49C1-8E55-761C-78EF7B9F2FA8}"/>
+          </ac:spMkLst>
+        </pc:spChg>
+        <pc:spChg chg="add del">
+          <ac:chgData name="Philippe Baucour" userId="5102170ae7533958" providerId="LiveId" clId="{1601E6E7-CA79-4409-AD99-5386FB3F24AE}" dt="2024-08-22T14:09:40.115" v="143" actId="22"/>
+          <ac:spMkLst>
+            <pc:docMk/>
+            <pc:sldMk cId="209198843" sldId="264"/>
+            <ac:spMk id="5" creationId="{6AFFE775-6770-E86E-ACA9-56161EA32626}"/>
+          </ac:spMkLst>
+        </pc:spChg>
+        <pc:spChg chg="add mod">
+          <ac:chgData name="Philippe Baucour" userId="5102170ae7533958" providerId="LiveId" clId="{1601E6E7-CA79-4409-AD99-5386FB3F24AE}" dt="2024-08-22T14:15:55.581" v="170" actId="1076"/>
+          <ac:spMkLst>
+            <pc:docMk/>
+            <pc:sldMk cId="209198843" sldId="264"/>
+            <ac:spMk id="8" creationId="{73A76093-B4E0-EEA8-86CC-DCCF03CCC8C3}"/>
+          </ac:spMkLst>
+        </pc:spChg>
+        <pc:picChg chg="add del mod">
+          <ac:chgData name="Philippe Baucour" userId="5102170ae7533958" providerId="LiveId" clId="{1601E6E7-CA79-4409-AD99-5386FB3F24AE}" dt="2024-08-22T14:27:08.903" v="339" actId="478"/>
+          <ac:picMkLst>
+            <pc:docMk/>
+            <pc:sldMk cId="209198843" sldId="264"/>
+            <ac:picMk id="7" creationId="{C222B210-A511-3113-7B90-0BDE1E1151E5}"/>
+          </ac:picMkLst>
+        </pc:picChg>
+        <pc:picChg chg="add del mod">
+          <ac:chgData name="Philippe Baucour" userId="5102170ae7533958" providerId="LiveId" clId="{1601E6E7-CA79-4409-AD99-5386FB3F24AE}" dt="2024-08-22T14:27:10.140" v="340" actId="478"/>
+          <ac:picMkLst>
+            <pc:docMk/>
+            <pc:sldMk cId="209198843" sldId="264"/>
+            <ac:picMk id="10" creationId="{EC4287C8-AF70-B757-EF89-AE1D42B62F26}"/>
+          </ac:picMkLst>
+        </pc:picChg>
+        <pc:picChg chg="add del mod">
+          <ac:chgData name="Philippe Baucour" userId="5102170ae7533958" providerId="LiveId" clId="{1601E6E7-CA79-4409-AD99-5386FB3F24AE}" dt="2024-08-22T14:27:13.096" v="341" actId="478"/>
+          <ac:picMkLst>
+            <pc:docMk/>
+            <pc:sldMk cId="209198843" sldId="264"/>
+            <ac:picMk id="12" creationId="{AABA5E3D-A3EA-D9BD-B99D-3A8E9E50B5C7}"/>
+          </ac:picMkLst>
+        </pc:picChg>
+        <pc:picChg chg="add mod ord">
+          <ac:chgData name="Philippe Baucour" userId="5102170ae7533958" providerId="LiveId" clId="{1601E6E7-CA79-4409-AD99-5386FB3F24AE}" dt="2024-08-22T14:36:11.047" v="410" actId="1076"/>
+          <ac:picMkLst>
+            <pc:docMk/>
+            <pc:sldMk cId="209198843" sldId="264"/>
+            <ac:picMk id="14" creationId="{DD6BA3D8-3BD0-4B52-EF54-33BDEDDD4665}"/>
+          </ac:picMkLst>
+        </pc:picChg>
+        <pc:picChg chg="add mod ord">
+          <ac:chgData name="Philippe Baucour" userId="5102170ae7533958" providerId="LiveId" clId="{1601E6E7-CA79-4409-AD99-5386FB3F24AE}" dt="2024-08-22T14:36:06.242" v="409" actId="1076"/>
+          <ac:picMkLst>
+            <pc:docMk/>
+            <pc:sldMk cId="209198843" sldId="264"/>
+            <ac:picMk id="16" creationId="{5268AC1D-D4FA-AE46-453F-AF128164B610}"/>
+          </ac:picMkLst>
+        </pc:picChg>
+        <pc:picChg chg="add mod">
+          <ac:chgData name="Philippe Baucour" userId="5102170ae7533958" providerId="LiveId" clId="{1601E6E7-CA79-4409-AD99-5386FB3F24AE}" dt="2024-08-22T14:36:15.954" v="411" actId="1076"/>
+          <ac:picMkLst>
+            <pc:docMk/>
+            <pc:sldMk cId="209198843" sldId="264"/>
+            <ac:picMk id="18" creationId="{C04E2636-71BD-60C0-D0F2-2AC1A33B799B}"/>
+          </ac:picMkLst>
+        </pc:picChg>
+        <pc:picChg chg="add del mod">
+          <ac:chgData name="Philippe Baucour" userId="5102170ae7533958" providerId="LiveId" clId="{1601E6E7-CA79-4409-AD99-5386FB3F24AE}" dt="2024-08-22T14:23:14.231" v="255" actId="478"/>
+          <ac:picMkLst>
+            <pc:docMk/>
+            <pc:sldMk cId="209198843" sldId="264"/>
+            <ac:picMk id="20" creationId="{69A9B82F-7B3C-4A33-C861-AC41B1888D0D}"/>
+          </ac:picMkLst>
+        </pc:picChg>
+        <pc:picChg chg="add mod">
+          <ac:chgData name="Philippe Baucour" userId="5102170ae7533958" providerId="LiveId" clId="{1601E6E7-CA79-4409-AD99-5386FB3F24AE}" dt="2024-08-22T14:29:22.863" v="356" actId="1076"/>
+          <ac:picMkLst>
+            <pc:docMk/>
+            <pc:sldMk cId="209198843" sldId="264"/>
+            <ac:picMk id="22" creationId="{8F8BCC4E-69C8-36E4-A8F1-744730E4E9A3}"/>
+          </ac:picMkLst>
+        </pc:picChg>
+        <pc:picChg chg="add del mod">
+          <ac:chgData name="Philippe Baucour" userId="5102170ae7533958" providerId="LiveId" clId="{1601E6E7-CA79-4409-AD99-5386FB3F24AE}" dt="2024-08-22T14:30:08.795" v="359" actId="21"/>
+          <ac:picMkLst>
+            <pc:docMk/>
+            <pc:sldMk cId="209198843" sldId="264"/>
+            <ac:picMk id="24" creationId="{CB227373-A969-BE8F-04D1-CB48F636BA0A}"/>
+          </ac:picMkLst>
+        </pc:picChg>
+        <pc:picChg chg="add mod">
+          <ac:chgData name="Philippe Baucour" userId="5102170ae7533958" providerId="LiveId" clId="{1601E6E7-CA79-4409-AD99-5386FB3F24AE}" dt="2024-08-22T14:34:35.569" v="395" actId="1076"/>
+          <ac:picMkLst>
+            <pc:docMk/>
+            <pc:sldMk cId="209198843" sldId="264"/>
+            <ac:picMk id="26" creationId="{2A3B5C4D-F1EC-4B2C-CB1A-222688215626}"/>
+          </ac:picMkLst>
+        </pc:picChg>
+        <pc:picChg chg="add mod">
+          <ac:chgData name="Philippe Baucour" userId="5102170ae7533958" providerId="LiveId" clId="{1601E6E7-CA79-4409-AD99-5386FB3F24AE}" dt="2024-08-22T14:29:22.863" v="356" actId="1076"/>
+          <ac:picMkLst>
+            <pc:docMk/>
+            <pc:sldMk cId="209198843" sldId="264"/>
+            <ac:picMk id="28" creationId="{7FA6199A-223A-E76C-241D-28F19931683E}"/>
+          </ac:picMkLst>
+        </pc:picChg>
+        <pc:picChg chg="add mod">
+          <ac:chgData name="Philippe Baucour" userId="5102170ae7533958" providerId="LiveId" clId="{1601E6E7-CA79-4409-AD99-5386FB3F24AE}" dt="2024-08-22T14:35:16.047" v="401" actId="1076"/>
+          <ac:picMkLst>
+            <pc:docMk/>
+            <pc:sldMk cId="209198843" sldId="264"/>
+            <ac:picMk id="29" creationId="{D0C443D2-D44B-2CF1-CB78-C08A25DDC951}"/>
+          </ac:picMkLst>
+        </pc:picChg>
+        <pc:picChg chg="add mod">
+          <ac:chgData name="Philippe Baucour" userId="5102170ae7533958" providerId="LiveId" clId="{1601E6E7-CA79-4409-AD99-5386FB3F24AE}" dt="2024-08-22T14:42:21.775" v="483" actId="108"/>
+          <ac:picMkLst>
+            <pc:docMk/>
+            <pc:sldMk cId="209198843" sldId="264"/>
+            <ac:picMk id="30" creationId="{F5B5DC52-E3A0-9A53-BD73-E4250793CBEA}"/>
+          </ac:picMkLst>
+        </pc:picChg>
+        <pc:picChg chg="add mod">
+          <ac:chgData name="Philippe Baucour" userId="5102170ae7533958" providerId="LiveId" clId="{1601E6E7-CA79-4409-AD99-5386FB3F24AE}" dt="2024-08-22T14:35:19.078" v="402" actId="1076"/>
+          <ac:picMkLst>
+            <pc:docMk/>
+            <pc:sldMk cId="209198843" sldId="264"/>
+            <ac:picMk id="31" creationId="{C33A6592-48F5-8271-0AF2-BF97356E6145}"/>
+          </ac:picMkLst>
+        </pc:picChg>
+        <pc:picChg chg="add mod">
+          <ac:chgData name="Philippe Baucour" userId="5102170ae7533958" providerId="LiveId" clId="{1601E6E7-CA79-4409-AD99-5386FB3F24AE}" dt="2024-08-22T14:42:20.307" v="482" actId="108"/>
+          <ac:picMkLst>
+            <pc:docMk/>
+            <pc:sldMk cId="209198843" sldId="264"/>
+            <ac:picMk id="33" creationId="{0E8A1DB4-F5C3-68AA-BE3B-A732611B7C58}"/>
+          </ac:picMkLst>
+        </pc:picChg>
+      </pc:sldChg>
+      <pc:sldChg chg="addSp delSp modSp new del mod">
+        <pc:chgData name="Philippe Baucour" userId="5102170ae7533958" providerId="LiveId" clId="{1601E6E7-CA79-4409-AD99-5386FB3F24AE}" dt="2024-08-22T14:36:34.502" v="412" actId="47"/>
+        <pc:sldMkLst>
+          <pc:docMk/>
+          <pc:sldMk cId="221431647" sldId="265"/>
+        </pc:sldMkLst>
+        <pc:spChg chg="mod">
+          <ac:chgData name="Philippe Baucour" userId="5102170ae7533958" providerId="LiveId" clId="{1601E6E7-CA79-4409-AD99-5386FB3F24AE}" dt="2024-08-22T14:18:40.156" v="228" actId="20577"/>
+          <ac:spMkLst>
+            <pc:docMk/>
+            <pc:sldMk cId="221431647" sldId="265"/>
+            <ac:spMk id="2" creationId="{F4240B5B-DC52-77C5-8234-7E7595F027A6}"/>
+          </ac:spMkLst>
+        </pc:spChg>
+        <pc:spChg chg="del">
+          <ac:chgData name="Philippe Baucour" userId="5102170ae7533958" providerId="LiveId" clId="{1601E6E7-CA79-4409-AD99-5386FB3F24AE}" dt="2024-08-22T14:20:46.304" v="243" actId="22"/>
+          <ac:spMkLst>
+            <pc:docMk/>
+            <pc:sldMk cId="221431647" sldId="265"/>
+            <ac:spMk id="3" creationId="{CFCC9E4B-8025-9DC4-6092-F725D7305146}"/>
+          </ac:spMkLst>
+        </pc:spChg>
+        <pc:spChg chg="add del mod">
+          <ac:chgData name="Philippe Baucour" userId="5102170ae7533958" providerId="LiveId" clId="{1601E6E7-CA79-4409-AD99-5386FB3F24AE}" dt="2024-08-22T14:32:58.936" v="382" actId="478"/>
+          <ac:spMkLst>
+            <pc:docMk/>
+            <pc:sldMk cId="221431647" sldId="265"/>
+            <ac:spMk id="12" creationId="{AFFB7925-3B20-452A-F4AD-2AE2D4A0649D}"/>
+          </ac:spMkLst>
+        </pc:spChg>
+        <pc:picChg chg="add del mod">
+          <ac:chgData name="Philippe Baucour" userId="5102170ae7533958" providerId="LiveId" clId="{1601E6E7-CA79-4409-AD99-5386FB3F24AE}" dt="2024-08-22T14:33:02.953" v="383" actId="21"/>
+          <ac:picMkLst>
+            <pc:docMk/>
+            <pc:sldMk cId="221431647" sldId="265"/>
+            <ac:picMk id="5" creationId="{D0C443D2-D44B-2CF1-CB78-C08A25DDC951}"/>
+          </ac:picMkLst>
+        </pc:picChg>
+        <pc:picChg chg="add del">
+          <ac:chgData name="Philippe Baucour" userId="5102170ae7533958" providerId="LiveId" clId="{1601E6E7-CA79-4409-AD99-5386FB3F24AE}" dt="2024-08-22T14:20:54.780" v="245" actId="478"/>
+          <ac:picMkLst>
+            <pc:docMk/>
+            <pc:sldMk cId="221431647" sldId="265"/>
+            <ac:picMk id="6" creationId="{2691937E-86B8-3AFE-8F5D-5839A517C0E7}"/>
+          </ac:picMkLst>
+        </pc:picChg>
+        <pc:picChg chg="add del mod">
+          <ac:chgData name="Philippe Baucour" userId="5102170ae7533958" providerId="LiveId" clId="{1601E6E7-CA79-4409-AD99-5386FB3F24AE}" dt="2024-08-22T14:33:21.148" v="386" actId="21"/>
+          <ac:picMkLst>
+            <pc:docMk/>
+            <pc:sldMk cId="221431647" sldId="265"/>
+            <ac:picMk id="8" creationId="{F5B5DC52-E3A0-9A53-BD73-E4250793CBEA}"/>
+          </ac:picMkLst>
+        </pc:picChg>
+        <pc:picChg chg="add del mod ord">
+          <ac:chgData name="Philippe Baucour" userId="5102170ae7533958" providerId="LiveId" clId="{1601E6E7-CA79-4409-AD99-5386FB3F24AE}" dt="2024-08-22T14:20:55.824" v="246" actId="478"/>
+          <ac:picMkLst>
+            <pc:docMk/>
+            <pc:sldMk cId="221431647" sldId="265"/>
+            <ac:picMk id="10" creationId="{00270C69-4F03-B28F-1773-C4C64395F697}"/>
+          </ac:picMkLst>
+        </pc:picChg>
+        <pc:picChg chg="add del mod">
+          <ac:chgData name="Philippe Baucour" userId="5102170ae7533958" providerId="LiveId" clId="{1601E6E7-CA79-4409-AD99-5386FB3F24AE}" dt="2024-08-22T14:33:21.148" v="386" actId="21"/>
+          <ac:picMkLst>
+            <pc:docMk/>
+            <pc:sldMk cId="221431647" sldId="265"/>
+            <ac:picMk id="14" creationId="{C33A6592-48F5-8271-0AF2-BF97356E6145}"/>
+          </ac:picMkLst>
+        </pc:picChg>
+        <pc:picChg chg="add mod">
+          <ac:chgData name="Philippe Baucour" userId="5102170ae7533958" providerId="LiveId" clId="{1601E6E7-CA79-4409-AD99-5386FB3F24AE}" dt="2024-08-22T14:29:54.550" v="358"/>
+          <ac:picMkLst>
+            <pc:docMk/>
+            <pc:sldMk cId="221431647" sldId="265"/>
+            <ac:picMk id="15" creationId="{EFB21D3D-D0F7-9312-DA81-50635494BB95}"/>
+          </ac:picMkLst>
+        </pc:picChg>
+        <pc:picChg chg="add mod">
+          <ac:chgData name="Philippe Baucour" userId="5102170ae7533958" providerId="LiveId" clId="{1601E6E7-CA79-4409-AD99-5386FB3F24AE}" dt="2024-08-22T14:29:54.550" v="358"/>
+          <ac:picMkLst>
+            <pc:docMk/>
+            <pc:sldMk cId="221431647" sldId="265"/>
+            <ac:picMk id="16" creationId="{6F274379-20D5-3A16-DA8F-7274AE6818FE}"/>
+          </ac:picMkLst>
+        </pc:picChg>
+        <pc:picChg chg="add mod">
+          <ac:chgData name="Philippe Baucour" userId="5102170ae7533958" providerId="LiveId" clId="{1601E6E7-CA79-4409-AD99-5386FB3F24AE}" dt="2024-08-22T14:29:54.550" v="358"/>
+          <ac:picMkLst>
+            <pc:docMk/>
+            <pc:sldMk cId="221431647" sldId="265"/>
+            <ac:picMk id="17" creationId="{492B0DAA-E623-7A6E-FC32-BA89509BED65}"/>
+          </ac:picMkLst>
+        </pc:picChg>
+        <pc:picChg chg="add mod">
+          <ac:chgData name="Philippe Baucour" userId="5102170ae7533958" providerId="LiveId" clId="{1601E6E7-CA79-4409-AD99-5386FB3F24AE}" dt="2024-08-22T14:29:54.550" v="358"/>
+          <ac:picMkLst>
+            <pc:docMk/>
+            <pc:sldMk cId="221431647" sldId="265"/>
+            <ac:picMk id="18" creationId="{1B95C8B1-08D9-C053-6F32-4EC5862C63DD}"/>
+          </ac:picMkLst>
+        </pc:picChg>
+        <pc:picChg chg="add mod">
+          <ac:chgData name="Philippe Baucour" userId="5102170ae7533958" providerId="LiveId" clId="{1601E6E7-CA79-4409-AD99-5386FB3F24AE}" dt="2024-08-22T14:29:54.550" v="358"/>
+          <ac:picMkLst>
+            <pc:docMk/>
+            <pc:sldMk cId="221431647" sldId="265"/>
+            <ac:picMk id="19" creationId="{6CBFB5BD-886D-DB3A-8F2D-E3B3B4AB4E0E}"/>
+          </ac:picMkLst>
+        </pc:picChg>
+      </pc:sldChg>
+      <pc:sldChg chg="new del">
+        <pc:chgData name="Philippe Baucour" userId="5102170ae7533958" providerId="LiveId" clId="{1601E6E7-CA79-4409-AD99-5386FB3F24AE}" dt="2024-08-22T14:26:22.328" v="326" actId="47"/>
+        <pc:sldMkLst>
+          <pc:docMk/>
+          <pc:sldMk cId="760559865" sldId="266"/>
+        </pc:sldMkLst>
+      </pc:sldChg>
+      <pc:sldChg chg="add del">
+        <pc:chgData name="Philippe Baucour" userId="5102170ae7533958" providerId="LiveId" clId="{1601E6E7-CA79-4409-AD99-5386FB3F24AE}" dt="2024-08-22T14:19:04.227" v="230"/>
+        <pc:sldMkLst>
+          <pc:docMk/>
+          <pc:sldMk cId="3079144314" sldId="266"/>
+        </pc:sldMkLst>
+      </pc:sldChg>
+      <pc:sldChg chg="addSp delSp modSp add mod ord modNotesTx">
+        <pc:chgData name="Philippe Baucour" userId="5102170ae7533958" providerId="LiveId" clId="{1601E6E7-CA79-4409-AD99-5386FB3F24AE}" dt="2024-08-22T15:01:54.309" v="662" actId="20577"/>
+        <pc:sldMkLst>
+          <pc:docMk/>
+          <pc:sldMk cId="3231554383" sldId="266"/>
+        </pc:sldMkLst>
+        <pc:spChg chg="mod">
+          <ac:chgData name="Philippe Baucour" userId="5102170ae7533958" providerId="LiveId" clId="{1601E6E7-CA79-4409-AD99-5386FB3F24AE}" dt="2024-08-22T15:01:54.309" v="662" actId="20577"/>
+          <ac:spMkLst>
+            <pc:docMk/>
+            <pc:sldMk cId="3231554383" sldId="266"/>
+            <ac:spMk id="2" creationId="{CA29B263-F466-620B-D79F-98E1228B9780}"/>
+          </ac:spMkLst>
+        </pc:spChg>
+        <pc:picChg chg="add mod">
+          <ac:chgData name="Philippe Baucour" userId="5102170ae7533958" providerId="LiveId" clId="{1601E6E7-CA79-4409-AD99-5386FB3F24AE}" dt="2024-08-22T14:31:16.826" v="369" actId="1076"/>
+          <ac:picMkLst>
+            <pc:docMk/>
+            <pc:sldMk cId="3231554383" sldId="266"/>
+            <ac:picMk id="3" creationId="{CB227373-A969-BE8F-04D1-CB48F636BA0A}"/>
+          </ac:picMkLst>
+        </pc:picChg>
+        <pc:picChg chg="add mod">
+          <ac:chgData name="Philippe Baucour" userId="5102170ae7533958" providerId="LiveId" clId="{1601E6E7-CA79-4409-AD99-5386FB3F24AE}" dt="2024-08-22T14:30:43.350" v="362"/>
+          <ac:picMkLst>
+            <pc:docMk/>
+            <pc:sldMk cId="3231554383" sldId="266"/>
+            <ac:picMk id="4" creationId="{36AA1E3C-67C6-E98D-245D-FD2771AABD92}"/>
+          </ac:picMkLst>
+        </pc:picChg>
+        <pc:picChg chg="mod">
+          <ac:chgData name="Philippe Baucour" userId="5102170ae7533958" providerId="LiveId" clId="{1601E6E7-CA79-4409-AD99-5386FB3F24AE}" dt="2024-08-22T14:30:58.292" v="365" actId="1076"/>
+          <ac:picMkLst>
+            <pc:docMk/>
+            <pc:sldMk cId="3231554383" sldId="266"/>
+            <ac:picMk id="10" creationId="{EC4287C8-AF70-B757-EF89-AE1D42B62F26}"/>
+          </ac:picMkLst>
+        </pc:picChg>
+        <pc:picChg chg="mod">
+          <ac:chgData name="Philippe Baucour" userId="5102170ae7533958" providerId="LiveId" clId="{1601E6E7-CA79-4409-AD99-5386FB3F24AE}" dt="2024-08-22T14:31:02.677" v="366" actId="1076"/>
+          <ac:picMkLst>
+            <pc:docMk/>
+            <pc:sldMk cId="3231554383" sldId="266"/>
+            <ac:picMk id="12" creationId="{AABA5E3D-A3EA-D9BD-B99D-3A8E9E50B5C7}"/>
+          </ac:picMkLst>
+        </pc:picChg>
+        <pc:picChg chg="mod">
+          <ac:chgData name="Philippe Baucour" userId="5102170ae7533958" providerId="LiveId" clId="{1601E6E7-CA79-4409-AD99-5386FB3F24AE}" dt="2024-08-22T14:31:35.844" v="373" actId="1076"/>
+          <ac:picMkLst>
+            <pc:docMk/>
+            <pc:sldMk cId="3231554383" sldId="266"/>
+            <ac:picMk id="14" creationId="{DD6BA3D8-3BD0-4B52-EF54-33BDEDDD4665}"/>
+          </ac:picMkLst>
+        </pc:picChg>
+        <pc:picChg chg="mod">
+          <ac:chgData name="Philippe Baucour" userId="5102170ae7533958" providerId="LiveId" clId="{1601E6E7-CA79-4409-AD99-5386FB3F24AE}" dt="2024-08-22T14:31:12.311" v="368" actId="1076"/>
+          <ac:picMkLst>
+            <pc:docMk/>
+            <pc:sldMk cId="3231554383" sldId="266"/>
+            <ac:picMk id="16" creationId="{5268AC1D-D4FA-AE46-453F-AF128164B610}"/>
+          </ac:picMkLst>
+        </pc:picChg>
+        <pc:picChg chg="mod ord">
+          <ac:chgData name="Philippe Baucour" userId="5102170ae7533958" providerId="LiveId" clId="{1601E6E7-CA79-4409-AD99-5386FB3F24AE}" dt="2024-08-22T14:31:30.676" v="372" actId="1076"/>
+          <ac:picMkLst>
+            <pc:docMk/>
+            <pc:sldMk cId="3231554383" sldId="266"/>
+            <ac:picMk id="18" creationId="{C04E2636-71BD-60C0-D0F2-2AC1A33B799B}"/>
+          </ac:picMkLst>
+        </pc:picChg>
+        <pc:picChg chg="del">
+          <ac:chgData name="Philippe Baucour" userId="5102170ae7533958" providerId="LiveId" clId="{1601E6E7-CA79-4409-AD99-5386FB3F24AE}" dt="2024-08-22T14:26:43.502" v="330" actId="478"/>
+          <ac:picMkLst>
+            <pc:docMk/>
+            <pc:sldMk cId="3231554383" sldId="266"/>
+            <ac:picMk id="22" creationId="{8F8BCC4E-69C8-36E4-A8F1-744730E4E9A3}"/>
+          </ac:picMkLst>
+        </pc:picChg>
+        <pc:picChg chg="del">
+          <ac:chgData name="Philippe Baucour" userId="5102170ae7533958" providerId="LiveId" clId="{1601E6E7-CA79-4409-AD99-5386FB3F24AE}" dt="2024-08-22T14:26:46.802" v="332" actId="478"/>
+          <ac:picMkLst>
+            <pc:docMk/>
+            <pc:sldMk cId="3231554383" sldId="266"/>
+            <ac:picMk id="24" creationId="{CB227373-A969-BE8F-04D1-CB48F636BA0A}"/>
+          </ac:picMkLst>
+        </pc:picChg>
+        <pc:picChg chg="del">
+          <ac:chgData name="Philippe Baucour" userId="5102170ae7533958" providerId="LiveId" clId="{1601E6E7-CA79-4409-AD99-5386FB3F24AE}" dt="2024-08-22T14:26:45.223" v="331" actId="478"/>
+          <ac:picMkLst>
+            <pc:docMk/>
+            <pc:sldMk cId="3231554383" sldId="266"/>
+            <ac:picMk id="26" creationId="{2A3B5C4D-F1EC-4B2C-CB1A-222688215626}"/>
+          </ac:picMkLst>
+        </pc:picChg>
+      </pc:sldChg>
+      <pc:sldChg chg="add del">
+        <pc:chgData name="Philippe Baucour" userId="5102170ae7533958" providerId="LiveId" clId="{1601E6E7-CA79-4409-AD99-5386FB3F24AE}" dt="2024-08-22T14:19:09.317" v="232"/>
+        <pc:sldMkLst>
+          <pc:docMk/>
+          <pc:sldMk cId="3311186169" sldId="266"/>
+        </pc:sldMkLst>
+      </pc:sldChg>
+      <pc:sldChg chg="addSp modSp new mod">
+        <pc:chgData name="Philippe Baucour" userId="5102170ae7533958" providerId="LiveId" clId="{1601E6E7-CA79-4409-AD99-5386FB3F24AE}" dt="2024-08-23T07:22:06.028" v="724" actId="20577"/>
+        <pc:sldMkLst>
+          <pc:docMk/>
+          <pc:sldMk cId="2161612315" sldId="267"/>
+        </pc:sldMkLst>
+        <pc:spChg chg="mod">
+          <ac:chgData name="Philippe Baucour" userId="5102170ae7533958" providerId="LiveId" clId="{1601E6E7-CA79-4409-AD99-5386FB3F24AE}" dt="2024-08-23T07:22:06.028" v="724" actId="20577"/>
+          <ac:spMkLst>
+            <pc:docMk/>
+            <pc:sldMk cId="2161612315" sldId="267"/>
+            <ac:spMk id="2" creationId="{A26CE876-5991-FF0D-42A5-8357293BA886}"/>
+          </ac:spMkLst>
+        </pc:spChg>
+        <pc:spChg chg="mod">
+          <ac:chgData name="Philippe Baucour" userId="5102170ae7533958" providerId="LiveId" clId="{1601E6E7-CA79-4409-AD99-5386FB3F24AE}" dt="2024-08-22T14:48:24.402" v="650" actId="404"/>
+          <ac:spMkLst>
+            <pc:docMk/>
+            <pc:sldMk cId="2161612315" sldId="267"/>
+            <ac:spMk id="3" creationId="{494FF7DD-70F1-07F3-59A0-7A0B1ABEAB56}"/>
+          </ac:spMkLst>
+        </pc:spChg>
+        <pc:spChg chg="add mod">
+          <ac:chgData name="Philippe Baucour" userId="5102170ae7533958" providerId="LiveId" clId="{1601E6E7-CA79-4409-AD99-5386FB3F24AE}" dt="2024-08-22T14:44:33.453" v="496" actId="1076"/>
+          <ac:spMkLst>
+            <pc:docMk/>
+            <pc:sldMk cId="2161612315" sldId="267"/>
+            <ac:spMk id="8" creationId="{B5B57056-4F68-4808-D3CC-7CE8D6BDFCAD}"/>
+          </ac:spMkLst>
+        </pc:spChg>
+        <pc:picChg chg="add mod">
+          <ac:chgData name="Philippe Baucour" userId="5102170ae7533958" providerId="LiveId" clId="{1601E6E7-CA79-4409-AD99-5386FB3F24AE}" dt="2024-08-22T14:43:56.953" v="489" actId="1076"/>
+          <ac:picMkLst>
+            <pc:docMk/>
+            <pc:sldMk cId="2161612315" sldId="267"/>
+            <ac:picMk id="5" creationId="{3C6FCFE8-EF9A-3FA1-C1BF-8487722DEA00}"/>
+          </ac:picMkLst>
+        </pc:picChg>
+        <pc:picChg chg="add mod">
+          <ac:chgData name="Philippe Baucour" userId="5102170ae7533958" providerId="LiveId" clId="{1601E6E7-CA79-4409-AD99-5386FB3F24AE}" dt="2024-08-22T14:44:27.887" v="495" actId="14100"/>
+          <ac:picMkLst>
+            <pc:docMk/>
+            <pc:sldMk cId="2161612315" sldId="267"/>
+            <ac:picMk id="7" creationId="{ABECA835-5C52-2AA2-8A18-9F7B8EDBE7EA}"/>
+          </ac:picMkLst>
+        </pc:picChg>
+      </pc:sldChg>
+      <pc:sldChg chg="modSp new mod">
+        <pc:chgData name="Philippe Baucour" userId="5102170ae7533958" providerId="LiveId" clId="{1601E6E7-CA79-4409-AD99-5386FB3F24AE}" dt="2024-08-23T07:22:21.486" v="728" actId="20577"/>
+        <pc:sldMkLst>
+          <pc:docMk/>
+          <pc:sldMk cId="1612286955" sldId="268"/>
+        </pc:sldMkLst>
+        <pc:spChg chg="mod">
+          <ac:chgData name="Philippe Baucour" userId="5102170ae7533958" providerId="LiveId" clId="{1601E6E7-CA79-4409-AD99-5386FB3F24AE}" dt="2024-08-23T07:22:21.486" v="728" actId="20577"/>
+          <ac:spMkLst>
+            <pc:docMk/>
+            <pc:sldMk cId="1612286955" sldId="268"/>
+            <ac:spMk id="2" creationId="{99380B92-D1BD-920D-9DDD-DE700497E6B3}"/>
+          </ac:spMkLst>
+        </pc:spChg>
+      </pc:sldChg>
+      <pc:sldChg chg="delSp modSp add mod delAnim modAnim modShow">
+        <pc:chgData name="Philippe Baucour" userId="5102170ae7533958" providerId="LiveId" clId="{1601E6E7-CA79-4409-AD99-5386FB3F24AE}" dt="2024-08-22T15:06:16.192" v="670" actId="729"/>
+        <pc:sldMkLst>
+          <pc:docMk/>
+          <pc:sldMk cId="4079956193" sldId="286"/>
+        </pc:sldMkLst>
+        <pc:spChg chg="mod">
+          <ac:chgData name="Philippe Baucour" userId="5102170ae7533958" providerId="LiveId" clId="{1601E6E7-CA79-4409-AD99-5386FB3F24AE}" dt="2024-08-22T15:04:50.598" v="666" actId="27636"/>
+          <ac:spMkLst>
+            <pc:docMk/>
+            <pc:sldMk cId="4079956193" sldId="286"/>
+            <ac:spMk id="3" creationId="{50F452AD-BB6D-A971-A6ED-43CD09F7AB2B}"/>
+          </ac:spMkLst>
+        </pc:spChg>
+        <pc:spChg chg="del">
+          <ac:chgData name="Philippe Baucour" userId="5102170ae7533958" providerId="LiveId" clId="{1601E6E7-CA79-4409-AD99-5386FB3F24AE}" dt="2024-08-22T15:05:09.725" v="668" actId="478"/>
+          <ac:spMkLst>
+            <pc:docMk/>
+            <pc:sldMk cId="4079956193" sldId="286"/>
+            <ac:spMk id="4" creationId="{0DCB7778-990E-4328-3E8E-079EAA3D8F0A}"/>
+          </ac:spMkLst>
+        </pc:spChg>
+        <pc:spChg chg="del">
+          <ac:chgData name="Philippe Baucour" userId="5102170ae7533958" providerId="LiveId" clId="{1601E6E7-CA79-4409-AD99-5386FB3F24AE}" dt="2024-08-22T15:05:06.833" v="667" actId="478"/>
+          <ac:spMkLst>
+            <pc:docMk/>
+            <pc:sldMk cId="4079956193" sldId="286"/>
+            <ac:spMk id="18" creationId="{D08D3D04-AEA4-9246-D67D-77A84139705E}"/>
+          </ac:spMkLst>
+        </pc:spChg>
+      </pc:sldChg>
+      <pc:sldChg chg="modSp new mod">
+        <pc:chgData name="Philippe Baucour" userId="5102170ae7533958" providerId="LiveId" clId="{1601E6E7-CA79-4409-AD99-5386FB3F24AE}" dt="2024-08-23T07:22:00.116" v="720" actId="20577"/>
+        <pc:sldMkLst>
+          <pc:docMk/>
+          <pc:sldMk cId="2275997330" sldId="287"/>
+        </pc:sldMkLst>
+        <pc:spChg chg="mod">
+          <ac:chgData name="Philippe Baucour" userId="5102170ae7533958" providerId="LiveId" clId="{1601E6E7-CA79-4409-AD99-5386FB3F24AE}" dt="2024-08-23T07:22:00.116" v="720" actId="20577"/>
+          <ac:spMkLst>
+            <pc:docMk/>
+            <pc:sldMk cId="2275997330" sldId="287"/>
+            <ac:spMk id="2" creationId="{7EC6ADED-F7D6-006E-5E1A-43C369CF43C1}"/>
+          </ac:spMkLst>
+        </pc:spChg>
+      </pc:sldChg>
+      <pc:sldChg chg="modSp add mod">
+        <pc:chgData name="Philippe Baucour" userId="5102170ae7533958" providerId="LiveId" clId="{1601E6E7-CA79-4409-AD99-5386FB3F24AE}" dt="2024-08-23T07:22:29.340" v="731" actId="20577"/>
+        <pc:sldMkLst>
+          <pc:docMk/>
+          <pc:sldMk cId="1695937145" sldId="288"/>
+        </pc:sldMkLst>
+        <pc:spChg chg="mod">
+          <ac:chgData name="Philippe Baucour" userId="5102170ae7533958" providerId="LiveId" clId="{1601E6E7-CA79-4409-AD99-5386FB3F24AE}" dt="2024-08-23T07:22:29.340" v="731" actId="20577"/>
+          <ac:spMkLst>
+            <pc:docMk/>
+            <pc:sldMk cId="1695937145" sldId="288"/>
+            <ac:spMk id="2" creationId="{99380B92-D1BD-920D-9DDD-DE700497E6B3}"/>
+          </ac:spMkLst>
+        </pc:spChg>
       </pc:sldChg>
     </pc:docChg>
   </pc:docChgLst>
@@ -2163,6 +2693,1801 @@
     </a:lvl9pPr>
   </p:notesStyle>
 </p:notesMaster>
+</file>
+
+<file path=ppt/notesSlides/notesSlide1.xml><?xml version="1.0" encoding="utf-8"?>
+<p:notes xmlns:a="http://schemas.openxmlformats.org/drawingml/2006/main" xmlns:r="http://schemas.openxmlformats.org/officeDocument/2006/relationships" xmlns:p="http://schemas.openxmlformats.org/presentationml/2006/main">
+  <p:cSld>
+    <p:spTree>
+      <p:nvGrpSpPr>
+        <p:cNvPr id="1" name=""/>
+        <p:cNvGrpSpPr/>
+        <p:nvPr/>
+      </p:nvGrpSpPr>
+      <p:grpSpPr>
+        <a:xfrm>
+          <a:off x="0" y="0"/>
+          <a:ext cx="0" cy="0"/>
+          <a:chOff x="0" y="0"/>
+          <a:chExt cx="0" cy="0"/>
+        </a:xfrm>
+      </p:grpSpPr>
+      <p:sp>
+        <p:nvSpPr>
+          <p:cNvPr id="2" name="Espace réservé de l'image des diapositives 1"/>
+          <p:cNvSpPr>
+            <a:spLocks noGrp="1" noRot="1" noChangeAspect="1"/>
+          </p:cNvSpPr>
+          <p:nvPr>
+            <p:ph type="sldImg"/>
+          </p:nvPr>
+        </p:nvSpPr>
+        <p:spPr/>
+      </p:sp>
+      <p:sp>
+        <p:nvSpPr>
+          <p:cNvPr id="3" name="Espace réservé des notes 2"/>
+          <p:cNvSpPr>
+            <a:spLocks noGrp="1"/>
+          </p:cNvSpPr>
+          <p:nvPr>
+            <p:ph type="body" idx="1"/>
+          </p:nvPr>
+        </p:nvSpPr>
+        <p:spPr/>
+        <p:txBody>
+          <a:bodyPr/>
+          <a:lstStyle/>
+          <a:p>
+            <a:pPr marL="0" marR="0" lvl="0" indent="0" algn="l" defTabSz="914400" rtl="0" eaLnBrk="1" fontAlgn="auto" latinLnBrk="0" hangingPunct="1">
+              <a:lnSpc>
+                <a:spcPct val="100000"/>
+              </a:lnSpc>
+              <a:spcBef>
+                <a:spcPts val="0"/>
+              </a:spcBef>
+              <a:spcAft>
+                <a:spcPts val="0"/>
+              </a:spcAft>
+              <a:buClrTx/>
+              <a:buSzTx/>
+              <a:buFontTx/>
+              <a:buNone/>
+              <a:tabLst/>
+              <a:defRPr/>
+            </a:pPr>
+            <a:r>
+              <a:rPr lang="en-US" b="0" dirty="0">
+                <a:solidFill>
+                  <a:srgbClr val="CCCCCC"/>
+                </a:solidFill>
+                <a:effectLst/>
+                <a:highlight>
+                  <a:srgbClr val="1F1F1F"/>
+                </a:highlight>
+                <a:latin typeface="JetBrains Mono" panose="02000009000000000000" pitchFamily="49" charset="0"/>
+              </a:rPr>
+              <a:t>1 </a:t>
+            </a:r>
+            <a:r>
+              <a:rPr lang="en-US" b="0" dirty="0" err="1">
+                <a:solidFill>
+                  <a:srgbClr val="CCCCCC"/>
+                </a:solidFill>
+                <a:effectLst/>
+                <a:highlight>
+                  <a:srgbClr val="1F1F1F"/>
+                </a:highlight>
+                <a:latin typeface="JetBrains Mono" panose="02000009000000000000" pitchFamily="49" charset="0"/>
+              </a:rPr>
+              <a:t>Quick_View</a:t>
+            </a:r>
+            <a:r>
+              <a:rPr lang="en-US" b="0" dirty="0">
+                <a:solidFill>
+                  <a:srgbClr val="CCCCCC"/>
+                </a:solidFill>
+                <a:effectLst/>
+                <a:highlight>
+                  <a:srgbClr val="1F1F1F"/>
+                </a:highlight>
+                <a:latin typeface="JetBrains Mono" panose="02000009000000000000" pitchFamily="49" charset="0"/>
+              </a:rPr>
+              <a:t>()</a:t>
+            </a:r>
+          </a:p>
+          <a:p>
+            <a:pPr marL="0" marR="0" lvl="0" indent="0" algn="l" defTabSz="914400" rtl="0" eaLnBrk="1" fontAlgn="auto" latinLnBrk="0" hangingPunct="1">
+              <a:lnSpc>
+                <a:spcPct val="100000"/>
+              </a:lnSpc>
+              <a:spcBef>
+                <a:spcPts val="0"/>
+              </a:spcBef>
+              <a:spcAft>
+                <a:spcPts val="0"/>
+              </a:spcAft>
+              <a:buClrTx/>
+              <a:buSzTx/>
+              <a:buFontTx/>
+              <a:buNone/>
+              <a:tabLst/>
+              <a:defRPr/>
+            </a:pPr>
+            <a:r>
+              <a:rPr lang="en-US" b="0" dirty="0">
+                <a:solidFill>
+                  <a:srgbClr val="CCCCCC"/>
+                </a:solidFill>
+                <a:effectLst/>
+                <a:highlight>
+                  <a:srgbClr val="1F1F1F"/>
+                </a:highlight>
+                <a:latin typeface="JetBrains Mono" panose="02000009000000000000" pitchFamily="49" charset="0"/>
+              </a:rPr>
+              <a:t>2 The main problem : Highly unbalanced target 3% </a:t>
+            </a:r>
+          </a:p>
+          <a:p>
+            <a:pPr marL="0" marR="0" lvl="0" indent="0" algn="l" defTabSz="914400" rtl="0" eaLnBrk="1" fontAlgn="auto" latinLnBrk="0" hangingPunct="1">
+              <a:lnSpc>
+                <a:spcPct val="100000"/>
+              </a:lnSpc>
+              <a:spcBef>
+                <a:spcPts val="0"/>
+              </a:spcBef>
+              <a:spcAft>
+                <a:spcPts val="0"/>
+              </a:spcAft>
+              <a:buClrTx/>
+              <a:buSzTx/>
+              <a:buFontTx/>
+              <a:buNone/>
+              <a:tabLst/>
+              <a:defRPr/>
+            </a:pPr>
+            <a:r>
+              <a:rPr lang="en-US" b="0" dirty="0">
+                <a:solidFill>
+                  <a:srgbClr val="CCCCCC"/>
+                </a:solidFill>
+                <a:effectLst/>
+                <a:highlight>
+                  <a:srgbClr val="1F1F1F"/>
+                </a:highlight>
+                <a:latin typeface="JetBrains Mono" panose="02000009000000000000" pitchFamily="49" charset="0"/>
+              </a:rPr>
+              <a:t>3 Outliers are mostly in both </a:t>
+            </a:r>
+            <a:r>
+              <a:rPr lang="en-US" b="0" dirty="0">
+                <a:solidFill>
+                  <a:srgbClr val="CE9178"/>
+                </a:solidFill>
+                <a:effectLst/>
+                <a:highlight>
+                  <a:srgbClr val="1F1F1F"/>
+                </a:highlight>
+                <a:latin typeface="JetBrains Mono" panose="02000009000000000000" pitchFamily="49" charset="0"/>
+              </a:rPr>
+              <a:t>``age``</a:t>
+            </a:r>
+            <a:r>
+              <a:rPr lang="en-US" b="0" dirty="0">
+                <a:solidFill>
+                  <a:srgbClr val="CCCCCC"/>
+                </a:solidFill>
+                <a:effectLst/>
+                <a:highlight>
+                  <a:srgbClr val="1F1F1F"/>
+                </a:highlight>
+                <a:latin typeface="JetBrains Mono" panose="02000009000000000000" pitchFamily="49" charset="0"/>
+              </a:rPr>
+              <a:t> and </a:t>
+            </a:r>
+            <a:r>
+              <a:rPr lang="en-US" b="0" dirty="0">
+                <a:solidFill>
+                  <a:srgbClr val="CE9178"/>
+                </a:solidFill>
+                <a:effectLst/>
+                <a:highlight>
+                  <a:srgbClr val="1F1F1F"/>
+                </a:highlight>
+                <a:latin typeface="JetBrains Mono" panose="02000009000000000000" pitchFamily="49" charset="0"/>
+              </a:rPr>
+              <a:t>``</a:t>
+            </a:r>
+            <a:r>
+              <a:rPr lang="en-US" b="0" dirty="0" err="1">
+                <a:solidFill>
+                  <a:srgbClr val="CE9178"/>
+                </a:solidFill>
+                <a:effectLst/>
+                <a:highlight>
+                  <a:srgbClr val="1F1F1F"/>
+                </a:highlight>
+                <a:latin typeface="JetBrains Mono" panose="02000009000000000000" pitchFamily="49" charset="0"/>
+              </a:rPr>
+              <a:t>total_page_visited</a:t>
+            </a:r>
+            <a:r>
+              <a:rPr lang="en-US" b="0" dirty="0">
+                <a:solidFill>
+                  <a:srgbClr val="CE9178"/>
+                </a:solidFill>
+                <a:effectLst/>
+                <a:highlight>
+                  <a:srgbClr val="1F1F1F"/>
+                </a:highlight>
+                <a:latin typeface="JetBrains Mono" panose="02000009000000000000" pitchFamily="49" charset="0"/>
+              </a:rPr>
+              <a:t>``</a:t>
+            </a:r>
+            <a:r>
+              <a:rPr lang="en-US" b="0" dirty="0">
+                <a:solidFill>
+                  <a:srgbClr val="CCCCCC"/>
+                </a:solidFill>
+                <a:effectLst/>
+                <a:highlight>
+                  <a:srgbClr val="1F1F1F"/>
+                </a:highlight>
+                <a:latin typeface="JetBrains Mono" panose="02000009000000000000" pitchFamily="49" charset="0"/>
+              </a:rPr>
+              <a:t> features</a:t>
+            </a:r>
+          </a:p>
+          <a:p>
+            <a:endParaRPr lang="fr-FR" dirty="0"/>
+          </a:p>
+        </p:txBody>
+      </p:sp>
+      <p:sp>
+        <p:nvSpPr>
+          <p:cNvPr id="4" name="Espace réservé du numéro de diapositive 3"/>
+          <p:cNvSpPr>
+            <a:spLocks noGrp="1"/>
+          </p:cNvSpPr>
+          <p:nvPr>
+            <p:ph type="sldNum" sz="quarter" idx="5"/>
+          </p:nvPr>
+        </p:nvSpPr>
+        <p:spPr/>
+        <p:txBody>
+          <a:bodyPr/>
+          <a:lstStyle/>
+          <a:p>
+            <a:fld id="{341AEC00-4977-4C47-A11B-52155DC12F54}" type="slidenum">
+              <a:rPr lang="fr-FR" smtClean="0"/>
+              <a:t>3</a:t>
+            </a:fld>
+            <a:endParaRPr lang="fr-FR"/>
+          </a:p>
+        </p:txBody>
+      </p:sp>
+    </p:spTree>
+    <p:extLst>
+      <p:ext uri="{BB962C8B-B14F-4D97-AF65-F5344CB8AC3E}">
+        <p14:creationId xmlns:p14="http://schemas.microsoft.com/office/powerpoint/2010/main" val="2815175346"/>
+      </p:ext>
+    </p:extLst>
+  </p:cSld>
+  <p:clrMapOvr>
+    <a:masterClrMapping/>
+  </p:clrMapOvr>
+</p:notes>
+</file>
+
+<file path=ppt/notesSlides/notesSlide2.xml><?xml version="1.0" encoding="utf-8"?>
+<p:notes xmlns:a="http://schemas.openxmlformats.org/drawingml/2006/main" xmlns:r="http://schemas.openxmlformats.org/officeDocument/2006/relationships" xmlns:p="http://schemas.openxmlformats.org/presentationml/2006/main">
+  <p:cSld>
+    <p:spTree>
+      <p:nvGrpSpPr>
+        <p:cNvPr id="1" name=""/>
+        <p:cNvGrpSpPr/>
+        <p:nvPr/>
+      </p:nvGrpSpPr>
+      <p:grpSpPr>
+        <a:xfrm>
+          <a:off x="0" y="0"/>
+          <a:ext cx="0" cy="0"/>
+          <a:chOff x="0" y="0"/>
+          <a:chExt cx="0" cy="0"/>
+        </a:xfrm>
+      </p:grpSpPr>
+      <p:sp>
+        <p:nvSpPr>
+          <p:cNvPr id="2" name="Espace réservé de l'image des diapositives 1"/>
+          <p:cNvSpPr>
+            <a:spLocks noGrp="1" noRot="1" noChangeAspect="1"/>
+          </p:cNvSpPr>
+          <p:nvPr>
+            <p:ph type="sldImg"/>
+          </p:nvPr>
+        </p:nvSpPr>
+        <p:spPr/>
+      </p:sp>
+      <p:sp>
+        <p:nvSpPr>
+          <p:cNvPr id="3" name="Espace réservé des notes 2"/>
+          <p:cNvSpPr>
+            <a:spLocks noGrp="1"/>
+          </p:cNvSpPr>
+          <p:nvPr>
+            <p:ph type="body" idx="1"/>
+          </p:nvPr>
+        </p:nvSpPr>
+        <p:spPr/>
+        <p:txBody>
+          <a:bodyPr/>
+          <a:lstStyle/>
+          <a:p>
+            <a:pPr marL="0" marR="0" lvl="0" indent="0" algn="l" defTabSz="914400" rtl="0" eaLnBrk="1" fontAlgn="auto" latinLnBrk="0" hangingPunct="1">
+              <a:lnSpc>
+                <a:spcPct val="100000"/>
+              </a:lnSpc>
+              <a:spcBef>
+                <a:spcPts val="0"/>
+              </a:spcBef>
+              <a:spcAft>
+                <a:spcPts val="0"/>
+              </a:spcAft>
+              <a:buClrTx/>
+              <a:buSzTx/>
+              <a:buFontTx/>
+              <a:buNone/>
+              <a:tabLst/>
+              <a:defRPr/>
+            </a:pPr>
+            <a:r>
+              <a:rPr lang="en-US" b="0" dirty="0">
+                <a:solidFill>
+                  <a:srgbClr val="CCCCCC"/>
+                </a:solidFill>
+                <a:effectLst/>
+                <a:highlight>
+                  <a:srgbClr val="1F1F1F"/>
+                </a:highlight>
+                <a:latin typeface="JetBrains Mono" panose="02000009000000000000" pitchFamily="49" charset="0"/>
+              </a:rPr>
+              <a:t>1 6% of duplicated observations</a:t>
+            </a:r>
+          </a:p>
+          <a:p>
+            <a:pPr marL="0" marR="0" lvl="0" indent="0" algn="l" defTabSz="914400" rtl="0" eaLnBrk="1" fontAlgn="auto" latinLnBrk="0" hangingPunct="1">
+              <a:lnSpc>
+                <a:spcPct val="100000"/>
+              </a:lnSpc>
+              <a:spcBef>
+                <a:spcPts val="0"/>
+              </a:spcBef>
+              <a:spcAft>
+                <a:spcPts val="0"/>
+              </a:spcAft>
+              <a:buClrTx/>
+              <a:buSzTx/>
+              <a:buFontTx/>
+              <a:buNone/>
+              <a:tabLst/>
+              <a:defRPr/>
+            </a:pPr>
+            <a:r>
+              <a:rPr lang="en-US" b="0" dirty="0">
+                <a:solidFill>
+                  <a:srgbClr val="CCCCCC"/>
+                </a:solidFill>
+                <a:effectLst/>
+                <a:highlight>
+                  <a:srgbClr val="1F1F1F"/>
+                </a:highlight>
+                <a:latin typeface="JetBrains Mono" panose="02000009000000000000" pitchFamily="49" charset="0"/>
+              </a:rPr>
+              <a:t>2 </a:t>
+            </a:r>
+            <a:r>
+              <a:rPr lang="en-US" b="0" dirty="0" err="1">
+                <a:solidFill>
+                  <a:srgbClr val="CCCCCC"/>
+                </a:solidFill>
+                <a:effectLst/>
+                <a:highlight>
+                  <a:srgbClr val="1F1F1F"/>
+                </a:highlight>
+                <a:latin typeface="JetBrains Mono" panose="02000009000000000000" pitchFamily="49" charset="0"/>
+              </a:rPr>
+              <a:t>total_pages_visited</a:t>
+            </a:r>
+            <a:r>
+              <a:rPr lang="en-US" b="0" dirty="0">
+                <a:solidFill>
+                  <a:srgbClr val="CCCCCC"/>
+                </a:solidFill>
+                <a:effectLst/>
+                <a:highlight>
+                  <a:srgbClr val="1F1F1F"/>
+                </a:highlight>
+                <a:latin typeface="JetBrains Mono" panose="02000009000000000000" pitchFamily="49" charset="0"/>
+              </a:rPr>
+              <a:t> is NOT symmetrical =&gt; 1,5xIQR rather than 3x</a:t>
+            </a:r>
+            <a:r>
+              <a:rPr lang="fr-FR" b="0" dirty="0">
+                <a:solidFill>
+                  <a:srgbClr val="CCCCCC"/>
+                </a:solidFill>
+                <a:effectLst/>
+                <a:highlight>
+                  <a:srgbClr val="1F1F1F"/>
+                </a:highlight>
+                <a:latin typeface="JetBrains Mono" panose="02000009000000000000" pitchFamily="49" charset="0"/>
+              </a:rPr>
+              <a:t>σ</a:t>
+            </a:r>
+            <a:r>
+              <a:rPr lang="en-US" b="0" dirty="0">
+                <a:solidFill>
+                  <a:srgbClr val="CCCCCC"/>
+                </a:solidFill>
+                <a:effectLst/>
+                <a:highlight>
+                  <a:srgbClr val="1F1F1F"/>
+                </a:highlight>
+                <a:latin typeface="JetBrains Mono" panose="02000009000000000000" pitchFamily="49" charset="0"/>
+              </a:rPr>
+              <a:t> </a:t>
+            </a:r>
+          </a:p>
+          <a:p>
+            <a:pPr marL="0" marR="0" lvl="0" indent="0" algn="l" defTabSz="914400" rtl="0" eaLnBrk="1" fontAlgn="auto" latinLnBrk="0" hangingPunct="1">
+              <a:lnSpc>
+                <a:spcPct val="100000"/>
+              </a:lnSpc>
+              <a:spcBef>
+                <a:spcPts val="0"/>
+              </a:spcBef>
+              <a:spcAft>
+                <a:spcPts val="0"/>
+              </a:spcAft>
+              <a:buClrTx/>
+              <a:buSzTx/>
+              <a:buFontTx/>
+              <a:buNone/>
+              <a:tabLst/>
+              <a:defRPr/>
+            </a:pPr>
+            <a:r>
+              <a:rPr lang="en-US" b="0" dirty="0">
+                <a:solidFill>
+                  <a:srgbClr val="CCCCCC"/>
+                </a:solidFill>
+                <a:effectLst/>
+                <a:highlight>
+                  <a:srgbClr val="1F1F1F"/>
+                </a:highlight>
+                <a:latin typeface="JetBrains Mono" panose="02000009000000000000" pitchFamily="49" charset="0"/>
+              </a:rPr>
+              <a:t>3 Correlation between </a:t>
+            </a:r>
+            <a:r>
+              <a:rPr lang="en-US" b="0" dirty="0" err="1">
+                <a:solidFill>
+                  <a:srgbClr val="CCCCCC"/>
+                </a:solidFill>
+                <a:effectLst/>
+                <a:highlight>
+                  <a:srgbClr val="1F1F1F"/>
+                </a:highlight>
+                <a:latin typeface="JetBrains Mono" panose="02000009000000000000" pitchFamily="49" charset="0"/>
+              </a:rPr>
+              <a:t>total_page_visited</a:t>
+            </a:r>
+            <a:r>
+              <a:rPr lang="en-US" b="0" dirty="0">
+                <a:solidFill>
+                  <a:srgbClr val="CCCCCC"/>
+                </a:solidFill>
+                <a:effectLst/>
+                <a:highlight>
+                  <a:srgbClr val="1F1F1F"/>
+                </a:highlight>
+                <a:latin typeface="JetBrains Mono" panose="02000009000000000000" pitchFamily="49" charset="0"/>
+              </a:rPr>
+              <a:t> et converted</a:t>
+            </a:r>
+          </a:p>
+          <a:p>
+            <a:endParaRPr lang="fr-FR" dirty="0"/>
+          </a:p>
+        </p:txBody>
+      </p:sp>
+      <p:sp>
+        <p:nvSpPr>
+          <p:cNvPr id="4" name="Espace réservé du numéro de diapositive 3"/>
+          <p:cNvSpPr>
+            <a:spLocks noGrp="1"/>
+          </p:cNvSpPr>
+          <p:nvPr>
+            <p:ph type="sldNum" sz="quarter" idx="5"/>
+          </p:nvPr>
+        </p:nvSpPr>
+        <p:spPr/>
+        <p:txBody>
+          <a:bodyPr/>
+          <a:lstStyle/>
+          <a:p>
+            <a:fld id="{341AEC00-4977-4C47-A11B-52155DC12F54}" type="slidenum">
+              <a:rPr lang="fr-FR" smtClean="0"/>
+              <a:t>4</a:t>
+            </a:fld>
+            <a:endParaRPr lang="fr-FR"/>
+          </a:p>
+        </p:txBody>
+      </p:sp>
+    </p:spTree>
+    <p:extLst>
+      <p:ext uri="{BB962C8B-B14F-4D97-AF65-F5344CB8AC3E}">
+        <p14:creationId xmlns:p14="http://schemas.microsoft.com/office/powerpoint/2010/main" val="2886274836"/>
+      </p:ext>
+    </p:extLst>
+  </p:cSld>
+  <p:clrMapOvr>
+    <a:masterClrMapping/>
+  </p:clrMapOvr>
+</p:notes>
+</file>
+
+<file path=ppt/notesSlides/notesSlide3.xml><?xml version="1.0" encoding="utf-8"?>
+<p:notes xmlns:a="http://schemas.openxmlformats.org/drawingml/2006/main" xmlns:r="http://schemas.openxmlformats.org/officeDocument/2006/relationships" xmlns:p="http://schemas.openxmlformats.org/presentationml/2006/main">
+  <p:cSld>
+    <p:spTree>
+      <p:nvGrpSpPr>
+        <p:cNvPr id="1" name=""/>
+        <p:cNvGrpSpPr/>
+        <p:nvPr/>
+      </p:nvGrpSpPr>
+      <p:grpSpPr>
+        <a:xfrm>
+          <a:off x="0" y="0"/>
+          <a:ext cx="0" cy="0"/>
+          <a:chOff x="0" y="0"/>
+          <a:chExt cx="0" cy="0"/>
+        </a:xfrm>
+      </p:grpSpPr>
+      <p:sp>
+        <p:nvSpPr>
+          <p:cNvPr id="2" name="Espace réservé de l'image des diapositives 1"/>
+          <p:cNvSpPr>
+            <a:spLocks noGrp="1" noRot="1" noChangeAspect="1"/>
+          </p:cNvSpPr>
+          <p:nvPr>
+            <p:ph type="sldImg"/>
+          </p:nvPr>
+        </p:nvSpPr>
+        <p:spPr/>
+      </p:sp>
+      <p:sp>
+        <p:nvSpPr>
+          <p:cNvPr id="3" name="Espace réservé des notes 2"/>
+          <p:cNvSpPr>
+            <a:spLocks noGrp="1"/>
+          </p:cNvSpPr>
+          <p:nvPr>
+            <p:ph type="body" idx="1"/>
+          </p:nvPr>
+        </p:nvSpPr>
+        <p:spPr/>
+        <p:txBody>
+          <a:bodyPr/>
+          <a:lstStyle/>
+          <a:p>
+            <a:r>
+              <a:rPr lang="en-US" b="0" i="0" dirty="0">
+                <a:solidFill>
+                  <a:srgbClr val="0C0D0E"/>
+                </a:solidFill>
+                <a:effectLst/>
+                <a:latin typeface="-apple-system"/>
+              </a:rPr>
+              <a:t>Pour les </a:t>
+            </a:r>
+            <a:r>
+              <a:rPr lang="en-US" b="1" i="0" dirty="0">
+                <a:solidFill>
+                  <a:srgbClr val="0C0D0E"/>
+                </a:solidFill>
+                <a:effectLst/>
+                <a:latin typeface="-apple-system"/>
+              </a:rPr>
+              <a:t>classifications</a:t>
+            </a:r>
+          </a:p>
+          <a:p>
+            <a:endParaRPr lang="en-US" b="1" i="0" dirty="0">
+              <a:solidFill>
+                <a:srgbClr val="0C0D0E"/>
+              </a:solidFill>
+              <a:effectLst/>
+              <a:latin typeface="-apple-system"/>
+            </a:endParaRPr>
+          </a:p>
+          <a:p>
+            <a:r>
+              <a:rPr lang="en-US" b="0" i="0" dirty="0" err="1">
+                <a:solidFill>
+                  <a:srgbClr val="0C0D0E"/>
+                </a:solidFill>
+                <a:effectLst/>
+                <a:latin typeface="-apple-system"/>
+              </a:rPr>
+              <a:t>C'est</a:t>
+            </a:r>
+            <a:r>
+              <a:rPr lang="en-US" b="0" i="0" dirty="0">
+                <a:solidFill>
+                  <a:srgbClr val="0C0D0E"/>
+                </a:solidFill>
+                <a:effectLst/>
+                <a:latin typeface="-apple-system"/>
+              </a:rPr>
+              <a:t> important de </a:t>
+            </a:r>
+            <a:r>
+              <a:rPr lang="en-US" b="0" i="0" dirty="0" err="1">
+                <a:solidFill>
+                  <a:srgbClr val="0C0D0E"/>
+                </a:solidFill>
+                <a:effectLst/>
+                <a:latin typeface="-apple-system"/>
+              </a:rPr>
+              <a:t>choisir</a:t>
+            </a:r>
+            <a:r>
+              <a:rPr lang="en-US" b="0" i="0" dirty="0">
+                <a:solidFill>
+                  <a:srgbClr val="0C0D0E"/>
+                </a:solidFill>
+                <a:effectLst/>
+                <a:latin typeface="-apple-system"/>
+              </a:rPr>
+              <a:t> </a:t>
+            </a:r>
+            <a:r>
+              <a:rPr lang="en-US" b="0" i="0" dirty="0" err="1">
+                <a:solidFill>
+                  <a:srgbClr val="0C0D0E"/>
+                </a:solidFill>
+                <a:effectLst/>
+                <a:latin typeface="-apple-system"/>
+              </a:rPr>
+              <a:t>si</a:t>
+            </a:r>
+            <a:r>
+              <a:rPr lang="en-US" b="0" i="0" dirty="0">
+                <a:solidFill>
+                  <a:srgbClr val="0C0D0E"/>
+                </a:solidFill>
+                <a:effectLst/>
+                <a:latin typeface="-apple-system"/>
+              </a:rPr>
+              <a:t> on </a:t>
+            </a:r>
+            <a:r>
+              <a:rPr lang="en-US" b="0" i="0" dirty="0" err="1">
+                <a:solidFill>
+                  <a:srgbClr val="0C0D0E"/>
+                </a:solidFill>
+                <a:effectLst/>
+                <a:latin typeface="-apple-system"/>
+              </a:rPr>
+              <a:t>veut</a:t>
+            </a:r>
+            <a:r>
+              <a:rPr lang="en-US" b="0" i="0" dirty="0">
+                <a:solidFill>
+                  <a:srgbClr val="0C0D0E"/>
+                </a:solidFill>
+                <a:effectLst/>
+                <a:latin typeface="-apple-system"/>
+              </a:rPr>
+              <a:t> </a:t>
+            </a:r>
+            <a:r>
+              <a:rPr lang="en-US" b="0" i="0" dirty="0" err="1">
+                <a:solidFill>
+                  <a:srgbClr val="0C0D0E"/>
+                </a:solidFill>
+                <a:effectLst/>
+                <a:latin typeface="-apple-system"/>
+              </a:rPr>
+              <a:t>favoriser</a:t>
+            </a:r>
+            <a:r>
+              <a:rPr lang="en-US" b="0" i="0" dirty="0">
+                <a:solidFill>
+                  <a:srgbClr val="0C0D0E"/>
+                </a:solidFill>
+                <a:effectLst/>
+                <a:latin typeface="-apple-system"/>
+              </a:rPr>
+              <a:t> le Recall </a:t>
+            </a:r>
+            <a:r>
+              <a:rPr lang="en-US" b="0" i="0" dirty="0" err="1">
+                <a:solidFill>
+                  <a:srgbClr val="0C0D0E"/>
+                </a:solidFill>
+                <a:effectLst/>
+                <a:latin typeface="-apple-system"/>
+              </a:rPr>
+              <a:t>ou</a:t>
+            </a:r>
+            <a:r>
+              <a:rPr lang="en-US" b="0" i="0" dirty="0">
+                <a:solidFill>
+                  <a:srgbClr val="0C0D0E"/>
+                </a:solidFill>
+                <a:effectLst/>
+                <a:latin typeface="-apple-system"/>
+              </a:rPr>
+              <a:t> la Precision car </a:t>
+            </a:r>
+            <a:r>
+              <a:rPr lang="en-US" b="0" i="0" dirty="0" err="1">
+                <a:solidFill>
+                  <a:srgbClr val="0C0D0E"/>
+                </a:solidFill>
+                <a:effectLst/>
+                <a:latin typeface="-apple-system"/>
+              </a:rPr>
+              <a:t>c'est</a:t>
+            </a:r>
+            <a:r>
+              <a:rPr lang="en-US" b="0" i="0" dirty="0">
+                <a:solidFill>
+                  <a:srgbClr val="0C0D0E"/>
+                </a:solidFill>
+                <a:effectLst/>
+                <a:latin typeface="-apple-system"/>
+              </a:rPr>
+              <a:t> le </a:t>
+            </a:r>
+            <a:r>
+              <a:rPr lang="en-US" b="0" i="0" dirty="0" err="1">
+                <a:solidFill>
+                  <a:srgbClr val="0C0D0E"/>
+                </a:solidFill>
+                <a:effectLst/>
+                <a:latin typeface="-apple-system"/>
+              </a:rPr>
+              <a:t>métrique</a:t>
+            </a:r>
+            <a:r>
+              <a:rPr lang="en-US" b="0" i="0" dirty="0">
+                <a:solidFill>
+                  <a:srgbClr val="0C0D0E"/>
+                </a:solidFill>
+                <a:effectLst/>
+                <a:latin typeface="-apple-system"/>
+              </a:rPr>
+              <a:t> </a:t>
+            </a:r>
+            <a:r>
+              <a:rPr lang="en-US" b="0" i="0" dirty="0" err="1">
+                <a:solidFill>
+                  <a:srgbClr val="0C0D0E"/>
+                </a:solidFill>
+                <a:effectLst/>
+                <a:latin typeface="-apple-system"/>
+              </a:rPr>
+              <a:t>dont</a:t>
+            </a:r>
+            <a:r>
+              <a:rPr lang="en-US" b="0" i="0" dirty="0">
+                <a:solidFill>
+                  <a:srgbClr val="0C0D0E"/>
+                </a:solidFill>
+                <a:effectLst/>
+                <a:latin typeface="-apple-system"/>
+              </a:rPr>
+              <a:t> on </a:t>
+            </a:r>
+            <a:r>
+              <a:rPr lang="en-US" b="0" i="0" dirty="0" err="1">
+                <a:solidFill>
+                  <a:srgbClr val="0C0D0E"/>
+                </a:solidFill>
+                <a:effectLst/>
+                <a:latin typeface="-apple-system"/>
+              </a:rPr>
+              <a:t>va</a:t>
+            </a:r>
+            <a:r>
+              <a:rPr lang="en-US" b="0" i="0" dirty="0">
+                <a:solidFill>
+                  <a:srgbClr val="0C0D0E"/>
+                </a:solidFill>
+                <a:effectLst/>
+                <a:latin typeface="-apple-system"/>
+              </a:rPr>
+              <a:t> </a:t>
+            </a:r>
+            <a:r>
+              <a:rPr lang="en-US" b="0" i="0" dirty="0" err="1">
+                <a:solidFill>
+                  <a:srgbClr val="0C0D0E"/>
+                </a:solidFill>
+                <a:effectLst/>
+                <a:latin typeface="-apple-system"/>
+              </a:rPr>
+              <a:t>suivre</a:t>
+            </a:r>
+            <a:r>
+              <a:rPr lang="en-US" b="0" i="0" dirty="0">
+                <a:solidFill>
+                  <a:srgbClr val="0C0D0E"/>
+                </a:solidFill>
+                <a:effectLst/>
+                <a:latin typeface="-apple-system"/>
+              </a:rPr>
+              <a:t> </a:t>
+            </a:r>
+            <a:r>
+              <a:rPr lang="en-US" b="0" i="0" dirty="0" err="1">
+                <a:solidFill>
+                  <a:srgbClr val="0C0D0E"/>
+                </a:solidFill>
+                <a:effectLst/>
+                <a:latin typeface="-apple-system"/>
+              </a:rPr>
+              <a:t>l'évolue</a:t>
+            </a:r>
+            <a:r>
+              <a:rPr lang="en-US" b="0" i="0" dirty="0">
+                <a:solidFill>
+                  <a:srgbClr val="0C0D0E"/>
+                </a:solidFill>
+                <a:effectLst/>
+                <a:latin typeface="-apple-system"/>
+              </a:rPr>
+              <a:t> </a:t>
+            </a:r>
+            <a:r>
+              <a:rPr lang="en-US" b="0" i="0" dirty="0" err="1">
+                <a:solidFill>
+                  <a:srgbClr val="0C0D0E"/>
+                </a:solidFill>
+                <a:effectLst/>
+                <a:latin typeface="-apple-system"/>
+              </a:rPr>
+              <a:t>lors</a:t>
+            </a:r>
+            <a:r>
+              <a:rPr lang="en-US" b="0" i="0" dirty="0">
+                <a:solidFill>
+                  <a:srgbClr val="0C0D0E"/>
+                </a:solidFill>
+                <a:effectLst/>
+                <a:latin typeface="-apple-system"/>
+              </a:rPr>
+              <a:t> des runs </a:t>
+            </a:r>
+            <a:r>
+              <a:rPr lang="en-US" b="0" i="0" dirty="0" err="1">
+                <a:solidFill>
+                  <a:srgbClr val="0C0D0E"/>
+                </a:solidFill>
+                <a:effectLst/>
+                <a:latin typeface="-apple-system"/>
+              </a:rPr>
+              <a:t>successifs</a:t>
+            </a:r>
+            <a:endParaRPr lang="en-US" b="0" i="0" dirty="0">
+              <a:solidFill>
+                <a:srgbClr val="0C0D0E"/>
+              </a:solidFill>
+              <a:effectLst/>
+              <a:latin typeface="-apple-system"/>
+            </a:endParaRPr>
+          </a:p>
+          <a:p>
+            <a:r>
+              <a:rPr lang="en-US" b="0" i="0" dirty="0">
+                <a:solidFill>
+                  <a:srgbClr val="0C0D0E"/>
+                </a:solidFill>
+                <a:effectLst/>
+                <a:latin typeface="-apple-system"/>
+              </a:rPr>
+              <a:t>Si on </a:t>
+            </a:r>
+            <a:r>
+              <a:rPr lang="en-US" b="0" i="0" dirty="0" err="1">
+                <a:solidFill>
+                  <a:srgbClr val="0C0D0E"/>
+                </a:solidFill>
+                <a:effectLst/>
+                <a:latin typeface="-apple-system"/>
+              </a:rPr>
+              <a:t>veut</a:t>
+            </a:r>
+            <a:r>
+              <a:rPr lang="en-US" b="0" i="0" dirty="0">
+                <a:solidFill>
+                  <a:srgbClr val="0C0D0E"/>
+                </a:solidFill>
+                <a:effectLst/>
+                <a:latin typeface="-apple-system"/>
+              </a:rPr>
+              <a:t> pas </a:t>
+            </a:r>
+            <a:r>
+              <a:rPr lang="en-US" b="0" i="0" dirty="0" err="1">
+                <a:solidFill>
+                  <a:srgbClr val="0C0D0E"/>
+                </a:solidFill>
+                <a:effectLst/>
+                <a:latin typeface="-apple-system"/>
+              </a:rPr>
+              <a:t>choisir</a:t>
+            </a:r>
+            <a:r>
+              <a:rPr lang="en-US" b="0" i="0" dirty="0">
+                <a:solidFill>
+                  <a:srgbClr val="0C0D0E"/>
+                </a:solidFill>
+                <a:effectLst/>
+                <a:latin typeface="-apple-system"/>
+              </a:rPr>
+              <a:t> entre Precision et Recall, prendre F1 Score</a:t>
+            </a:r>
+          </a:p>
+          <a:p>
+            <a:endParaRPr lang="en-US" b="0" i="0" dirty="0">
+              <a:solidFill>
+                <a:srgbClr val="0C0D0E"/>
+              </a:solidFill>
+              <a:effectLst/>
+              <a:latin typeface="-apple-system"/>
+            </a:endParaRPr>
+          </a:p>
+          <a:p>
+            <a:r>
+              <a:rPr lang="en-US" b="1" i="0" dirty="0">
+                <a:solidFill>
+                  <a:srgbClr val="0C0D0E"/>
+                </a:solidFill>
+                <a:effectLst/>
+                <a:latin typeface="-apple-system"/>
+              </a:rPr>
+              <a:t>Recall</a:t>
+            </a:r>
+            <a:r>
+              <a:rPr lang="en-US" b="0" i="0" dirty="0">
+                <a:solidFill>
+                  <a:srgbClr val="0C0D0E"/>
+                </a:solidFill>
+                <a:effectLst/>
+                <a:latin typeface="-apple-system"/>
+              </a:rPr>
+              <a:t> means to bring back or remember. </a:t>
+            </a:r>
+          </a:p>
+          <a:p>
+            <a:r>
+              <a:rPr lang="en-US" b="0" i="0" dirty="0">
+                <a:solidFill>
+                  <a:srgbClr val="0C0D0E"/>
+                </a:solidFill>
+                <a:effectLst/>
+                <a:latin typeface="-apple-system"/>
+              </a:rPr>
+              <a:t>The terminology comes from information retrieval where it's usually being applied to a result set from a query. </a:t>
+            </a:r>
+          </a:p>
+          <a:p>
+            <a:r>
+              <a:rPr lang="en-US" b="0" i="0" dirty="0">
+                <a:solidFill>
+                  <a:srgbClr val="0C0D0E"/>
+                </a:solidFill>
+                <a:effectLst/>
+                <a:latin typeface="-apple-system"/>
+              </a:rPr>
+              <a:t>The sense of it is : how much of the set of right answers was retrieved by the query? How much of it was recalled?</a:t>
+            </a:r>
+          </a:p>
+          <a:p>
+            <a:endParaRPr lang="en-US" b="0" i="0" dirty="0">
+              <a:solidFill>
+                <a:srgbClr val="0C0D0E"/>
+              </a:solidFill>
+              <a:effectLst/>
+              <a:latin typeface="-apple-system"/>
+            </a:endParaRPr>
+          </a:p>
+          <a:p>
+            <a:r>
+              <a:rPr lang="en-US" b="0" i="0" dirty="0">
+                <a:solidFill>
+                  <a:srgbClr val="0C0D0E"/>
+                </a:solidFill>
+                <a:effectLst/>
+                <a:latin typeface="-apple-system"/>
+              </a:rPr>
+              <a:t>Pour les medicaments</a:t>
+            </a:r>
+          </a:p>
+          <a:p>
+            <a:r>
+              <a:rPr lang="fr-FR" b="0" dirty="0" err="1">
+                <a:solidFill>
+                  <a:srgbClr val="CCCCCC"/>
+                </a:solidFill>
+                <a:effectLst/>
+                <a:latin typeface="JetBrains Mono" panose="02000009000000000000" pitchFamily="49" charset="0"/>
+              </a:rPr>
+              <a:t>Precision</a:t>
+            </a:r>
+            <a:r>
+              <a:rPr lang="fr-FR" b="0" dirty="0">
+                <a:solidFill>
+                  <a:srgbClr val="CCCCCC"/>
+                </a:solidFill>
+                <a:effectLst/>
+                <a:latin typeface="JetBrains Mono" panose="02000009000000000000" pitchFamily="49" charset="0"/>
+              </a:rPr>
+              <a:t> :</a:t>
+            </a:r>
+          </a:p>
+          <a:p>
+            <a:r>
+              <a:rPr lang="fr-FR" b="0" dirty="0">
+                <a:solidFill>
+                  <a:srgbClr val="6796E6"/>
+                </a:solidFill>
+                <a:effectLst/>
+                <a:latin typeface="JetBrains Mono" panose="02000009000000000000" pitchFamily="49" charset="0"/>
+              </a:rPr>
+              <a:t>*</a:t>
+            </a:r>
+            <a:r>
+              <a:rPr lang="fr-FR" b="0" dirty="0">
+                <a:solidFill>
+                  <a:srgbClr val="CCCCCC"/>
+                </a:solidFill>
+                <a:effectLst/>
+                <a:latin typeface="JetBrains Mono" panose="02000009000000000000" pitchFamily="49" charset="0"/>
+              </a:rPr>
+              <a:t> colonne de </a:t>
+            </a:r>
+            <a:r>
+              <a:rPr lang="fr-FR" b="0" dirty="0" err="1">
+                <a:solidFill>
+                  <a:srgbClr val="CCCCCC"/>
+                </a:solidFill>
+                <a:effectLst/>
+                <a:latin typeface="JetBrains Mono" panose="02000009000000000000" pitchFamily="49" charset="0"/>
+              </a:rPr>
+              <a:t>dtorite</a:t>
+            </a:r>
+            <a:endParaRPr lang="fr-FR" b="0" dirty="0">
+              <a:solidFill>
+                <a:srgbClr val="CCCCCC"/>
+              </a:solidFill>
+              <a:effectLst/>
+              <a:latin typeface="JetBrains Mono" panose="02000009000000000000" pitchFamily="49" charset="0"/>
+            </a:endParaRPr>
+          </a:p>
+          <a:p>
+            <a:r>
+              <a:rPr lang="fr-FR" b="0" dirty="0">
+                <a:solidFill>
+                  <a:srgbClr val="6796E6"/>
+                </a:solidFill>
+                <a:effectLst/>
+                <a:latin typeface="JetBrains Mono" panose="02000009000000000000" pitchFamily="49" charset="0"/>
+              </a:rPr>
+              <a:t>*</a:t>
+            </a:r>
+            <a:r>
+              <a:rPr lang="fr-FR" b="0" dirty="0">
+                <a:solidFill>
+                  <a:srgbClr val="CCCCCC"/>
+                </a:solidFill>
+                <a:effectLst/>
+                <a:latin typeface="JetBrains Mono" panose="02000009000000000000" pitchFamily="49" charset="0"/>
+              </a:rPr>
+              <a:t> $</a:t>
+            </a:r>
+            <a:r>
+              <a:rPr lang="fr-FR" b="0" dirty="0">
+                <a:solidFill>
+                  <a:srgbClr val="D4D4D4"/>
+                </a:solidFill>
+                <a:effectLst/>
+                <a:latin typeface="JetBrains Mono" panose="02000009000000000000" pitchFamily="49" charset="0"/>
+              </a:rPr>
+              <a:t> </a:t>
+            </a:r>
+            <a:r>
+              <a:rPr lang="fr-FR" b="0" dirty="0">
+                <a:solidFill>
+                  <a:srgbClr val="569CD6"/>
+                </a:solidFill>
+                <a:effectLst/>
+                <a:latin typeface="JetBrains Mono" panose="02000009000000000000" pitchFamily="49" charset="0"/>
+              </a:rPr>
+              <a:t>\</a:t>
+            </a:r>
+            <a:r>
+              <a:rPr lang="fr-FR" b="0" dirty="0" err="1">
+                <a:solidFill>
+                  <a:srgbClr val="DCDCAA"/>
+                </a:solidFill>
+                <a:effectLst/>
+                <a:latin typeface="JetBrains Mono" panose="02000009000000000000" pitchFamily="49" charset="0"/>
+              </a:rPr>
+              <a:t>text</a:t>
+            </a:r>
+            <a:r>
+              <a:rPr lang="fr-FR" b="0" dirty="0">
+                <a:solidFill>
+                  <a:srgbClr val="D4D4D4"/>
+                </a:solidFill>
+                <a:effectLst/>
+                <a:latin typeface="JetBrains Mono" panose="02000009000000000000" pitchFamily="49" charset="0"/>
+              </a:rPr>
+              <a:t>{</a:t>
+            </a:r>
+            <a:r>
+              <a:rPr lang="fr-FR" b="0" dirty="0" err="1">
+                <a:solidFill>
+                  <a:srgbClr val="D4D4D4"/>
+                </a:solidFill>
+                <a:effectLst/>
+                <a:latin typeface="JetBrains Mono" panose="02000009000000000000" pitchFamily="49" charset="0"/>
+              </a:rPr>
+              <a:t>Precision</a:t>
+            </a:r>
+            <a:r>
+              <a:rPr lang="fr-FR" b="0" dirty="0">
+                <a:solidFill>
+                  <a:srgbClr val="D4D4D4"/>
+                </a:solidFill>
+                <a:effectLst/>
+                <a:latin typeface="JetBrains Mono" panose="02000009000000000000" pitchFamily="49" charset="0"/>
+              </a:rPr>
+              <a:t>}  = </a:t>
+            </a:r>
+            <a:r>
+              <a:rPr lang="fr-FR" b="0" dirty="0">
+                <a:solidFill>
+                  <a:srgbClr val="569CD6"/>
+                </a:solidFill>
+                <a:effectLst/>
+                <a:latin typeface="JetBrains Mono" panose="02000009000000000000" pitchFamily="49" charset="0"/>
+              </a:rPr>
+              <a:t>\</a:t>
+            </a:r>
+            <a:r>
+              <a:rPr lang="fr-FR" b="0" dirty="0">
+                <a:solidFill>
+                  <a:srgbClr val="DCDCAA"/>
+                </a:solidFill>
+                <a:effectLst/>
+                <a:latin typeface="JetBrains Mono" panose="02000009000000000000" pitchFamily="49" charset="0"/>
+              </a:rPr>
+              <a:t>frac</a:t>
+            </a:r>
+            <a:r>
+              <a:rPr lang="fr-FR" b="0" dirty="0">
+                <a:solidFill>
+                  <a:srgbClr val="D4D4D4"/>
+                </a:solidFill>
+                <a:effectLst/>
+                <a:latin typeface="JetBrains Mono" panose="02000009000000000000" pitchFamily="49" charset="0"/>
+              </a:rPr>
+              <a:t>{TP}{TP+FP}</a:t>
+            </a:r>
+            <a:r>
+              <a:rPr lang="fr-FR" b="0" dirty="0">
+                <a:solidFill>
+                  <a:srgbClr val="CCCCCC"/>
+                </a:solidFill>
+                <a:effectLst/>
+                <a:latin typeface="JetBrains Mono" panose="02000009000000000000" pitchFamily="49" charset="0"/>
+              </a:rPr>
+              <a:t>$</a:t>
+            </a:r>
+          </a:p>
+          <a:p>
+            <a:br>
+              <a:rPr lang="fr-FR" b="0" dirty="0">
+                <a:solidFill>
+                  <a:srgbClr val="CCCCCC"/>
+                </a:solidFill>
+                <a:effectLst/>
+                <a:latin typeface="JetBrains Mono" panose="02000009000000000000" pitchFamily="49" charset="0"/>
+              </a:rPr>
+            </a:br>
+            <a:r>
+              <a:rPr lang="fr-FR" b="0" dirty="0" err="1">
+                <a:solidFill>
+                  <a:srgbClr val="CCCCCC"/>
+                </a:solidFill>
+                <a:effectLst/>
+                <a:latin typeface="JetBrains Mono" panose="02000009000000000000" pitchFamily="49" charset="0"/>
+              </a:rPr>
+              <a:t>Recall</a:t>
+            </a:r>
+            <a:r>
+              <a:rPr lang="fr-FR" b="0" dirty="0">
+                <a:solidFill>
+                  <a:srgbClr val="CCCCCC"/>
+                </a:solidFill>
+                <a:effectLst/>
+                <a:latin typeface="JetBrains Mono" panose="02000009000000000000" pitchFamily="49" charset="0"/>
+              </a:rPr>
+              <a:t> : </a:t>
+            </a:r>
+          </a:p>
+          <a:p>
+            <a:r>
+              <a:rPr lang="fr-FR" b="0" dirty="0">
+                <a:solidFill>
+                  <a:srgbClr val="6796E6"/>
+                </a:solidFill>
+                <a:effectLst/>
+                <a:latin typeface="JetBrains Mono" panose="02000009000000000000" pitchFamily="49" charset="0"/>
+              </a:rPr>
+              <a:t>*</a:t>
+            </a:r>
+            <a:r>
+              <a:rPr lang="fr-FR" b="0" dirty="0">
+                <a:solidFill>
+                  <a:srgbClr val="CCCCCC"/>
+                </a:solidFill>
+                <a:effectLst/>
+                <a:latin typeface="JetBrains Mono" panose="02000009000000000000" pitchFamily="49" charset="0"/>
+              </a:rPr>
+              <a:t> ligne du bas</a:t>
+            </a:r>
+          </a:p>
+          <a:p>
+            <a:r>
+              <a:rPr lang="fr-FR" b="0" dirty="0">
+                <a:solidFill>
+                  <a:srgbClr val="6796E6"/>
+                </a:solidFill>
+                <a:effectLst/>
+                <a:latin typeface="JetBrains Mono" panose="02000009000000000000" pitchFamily="49" charset="0"/>
+              </a:rPr>
+              <a:t>*</a:t>
+            </a:r>
+            <a:r>
+              <a:rPr lang="fr-FR" b="0" dirty="0">
+                <a:solidFill>
+                  <a:srgbClr val="CCCCCC"/>
+                </a:solidFill>
+                <a:effectLst/>
+                <a:latin typeface="JetBrains Mono" panose="02000009000000000000" pitchFamily="49" charset="0"/>
+              </a:rPr>
+              <a:t> $</a:t>
+            </a:r>
+            <a:r>
+              <a:rPr lang="fr-FR" b="0" dirty="0">
+                <a:solidFill>
+                  <a:srgbClr val="D4D4D4"/>
+                </a:solidFill>
+                <a:effectLst/>
+                <a:latin typeface="JetBrains Mono" panose="02000009000000000000" pitchFamily="49" charset="0"/>
+              </a:rPr>
+              <a:t> </a:t>
+            </a:r>
+            <a:r>
+              <a:rPr lang="fr-FR" b="0" dirty="0">
+                <a:solidFill>
+                  <a:srgbClr val="569CD6"/>
+                </a:solidFill>
+                <a:effectLst/>
+                <a:latin typeface="JetBrains Mono" panose="02000009000000000000" pitchFamily="49" charset="0"/>
+              </a:rPr>
+              <a:t>\</a:t>
+            </a:r>
+            <a:r>
+              <a:rPr lang="fr-FR" b="0" dirty="0" err="1">
+                <a:solidFill>
+                  <a:srgbClr val="DCDCAA"/>
+                </a:solidFill>
+                <a:effectLst/>
+                <a:latin typeface="JetBrains Mono" panose="02000009000000000000" pitchFamily="49" charset="0"/>
+              </a:rPr>
+              <a:t>text</a:t>
+            </a:r>
+            <a:r>
+              <a:rPr lang="fr-FR" b="0" dirty="0">
+                <a:solidFill>
+                  <a:srgbClr val="D4D4D4"/>
+                </a:solidFill>
+                <a:effectLst/>
+                <a:latin typeface="JetBrains Mono" panose="02000009000000000000" pitchFamily="49" charset="0"/>
+              </a:rPr>
+              <a:t>{</a:t>
+            </a:r>
+            <a:r>
+              <a:rPr lang="fr-FR" b="0" dirty="0" err="1">
+                <a:solidFill>
+                  <a:srgbClr val="D4D4D4"/>
+                </a:solidFill>
+                <a:effectLst/>
+                <a:latin typeface="JetBrains Mono" panose="02000009000000000000" pitchFamily="49" charset="0"/>
+              </a:rPr>
+              <a:t>Recall</a:t>
+            </a:r>
+            <a:r>
+              <a:rPr lang="fr-FR" b="0" dirty="0">
+                <a:solidFill>
+                  <a:srgbClr val="D4D4D4"/>
+                </a:solidFill>
+                <a:effectLst/>
+                <a:latin typeface="JetBrains Mono" panose="02000009000000000000" pitchFamily="49" charset="0"/>
+              </a:rPr>
+              <a:t>} = </a:t>
+            </a:r>
+            <a:r>
+              <a:rPr lang="fr-FR" b="0" dirty="0">
+                <a:solidFill>
+                  <a:srgbClr val="569CD6"/>
+                </a:solidFill>
+                <a:effectLst/>
+                <a:latin typeface="JetBrains Mono" panose="02000009000000000000" pitchFamily="49" charset="0"/>
+              </a:rPr>
+              <a:t>\</a:t>
+            </a:r>
+            <a:r>
+              <a:rPr lang="fr-FR" b="0" dirty="0">
+                <a:solidFill>
+                  <a:srgbClr val="DCDCAA"/>
+                </a:solidFill>
+                <a:effectLst/>
+                <a:latin typeface="JetBrains Mono" panose="02000009000000000000" pitchFamily="49" charset="0"/>
+              </a:rPr>
+              <a:t>frac</a:t>
+            </a:r>
+            <a:r>
+              <a:rPr lang="fr-FR" b="0" dirty="0">
+                <a:solidFill>
+                  <a:srgbClr val="D4D4D4"/>
+                </a:solidFill>
+                <a:effectLst/>
+                <a:latin typeface="JetBrains Mono" panose="02000009000000000000" pitchFamily="49" charset="0"/>
+              </a:rPr>
+              <a:t>{TP}{TP+FN}</a:t>
+            </a:r>
+            <a:r>
+              <a:rPr lang="fr-FR" b="0" dirty="0">
+                <a:solidFill>
+                  <a:srgbClr val="CCCCCC"/>
+                </a:solidFill>
+                <a:effectLst/>
+                <a:latin typeface="JetBrains Mono" panose="02000009000000000000" pitchFamily="49" charset="0"/>
+              </a:rPr>
+              <a:t>$</a:t>
+            </a:r>
+          </a:p>
+          <a:p>
+            <a:br>
+              <a:rPr lang="fr-FR" b="0" dirty="0">
+                <a:solidFill>
+                  <a:srgbClr val="CCCCCC"/>
+                </a:solidFill>
+                <a:effectLst/>
+                <a:latin typeface="JetBrains Mono" panose="02000009000000000000" pitchFamily="49" charset="0"/>
+              </a:rPr>
+            </a:br>
+            <a:r>
+              <a:rPr lang="fr-FR" b="0" dirty="0" err="1">
+                <a:solidFill>
+                  <a:srgbClr val="CCCCCC"/>
+                </a:solidFill>
+                <a:effectLst/>
+                <a:latin typeface="JetBrains Mono" panose="02000009000000000000" pitchFamily="49" charset="0"/>
+              </a:rPr>
+              <a:t>Sensitivity</a:t>
+            </a:r>
+            <a:r>
+              <a:rPr lang="fr-FR" b="0" dirty="0">
+                <a:solidFill>
+                  <a:srgbClr val="CCCCCC"/>
+                </a:solidFill>
+                <a:effectLst/>
+                <a:latin typeface="JetBrains Mono" panose="02000009000000000000" pitchFamily="49" charset="0"/>
+              </a:rPr>
+              <a:t> = </a:t>
+            </a:r>
+            <a:r>
+              <a:rPr lang="fr-FR" b="0" dirty="0" err="1">
+                <a:solidFill>
+                  <a:srgbClr val="CCCCCC"/>
+                </a:solidFill>
+                <a:effectLst/>
+                <a:latin typeface="JetBrains Mono" panose="02000009000000000000" pitchFamily="49" charset="0"/>
+              </a:rPr>
+              <a:t>Recall</a:t>
+            </a:r>
+            <a:endParaRPr lang="fr-FR" b="0" dirty="0">
+              <a:solidFill>
+                <a:srgbClr val="CCCCCC"/>
+              </a:solidFill>
+              <a:effectLst/>
+              <a:latin typeface="JetBrains Mono" panose="02000009000000000000" pitchFamily="49" charset="0"/>
+            </a:endParaRPr>
+          </a:p>
+          <a:p>
+            <a:r>
+              <a:rPr lang="fr-FR" b="0" dirty="0">
+                <a:solidFill>
+                  <a:srgbClr val="6796E6"/>
+                </a:solidFill>
+                <a:effectLst/>
+                <a:latin typeface="JetBrains Mono" panose="02000009000000000000" pitchFamily="49" charset="0"/>
+              </a:rPr>
+              <a:t>*</a:t>
+            </a:r>
+            <a:r>
+              <a:rPr lang="fr-FR" b="0" dirty="0">
+                <a:solidFill>
+                  <a:srgbClr val="CCCCCC"/>
+                </a:solidFill>
+                <a:effectLst/>
+                <a:latin typeface="JetBrains Mono" panose="02000009000000000000" pitchFamily="49" charset="0"/>
+              </a:rPr>
+              <a:t> ligne du bas</a:t>
+            </a:r>
+          </a:p>
+          <a:p>
+            <a:r>
+              <a:rPr lang="fr-FR" b="0" dirty="0">
+                <a:solidFill>
+                  <a:srgbClr val="6796E6"/>
+                </a:solidFill>
+                <a:effectLst/>
+                <a:latin typeface="JetBrains Mono" panose="02000009000000000000" pitchFamily="49" charset="0"/>
+              </a:rPr>
+              <a:t>*</a:t>
+            </a:r>
+            <a:r>
+              <a:rPr lang="fr-FR" b="0" dirty="0">
+                <a:solidFill>
+                  <a:srgbClr val="CCCCCC"/>
+                </a:solidFill>
+                <a:effectLst/>
+                <a:latin typeface="JetBrains Mono" panose="02000009000000000000" pitchFamily="49" charset="0"/>
+              </a:rPr>
+              <a:t> $</a:t>
+            </a:r>
+            <a:r>
+              <a:rPr lang="fr-FR" b="0" dirty="0">
+                <a:solidFill>
+                  <a:srgbClr val="D4D4D4"/>
+                </a:solidFill>
+                <a:effectLst/>
+                <a:latin typeface="JetBrains Mono" panose="02000009000000000000" pitchFamily="49" charset="0"/>
+              </a:rPr>
+              <a:t> </a:t>
+            </a:r>
+            <a:r>
+              <a:rPr lang="fr-FR" b="0" dirty="0">
+                <a:solidFill>
+                  <a:srgbClr val="569CD6"/>
+                </a:solidFill>
+                <a:effectLst/>
+                <a:latin typeface="JetBrains Mono" panose="02000009000000000000" pitchFamily="49" charset="0"/>
+              </a:rPr>
+              <a:t>\</a:t>
+            </a:r>
+            <a:r>
+              <a:rPr lang="fr-FR" b="0" dirty="0" err="1">
+                <a:solidFill>
+                  <a:srgbClr val="DCDCAA"/>
+                </a:solidFill>
+                <a:effectLst/>
+                <a:latin typeface="JetBrains Mono" panose="02000009000000000000" pitchFamily="49" charset="0"/>
+              </a:rPr>
+              <a:t>text</a:t>
+            </a:r>
+            <a:r>
+              <a:rPr lang="fr-FR" b="0" dirty="0">
+                <a:solidFill>
+                  <a:srgbClr val="D4D4D4"/>
+                </a:solidFill>
+                <a:effectLst/>
+                <a:latin typeface="JetBrains Mono" panose="02000009000000000000" pitchFamily="49" charset="0"/>
+              </a:rPr>
+              <a:t>{</a:t>
+            </a:r>
+            <a:r>
+              <a:rPr lang="fr-FR" b="0" dirty="0" err="1">
+                <a:solidFill>
+                  <a:srgbClr val="D4D4D4"/>
+                </a:solidFill>
+                <a:effectLst/>
+                <a:latin typeface="JetBrains Mono" panose="02000009000000000000" pitchFamily="49" charset="0"/>
+              </a:rPr>
+              <a:t>Sensitivity</a:t>
+            </a:r>
+            <a:r>
+              <a:rPr lang="fr-FR" b="0" dirty="0">
+                <a:solidFill>
+                  <a:srgbClr val="D4D4D4"/>
+                </a:solidFill>
+                <a:effectLst/>
+                <a:latin typeface="JetBrains Mono" panose="02000009000000000000" pitchFamily="49" charset="0"/>
+              </a:rPr>
+              <a:t>} = </a:t>
+            </a:r>
+            <a:r>
+              <a:rPr lang="fr-FR" b="0" dirty="0">
+                <a:solidFill>
+                  <a:srgbClr val="569CD6"/>
+                </a:solidFill>
+                <a:effectLst/>
+                <a:latin typeface="JetBrains Mono" panose="02000009000000000000" pitchFamily="49" charset="0"/>
+              </a:rPr>
+              <a:t>\</a:t>
+            </a:r>
+            <a:r>
+              <a:rPr lang="fr-FR" b="0" dirty="0">
+                <a:solidFill>
+                  <a:srgbClr val="DCDCAA"/>
+                </a:solidFill>
+                <a:effectLst/>
+                <a:latin typeface="JetBrains Mono" panose="02000009000000000000" pitchFamily="49" charset="0"/>
+              </a:rPr>
+              <a:t>frac</a:t>
+            </a:r>
+            <a:r>
+              <a:rPr lang="fr-FR" b="0" dirty="0">
+                <a:solidFill>
+                  <a:srgbClr val="D4D4D4"/>
+                </a:solidFill>
+                <a:effectLst/>
+                <a:latin typeface="JetBrains Mono" panose="02000009000000000000" pitchFamily="49" charset="0"/>
+              </a:rPr>
+              <a:t>{TP}{TP+FN}</a:t>
+            </a:r>
+            <a:r>
+              <a:rPr lang="fr-FR" b="0" dirty="0">
+                <a:solidFill>
+                  <a:srgbClr val="CCCCCC"/>
+                </a:solidFill>
+                <a:effectLst/>
+                <a:latin typeface="JetBrains Mono" panose="02000009000000000000" pitchFamily="49" charset="0"/>
+              </a:rPr>
+              <a:t>$</a:t>
+            </a:r>
+          </a:p>
+          <a:p>
+            <a:br>
+              <a:rPr lang="fr-FR" b="0" dirty="0">
+                <a:solidFill>
+                  <a:srgbClr val="CCCCCC"/>
+                </a:solidFill>
+                <a:effectLst/>
+                <a:latin typeface="JetBrains Mono" panose="02000009000000000000" pitchFamily="49" charset="0"/>
+              </a:rPr>
+            </a:br>
+            <a:r>
+              <a:rPr lang="fr-FR" b="0" dirty="0" err="1">
+                <a:solidFill>
+                  <a:srgbClr val="CCCCCC"/>
+                </a:solidFill>
+                <a:effectLst/>
+                <a:latin typeface="JetBrains Mono" panose="02000009000000000000" pitchFamily="49" charset="0"/>
+              </a:rPr>
+              <a:t>Specificity</a:t>
+            </a:r>
+            <a:r>
+              <a:rPr lang="fr-FR" b="0" dirty="0">
+                <a:solidFill>
+                  <a:srgbClr val="CCCCCC"/>
+                </a:solidFill>
+                <a:effectLst/>
+                <a:latin typeface="JetBrains Mono" panose="02000009000000000000" pitchFamily="49" charset="0"/>
+              </a:rPr>
+              <a:t> :</a:t>
+            </a:r>
+          </a:p>
+          <a:p>
+            <a:r>
+              <a:rPr lang="fr-FR" b="0" dirty="0">
+                <a:solidFill>
+                  <a:srgbClr val="6796E6"/>
+                </a:solidFill>
+                <a:effectLst/>
+                <a:latin typeface="JetBrains Mono" panose="02000009000000000000" pitchFamily="49" charset="0"/>
+              </a:rPr>
+              <a:t>*</a:t>
+            </a:r>
+            <a:r>
+              <a:rPr lang="fr-FR" b="0" dirty="0">
+                <a:solidFill>
+                  <a:srgbClr val="CCCCCC"/>
+                </a:solidFill>
+                <a:effectLst/>
+                <a:latin typeface="JetBrains Mono" panose="02000009000000000000" pitchFamily="49" charset="0"/>
+              </a:rPr>
+              <a:t> ligne du haut</a:t>
+            </a:r>
+          </a:p>
+          <a:p>
+            <a:r>
+              <a:rPr lang="fr-FR" b="0" dirty="0">
+                <a:solidFill>
+                  <a:srgbClr val="6796E6"/>
+                </a:solidFill>
+                <a:effectLst/>
+                <a:latin typeface="JetBrains Mono" panose="02000009000000000000" pitchFamily="49" charset="0"/>
+              </a:rPr>
+              <a:t>*</a:t>
+            </a:r>
+            <a:r>
+              <a:rPr lang="fr-FR" b="0" dirty="0">
+                <a:solidFill>
+                  <a:srgbClr val="CCCCCC"/>
+                </a:solidFill>
+                <a:effectLst/>
+                <a:latin typeface="JetBrains Mono" panose="02000009000000000000" pitchFamily="49" charset="0"/>
+              </a:rPr>
+              <a:t> $</a:t>
+            </a:r>
+            <a:r>
+              <a:rPr lang="fr-FR" b="0" dirty="0">
+                <a:solidFill>
+                  <a:srgbClr val="D4D4D4"/>
+                </a:solidFill>
+                <a:effectLst/>
+                <a:latin typeface="JetBrains Mono" panose="02000009000000000000" pitchFamily="49" charset="0"/>
+              </a:rPr>
+              <a:t> </a:t>
+            </a:r>
+            <a:r>
+              <a:rPr lang="fr-FR" b="0" dirty="0">
+                <a:solidFill>
+                  <a:srgbClr val="569CD6"/>
+                </a:solidFill>
+                <a:effectLst/>
+                <a:latin typeface="JetBrains Mono" panose="02000009000000000000" pitchFamily="49" charset="0"/>
+              </a:rPr>
+              <a:t>\</a:t>
+            </a:r>
+            <a:r>
+              <a:rPr lang="fr-FR" b="0" dirty="0" err="1">
+                <a:solidFill>
+                  <a:srgbClr val="DCDCAA"/>
+                </a:solidFill>
+                <a:effectLst/>
+                <a:latin typeface="JetBrains Mono" panose="02000009000000000000" pitchFamily="49" charset="0"/>
+              </a:rPr>
+              <a:t>text</a:t>
+            </a:r>
+            <a:r>
+              <a:rPr lang="fr-FR" b="0" dirty="0">
+                <a:solidFill>
+                  <a:srgbClr val="D4D4D4"/>
+                </a:solidFill>
+                <a:effectLst/>
+                <a:latin typeface="JetBrains Mono" panose="02000009000000000000" pitchFamily="49" charset="0"/>
+              </a:rPr>
+              <a:t>{</a:t>
+            </a:r>
+            <a:r>
+              <a:rPr lang="fr-FR" b="0" dirty="0" err="1">
+                <a:solidFill>
+                  <a:srgbClr val="D4D4D4"/>
+                </a:solidFill>
+                <a:effectLst/>
+                <a:latin typeface="JetBrains Mono" panose="02000009000000000000" pitchFamily="49" charset="0"/>
+              </a:rPr>
+              <a:t>Specificity</a:t>
+            </a:r>
+            <a:r>
+              <a:rPr lang="fr-FR" b="0" dirty="0">
+                <a:solidFill>
+                  <a:srgbClr val="D4D4D4"/>
+                </a:solidFill>
+                <a:effectLst/>
+                <a:latin typeface="JetBrains Mono" panose="02000009000000000000" pitchFamily="49" charset="0"/>
+              </a:rPr>
+              <a:t>} = </a:t>
+            </a:r>
+            <a:r>
+              <a:rPr lang="fr-FR" b="0" dirty="0">
+                <a:solidFill>
+                  <a:srgbClr val="569CD6"/>
+                </a:solidFill>
+                <a:effectLst/>
+                <a:latin typeface="JetBrains Mono" panose="02000009000000000000" pitchFamily="49" charset="0"/>
+              </a:rPr>
+              <a:t>\</a:t>
+            </a:r>
+            <a:r>
+              <a:rPr lang="fr-FR" b="0" dirty="0">
+                <a:solidFill>
+                  <a:srgbClr val="DCDCAA"/>
+                </a:solidFill>
+                <a:effectLst/>
+                <a:latin typeface="JetBrains Mono" panose="02000009000000000000" pitchFamily="49" charset="0"/>
+              </a:rPr>
+              <a:t>frac</a:t>
+            </a:r>
+            <a:r>
+              <a:rPr lang="fr-FR" b="0" dirty="0">
+                <a:solidFill>
+                  <a:srgbClr val="D4D4D4"/>
+                </a:solidFill>
+                <a:effectLst/>
+                <a:latin typeface="JetBrains Mono" panose="02000009000000000000" pitchFamily="49" charset="0"/>
+              </a:rPr>
+              <a:t>{TN}{TN+FP}</a:t>
+            </a:r>
+            <a:r>
+              <a:rPr lang="fr-FR" b="0" dirty="0">
+                <a:solidFill>
+                  <a:srgbClr val="CCCCCC"/>
+                </a:solidFill>
+                <a:effectLst/>
+                <a:latin typeface="JetBrains Mono" panose="02000009000000000000" pitchFamily="49" charset="0"/>
+              </a:rPr>
+              <a:t>$</a:t>
+            </a:r>
+          </a:p>
+          <a:p>
+            <a:endParaRPr lang="fr-FR" b="0" dirty="0">
+              <a:solidFill>
+                <a:srgbClr val="CCCCCC"/>
+              </a:solidFill>
+              <a:effectLst/>
+              <a:latin typeface="JetBrains Mono" panose="02000009000000000000" pitchFamily="49" charset="0"/>
+            </a:endParaRPr>
+          </a:p>
+        </p:txBody>
+      </p:sp>
+      <p:sp>
+        <p:nvSpPr>
+          <p:cNvPr id="4" name="Espace réservé du numéro de diapositive 3"/>
+          <p:cNvSpPr>
+            <a:spLocks noGrp="1"/>
+          </p:cNvSpPr>
+          <p:nvPr>
+            <p:ph type="sldNum" sz="quarter" idx="5"/>
+          </p:nvPr>
+        </p:nvSpPr>
+        <p:spPr/>
+        <p:txBody>
+          <a:bodyPr/>
+          <a:lstStyle/>
+          <a:p>
+            <a:fld id="{CA52ACDA-CAD7-4952-B2DF-2528E011DCB5}" type="slidenum">
+              <a:rPr lang="fr-FR" smtClean="0"/>
+              <a:t>7</a:t>
+            </a:fld>
+            <a:endParaRPr lang="fr-FR"/>
+          </a:p>
+        </p:txBody>
+      </p:sp>
+    </p:spTree>
+    <p:extLst>
+      <p:ext uri="{BB962C8B-B14F-4D97-AF65-F5344CB8AC3E}">
+        <p14:creationId xmlns:p14="http://schemas.microsoft.com/office/powerpoint/2010/main" val="583671224"/>
+      </p:ext>
+    </p:extLst>
+  </p:cSld>
+  <p:clrMapOvr>
+    <a:masterClrMapping/>
+  </p:clrMapOvr>
+</p:notes>
 </file>
 
 <file path=ppt/slideLayouts/slideLayout1.xml><?xml version="1.0" encoding="utf-8"?>
@@ -5551,6 +7876,192 @@
 </p:sld>
 </file>
 
+<file path=ppt/slides/slide10.xml><?xml version="1.0" encoding="utf-8"?>
+<p:sld xmlns:a="http://schemas.openxmlformats.org/drawingml/2006/main" xmlns:r="http://schemas.openxmlformats.org/officeDocument/2006/relationships" xmlns:p="http://schemas.openxmlformats.org/presentationml/2006/main">
+  <p:cSld>
+    <p:spTree>
+      <p:nvGrpSpPr>
+        <p:cNvPr id="1" name=""/>
+        <p:cNvGrpSpPr/>
+        <p:nvPr/>
+      </p:nvGrpSpPr>
+      <p:grpSpPr>
+        <a:xfrm>
+          <a:off x="0" y="0"/>
+          <a:ext cx="0" cy="0"/>
+          <a:chOff x="0" y="0"/>
+          <a:chExt cx="0" cy="0"/>
+        </a:xfrm>
+      </p:grpSpPr>
+      <p:sp>
+        <p:nvSpPr>
+          <p:cNvPr id="2" name="Titre 1">
+            <a:extLst>
+              <a:ext uri="{FF2B5EF4-FFF2-40B4-BE49-F238E27FC236}">
+                <a16:creationId xmlns:a16="http://schemas.microsoft.com/office/drawing/2014/main" id="{F13D07B4-C7D9-46E1-38A0-A6EEF16B48EB}"/>
+              </a:ext>
+            </a:extLst>
+          </p:cNvPr>
+          <p:cNvSpPr>
+            <a:spLocks noGrp="1"/>
+          </p:cNvSpPr>
+          <p:nvPr>
+            <p:ph type="title"/>
+          </p:nvPr>
+        </p:nvSpPr>
+        <p:spPr/>
+        <p:txBody>
+          <a:bodyPr/>
+          <a:lstStyle/>
+          <a:p>
+            <a:r>
+              <a:rPr lang="fr-FR" dirty="0" err="1"/>
+              <a:t>Take</a:t>
+            </a:r>
+            <a:r>
+              <a:rPr lang="fr-FR" dirty="0"/>
+              <a:t> </a:t>
+            </a:r>
+            <a:r>
+              <a:rPr lang="fr-FR" dirty="0" err="1"/>
+              <a:t>away</a:t>
+            </a:r>
+            <a:endParaRPr lang="fr-FR" dirty="0"/>
+          </a:p>
+        </p:txBody>
+      </p:sp>
+      <p:sp>
+        <p:nvSpPr>
+          <p:cNvPr id="3" name="Espace réservé du contenu 2">
+            <a:extLst>
+              <a:ext uri="{FF2B5EF4-FFF2-40B4-BE49-F238E27FC236}">
+                <a16:creationId xmlns:a16="http://schemas.microsoft.com/office/drawing/2014/main" id="{1A803C62-BD0B-D0AC-2B41-C4F420891B06}"/>
+              </a:ext>
+            </a:extLst>
+          </p:cNvPr>
+          <p:cNvSpPr>
+            <a:spLocks noGrp="1"/>
+          </p:cNvSpPr>
+          <p:nvPr>
+            <p:ph idx="1"/>
+          </p:nvPr>
+        </p:nvSpPr>
+        <p:spPr/>
+        <p:txBody>
+          <a:bodyPr/>
+          <a:lstStyle/>
+          <a:p>
+            <a:endParaRPr lang="fr-FR" dirty="0"/>
+          </a:p>
+        </p:txBody>
+      </p:sp>
+    </p:spTree>
+    <p:extLst>
+      <p:ext uri="{BB962C8B-B14F-4D97-AF65-F5344CB8AC3E}">
+        <p14:creationId xmlns:p14="http://schemas.microsoft.com/office/powerpoint/2010/main" val="3201622378"/>
+      </p:ext>
+    </p:extLst>
+  </p:cSld>
+  <p:clrMapOvr>
+    <a:masterClrMapping/>
+  </p:clrMapOvr>
+</p:sld>
+</file>
+
+<file path=ppt/slides/slide11.xml><?xml version="1.0" encoding="utf-8"?>
+<p:sld xmlns:a="http://schemas.openxmlformats.org/drawingml/2006/main" xmlns:r="http://schemas.openxmlformats.org/officeDocument/2006/relationships" xmlns:p="http://schemas.openxmlformats.org/presentationml/2006/main">
+  <p:cSld>
+    <p:spTree>
+      <p:nvGrpSpPr>
+        <p:cNvPr id="1" name=""/>
+        <p:cNvGrpSpPr/>
+        <p:nvPr/>
+      </p:nvGrpSpPr>
+      <p:grpSpPr>
+        <a:xfrm>
+          <a:off x="0" y="0"/>
+          <a:ext cx="0" cy="0"/>
+          <a:chOff x="0" y="0"/>
+          <a:chExt cx="0" cy="0"/>
+        </a:xfrm>
+      </p:grpSpPr>
+      <p:sp>
+        <p:nvSpPr>
+          <p:cNvPr id="4" name="Titre 3">
+            <a:extLst>
+              <a:ext uri="{FF2B5EF4-FFF2-40B4-BE49-F238E27FC236}">
+                <a16:creationId xmlns:a16="http://schemas.microsoft.com/office/drawing/2014/main" id="{80E590DF-0A88-7056-85D1-A8E809E2318F}"/>
+              </a:ext>
+            </a:extLst>
+          </p:cNvPr>
+          <p:cNvSpPr>
+            <a:spLocks noGrp="1"/>
+          </p:cNvSpPr>
+          <p:nvPr>
+            <p:ph type="title"/>
+          </p:nvPr>
+        </p:nvSpPr>
+        <p:spPr>
+          <a:xfrm>
+            <a:off x="831850" y="1709738"/>
+            <a:ext cx="10515600" cy="1837859"/>
+          </a:xfrm>
+        </p:spPr>
+        <p:txBody>
+          <a:bodyPr/>
+          <a:lstStyle/>
+          <a:p>
+            <a:pPr algn="ctr"/>
+            <a:r>
+              <a:rPr lang="fr-FR" dirty="0"/>
+              <a:t>Code </a:t>
+            </a:r>
+            <a:r>
+              <a:rPr lang="fr-FR" dirty="0" err="1"/>
+              <a:t>Review</a:t>
+            </a:r>
+            <a:endParaRPr lang="fr-FR" dirty="0"/>
+          </a:p>
+        </p:txBody>
+      </p:sp>
+      <p:sp>
+        <p:nvSpPr>
+          <p:cNvPr id="5" name="Espace réservé du texte 4">
+            <a:extLst>
+              <a:ext uri="{FF2B5EF4-FFF2-40B4-BE49-F238E27FC236}">
+                <a16:creationId xmlns:a16="http://schemas.microsoft.com/office/drawing/2014/main" id="{64E8BF61-007C-0740-1AA1-06B9449B33C7}"/>
+              </a:ext>
+            </a:extLst>
+          </p:cNvPr>
+          <p:cNvSpPr>
+            <a:spLocks noGrp="1"/>
+          </p:cNvSpPr>
+          <p:nvPr>
+            <p:ph type="body" idx="1"/>
+          </p:nvPr>
+        </p:nvSpPr>
+        <p:spPr/>
+        <p:txBody>
+          <a:bodyPr/>
+          <a:lstStyle/>
+          <a:p>
+            <a:endParaRPr lang="fr-FR"/>
+          </a:p>
+        </p:txBody>
+      </p:sp>
+    </p:spTree>
+    <p:extLst>
+      <p:ext uri="{BB962C8B-B14F-4D97-AF65-F5344CB8AC3E}">
+        <p14:creationId xmlns:p14="http://schemas.microsoft.com/office/powerpoint/2010/main" val="312535264"/>
+      </p:ext>
+    </p:extLst>
+  </p:cSld>
+  <p:clrMapOvr>
+    <a:masterClrMapping/>
+  </p:clrMapOvr>
+</p:sld>
+</file>
+
 <file path=ppt/slides/slide2.xml><?xml version="1.0" encoding="utf-8"?>
 <p:sld xmlns:a="http://schemas.openxmlformats.org/drawingml/2006/main" xmlns:r="http://schemas.openxmlformats.org/officeDocument/2006/relationships" xmlns:p="http://schemas.openxmlformats.org/presentationml/2006/main">
   <p:cSld>
@@ -5954,7 +8465,7 @@
           <p:cNvPr id="2" name="Titre 1">
             <a:extLst>
               <a:ext uri="{FF2B5EF4-FFF2-40B4-BE49-F238E27FC236}">
-                <a16:creationId xmlns:a16="http://schemas.microsoft.com/office/drawing/2014/main" id="{F13D07B4-C7D9-46E1-38A0-A6EEF16B48EB}"/>
+                <a16:creationId xmlns:a16="http://schemas.microsoft.com/office/drawing/2014/main" id="{CA29B263-F466-620B-D79F-98E1228B9780}"/>
               </a:ext>
             </a:extLst>
           </p:cNvPr>
@@ -5971,50 +8482,356 @@
           <a:lstStyle/>
           <a:p>
             <a:r>
-              <a:rPr lang="fr-FR" dirty="0" err="1"/>
-              <a:t>Take</a:t>
-            </a:r>
-            <a:r>
               <a:rPr lang="fr-FR" dirty="0"/>
-              <a:t> </a:t>
-            </a:r>
-            <a:r>
-              <a:rPr lang="fr-FR" dirty="0" err="1"/>
-              <a:t>away</a:t>
-            </a:r>
-            <a:endParaRPr lang="fr-FR" dirty="0"/>
+              <a:t>EDA 1/2</a:t>
+            </a:r>
           </a:p>
         </p:txBody>
       </p:sp>
+      <p:pic>
+        <p:nvPicPr>
+          <p:cNvPr id="7" name="Image 6">
+            <a:extLst>
+              <a:ext uri="{FF2B5EF4-FFF2-40B4-BE49-F238E27FC236}">
+                <a16:creationId xmlns:a16="http://schemas.microsoft.com/office/drawing/2014/main" id="{C222B210-A511-3113-7B90-0BDE1E1151E5}"/>
+              </a:ext>
+            </a:extLst>
+          </p:cNvPr>
+          <p:cNvPicPr>
+            <a:picLocks noChangeAspect="1"/>
+          </p:cNvPicPr>
+          <p:nvPr/>
+        </p:nvPicPr>
+        <p:blipFill>
+          <a:blip r:embed="rId3"/>
+          <a:stretch>
+            <a:fillRect/>
+          </a:stretch>
+        </p:blipFill>
+        <p:spPr>
+          <a:xfrm>
+            <a:off x="213360" y="929214"/>
+            <a:ext cx="6915993" cy="1429014"/>
+          </a:xfrm>
+          <a:prstGeom prst="rect">
+            <a:avLst/>
+          </a:prstGeom>
+          <a:effectLst>
+            <a:outerShdw blurRad="50800" dist="38100" dir="2700000" algn="tl" rotWithShape="0">
+              <a:prstClr val="black">
+                <a:alpha val="40000"/>
+              </a:prstClr>
+            </a:outerShdw>
+          </a:effectLst>
+        </p:spPr>
+      </p:pic>
       <p:sp>
         <p:nvSpPr>
-          <p:cNvPr id="3" name="Espace réservé du contenu 2">
-            <a:extLst>
-              <a:ext uri="{FF2B5EF4-FFF2-40B4-BE49-F238E27FC236}">
-                <a16:creationId xmlns:a16="http://schemas.microsoft.com/office/drawing/2014/main" id="{1A803C62-BD0B-D0AC-2B41-C4F420891B06}"/>
-              </a:ext>
-            </a:extLst>
-          </p:cNvPr>
-          <p:cNvSpPr>
-            <a:spLocks noGrp="1"/>
-          </p:cNvSpPr>
+          <p:cNvPr id="8" name="Flèche : haut 7">
+            <a:extLst>
+              <a:ext uri="{FF2B5EF4-FFF2-40B4-BE49-F238E27FC236}">
+                <a16:creationId xmlns:a16="http://schemas.microsoft.com/office/drawing/2014/main" id="{73A76093-B4E0-EEA8-86CC-DCCF03CCC8C3}"/>
+              </a:ext>
+            </a:extLst>
+          </p:cNvPr>
+          <p:cNvSpPr/>
+          <p:nvPr/>
+        </p:nvSpPr>
+        <p:spPr>
+          <a:xfrm rot="2468856">
+            <a:off x="-763521" y="418004"/>
+            <a:ext cx="464127" cy="644236"/>
+          </a:xfrm>
+          <a:prstGeom prst="upArrow">
+            <a:avLst/>
+          </a:prstGeom>
+          <a:solidFill>
+            <a:srgbClr val="FF0000"/>
+          </a:solidFill>
+        </p:spPr>
+        <p:style>
+          <a:lnRef idx="2">
+            <a:schemeClr val="accent1">
+              <a:shade val="15000"/>
+            </a:schemeClr>
+          </a:lnRef>
+          <a:fillRef idx="1">
+            <a:schemeClr val="accent1"/>
+          </a:fillRef>
+          <a:effectRef idx="0">
+            <a:schemeClr val="accent1"/>
+          </a:effectRef>
+          <a:fontRef idx="minor">
+            <a:schemeClr val="lt1"/>
+          </a:fontRef>
+        </p:style>
+        <p:txBody>
+          <a:bodyPr rtlCol="0" anchor="ctr"/>
+          <a:lstStyle/>
+          <a:p>
+            <a:pPr algn="ctr"/>
+            <a:endParaRPr lang="fr-FR"/>
+          </a:p>
+        </p:txBody>
+      </p:sp>
+      <p:pic>
+        <p:nvPicPr>
+          <p:cNvPr id="10" name="Image 9">
+            <a:extLst>
+              <a:ext uri="{FF2B5EF4-FFF2-40B4-BE49-F238E27FC236}">
+                <a16:creationId xmlns:a16="http://schemas.microsoft.com/office/drawing/2014/main" id="{EC4287C8-AF70-B757-EF89-AE1D42B62F26}"/>
+              </a:ext>
+            </a:extLst>
+          </p:cNvPr>
+          <p:cNvPicPr>
+            <a:picLocks noChangeAspect="1"/>
+          </p:cNvPicPr>
+          <p:nvPr/>
+        </p:nvPicPr>
+        <p:blipFill>
+          <a:blip r:embed="rId4"/>
+          <a:stretch>
+            <a:fillRect/>
+          </a:stretch>
+        </p:blipFill>
+        <p:spPr>
+          <a:xfrm>
+            <a:off x="7331791" y="1519178"/>
+            <a:ext cx="3809994" cy="1489405"/>
+          </a:xfrm>
+          <a:prstGeom prst="rect">
+            <a:avLst/>
+          </a:prstGeom>
+          <a:effectLst>
+            <a:outerShdw blurRad="50800" dist="38100" dir="2700000" algn="tl" rotWithShape="0">
+              <a:prstClr val="black">
+                <a:alpha val="40000"/>
+              </a:prstClr>
+            </a:outerShdw>
+          </a:effectLst>
+        </p:spPr>
+      </p:pic>
+      <p:pic>
+        <p:nvPicPr>
+          <p:cNvPr id="12" name="Image 11">
+            <a:extLst>
+              <a:ext uri="{FF2B5EF4-FFF2-40B4-BE49-F238E27FC236}">
+                <a16:creationId xmlns:a16="http://schemas.microsoft.com/office/drawing/2014/main" id="{AABA5E3D-A3EA-D9BD-B99D-3A8E9E50B5C7}"/>
+              </a:ext>
+            </a:extLst>
+          </p:cNvPr>
+          <p:cNvPicPr>
+            <a:picLocks noChangeAspect="1"/>
+          </p:cNvPicPr>
+          <p:nvPr/>
+        </p:nvPicPr>
+        <p:blipFill>
+          <a:blip r:embed="rId5"/>
+          <a:stretch>
+            <a:fillRect/>
+          </a:stretch>
+        </p:blipFill>
+        <p:spPr>
+          <a:xfrm>
+            <a:off x="290128" y="2951258"/>
+            <a:ext cx="3602712" cy="2513860"/>
+          </a:xfrm>
+          <a:prstGeom prst="rect">
+            <a:avLst/>
+          </a:prstGeom>
+          <a:effectLst>
+            <a:outerShdw blurRad="50800" dist="38100" dir="2700000" algn="tl" rotWithShape="0">
+              <a:prstClr val="black">
+                <a:alpha val="40000"/>
+              </a:prstClr>
+            </a:outerShdw>
+          </a:effectLst>
+        </p:spPr>
+      </p:pic>
+      <p:pic>
+        <p:nvPicPr>
+          <p:cNvPr id="16" name="Graphique 15" descr="Badge 1 avec un remplissage uni">
+            <a:extLst>
+              <a:ext uri="{FF2B5EF4-FFF2-40B4-BE49-F238E27FC236}">
+                <a16:creationId xmlns:a16="http://schemas.microsoft.com/office/drawing/2014/main" id="{5268AC1D-D4FA-AE46-453F-AF128164B610}"/>
+              </a:ext>
+            </a:extLst>
+          </p:cNvPr>
+          <p:cNvPicPr>
+            <a:picLocks noChangeAspect="1"/>
+          </p:cNvPicPr>
+          <p:nvPr/>
+        </p:nvPicPr>
+        <p:blipFill>
+          <a:blip r:embed="rId6">
+            <a:extLst>
+              <a:ext uri="{96DAC541-7B7A-43D3-8B79-37D633B846F1}">
+                <asvg:svgBlip xmlns:asvg="http://schemas.microsoft.com/office/drawing/2016/SVG/main" r:embed="rId7"/>
+              </a:ext>
+            </a:extLst>
+          </a:blip>
+          <a:stretch>
+            <a:fillRect/>
+          </a:stretch>
+        </p:blipFill>
+        <p:spPr>
+          <a:xfrm>
+            <a:off x="7331791" y="546158"/>
+            <a:ext cx="914400" cy="914400"/>
+          </a:xfrm>
+          <a:prstGeom prst="rect">
+            <a:avLst/>
+          </a:prstGeom>
+        </p:spPr>
+      </p:pic>
+      <p:pic>
+        <p:nvPicPr>
+          <p:cNvPr id="14" name="Espace réservé du contenu 13" descr="Badge avec un remplissage uni">
+            <a:extLst>
+              <a:ext uri="{FF2B5EF4-FFF2-40B4-BE49-F238E27FC236}">
+                <a16:creationId xmlns:a16="http://schemas.microsoft.com/office/drawing/2014/main" id="{DD6BA3D8-3BD0-4B52-EF54-33BDEDDD4665}"/>
+              </a:ext>
+            </a:extLst>
+          </p:cNvPr>
+          <p:cNvPicPr>
+            <a:picLocks noGrp="1" noChangeAspect="1"/>
+          </p:cNvPicPr>
           <p:nvPr>
             <p:ph idx="1"/>
           </p:nvPr>
-        </p:nvSpPr>
-        <p:spPr/>
-        <p:txBody>
-          <a:bodyPr/>
-          <a:lstStyle/>
-          <a:p>
-            <a:endParaRPr lang="fr-FR" dirty="0"/>
-          </a:p>
-        </p:txBody>
-      </p:sp>
+        </p:nvPicPr>
+        <p:blipFill>
+          <a:blip r:embed="rId8">
+            <a:extLst>
+              <a:ext uri="{96DAC541-7B7A-43D3-8B79-37D633B846F1}">
+                <asvg:svgBlip xmlns:asvg="http://schemas.microsoft.com/office/drawing/2016/SVG/main" r:embed="rId9"/>
+              </a:ext>
+            </a:extLst>
+          </a:blip>
+          <a:stretch>
+            <a:fillRect/>
+          </a:stretch>
+        </p:blipFill>
+        <p:spPr>
+          <a:xfrm>
+            <a:off x="840316" y="3450548"/>
+            <a:ext cx="914400" cy="914400"/>
+          </a:xfrm>
+        </p:spPr>
+      </p:pic>
+      <p:pic>
+        <p:nvPicPr>
+          <p:cNvPr id="3" name="Image 2">
+            <a:extLst>
+              <a:ext uri="{FF2B5EF4-FFF2-40B4-BE49-F238E27FC236}">
+                <a16:creationId xmlns:a16="http://schemas.microsoft.com/office/drawing/2014/main" id="{CB227373-A969-BE8F-04D1-CB48F636BA0A}"/>
+              </a:ext>
+            </a:extLst>
+          </p:cNvPr>
+          <p:cNvPicPr>
+            <a:picLocks noChangeAspect="1"/>
+          </p:cNvPicPr>
+          <p:nvPr/>
+        </p:nvPicPr>
+        <p:blipFill>
+          <a:blip r:embed="rId10"/>
+          <a:stretch>
+            <a:fillRect/>
+          </a:stretch>
+        </p:blipFill>
+        <p:spPr>
+          <a:xfrm>
+            <a:off x="5549289" y="3883424"/>
+            <a:ext cx="4261525" cy="2838051"/>
+          </a:xfrm>
+          <a:prstGeom prst="rect">
+            <a:avLst/>
+          </a:prstGeom>
+          <a:effectLst>
+            <a:outerShdw blurRad="50800" dist="38100" dir="2700000" algn="tl" rotWithShape="0">
+              <a:prstClr val="black">
+                <a:alpha val="40000"/>
+              </a:prstClr>
+            </a:outerShdw>
+          </a:effectLst>
+        </p:spPr>
+      </p:pic>
+      <p:pic>
+        <p:nvPicPr>
+          <p:cNvPr id="4" name="Graphique 3" descr="Badge 4 avec un remplissage uni">
+            <a:extLst>
+              <a:ext uri="{FF2B5EF4-FFF2-40B4-BE49-F238E27FC236}">
+                <a16:creationId xmlns:a16="http://schemas.microsoft.com/office/drawing/2014/main" id="{36AA1E3C-67C6-E98D-245D-FD2771AABD92}"/>
+              </a:ext>
+            </a:extLst>
+          </p:cNvPr>
+          <p:cNvPicPr>
+            <a:picLocks noChangeAspect="1"/>
+          </p:cNvPicPr>
+          <p:nvPr/>
+        </p:nvPicPr>
+        <p:blipFill>
+          <a:blip r:embed="rId11">
+            <a:extLst>
+              <a:ext uri="{96DAC541-7B7A-43D3-8B79-37D633B846F1}">
+                <asvg:svgBlip xmlns:asvg="http://schemas.microsoft.com/office/drawing/2016/SVG/main" r:embed="rId12"/>
+              </a:ext>
+            </a:extLst>
+          </a:blip>
+          <a:stretch>
+            <a:fillRect/>
+          </a:stretch>
+        </p:blipFill>
+        <p:spPr>
+          <a:xfrm>
+            <a:off x="-1059155" y="4795843"/>
+            <a:ext cx="914400" cy="914400"/>
+          </a:xfrm>
+          <a:prstGeom prst="rect">
+            <a:avLst/>
+          </a:prstGeom>
+        </p:spPr>
+      </p:pic>
+      <p:pic>
+        <p:nvPicPr>
+          <p:cNvPr id="18" name="Graphique 17" descr="Badge 3 avec un remplissage uni">
+            <a:extLst>
+              <a:ext uri="{FF2B5EF4-FFF2-40B4-BE49-F238E27FC236}">
+                <a16:creationId xmlns:a16="http://schemas.microsoft.com/office/drawing/2014/main" id="{C04E2636-71BD-60C0-D0F2-2AC1A33B799B}"/>
+              </a:ext>
+            </a:extLst>
+          </p:cNvPr>
+          <p:cNvPicPr>
+            <a:picLocks noChangeAspect="1"/>
+          </p:cNvPicPr>
+          <p:nvPr/>
+        </p:nvPicPr>
+        <p:blipFill>
+          <a:blip r:embed="rId13">
+            <a:extLst>
+              <a:ext uri="{96DAC541-7B7A-43D3-8B79-37D633B846F1}">
+                <asvg:svgBlip xmlns:asvg="http://schemas.microsoft.com/office/drawing/2016/SVG/main" r:embed="rId14"/>
+              </a:ext>
+            </a:extLst>
+          </a:blip>
+          <a:stretch>
+            <a:fillRect/>
+          </a:stretch>
+        </p:blipFill>
+        <p:spPr>
+          <a:xfrm>
+            <a:off x="8672484" y="4338643"/>
+            <a:ext cx="914400" cy="914400"/>
+          </a:xfrm>
+          <a:prstGeom prst="rect">
+            <a:avLst/>
+          </a:prstGeom>
+        </p:spPr>
+      </p:pic>
     </p:spTree>
     <p:extLst>
       <p:ext uri="{BB962C8B-B14F-4D97-AF65-F5344CB8AC3E}">
-        <p14:creationId xmlns:p14="http://schemas.microsoft.com/office/powerpoint/2010/main" val="3201622378"/>
+        <p14:creationId xmlns:p14="http://schemas.microsoft.com/office/powerpoint/2010/main" val="3231554383"/>
       </p:ext>
     </p:extLst>
   </p:cSld>
@@ -6043,10 +8860,10 @@
       </p:grpSpPr>
       <p:sp>
         <p:nvSpPr>
-          <p:cNvPr id="4" name="Titre 3">
-            <a:extLst>
-              <a:ext uri="{FF2B5EF4-FFF2-40B4-BE49-F238E27FC236}">
-                <a16:creationId xmlns:a16="http://schemas.microsoft.com/office/drawing/2014/main" id="{80E590DF-0A88-7056-85D1-A8E809E2318F}"/>
+          <p:cNvPr id="2" name="Titre 1">
+            <a:extLst>
+              <a:ext uri="{FF2B5EF4-FFF2-40B4-BE49-F238E27FC236}">
+                <a16:creationId xmlns:a16="http://schemas.microsoft.com/office/drawing/2014/main" id="{CA29B263-F466-620B-D79F-98E1228B9780}"/>
               </a:ext>
             </a:extLst>
           </p:cNvPr>
@@ -6057,35 +8874,467 @@
             <p:ph type="title"/>
           </p:nvPr>
         </p:nvSpPr>
-        <p:spPr>
-          <a:xfrm>
-            <a:off x="831850" y="1709738"/>
-            <a:ext cx="10515600" cy="1837859"/>
-          </a:xfrm>
-        </p:spPr>
+        <p:spPr/>
         <p:txBody>
           <a:bodyPr/>
           <a:lstStyle/>
           <a:p>
-            <a:pPr algn="ctr"/>
             <a:r>
               <a:rPr lang="fr-FR" dirty="0"/>
-              <a:t>Code </a:t>
-            </a:r>
-            <a:r>
-              <a:rPr lang="fr-FR" dirty="0" err="1"/>
-              <a:t>Review</a:t>
-            </a:r>
-            <a:endParaRPr lang="fr-FR" dirty="0"/>
+              <a:t>EDA 2/2</a:t>
+            </a:r>
           </a:p>
         </p:txBody>
       </p:sp>
       <p:sp>
         <p:nvSpPr>
-          <p:cNvPr id="5" name="Espace réservé du texte 4">
-            <a:extLst>
-              <a:ext uri="{FF2B5EF4-FFF2-40B4-BE49-F238E27FC236}">
-                <a16:creationId xmlns:a16="http://schemas.microsoft.com/office/drawing/2014/main" id="{64E8BF61-007C-0740-1AA1-06B9449B33C7}"/>
+          <p:cNvPr id="8" name="Flèche : haut 7">
+            <a:extLst>
+              <a:ext uri="{FF2B5EF4-FFF2-40B4-BE49-F238E27FC236}">
+                <a16:creationId xmlns:a16="http://schemas.microsoft.com/office/drawing/2014/main" id="{73A76093-B4E0-EEA8-86CC-DCCF03CCC8C3}"/>
+              </a:ext>
+            </a:extLst>
+          </p:cNvPr>
+          <p:cNvSpPr/>
+          <p:nvPr/>
+        </p:nvSpPr>
+        <p:spPr>
+          <a:xfrm rot="2468856">
+            <a:off x="-763521" y="418004"/>
+            <a:ext cx="464127" cy="644236"/>
+          </a:xfrm>
+          <a:prstGeom prst="upArrow">
+            <a:avLst/>
+          </a:prstGeom>
+          <a:solidFill>
+            <a:srgbClr val="FF0000"/>
+          </a:solidFill>
+        </p:spPr>
+        <p:style>
+          <a:lnRef idx="2">
+            <a:schemeClr val="accent1">
+              <a:shade val="15000"/>
+            </a:schemeClr>
+          </a:lnRef>
+          <a:fillRef idx="1">
+            <a:schemeClr val="accent1"/>
+          </a:fillRef>
+          <a:effectRef idx="0">
+            <a:schemeClr val="accent1"/>
+          </a:effectRef>
+          <a:fontRef idx="minor">
+            <a:schemeClr val="lt1"/>
+          </a:fontRef>
+        </p:style>
+        <p:txBody>
+          <a:bodyPr rtlCol="0" anchor="ctr"/>
+          <a:lstStyle/>
+          <a:p>
+            <a:pPr algn="ctr"/>
+            <a:endParaRPr lang="fr-FR"/>
+          </a:p>
+        </p:txBody>
+      </p:sp>
+      <p:pic>
+        <p:nvPicPr>
+          <p:cNvPr id="18" name="Graphique 17" descr="Badge 3 avec un remplissage uni">
+            <a:extLst>
+              <a:ext uri="{FF2B5EF4-FFF2-40B4-BE49-F238E27FC236}">
+                <a16:creationId xmlns:a16="http://schemas.microsoft.com/office/drawing/2014/main" id="{C04E2636-71BD-60C0-D0F2-2AC1A33B799B}"/>
+              </a:ext>
+            </a:extLst>
+          </p:cNvPr>
+          <p:cNvPicPr>
+            <a:picLocks noChangeAspect="1"/>
+          </p:cNvPicPr>
+          <p:nvPr/>
+        </p:nvPicPr>
+        <p:blipFill>
+          <a:blip r:embed="rId3">
+            <a:extLst>
+              <a:ext uri="{96DAC541-7B7A-43D3-8B79-37D633B846F1}">
+                <asvg:svgBlip xmlns:asvg="http://schemas.microsoft.com/office/drawing/2016/SVG/main" r:embed="rId4"/>
+              </a:ext>
+            </a:extLst>
+          </a:blip>
+          <a:stretch>
+            <a:fillRect/>
+          </a:stretch>
+        </p:blipFill>
+        <p:spPr>
+          <a:xfrm>
+            <a:off x="6950439" y="3126422"/>
+            <a:ext cx="914400" cy="914400"/>
+          </a:xfrm>
+          <a:prstGeom prst="rect">
+            <a:avLst/>
+          </a:prstGeom>
+        </p:spPr>
+      </p:pic>
+      <p:pic>
+        <p:nvPicPr>
+          <p:cNvPr id="14" name="Espace réservé du contenu 13" descr="Badge avec un remplissage uni">
+            <a:extLst>
+              <a:ext uri="{FF2B5EF4-FFF2-40B4-BE49-F238E27FC236}">
+                <a16:creationId xmlns:a16="http://schemas.microsoft.com/office/drawing/2014/main" id="{DD6BA3D8-3BD0-4B52-EF54-33BDEDDD4665}"/>
+              </a:ext>
+            </a:extLst>
+          </p:cNvPr>
+          <p:cNvPicPr>
+            <a:picLocks noGrp="1" noChangeAspect="1"/>
+          </p:cNvPicPr>
+          <p:nvPr>
+            <p:ph idx="1"/>
+          </p:nvPr>
+        </p:nvPicPr>
+        <p:blipFill>
+          <a:blip r:embed="rId5">
+            <a:extLst>
+              <a:ext uri="{96DAC541-7B7A-43D3-8B79-37D633B846F1}">
+                <asvg:svgBlip xmlns:asvg="http://schemas.microsoft.com/office/drawing/2016/SVG/main" r:embed="rId6"/>
+              </a:ext>
+            </a:extLst>
+          </a:blip>
+          <a:stretch>
+            <a:fillRect/>
+          </a:stretch>
+        </p:blipFill>
+        <p:spPr>
+          <a:xfrm>
+            <a:off x="5508395" y="4544072"/>
+            <a:ext cx="914400" cy="914400"/>
+          </a:xfrm>
+        </p:spPr>
+      </p:pic>
+      <p:pic>
+        <p:nvPicPr>
+          <p:cNvPr id="22" name="Graphique 21" descr="Badge 5 avec un remplissage uni">
+            <a:extLst>
+              <a:ext uri="{FF2B5EF4-FFF2-40B4-BE49-F238E27FC236}">
+                <a16:creationId xmlns:a16="http://schemas.microsoft.com/office/drawing/2014/main" id="{8F8BCC4E-69C8-36E4-A8F1-744730E4E9A3}"/>
+              </a:ext>
+            </a:extLst>
+          </p:cNvPr>
+          <p:cNvPicPr>
+            <a:picLocks noChangeAspect="1"/>
+          </p:cNvPicPr>
+          <p:nvPr/>
+        </p:nvPicPr>
+        <p:blipFill>
+          <a:blip r:embed="rId7">
+            <a:extLst>
+              <a:ext uri="{96DAC541-7B7A-43D3-8B79-37D633B846F1}">
+                <asvg:svgBlip xmlns:asvg="http://schemas.microsoft.com/office/drawing/2016/SVG/main" r:embed="rId8"/>
+              </a:ext>
+            </a:extLst>
+          </a:blip>
+          <a:stretch>
+            <a:fillRect/>
+          </a:stretch>
+        </p:blipFill>
+        <p:spPr>
+          <a:xfrm>
+            <a:off x="-1059155" y="5680273"/>
+            <a:ext cx="914400" cy="914400"/>
+          </a:xfrm>
+          <a:prstGeom prst="rect">
+            <a:avLst/>
+          </a:prstGeom>
+        </p:spPr>
+      </p:pic>
+      <p:pic>
+        <p:nvPicPr>
+          <p:cNvPr id="26" name="Image 25">
+            <a:extLst>
+              <a:ext uri="{FF2B5EF4-FFF2-40B4-BE49-F238E27FC236}">
+                <a16:creationId xmlns:a16="http://schemas.microsoft.com/office/drawing/2014/main" id="{2A3B5C4D-F1EC-4B2C-CB1A-222688215626}"/>
+              </a:ext>
+            </a:extLst>
+          </p:cNvPr>
+          <p:cNvPicPr>
+            <a:picLocks noChangeAspect="1"/>
+          </p:cNvPicPr>
+          <p:nvPr/>
+        </p:nvPicPr>
+        <p:blipFill>
+          <a:blip r:embed="rId9"/>
+          <a:stretch>
+            <a:fillRect/>
+          </a:stretch>
+        </p:blipFill>
+        <p:spPr>
+          <a:xfrm>
+            <a:off x="334868" y="933350"/>
+            <a:ext cx="4042202" cy="2838051"/>
+          </a:xfrm>
+          <a:prstGeom prst="rect">
+            <a:avLst/>
+          </a:prstGeom>
+          <a:effectLst>
+            <a:outerShdw blurRad="50800" dist="38100" dir="2700000" algn="tl" rotWithShape="0">
+              <a:prstClr val="black">
+                <a:alpha val="40000"/>
+              </a:prstClr>
+            </a:outerShdw>
+          </a:effectLst>
+        </p:spPr>
+      </p:pic>
+      <p:pic>
+        <p:nvPicPr>
+          <p:cNvPr id="28" name="Graphique 27" descr="Badge 4 avec un remplissage uni">
+            <a:extLst>
+              <a:ext uri="{FF2B5EF4-FFF2-40B4-BE49-F238E27FC236}">
+                <a16:creationId xmlns:a16="http://schemas.microsoft.com/office/drawing/2014/main" id="{7FA6199A-223A-E76C-241D-28F19931683E}"/>
+              </a:ext>
+            </a:extLst>
+          </p:cNvPr>
+          <p:cNvPicPr>
+            <a:picLocks noChangeAspect="1"/>
+          </p:cNvPicPr>
+          <p:nvPr/>
+        </p:nvPicPr>
+        <p:blipFill>
+          <a:blip r:embed="rId10">
+            <a:extLst>
+              <a:ext uri="{96DAC541-7B7A-43D3-8B79-37D633B846F1}">
+                <asvg:svgBlip xmlns:asvg="http://schemas.microsoft.com/office/drawing/2016/SVG/main" r:embed="rId11"/>
+              </a:ext>
+            </a:extLst>
+          </a:blip>
+          <a:stretch>
+            <a:fillRect/>
+          </a:stretch>
+        </p:blipFill>
+        <p:spPr>
+          <a:xfrm>
+            <a:off x="-1059155" y="4795843"/>
+            <a:ext cx="914400" cy="914400"/>
+          </a:xfrm>
+          <a:prstGeom prst="rect">
+            <a:avLst/>
+          </a:prstGeom>
+        </p:spPr>
+      </p:pic>
+      <p:pic>
+        <p:nvPicPr>
+          <p:cNvPr id="29" name="Image 28">
+            <a:extLst>
+              <a:ext uri="{FF2B5EF4-FFF2-40B4-BE49-F238E27FC236}">
+                <a16:creationId xmlns:a16="http://schemas.microsoft.com/office/drawing/2014/main" id="{D0C443D2-D44B-2CF1-CB78-C08A25DDC951}"/>
+              </a:ext>
+            </a:extLst>
+          </p:cNvPr>
+          <p:cNvPicPr>
+            <a:picLocks noChangeAspect="1"/>
+          </p:cNvPicPr>
+          <p:nvPr/>
+        </p:nvPicPr>
+        <p:blipFill>
+          <a:blip r:embed="rId12"/>
+          <a:stretch>
+            <a:fillRect/>
+          </a:stretch>
+        </p:blipFill>
+        <p:spPr>
+          <a:xfrm>
+            <a:off x="334868" y="3877009"/>
+            <a:ext cx="5067683" cy="2858894"/>
+          </a:xfrm>
+          <a:prstGeom prst="rect">
+            <a:avLst/>
+          </a:prstGeom>
+          <a:effectLst>
+            <a:outerShdw blurRad="50800" dist="38100" dir="2700000" algn="tl" rotWithShape="0">
+              <a:prstClr val="black">
+                <a:alpha val="40000"/>
+              </a:prstClr>
+            </a:outerShdw>
+          </a:effectLst>
+        </p:spPr>
+      </p:pic>
+      <p:pic>
+        <p:nvPicPr>
+          <p:cNvPr id="30" name="Image 29">
+            <a:extLst>
+              <a:ext uri="{FF2B5EF4-FFF2-40B4-BE49-F238E27FC236}">
+                <a16:creationId xmlns:a16="http://schemas.microsoft.com/office/drawing/2014/main" id="{F5B5DC52-E3A0-9A53-BD73-E4250793CBEA}"/>
+              </a:ext>
+            </a:extLst>
+          </p:cNvPr>
+          <p:cNvPicPr>
+            <a:picLocks noChangeAspect="1"/>
+          </p:cNvPicPr>
+          <p:nvPr/>
+        </p:nvPicPr>
+        <p:blipFill>
+          <a:blip r:embed="rId13"/>
+          <a:stretch>
+            <a:fillRect/>
+          </a:stretch>
+        </p:blipFill>
+        <p:spPr>
+          <a:xfrm>
+            <a:off x="5621558" y="5724159"/>
+            <a:ext cx="3152742" cy="629680"/>
+          </a:xfrm>
+          <a:prstGeom prst="rect">
+            <a:avLst/>
+          </a:prstGeom>
+          <a:effectLst>
+            <a:outerShdw blurRad="50800" dist="38100" dir="2700000" algn="tl" rotWithShape="0">
+              <a:prstClr val="black">
+                <a:alpha val="40000"/>
+              </a:prstClr>
+            </a:outerShdw>
+          </a:effectLst>
+        </p:spPr>
+      </p:pic>
+      <p:pic>
+        <p:nvPicPr>
+          <p:cNvPr id="31" name="Image 30">
+            <a:extLst>
+              <a:ext uri="{FF2B5EF4-FFF2-40B4-BE49-F238E27FC236}">
+                <a16:creationId xmlns:a16="http://schemas.microsoft.com/office/drawing/2014/main" id="{C33A6592-48F5-8271-0AF2-BF97356E6145}"/>
+              </a:ext>
+            </a:extLst>
+          </p:cNvPr>
+          <p:cNvPicPr>
+            <a:picLocks noChangeAspect="1"/>
+          </p:cNvPicPr>
+          <p:nvPr/>
+        </p:nvPicPr>
+        <p:blipFill>
+          <a:blip r:embed="rId14"/>
+          <a:stretch>
+            <a:fillRect/>
+          </a:stretch>
+        </p:blipFill>
+        <p:spPr>
+          <a:xfrm>
+            <a:off x="7197929" y="143657"/>
+            <a:ext cx="4464452" cy="2915374"/>
+          </a:xfrm>
+          <a:prstGeom prst="rect">
+            <a:avLst/>
+          </a:prstGeom>
+          <a:effectLst>
+            <a:outerShdw blurRad="50800" dist="38100" dir="2700000" algn="tl" rotWithShape="0">
+              <a:prstClr val="black">
+                <a:alpha val="40000"/>
+              </a:prstClr>
+            </a:outerShdw>
+          </a:effectLst>
+        </p:spPr>
+      </p:pic>
+      <p:pic>
+        <p:nvPicPr>
+          <p:cNvPr id="33" name="Image 32">
+            <a:extLst>
+              <a:ext uri="{FF2B5EF4-FFF2-40B4-BE49-F238E27FC236}">
+                <a16:creationId xmlns:a16="http://schemas.microsoft.com/office/drawing/2014/main" id="{0E8A1DB4-F5C3-68AA-BE3B-A732611B7C58}"/>
+              </a:ext>
+            </a:extLst>
+          </p:cNvPr>
+          <p:cNvPicPr>
+            <a:picLocks noChangeAspect="1"/>
+          </p:cNvPicPr>
+          <p:nvPr/>
+        </p:nvPicPr>
+        <p:blipFill>
+          <a:blip r:embed="rId15"/>
+          <a:stretch>
+            <a:fillRect/>
+          </a:stretch>
+        </p:blipFill>
+        <p:spPr>
+          <a:xfrm>
+            <a:off x="8014022" y="3198931"/>
+            <a:ext cx="3648359" cy="572470"/>
+          </a:xfrm>
+          <a:prstGeom prst="rect">
+            <a:avLst/>
+          </a:prstGeom>
+          <a:effectLst>
+            <a:outerShdw blurRad="50800" dist="38100" dir="2700000" algn="tl" rotWithShape="0">
+              <a:prstClr val="black">
+                <a:alpha val="40000"/>
+              </a:prstClr>
+            </a:outerShdw>
+          </a:effectLst>
+        </p:spPr>
+      </p:pic>
+      <p:pic>
+        <p:nvPicPr>
+          <p:cNvPr id="16" name="Graphique 15" descr="Badge 1 avec un remplissage uni">
+            <a:extLst>
+              <a:ext uri="{FF2B5EF4-FFF2-40B4-BE49-F238E27FC236}">
+                <a16:creationId xmlns:a16="http://schemas.microsoft.com/office/drawing/2014/main" id="{5268AC1D-D4FA-AE46-453F-AF128164B610}"/>
+              </a:ext>
+            </a:extLst>
+          </p:cNvPr>
+          <p:cNvPicPr>
+            <a:picLocks noChangeAspect="1"/>
+          </p:cNvPicPr>
+          <p:nvPr/>
+        </p:nvPicPr>
+        <p:blipFill>
+          <a:blip r:embed="rId16">
+            <a:extLst>
+              <a:ext uri="{96DAC541-7B7A-43D3-8B79-37D633B846F1}">
+                <asvg:svgBlip xmlns:asvg="http://schemas.microsoft.com/office/drawing/2016/SVG/main" r:embed="rId17"/>
+              </a:ext>
+            </a:extLst>
+          </a:blip>
+          <a:stretch>
+            <a:fillRect/>
+          </a:stretch>
+        </p:blipFill>
+        <p:spPr>
+          <a:xfrm>
+            <a:off x="3385403" y="1081790"/>
+            <a:ext cx="914400" cy="914400"/>
+          </a:xfrm>
+          <a:prstGeom prst="rect">
+            <a:avLst/>
+          </a:prstGeom>
+        </p:spPr>
+      </p:pic>
+    </p:spTree>
+    <p:extLst>
+      <p:ext uri="{BB962C8B-B14F-4D97-AF65-F5344CB8AC3E}">
+        <p14:creationId xmlns:p14="http://schemas.microsoft.com/office/powerpoint/2010/main" val="209198843"/>
+      </p:ext>
+    </p:extLst>
+  </p:cSld>
+  <p:clrMapOvr>
+    <a:masterClrMapping/>
+  </p:clrMapOvr>
+</p:sld>
+</file>
+
+<file path=ppt/slides/slide5.xml><?xml version="1.0" encoding="utf-8"?>
+<p:sld xmlns:a="http://schemas.openxmlformats.org/drawingml/2006/main" xmlns:r="http://schemas.openxmlformats.org/officeDocument/2006/relationships" xmlns:p="http://schemas.openxmlformats.org/presentationml/2006/main">
+  <p:cSld>
+    <p:spTree>
+      <p:nvGrpSpPr>
+        <p:cNvPr id="1" name=""/>
+        <p:cNvGrpSpPr/>
+        <p:nvPr/>
+      </p:nvGrpSpPr>
+      <p:grpSpPr>
+        <a:xfrm>
+          <a:off x="0" y="0"/>
+          <a:ext cx="0" cy="0"/>
+          <a:chOff x="0" y="0"/>
+          <a:chExt cx="0" cy="0"/>
+        </a:xfrm>
+      </p:grpSpPr>
+      <p:sp>
+        <p:nvSpPr>
+          <p:cNvPr id="2" name="Titre 1">
+            <a:extLst>
+              <a:ext uri="{FF2B5EF4-FFF2-40B4-BE49-F238E27FC236}">
+                <a16:creationId xmlns:a16="http://schemas.microsoft.com/office/drawing/2014/main" id="{A26CE876-5991-FF0D-42A5-8357293BA886}"/>
               </a:ext>
             </a:extLst>
           </p:cNvPr>
@@ -6093,7 +9342,7 @@
             <a:spLocks noGrp="1"/>
           </p:cNvSpPr>
           <p:nvPr>
-            <p:ph type="body" idx="1"/>
+            <p:ph type="title"/>
           </p:nvPr>
         </p:nvSpPr>
         <p:spPr/>
@@ -6101,6 +9350,183 @@
           <a:bodyPr/>
           <a:lstStyle/>
           <a:p>
+            <a:r>
+              <a:rPr lang="fr-FR" dirty="0"/>
+              <a:t>Baseline model 1/2</a:t>
+            </a:r>
+          </a:p>
+        </p:txBody>
+      </p:sp>
+      <p:sp>
+        <p:nvSpPr>
+          <p:cNvPr id="3" name="Espace réservé du contenu 2">
+            <a:extLst>
+              <a:ext uri="{FF2B5EF4-FFF2-40B4-BE49-F238E27FC236}">
+                <a16:creationId xmlns:a16="http://schemas.microsoft.com/office/drawing/2014/main" id="{494FF7DD-70F1-07F3-59A0-7A0B1ABEAB56}"/>
+              </a:ext>
+            </a:extLst>
+          </p:cNvPr>
+          <p:cNvSpPr>
+            <a:spLocks noGrp="1"/>
+          </p:cNvSpPr>
+          <p:nvPr>
+            <p:ph idx="1"/>
+          </p:nvPr>
+        </p:nvSpPr>
+        <p:spPr/>
+        <p:txBody>
+          <a:bodyPr/>
+          <a:lstStyle/>
+          <a:p>
+            <a:r>
+              <a:rPr lang="fr-FR" dirty="0" err="1"/>
+              <a:t>LogisticRegression</a:t>
+            </a:r>
+            <a:r>
+              <a:rPr lang="fr-FR" dirty="0"/>
+              <a:t>() + </a:t>
+            </a:r>
+            <a:r>
+              <a:rPr lang="fr-FR" dirty="0" err="1"/>
+              <a:t>PolynomialFeatures</a:t>
+            </a:r>
+            <a:r>
+              <a:rPr lang="fr-FR" dirty="0"/>
+              <a:t>() [</a:t>
+            </a:r>
+            <a:r>
+              <a:rPr lang="fr-FR" sz="2400" dirty="0" err="1"/>
+              <a:t>optional</a:t>
+            </a:r>
+            <a:r>
+              <a:rPr lang="fr-FR" dirty="0"/>
+              <a:t>]</a:t>
+            </a:r>
+          </a:p>
+          <a:p>
+            <a:r>
+              <a:rPr lang="fr-FR" dirty="0" err="1"/>
+              <a:t>GridSearchCV</a:t>
+            </a:r>
+            <a:r>
+              <a:rPr lang="fr-FR" dirty="0"/>
+              <a:t>()</a:t>
+            </a:r>
+          </a:p>
+        </p:txBody>
+      </p:sp>
+      <p:pic>
+        <p:nvPicPr>
+          <p:cNvPr id="5" name="Image 4">
+            <a:extLst>
+              <a:ext uri="{FF2B5EF4-FFF2-40B4-BE49-F238E27FC236}">
+                <a16:creationId xmlns:a16="http://schemas.microsoft.com/office/drawing/2014/main" id="{3C6FCFE8-EF9A-3FA1-C1BF-8487722DEA00}"/>
+              </a:ext>
+            </a:extLst>
+          </p:cNvPr>
+          <p:cNvPicPr>
+            <a:picLocks noChangeAspect="1"/>
+          </p:cNvPicPr>
+          <p:nvPr/>
+        </p:nvPicPr>
+        <p:blipFill>
+          <a:blip r:embed="rId2"/>
+          <a:stretch>
+            <a:fillRect/>
+          </a:stretch>
+        </p:blipFill>
+        <p:spPr>
+          <a:xfrm>
+            <a:off x="529618" y="2368369"/>
+            <a:ext cx="3581744" cy="1344952"/>
+          </a:xfrm>
+          <a:prstGeom prst="rect">
+            <a:avLst/>
+          </a:prstGeom>
+          <a:effectLst>
+            <a:outerShdw blurRad="50800" dist="38100" dir="2700000" algn="tl" rotWithShape="0">
+              <a:prstClr val="black">
+                <a:alpha val="40000"/>
+              </a:prstClr>
+            </a:outerShdw>
+          </a:effectLst>
+        </p:spPr>
+      </p:pic>
+      <p:pic>
+        <p:nvPicPr>
+          <p:cNvPr id="7" name="Image 6">
+            <a:extLst>
+              <a:ext uri="{FF2B5EF4-FFF2-40B4-BE49-F238E27FC236}">
+                <a16:creationId xmlns:a16="http://schemas.microsoft.com/office/drawing/2014/main" id="{ABECA835-5C52-2AA2-8A18-9F7B8EDBE7EA}"/>
+              </a:ext>
+            </a:extLst>
+          </p:cNvPr>
+          <p:cNvPicPr>
+            <a:picLocks noChangeAspect="1"/>
+          </p:cNvPicPr>
+          <p:nvPr/>
+        </p:nvPicPr>
+        <p:blipFill>
+          <a:blip r:embed="rId3"/>
+          <a:stretch>
+            <a:fillRect/>
+          </a:stretch>
+        </p:blipFill>
+        <p:spPr>
+          <a:xfrm>
+            <a:off x="1233862" y="4079063"/>
+            <a:ext cx="10648754" cy="2569244"/>
+          </a:xfrm>
+          <a:prstGeom prst="rect">
+            <a:avLst/>
+          </a:prstGeom>
+        </p:spPr>
+      </p:pic>
+      <p:sp>
+        <p:nvSpPr>
+          <p:cNvPr id="8" name="Flèche : haut 7">
+            <a:extLst>
+              <a:ext uri="{FF2B5EF4-FFF2-40B4-BE49-F238E27FC236}">
+                <a16:creationId xmlns:a16="http://schemas.microsoft.com/office/drawing/2014/main" id="{B5B57056-4F68-4808-D3CC-7CE8D6BDFCAD}"/>
+              </a:ext>
+            </a:extLst>
+          </p:cNvPr>
+          <p:cNvSpPr/>
+          <p:nvPr/>
+        </p:nvSpPr>
+        <p:spPr>
+          <a:xfrm rot="5400000">
+            <a:off x="583656" y="6196919"/>
+            <a:ext cx="464127" cy="644236"/>
+          </a:xfrm>
+          <a:prstGeom prst="upArrow">
+            <a:avLst/>
+          </a:prstGeom>
+          <a:solidFill>
+            <a:srgbClr val="FF0000"/>
+          </a:solidFill>
+        </p:spPr>
+        <p:style>
+          <a:lnRef idx="2">
+            <a:schemeClr val="accent1">
+              <a:shade val="15000"/>
+            </a:schemeClr>
+          </a:lnRef>
+          <a:fillRef idx="1">
+            <a:schemeClr val="accent1"/>
+          </a:fillRef>
+          <a:effectRef idx="0">
+            <a:schemeClr val="accent1"/>
+          </a:effectRef>
+          <a:fontRef idx="minor">
+            <a:schemeClr val="lt1"/>
+          </a:fontRef>
+        </p:style>
+        <p:txBody>
+          <a:bodyPr rtlCol="0" anchor="ctr"/>
+          <a:lstStyle/>
+          <a:p>
+            <a:pPr algn="ctr"/>
             <a:endParaRPr lang="fr-FR"/>
           </a:p>
         </p:txBody>
@@ -6108,7 +9534,1258 @@
     </p:spTree>
     <p:extLst>
       <p:ext uri="{BB962C8B-B14F-4D97-AF65-F5344CB8AC3E}">
-        <p14:creationId xmlns:p14="http://schemas.microsoft.com/office/powerpoint/2010/main" val="312535264"/>
+        <p14:creationId xmlns:p14="http://schemas.microsoft.com/office/powerpoint/2010/main" val="2161612315"/>
+      </p:ext>
+    </p:extLst>
+  </p:cSld>
+  <p:clrMapOvr>
+    <a:masterClrMapping/>
+  </p:clrMapOvr>
+</p:sld>
+</file>
+
+<file path=ppt/slides/slide6.xml><?xml version="1.0" encoding="utf-8"?>
+<p:sld xmlns:a="http://schemas.openxmlformats.org/drawingml/2006/main" xmlns:r="http://schemas.openxmlformats.org/officeDocument/2006/relationships" xmlns:p="http://schemas.openxmlformats.org/presentationml/2006/main">
+  <p:cSld>
+    <p:spTree>
+      <p:nvGrpSpPr>
+        <p:cNvPr id="1" name=""/>
+        <p:cNvGrpSpPr/>
+        <p:nvPr/>
+      </p:nvGrpSpPr>
+      <p:grpSpPr>
+        <a:xfrm>
+          <a:off x="0" y="0"/>
+          <a:ext cx="0" cy="0"/>
+          <a:chOff x="0" y="0"/>
+          <a:chExt cx="0" cy="0"/>
+        </a:xfrm>
+      </p:grpSpPr>
+      <p:sp>
+        <p:nvSpPr>
+          <p:cNvPr id="2" name="Titre 1">
+            <a:extLst>
+              <a:ext uri="{FF2B5EF4-FFF2-40B4-BE49-F238E27FC236}">
+                <a16:creationId xmlns:a16="http://schemas.microsoft.com/office/drawing/2014/main" id="{7EC6ADED-F7D6-006E-5E1A-43C369CF43C1}"/>
+              </a:ext>
+            </a:extLst>
+          </p:cNvPr>
+          <p:cNvSpPr>
+            <a:spLocks noGrp="1"/>
+          </p:cNvSpPr>
+          <p:nvPr>
+            <p:ph type="title"/>
+          </p:nvPr>
+        </p:nvSpPr>
+        <p:spPr/>
+        <p:txBody>
+          <a:bodyPr/>
+          <a:lstStyle/>
+          <a:p>
+            <a:r>
+              <a:rPr lang="fr-FR" dirty="0"/>
+              <a:t>Baseline model 2/2</a:t>
+            </a:r>
+          </a:p>
+        </p:txBody>
+      </p:sp>
+      <p:sp>
+        <p:nvSpPr>
+          <p:cNvPr id="3" name="Espace réservé du contenu 2">
+            <a:extLst>
+              <a:ext uri="{FF2B5EF4-FFF2-40B4-BE49-F238E27FC236}">
+                <a16:creationId xmlns:a16="http://schemas.microsoft.com/office/drawing/2014/main" id="{30B415C2-EFD0-32B2-4D57-9DC18ABA9C40}"/>
+              </a:ext>
+            </a:extLst>
+          </p:cNvPr>
+          <p:cNvSpPr>
+            <a:spLocks noGrp="1"/>
+          </p:cNvSpPr>
+          <p:nvPr>
+            <p:ph idx="1"/>
+          </p:nvPr>
+        </p:nvSpPr>
+        <p:spPr/>
+        <p:txBody>
+          <a:bodyPr/>
+          <a:lstStyle/>
+          <a:p>
+            <a:endParaRPr lang="fr-FR"/>
+          </a:p>
+        </p:txBody>
+      </p:sp>
+    </p:spTree>
+    <p:extLst>
+      <p:ext uri="{BB962C8B-B14F-4D97-AF65-F5344CB8AC3E}">
+        <p14:creationId xmlns:p14="http://schemas.microsoft.com/office/powerpoint/2010/main" val="2275997330"/>
+      </p:ext>
+    </p:extLst>
+  </p:cSld>
+  <p:clrMapOvr>
+    <a:masterClrMapping/>
+  </p:clrMapOvr>
+</p:sld>
+</file>
+
+<file path=ppt/slides/slide7.xml><?xml version="1.0" encoding="utf-8"?>
+<p:sld xmlns:a="http://schemas.openxmlformats.org/drawingml/2006/main" xmlns:r="http://schemas.openxmlformats.org/officeDocument/2006/relationships" xmlns:p="http://schemas.openxmlformats.org/presentationml/2006/main" show="0">
+  <p:cSld>
+    <p:spTree>
+      <p:nvGrpSpPr>
+        <p:cNvPr id="1" name=""/>
+        <p:cNvGrpSpPr/>
+        <p:nvPr/>
+      </p:nvGrpSpPr>
+      <p:grpSpPr>
+        <a:xfrm>
+          <a:off x="0" y="0"/>
+          <a:ext cx="0" cy="0"/>
+          <a:chOff x="0" y="0"/>
+          <a:chExt cx="0" cy="0"/>
+        </a:xfrm>
+      </p:grpSpPr>
+      <p:pic>
+        <p:nvPicPr>
+          <p:cNvPr id="5" name="Image 4">
+            <a:extLst>
+              <a:ext uri="{FF2B5EF4-FFF2-40B4-BE49-F238E27FC236}">
+                <a16:creationId xmlns:a16="http://schemas.microsoft.com/office/drawing/2014/main" id="{6A2E7D5E-07D9-3CC8-E1A3-8A71CB765DA1}"/>
+              </a:ext>
+            </a:extLst>
+          </p:cNvPr>
+          <p:cNvPicPr>
+            <a:picLocks noChangeAspect="1"/>
+          </p:cNvPicPr>
+          <p:nvPr/>
+        </p:nvPicPr>
+        <p:blipFill rotWithShape="1">
+          <a:blip r:embed="rId3"/>
+          <a:srcRect l="5097" t="4997" r="12822" b="4375"/>
+          <a:stretch/>
+        </p:blipFill>
+        <p:spPr>
+          <a:xfrm>
+            <a:off x="8878691" y="2295603"/>
+            <a:ext cx="2772896" cy="2756457"/>
+          </a:xfrm>
+          <a:prstGeom prst="rect">
+            <a:avLst/>
+          </a:prstGeom>
+        </p:spPr>
+      </p:pic>
+      <p:sp>
+        <p:nvSpPr>
+          <p:cNvPr id="2" name="Titre 1">
+            <a:extLst>
+              <a:ext uri="{FF2B5EF4-FFF2-40B4-BE49-F238E27FC236}">
+                <a16:creationId xmlns:a16="http://schemas.microsoft.com/office/drawing/2014/main" id="{01550143-BB45-DECE-8CD5-D2EAB39AC9C3}"/>
+              </a:ext>
+            </a:extLst>
+          </p:cNvPr>
+          <p:cNvSpPr>
+            <a:spLocks noGrp="1"/>
+          </p:cNvSpPr>
+          <p:nvPr>
+            <p:ph type="title"/>
+          </p:nvPr>
+        </p:nvSpPr>
+        <p:spPr/>
+        <p:txBody>
+          <a:bodyPr/>
+          <a:lstStyle/>
+          <a:p>
+            <a:r>
+              <a:rPr lang="fr-FR" dirty="0" err="1"/>
+              <a:t>Precision</a:t>
+            </a:r>
+            <a:r>
+              <a:rPr lang="fr-FR" dirty="0"/>
+              <a:t>, </a:t>
+            </a:r>
+            <a:r>
+              <a:rPr lang="fr-FR" dirty="0" err="1"/>
+              <a:t>recall</a:t>
+            </a:r>
+            <a:r>
+              <a:rPr lang="fr-FR" dirty="0"/>
+              <a:t> &amp; F1 scores</a:t>
+            </a:r>
+          </a:p>
+        </p:txBody>
+      </p:sp>
+      <p:sp>
+        <p:nvSpPr>
+          <p:cNvPr id="3" name="Espace réservé du contenu 2">
+            <a:extLst>
+              <a:ext uri="{FF2B5EF4-FFF2-40B4-BE49-F238E27FC236}">
+                <a16:creationId xmlns:a16="http://schemas.microsoft.com/office/drawing/2014/main" id="{50F452AD-BB6D-A971-A6ED-43CD09F7AB2B}"/>
+              </a:ext>
+            </a:extLst>
+          </p:cNvPr>
+          <p:cNvSpPr>
+            <a:spLocks noGrp="1"/>
+          </p:cNvSpPr>
+          <p:nvPr>
+            <p:ph idx="1"/>
+          </p:nvPr>
+        </p:nvSpPr>
+        <p:spPr>
+          <a:xfrm>
+            <a:off x="838200" y="1825625"/>
+            <a:ext cx="7723340" cy="4351338"/>
+          </a:xfrm>
+        </p:spPr>
+        <p:txBody>
+          <a:bodyPr>
+            <a:normAutofit fontScale="77500" lnSpcReduction="20000"/>
+          </a:bodyPr>
+          <a:lstStyle/>
+          <a:p>
+            <a:r>
+              <a:rPr lang="en-US" dirty="0">
+                <a:highlight>
+                  <a:srgbClr val="00FF00"/>
+                </a:highlight>
+              </a:rPr>
+              <a:t>Pre</a:t>
+            </a:r>
+            <a:r>
+              <a:rPr lang="en-US" dirty="0"/>
+              <a:t>cision </a:t>
+            </a:r>
+            <a:r>
+              <a:rPr lang="en-US" dirty="0">
+                <a:solidFill>
+                  <a:schemeClr val="bg1">
+                    <a:lumMod val="65000"/>
+                  </a:schemeClr>
+                </a:solidFill>
+              </a:rPr>
+              <a:t>(Bayes posterior)</a:t>
+            </a:r>
+            <a:r>
+              <a:rPr lang="en-US" dirty="0"/>
+              <a:t> :</a:t>
+            </a:r>
+          </a:p>
+          <a:p>
+            <a:pPr lvl="1"/>
+            <a:r>
+              <a:rPr lang="en-US" dirty="0"/>
+              <a:t>Point de </a:t>
+            </a:r>
+            <a:r>
+              <a:rPr lang="en-US" dirty="0" err="1"/>
+              <a:t>vue</a:t>
+            </a:r>
+            <a:r>
+              <a:rPr lang="en-US" dirty="0"/>
+              <a:t> des </a:t>
+            </a:r>
+            <a:r>
+              <a:rPr lang="en-US" dirty="0">
+                <a:highlight>
+                  <a:srgbClr val="00FF00"/>
+                </a:highlight>
+              </a:rPr>
+              <a:t>pre</a:t>
+            </a:r>
+            <a:r>
+              <a:rPr lang="en-US" dirty="0"/>
+              <a:t>dictions (</a:t>
+            </a:r>
+            <a:r>
+              <a:rPr lang="en-US" sz="1900" i="1" dirty="0"/>
+              <a:t>par </a:t>
+            </a:r>
+            <a:r>
+              <a:rPr lang="en-US" sz="1900" i="1" dirty="0" err="1"/>
+              <a:t>colonne</a:t>
+            </a:r>
+            <a:r>
+              <a:rPr lang="en-US" dirty="0"/>
+              <a:t>)</a:t>
+            </a:r>
+          </a:p>
+          <a:p>
+            <a:pPr lvl="1"/>
+            <a:r>
+              <a:rPr lang="en-US" i="1" dirty="0">
+                <a:highlight>
+                  <a:srgbClr val="FFFF00"/>
+                </a:highlight>
+              </a:rPr>
+              <a:t>De </a:t>
+            </a:r>
+            <a:r>
+              <a:rPr lang="en-US" i="1" dirty="0" err="1">
+                <a:highlight>
+                  <a:srgbClr val="FFFF00"/>
+                </a:highlight>
+              </a:rPr>
+              <a:t>tous</a:t>
+            </a:r>
+            <a:r>
+              <a:rPr lang="en-US" i="1" dirty="0">
+                <a:highlight>
+                  <a:srgbClr val="FFFF00"/>
+                </a:highlight>
+              </a:rPr>
+              <a:t> </a:t>
+            </a:r>
+            <a:r>
+              <a:rPr lang="en-US" i="1" dirty="0" err="1">
+                <a:highlight>
+                  <a:srgbClr val="FFFF00"/>
+                </a:highlight>
+              </a:rPr>
+              <a:t>ceux</a:t>
+            </a:r>
+            <a:r>
+              <a:rPr lang="en-US" i="1" dirty="0">
+                <a:highlight>
+                  <a:srgbClr val="FFFF00"/>
+                </a:highlight>
+              </a:rPr>
+              <a:t> </a:t>
+            </a:r>
+            <a:r>
+              <a:rPr lang="en-US" i="1" dirty="0" err="1">
+                <a:highlight>
+                  <a:srgbClr val="FFFF00"/>
+                </a:highlight>
+              </a:rPr>
+              <a:t>qu'on</a:t>
+            </a:r>
+            <a:r>
+              <a:rPr lang="en-US" i="1" dirty="0">
+                <a:highlight>
+                  <a:srgbClr val="FFFF00"/>
+                </a:highlight>
+              </a:rPr>
+              <a:t> </a:t>
+            </a:r>
+            <a:r>
+              <a:rPr lang="en-US" i="1" dirty="0" err="1">
+                <a:highlight>
+                  <a:srgbClr val="FFFF00"/>
+                </a:highlight>
+              </a:rPr>
+              <a:t>prédit</a:t>
+            </a:r>
+            <a:r>
+              <a:rPr lang="en-US" i="1" dirty="0"/>
+              <a:t> </a:t>
+            </a:r>
+            <a:r>
+              <a:rPr lang="en-US" dirty="0" err="1"/>
+              <a:t>comme</a:t>
+            </a:r>
+            <a:r>
+              <a:rPr lang="en-US" dirty="0"/>
+              <a:t> </a:t>
+            </a:r>
+            <a:r>
+              <a:rPr lang="en-US" dirty="0" err="1"/>
+              <a:t>cancéreux</a:t>
+            </a:r>
+            <a:r>
+              <a:rPr lang="en-US" dirty="0"/>
+              <a:t>, </a:t>
+            </a:r>
+            <a:r>
+              <a:rPr lang="en-US" dirty="0" err="1"/>
+              <a:t>combien</a:t>
+            </a:r>
+            <a:r>
+              <a:rPr lang="en-US" dirty="0"/>
+              <a:t> </a:t>
+            </a:r>
+            <a:r>
+              <a:rPr lang="en-US" dirty="0" err="1"/>
+              <a:t>l'ont</a:t>
+            </a:r>
+            <a:r>
+              <a:rPr lang="en-US" dirty="0"/>
+              <a:t> </a:t>
+            </a:r>
+            <a:r>
+              <a:rPr lang="en-US" dirty="0" err="1"/>
+              <a:t>réellement</a:t>
+            </a:r>
+            <a:r>
+              <a:rPr lang="en-US" dirty="0"/>
+              <a:t>? </a:t>
+            </a:r>
+          </a:p>
+          <a:p>
+            <a:pPr lvl="1"/>
+            <a:r>
+              <a:rPr lang="en-US" dirty="0"/>
+              <a:t>TP/(TP+FP) : </a:t>
+            </a:r>
+            <a:r>
+              <a:rPr lang="en-US" dirty="0" err="1"/>
+              <a:t>colonne</a:t>
+            </a:r>
+            <a:r>
+              <a:rPr lang="en-US" dirty="0"/>
+              <a:t> de droite</a:t>
+            </a:r>
+          </a:p>
+          <a:p>
+            <a:r>
+              <a:rPr lang="en-US" dirty="0"/>
+              <a:t>Recall (rappel, </a:t>
+            </a:r>
+            <a:r>
+              <a:rPr lang="en-US" dirty="0" err="1"/>
+              <a:t>sensibilité</a:t>
+            </a:r>
+            <a:r>
+              <a:rPr lang="en-US" dirty="0"/>
+              <a:t>, True Positive Rate) : </a:t>
+            </a:r>
+          </a:p>
+          <a:p>
+            <a:pPr lvl="1"/>
+            <a:r>
+              <a:rPr lang="en-US" dirty="0"/>
+              <a:t>Point de </a:t>
+            </a:r>
+            <a:r>
+              <a:rPr lang="en-US" dirty="0" err="1"/>
+              <a:t>vue</a:t>
+            </a:r>
+            <a:r>
+              <a:rPr lang="en-US" dirty="0"/>
+              <a:t> des observations (</a:t>
+            </a:r>
+            <a:r>
+              <a:rPr lang="en-US" sz="1900" i="1" dirty="0"/>
+              <a:t>par </a:t>
+            </a:r>
+            <a:r>
+              <a:rPr lang="en-US" sz="1900" i="1" dirty="0" err="1"/>
+              <a:t>ligne</a:t>
+            </a:r>
+            <a:r>
+              <a:rPr lang="en-US" dirty="0"/>
+              <a:t>)</a:t>
+            </a:r>
+          </a:p>
+          <a:p>
+            <a:pPr lvl="1"/>
+            <a:r>
+              <a:rPr lang="en-US" i="1" dirty="0">
+                <a:highlight>
+                  <a:srgbClr val="FFFF00"/>
+                </a:highlight>
+              </a:rPr>
+              <a:t>De </a:t>
+            </a:r>
+            <a:r>
+              <a:rPr lang="en-US" i="1" dirty="0" err="1">
+                <a:highlight>
+                  <a:srgbClr val="FFFF00"/>
+                </a:highlight>
+              </a:rPr>
+              <a:t>tous</a:t>
+            </a:r>
+            <a:r>
+              <a:rPr lang="en-US" i="1" dirty="0">
+                <a:highlight>
+                  <a:srgbClr val="FFFF00"/>
+                </a:highlight>
+              </a:rPr>
+              <a:t> </a:t>
+            </a:r>
+            <a:r>
+              <a:rPr lang="en-US" i="1" dirty="0" err="1">
+                <a:highlight>
+                  <a:srgbClr val="FFFF00"/>
+                </a:highlight>
+              </a:rPr>
+              <a:t>ceux</a:t>
+            </a:r>
+            <a:r>
+              <a:rPr lang="en-US" i="1" dirty="0">
+                <a:highlight>
+                  <a:srgbClr val="FFFF00"/>
+                </a:highlight>
+              </a:rPr>
+              <a:t> </a:t>
+            </a:r>
+            <a:r>
+              <a:rPr lang="en-US" i="1" dirty="0" err="1">
+                <a:highlight>
+                  <a:srgbClr val="FFFF00"/>
+                </a:highlight>
+              </a:rPr>
+              <a:t>qu'on</a:t>
+            </a:r>
+            <a:r>
+              <a:rPr lang="en-US" i="1" dirty="0">
+                <a:highlight>
+                  <a:srgbClr val="FFFF00"/>
+                </a:highlight>
+              </a:rPr>
+              <a:t> observe </a:t>
+            </a:r>
+            <a:r>
+              <a:rPr lang="en-US" dirty="0" err="1"/>
+              <a:t>comme</a:t>
+            </a:r>
+            <a:r>
+              <a:rPr lang="en-US" dirty="0"/>
+              <a:t> </a:t>
+            </a:r>
+            <a:r>
+              <a:rPr lang="en-US" dirty="0" err="1"/>
+              <a:t>cancéreux</a:t>
+            </a:r>
+            <a:r>
+              <a:rPr lang="en-US" dirty="0"/>
+              <a:t>, </a:t>
+            </a:r>
+            <a:r>
+              <a:rPr lang="en-US" dirty="0" err="1"/>
+              <a:t>combien</a:t>
+            </a:r>
+            <a:r>
+              <a:rPr lang="en-US" dirty="0"/>
+              <a:t> </a:t>
+            </a:r>
+            <a:r>
+              <a:rPr lang="en-US" dirty="0" err="1"/>
+              <a:t>ont</a:t>
+            </a:r>
+            <a:r>
+              <a:rPr lang="en-US" dirty="0"/>
+              <a:t> </a:t>
+            </a:r>
+            <a:r>
+              <a:rPr lang="en-US" dirty="0" err="1"/>
+              <a:t>été</a:t>
+            </a:r>
+            <a:r>
+              <a:rPr lang="en-US" dirty="0"/>
+              <a:t> bien </a:t>
+            </a:r>
+            <a:r>
+              <a:rPr lang="en-US" dirty="0" err="1"/>
+              <a:t>classés</a:t>
+            </a:r>
+            <a:r>
+              <a:rPr lang="en-US" dirty="0"/>
+              <a:t>?</a:t>
+            </a:r>
+          </a:p>
+          <a:p>
+            <a:pPr lvl="1"/>
+            <a:r>
+              <a:rPr lang="en-US" dirty="0"/>
+              <a:t>TP/(TP+FN) : </a:t>
+            </a:r>
+            <a:r>
+              <a:rPr lang="en-US" dirty="0" err="1"/>
+              <a:t>ligne</a:t>
+            </a:r>
+            <a:r>
+              <a:rPr lang="en-US" dirty="0"/>
+              <a:t> du bas</a:t>
+            </a:r>
+          </a:p>
+          <a:p>
+            <a:r>
+              <a:rPr lang="en-US" dirty="0"/>
+              <a:t>F1 : 2/(1/</a:t>
+            </a:r>
+            <a:r>
+              <a:rPr lang="en-US" dirty="0" err="1"/>
+              <a:t>Prec</a:t>
+            </a:r>
+            <a:r>
+              <a:rPr lang="en-US" dirty="0"/>
+              <a:t> + 1/Rec)</a:t>
+            </a:r>
+          </a:p>
+          <a:p>
+            <a:pPr lvl="1"/>
+            <a:r>
+              <a:rPr lang="en-US" dirty="0"/>
+              <a:t>Moyenne </a:t>
+            </a:r>
+            <a:r>
+              <a:rPr lang="en-US" dirty="0" err="1"/>
+              <a:t>harmonique</a:t>
+            </a:r>
+            <a:r>
+              <a:rPr lang="en-US" dirty="0"/>
+              <a:t> entre Recall &amp; Precision </a:t>
+            </a:r>
+          </a:p>
+          <a:p>
+            <a:r>
+              <a:rPr lang="fr-FR" dirty="0" err="1"/>
+              <a:t>Accuracy</a:t>
+            </a:r>
+            <a:r>
+              <a:rPr lang="fr-FR" dirty="0"/>
+              <a:t> (TP+TN)/(TP+FN+TN+FP)</a:t>
+            </a:r>
+          </a:p>
+          <a:p>
+            <a:pPr lvl="1"/>
+            <a:r>
+              <a:rPr lang="fr-FR" dirty="0"/>
+              <a:t>1</a:t>
+            </a:r>
+            <a:r>
+              <a:rPr lang="fr-FR" baseline="30000" dirty="0"/>
+              <a:t>st</a:t>
+            </a:r>
+            <a:r>
+              <a:rPr lang="fr-FR" dirty="0"/>
+              <a:t> </a:t>
+            </a:r>
+            <a:r>
+              <a:rPr lang="fr-FR" dirty="0" err="1"/>
+              <a:t>diag</a:t>
+            </a:r>
+            <a:r>
+              <a:rPr lang="fr-FR" dirty="0"/>
+              <a:t> over Total</a:t>
+            </a:r>
+          </a:p>
+        </p:txBody>
+      </p:sp>
+      <p:sp>
+        <p:nvSpPr>
+          <p:cNvPr id="6" name="ZoneTexte 5">
+            <a:extLst>
+              <a:ext uri="{FF2B5EF4-FFF2-40B4-BE49-F238E27FC236}">
+                <a16:creationId xmlns:a16="http://schemas.microsoft.com/office/drawing/2014/main" id="{5DD7DE6D-88EC-2904-60AB-4124639D63A0}"/>
+              </a:ext>
+            </a:extLst>
+          </p:cNvPr>
+          <p:cNvSpPr txBox="1"/>
+          <p:nvPr/>
+        </p:nvSpPr>
+        <p:spPr>
+          <a:xfrm>
+            <a:off x="10977568" y="4285899"/>
+            <a:ext cx="415498" cy="369332"/>
+          </a:xfrm>
+          <a:prstGeom prst="rect">
+            <a:avLst/>
+          </a:prstGeom>
+          <a:noFill/>
+        </p:spPr>
+        <p:txBody>
+          <a:bodyPr wrap="none" rtlCol="0">
+            <a:spAutoFit/>
+          </a:bodyPr>
+          <a:lstStyle/>
+          <a:p>
+            <a:r>
+              <a:rPr lang="fr-FR" dirty="0">
+                <a:solidFill>
+                  <a:schemeClr val="bg1"/>
+                </a:solidFill>
+                <a:latin typeface="Impact" panose="020B0806030902050204" pitchFamily="34" charset="0"/>
+              </a:rPr>
+              <a:t>TP</a:t>
+            </a:r>
+          </a:p>
+        </p:txBody>
+      </p:sp>
+      <p:sp>
+        <p:nvSpPr>
+          <p:cNvPr id="7" name="ZoneTexte 6">
+            <a:extLst>
+              <a:ext uri="{FF2B5EF4-FFF2-40B4-BE49-F238E27FC236}">
+                <a16:creationId xmlns:a16="http://schemas.microsoft.com/office/drawing/2014/main" id="{49879E25-6878-2BEB-C1CD-C497153BA9D2}"/>
+              </a:ext>
+            </a:extLst>
+          </p:cNvPr>
+          <p:cNvSpPr txBox="1"/>
+          <p:nvPr/>
+        </p:nvSpPr>
+        <p:spPr>
+          <a:xfrm>
+            <a:off x="9440479" y="3047902"/>
+            <a:ext cx="415498" cy="369332"/>
+          </a:xfrm>
+          <a:prstGeom prst="rect">
+            <a:avLst/>
+          </a:prstGeom>
+          <a:noFill/>
+        </p:spPr>
+        <p:txBody>
+          <a:bodyPr wrap="none" rtlCol="0">
+            <a:spAutoFit/>
+          </a:bodyPr>
+          <a:lstStyle/>
+          <a:p>
+            <a:r>
+              <a:rPr lang="fr-FR" dirty="0">
+                <a:latin typeface="Impact" panose="020B0806030902050204" pitchFamily="34" charset="0"/>
+              </a:rPr>
+              <a:t>TN</a:t>
+            </a:r>
+          </a:p>
+        </p:txBody>
+      </p:sp>
+      <p:sp>
+        <p:nvSpPr>
+          <p:cNvPr id="8" name="ZoneTexte 7">
+            <a:extLst>
+              <a:ext uri="{FF2B5EF4-FFF2-40B4-BE49-F238E27FC236}">
+                <a16:creationId xmlns:a16="http://schemas.microsoft.com/office/drawing/2014/main" id="{2B3DC166-246A-0EA1-3D76-C39162AA475B}"/>
+              </a:ext>
+            </a:extLst>
+          </p:cNvPr>
+          <p:cNvSpPr txBox="1"/>
+          <p:nvPr/>
+        </p:nvSpPr>
+        <p:spPr>
+          <a:xfrm>
+            <a:off x="10944534" y="3150242"/>
+            <a:ext cx="391454" cy="369332"/>
+          </a:xfrm>
+          <a:prstGeom prst="rect">
+            <a:avLst/>
+          </a:prstGeom>
+          <a:noFill/>
+        </p:spPr>
+        <p:txBody>
+          <a:bodyPr wrap="none" rtlCol="0">
+            <a:spAutoFit/>
+          </a:bodyPr>
+          <a:lstStyle/>
+          <a:p>
+            <a:r>
+              <a:rPr lang="fr-FR" dirty="0">
+                <a:solidFill>
+                  <a:schemeClr val="bg1"/>
+                </a:solidFill>
+                <a:latin typeface="Impact" panose="020B0806030902050204" pitchFamily="34" charset="0"/>
+              </a:rPr>
+              <a:t>FP</a:t>
+            </a:r>
+          </a:p>
+        </p:txBody>
+      </p:sp>
+      <p:sp>
+        <p:nvSpPr>
+          <p:cNvPr id="9" name="ZoneTexte 8">
+            <a:extLst>
+              <a:ext uri="{FF2B5EF4-FFF2-40B4-BE49-F238E27FC236}">
+                <a16:creationId xmlns:a16="http://schemas.microsoft.com/office/drawing/2014/main" id="{6ECCAAEB-A845-6374-EC5E-3314A8807644}"/>
+              </a:ext>
+            </a:extLst>
+          </p:cNvPr>
+          <p:cNvSpPr txBox="1"/>
+          <p:nvPr/>
+        </p:nvSpPr>
+        <p:spPr>
+          <a:xfrm>
+            <a:off x="9429741" y="4327133"/>
+            <a:ext cx="401072" cy="369332"/>
+          </a:xfrm>
+          <a:prstGeom prst="rect">
+            <a:avLst/>
+          </a:prstGeom>
+          <a:noFill/>
+        </p:spPr>
+        <p:txBody>
+          <a:bodyPr wrap="none" rtlCol="0">
+            <a:spAutoFit/>
+          </a:bodyPr>
+          <a:lstStyle/>
+          <a:p>
+            <a:r>
+              <a:rPr lang="fr-FR" dirty="0">
+                <a:solidFill>
+                  <a:schemeClr val="bg1"/>
+                </a:solidFill>
+                <a:latin typeface="Impact" panose="020B0806030902050204" pitchFamily="34" charset="0"/>
+              </a:rPr>
+              <a:t>FN</a:t>
+            </a:r>
+          </a:p>
+        </p:txBody>
+      </p:sp>
+      <p:sp>
+        <p:nvSpPr>
+          <p:cNvPr id="11" name="Flèche : gauche 10">
+            <a:extLst>
+              <a:ext uri="{FF2B5EF4-FFF2-40B4-BE49-F238E27FC236}">
+                <a16:creationId xmlns:a16="http://schemas.microsoft.com/office/drawing/2014/main" id="{45B9CAB5-DFCC-48F4-759E-E1EEC02148C6}"/>
+              </a:ext>
+            </a:extLst>
+          </p:cNvPr>
+          <p:cNvSpPr/>
+          <p:nvPr/>
+        </p:nvSpPr>
+        <p:spPr>
+          <a:xfrm>
+            <a:off x="9071115" y="4945594"/>
+            <a:ext cx="2462709" cy="415126"/>
+          </a:xfrm>
+          <a:prstGeom prst="leftArrow">
+            <a:avLst/>
+          </a:prstGeom>
+          <a:ln>
+            <a:noFill/>
+          </a:ln>
+        </p:spPr>
+        <p:style>
+          <a:lnRef idx="2">
+            <a:schemeClr val="accent2">
+              <a:shade val="15000"/>
+            </a:schemeClr>
+          </a:lnRef>
+          <a:fillRef idx="1">
+            <a:schemeClr val="accent2"/>
+          </a:fillRef>
+          <a:effectRef idx="0">
+            <a:schemeClr val="accent2"/>
+          </a:effectRef>
+          <a:fontRef idx="minor">
+            <a:schemeClr val="lt1"/>
+          </a:fontRef>
+        </p:style>
+        <p:txBody>
+          <a:bodyPr rtlCol="0" anchor="ctr"/>
+          <a:lstStyle/>
+          <a:p>
+            <a:pPr algn="ctr"/>
+            <a:r>
+              <a:rPr lang="fr-FR" sz="1400" dirty="0" err="1"/>
+              <a:t>Recall</a:t>
+            </a:r>
+            <a:endParaRPr lang="fr-FR" sz="1400" dirty="0"/>
+          </a:p>
+        </p:txBody>
+      </p:sp>
+      <p:sp>
+        <p:nvSpPr>
+          <p:cNvPr id="13" name="Flèche : haut 12">
+            <a:extLst>
+              <a:ext uri="{FF2B5EF4-FFF2-40B4-BE49-F238E27FC236}">
+                <a16:creationId xmlns:a16="http://schemas.microsoft.com/office/drawing/2014/main" id="{F135D333-FA3A-6428-97C5-D6FB4E06DA94}"/>
+              </a:ext>
+            </a:extLst>
+          </p:cNvPr>
+          <p:cNvSpPr/>
+          <p:nvPr/>
+        </p:nvSpPr>
+        <p:spPr>
+          <a:xfrm>
+            <a:off x="11651587" y="2445328"/>
+            <a:ext cx="448785" cy="2405186"/>
+          </a:xfrm>
+          <a:prstGeom prst="upArrow">
+            <a:avLst/>
+          </a:prstGeom>
+        </p:spPr>
+        <p:style>
+          <a:lnRef idx="2">
+            <a:schemeClr val="accent1">
+              <a:shade val="15000"/>
+            </a:schemeClr>
+          </a:lnRef>
+          <a:fillRef idx="1">
+            <a:schemeClr val="accent1"/>
+          </a:fillRef>
+          <a:effectRef idx="0">
+            <a:schemeClr val="accent1"/>
+          </a:effectRef>
+          <a:fontRef idx="minor">
+            <a:schemeClr val="lt1"/>
+          </a:fontRef>
+        </p:style>
+        <p:txBody>
+          <a:bodyPr vert="vert270" rtlCol="0" anchor="ctr"/>
+          <a:lstStyle/>
+          <a:p>
+            <a:pPr algn="ctr"/>
+            <a:r>
+              <a:rPr lang="fr-FR" sz="1400" dirty="0" err="1"/>
+              <a:t>Precision</a:t>
+            </a:r>
+            <a:endParaRPr lang="fr-FR" sz="1400" dirty="0"/>
+          </a:p>
+        </p:txBody>
+      </p:sp>
+      <p:sp>
+        <p:nvSpPr>
+          <p:cNvPr id="12" name="ZoneTexte 11">
+            <a:extLst>
+              <a:ext uri="{FF2B5EF4-FFF2-40B4-BE49-F238E27FC236}">
+                <a16:creationId xmlns:a16="http://schemas.microsoft.com/office/drawing/2014/main" id="{620BC2E6-F7F1-762D-A243-2656FBC57365}"/>
+              </a:ext>
+            </a:extLst>
+          </p:cNvPr>
+          <p:cNvSpPr txBox="1"/>
+          <p:nvPr/>
+        </p:nvSpPr>
+        <p:spPr>
+          <a:xfrm>
+            <a:off x="9071116" y="5507972"/>
+            <a:ext cx="2580472" cy="523220"/>
+          </a:xfrm>
+          <a:prstGeom prst="rect">
+            <a:avLst/>
+          </a:prstGeom>
+          <a:noFill/>
+          <a:ln>
+            <a:solidFill>
+              <a:schemeClr val="tx1"/>
+            </a:solidFill>
+          </a:ln>
+        </p:spPr>
+        <p:txBody>
+          <a:bodyPr wrap="square" rtlCol="0">
+            <a:spAutoFit/>
+          </a:bodyPr>
+          <a:lstStyle/>
+          <a:p>
+            <a:r>
+              <a:rPr lang="fr-FR" sz="1400" i="1" dirty="0">
+                <a:latin typeface="Times New Roman" panose="02020603050405020304" pitchFamily="18" charset="0"/>
+                <a:cs typeface="Times New Roman" panose="02020603050405020304" pitchFamily="18" charset="0"/>
+              </a:rPr>
+              <a:t>On compare TP au total de la ligne ou de la colonne.</a:t>
+            </a:r>
+          </a:p>
+        </p:txBody>
+      </p:sp>
+      <p:sp>
+        <p:nvSpPr>
+          <p:cNvPr id="10" name="ZoneTexte 9">
+            <a:extLst>
+              <a:ext uri="{FF2B5EF4-FFF2-40B4-BE49-F238E27FC236}">
+                <a16:creationId xmlns:a16="http://schemas.microsoft.com/office/drawing/2014/main" id="{3F088FB5-2E18-ED3C-7463-994EA167060C}"/>
+              </a:ext>
+            </a:extLst>
+          </p:cNvPr>
+          <p:cNvSpPr txBox="1"/>
+          <p:nvPr/>
+        </p:nvSpPr>
+        <p:spPr>
+          <a:xfrm>
+            <a:off x="9439930" y="1926271"/>
+            <a:ext cx="1701107" cy="369332"/>
+          </a:xfrm>
+          <a:prstGeom prst="rect">
+            <a:avLst/>
+          </a:prstGeom>
+          <a:solidFill>
+            <a:schemeClr val="accent1">
+              <a:lumMod val="40000"/>
+              <a:lumOff val="60000"/>
+            </a:schemeClr>
+          </a:solidFill>
+        </p:spPr>
+        <p:txBody>
+          <a:bodyPr wrap="none" rtlCol="0">
+            <a:spAutoFit/>
+          </a:bodyPr>
+          <a:lstStyle/>
+          <a:p>
+            <a:r>
+              <a:rPr lang="fr-FR" dirty="0">
+                <a:latin typeface="Courier New" panose="02070309020205020404" pitchFamily="49" charset="0"/>
+                <a:cs typeface="Courier New" panose="02070309020205020404" pitchFamily="49" charset="0"/>
+              </a:rPr>
+              <a:t>Prédictions</a:t>
+            </a:r>
+          </a:p>
+        </p:txBody>
+      </p:sp>
+      <p:sp>
+        <p:nvSpPr>
+          <p:cNvPr id="14" name="ZoneTexte 13">
+            <a:extLst>
+              <a:ext uri="{FF2B5EF4-FFF2-40B4-BE49-F238E27FC236}">
+                <a16:creationId xmlns:a16="http://schemas.microsoft.com/office/drawing/2014/main" id="{5422BA34-6F23-5D64-E2F0-F006A3D44F3C}"/>
+              </a:ext>
+            </a:extLst>
+          </p:cNvPr>
+          <p:cNvSpPr txBox="1"/>
+          <p:nvPr/>
+        </p:nvSpPr>
+        <p:spPr>
+          <a:xfrm rot="16200000">
+            <a:off x="7774542" y="3414423"/>
+            <a:ext cx="1838965" cy="369332"/>
+          </a:xfrm>
+          <a:prstGeom prst="rect">
+            <a:avLst/>
+          </a:prstGeom>
+          <a:solidFill>
+            <a:schemeClr val="accent2">
+              <a:lumMod val="60000"/>
+              <a:lumOff val="40000"/>
+            </a:schemeClr>
+          </a:solidFill>
+        </p:spPr>
+        <p:txBody>
+          <a:bodyPr wrap="none" rtlCol="0">
+            <a:spAutoFit/>
+          </a:bodyPr>
+          <a:lstStyle/>
+          <a:p>
+            <a:r>
+              <a:rPr lang="fr-FR" dirty="0">
+                <a:latin typeface="Courier New" panose="02070309020205020404" pitchFamily="49" charset="0"/>
+                <a:cs typeface="Courier New" panose="02070309020205020404" pitchFamily="49" charset="0"/>
+              </a:rPr>
+              <a:t>Observations</a:t>
+            </a:r>
+          </a:p>
+        </p:txBody>
+      </p:sp>
+      <p:sp>
+        <p:nvSpPr>
+          <p:cNvPr id="16" name="ZoneTexte 15">
+            <a:extLst>
+              <a:ext uri="{FF2B5EF4-FFF2-40B4-BE49-F238E27FC236}">
+                <a16:creationId xmlns:a16="http://schemas.microsoft.com/office/drawing/2014/main" id="{4DF975F5-2407-35C6-2EB3-6E1E4231DD1B}"/>
+              </a:ext>
+            </a:extLst>
+          </p:cNvPr>
+          <p:cNvSpPr txBox="1"/>
+          <p:nvPr/>
+        </p:nvSpPr>
+        <p:spPr>
+          <a:xfrm>
+            <a:off x="4907693" y="5853797"/>
+            <a:ext cx="3606565" cy="646331"/>
+          </a:xfrm>
+          <a:prstGeom prst="rect">
+            <a:avLst/>
+          </a:prstGeom>
+          <a:solidFill>
+            <a:schemeClr val="accent6">
+              <a:lumMod val="20000"/>
+              <a:lumOff val="80000"/>
+            </a:schemeClr>
+          </a:solidFill>
+          <a:ln>
+            <a:solidFill>
+              <a:schemeClr val="tx1"/>
+            </a:solidFill>
+          </a:ln>
+          <a:effectLst>
+            <a:outerShdw blurRad="50800" dist="38100" dir="2700000" algn="tl" rotWithShape="0">
+              <a:prstClr val="black">
+                <a:alpha val="40000"/>
+              </a:prstClr>
+            </a:outerShdw>
+          </a:effectLst>
+        </p:spPr>
+        <p:txBody>
+          <a:bodyPr wrap="none" rtlCol="0">
+            <a:spAutoFit/>
+          </a:bodyPr>
+          <a:lstStyle>
+            <a:defPPr>
+              <a:defRPr lang="fr-FR"/>
+            </a:defPPr>
+          </a:lstStyle>
+          <a:p>
+            <a:r>
+              <a:rPr lang="fr-FR" dirty="0"/>
+              <a:t>Lors des runs </a:t>
+            </a:r>
+            <a:r>
+              <a:rPr lang="fr-FR"/>
+              <a:t>successifs surveiller </a:t>
+            </a:r>
+          </a:p>
+          <a:p>
+            <a:r>
+              <a:rPr lang="fr-FR" dirty="0"/>
+              <a:t>comment la métrique choisie évolue</a:t>
+            </a:r>
+          </a:p>
+        </p:txBody>
+      </p:sp>
+    </p:spTree>
+    <p:extLst>
+      <p:ext uri="{BB962C8B-B14F-4D97-AF65-F5344CB8AC3E}">
+        <p14:creationId xmlns:p14="http://schemas.microsoft.com/office/powerpoint/2010/main" val="4079956193"/>
+      </p:ext>
+    </p:extLst>
+  </p:cSld>
+  <p:clrMapOvr>
+    <a:masterClrMapping/>
+  </p:clrMapOvr>
+</p:sld>
+</file>
+
+<file path=ppt/slides/slide8.xml><?xml version="1.0" encoding="utf-8"?>
+<p:sld xmlns:a="http://schemas.openxmlformats.org/drawingml/2006/main" xmlns:r="http://schemas.openxmlformats.org/officeDocument/2006/relationships" xmlns:p="http://schemas.openxmlformats.org/presentationml/2006/main">
+  <p:cSld>
+    <p:spTree>
+      <p:nvGrpSpPr>
+        <p:cNvPr id="1" name=""/>
+        <p:cNvGrpSpPr/>
+        <p:nvPr/>
+      </p:nvGrpSpPr>
+      <p:grpSpPr>
+        <a:xfrm>
+          <a:off x="0" y="0"/>
+          <a:ext cx="0" cy="0"/>
+          <a:chOff x="0" y="0"/>
+          <a:chExt cx="0" cy="0"/>
+        </a:xfrm>
+      </p:grpSpPr>
+      <p:sp>
+        <p:nvSpPr>
+          <p:cNvPr id="2" name="Titre 1">
+            <a:extLst>
+              <a:ext uri="{FF2B5EF4-FFF2-40B4-BE49-F238E27FC236}">
+                <a16:creationId xmlns:a16="http://schemas.microsoft.com/office/drawing/2014/main" id="{99380B92-D1BD-920D-9DDD-DE700497E6B3}"/>
+              </a:ext>
+            </a:extLst>
+          </p:cNvPr>
+          <p:cNvSpPr>
+            <a:spLocks noGrp="1"/>
+          </p:cNvSpPr>
+          <p:nvPr>
+            <p:ph type="title"/>
+          </p:nvPr>
+        </p:nvSpPr>
+        <p:spPr/>
+        <p:txBody>
+          <a:bodyPr/>
+          <a:lstStyle/>
+          <a:p>
+            <a:r>
+              <a:rPr lang="fr-FR" dirty="0"/>
+              <a:t>Framework 1/2</a:t>
+            </a:r>
+          </a:p>
+        </p:txBody>
+      </p:sp>
+      <p:sp>
+        <p:nvSpPr>
+          <p:cNvPr id="3" name="Espace réservé du contenu 2">
+            <a:extLst>
+              <a:ext uri="{FF2B5EF4-FFF2-40B4-BE49-F238E27FC236}">
+                <a16:creationId xmlns:a16="http://schemas.microsoft.com/office/drawing/2014/main" id="{804F1FBD-A313-E83F-F536-A12A2E838AC3}"/>
+              </a:ext>
+            </a:extLst>
+          </p:cNvPr>
+          <p:cNvSpPr>
+            <a:spLocks noGrp="1"/>
+          </p:cNvSpPr>
+          <p:nvPr>
+            <p:ph idx="1"/>
+          </p:nvPr>
+        </p:nvSpPr>
+        <p:spPr/>
+        <p:txBody>
+          <a:bodyPr/>
+          <a:lstStyle/>
+          <a:p>
+            <a:endParaRPr lang="fr-FR"/>
+          </a:p>
+        </p:txBody>
+      </p:sp>
+    </p:spTree>
+    <p:extLst>
+      <p:ext uri="{BB962C8B-B14F-4D97-AF65-F5344CB8AC3E}">
+        <p14:creationId xmlns:p14="http://schemas.microsoft.com/office/powerpoint/2010/main" val="1612286955"/>
+      </p:ext>
+    </p:extLst>
+  </p:cSld>
+  <p:clrMapOvr>
+    <a:masterClrMapping/>
+  </p:clrMapOvr>
+</p:sld>
+</file>
+
+<file path=ppt/slides/slide9.xml><?xml version="1.0" encoding="utf-8"?>
+<p:sld xmlns:a="http://schemas.openxmlformats.org/drawingml/2006/main" xmlns:r="http://schemas.openxmlformats.org/officeDocument/2006/relationships" xmlns:p="http://schemas.openxmlformats.org/presentationml/2006/main">
+  <p:cSld>
+    <p:spTree>
+      <p:nvGrpSpPr>
+        <p:cNvPr id="1" name=""/>
+        <p:cNvGrpSpPr/>
+        <p:nvPr/>
+      </p:nvGrpSpPr>
+      <p:grpSpPr>
+        <a:xfrm>
+          <a:off x="0" y="0"/>
+          <a:ext cx="0" cy="0"/>
+          <a:chOff x="0" y="0"/>
+          <a:chExt cx="0" cy="0"/>
+        </a:xfrm>
+      </p:grpSpPr>
+      <p:sp>
+        <p:nvSpPr>
+          <p:cNvPr id="2" name="Titre 1">
+            <a:extLst>
+              <a:ext uri="{FF2B5EF4-FFF2-40B4-BE49-F238E27FC236}">
+                <a16:creationId xmlns:a16="http://schemas.microsoft.com/office/drawing/2014/main" id="{99380B92-D1BD-920D-9DDD-DE700497E6B3}"/>
+              </a:ext>
+            </a:extLst>
+          </p:cNvPr>
+          <p:cNvSpPr>
+            <a:spLocks noGrp="1"/>
+          </p:cNvSpPr>
+          <p:nvPr>
+            <p:ph type="title"/>
+          </p:nvPr>
+        </p:nvSpPr>
+        <p:spPr/>
+        <p:txBody>
+          <a:bodyPr/>
+          <a:lstStyle/>
+          <a:p>
+            <a:r>
+              <a:rPr lang="fr-FR"/>
+              <a:t>Framework 2/2</a:t>
+            </a:r>
+            <a:endParaRPr lang="fr-FR" dirty="0"/>
+          </a:p>
+        </p:txBody>
+      </p:sp>
+      <p:sp>
+        <p:nvSpPr>
+          <p:cNvPr id="3" name="Espace réservé du contenu 2">
+            <a:extLst>
+              <a:ext uri="{FF2B5EF4-FFF2-40B4-BE49-F238E27FC236}">
+                <a16:creationId xmlns:a16="http://schemas.microsoft.com/office/drawing/2014/main" id="{804F1FBD-A313-E83F-F536-A12A2E838AC3}"/>
+              </a:ext>
+            </a:extLst>
+          </p:cNvPr>
+          <p:cNvSpPr>
+            <a:spLocks noGrp="1"/>
+          </p:cNvSpPr>
+          <p:nvPr>
+            <p:ph idx="1"/>
+          </p:nvPr>
+        </p:nvSpPr>
+        <p:spPr/>
+        <p:txBody>
+          <a:bodyPr/>
+          <a:lstStyle/>
+          <a:p>
+            <a:endParaRPr lang="fr-FR"/>
+          </a:p>
+        </p:txBody>
+      </p:sp>
+    </p:spTree>
+    <p:extLst>
+      <p:ext uri="{BB962C8B-B14F-4D97-AF65-F5344CB8AC3E}">
+        <p14:creationId xmlns:p14="http://schemas.microsoft.com/office/powerpoint/2010/main" val="1695937145"/>
       </p:ext>
     </p:extLst>
   </p:cSld>

</xml_diff>

<commit_message>
finalize base line model adding threshold adjustement
</commit_message>
<xml_diff>
--- a/05_supervised_ML/99_Project_Conversion_rate_challenge/01_conversion_rate_challenge.pptx
+++ b/05_supervised_ML/99_Project_Conversion_rate_challenge/01_conversion_rate_challenge.pptx
@@ -5,7 +5,7 @@
     <p:sldMasterId id="2147483660" r:id="rId1"/>
   </p:sldMasterIdLst>
   <p:notesMasterIdLst>
-    <p:notesMasterId r:id="rId13"/>
+    <p:notesMasterId r:id="rId12"/>
   </p:notesMasterIdLst>
   <p:sldIdLst>
     <p:sldId id="256" r:id="rId2"/>
@@ -13,12 +13,11 @@
     <p:sldId id="266" r:id="rId4"/>
     <p:sldId id="264" r:id="rId5"/>
     <p:sldId id="267" r:id="rId6"/>
-    <p:sldId id="287" r:id="rId7"/>
-    <p:sldId id="286" r:id="rId8"/>
+    <p:sldId id="286" r:id="rId7"/>
+    <p:sldId id="287" r:id="rId8"/>
     <p:sldId id="268" r:id="rId9"/>
-    <p:sldId id="288" r:id="rId10"/>
-    <p:sldId id="257" r:id="rId11"/>
-    <p:sldId id="263" r:id="rId12"/>
+    <p:sldId id="257" r:id="rId10"/>
+    <p:sldId id="263" r:id="rId11"/>
   </p:sldIdLst>
   <p:sldSz cx="12192000" cy="6858000"/>
   <p:notesSz cx="6858000" cy="9144000"/>
@@ -128,7 +127,7 @@
 <file path=ppt/revisionInfo.xml><?xml version="1.0" encoding="utf-8"?>
 <p1510:revInfo xmlns:a="http://schemas.openxmlformats.org/drawingml/2006/main" xmlns:r="http://schemas.openxmlformats.org/officeDocument/2006/relationships" xmlns:p1510="http://schemas.microsoft.com/office/powerpoint/2015/10/main">
   <p1510:revLst>
-    <p1510:client id="{1601E6E7-CA79-4409-AD99-5386FB3F24AE}" v="25" dt="2024-08-24T09:39:44.292"/>
+    <p1510:client id="{1601E6E7-CA79-4409-AD99-5386FB3F24AE}" v="28" dt="2024-08-25T10:59:34.210"/>
   </p1510:revLst>
 </p1510:revInfo>
 </file>
@@ -1567,7 +1566,7 @@
   <pc:docChgLst>
     <pc:chgData name="Philippe Baucour" userId="5102170ae7533958" providerId="LiveId" clId="{1601E6E7-CA79-4409-AD99-5386FB3F24AE}"/>
     <pc:docChg chg="undo custSel addSld delSld modSld sldOrd">
-      <pc:chgData name="Philippe Baucour" userId="5102170ae7533958" providerId="LiveId" clId="{1601E6E7-CA79-4409-AD99-5386FB3F24AE}" dt="2024-08-24T09:42:35.984" v="798" actId="27636"/>
+      <pc:chgData name="Philippe Baucour" userId="5102170ae7533958" providerId="LiveId" clId="{1601E6E7-CA79-4409-AD99-5386FB3F24AE}" dt="2024-08-25T12:36:42.500" v="1627" actId="47"/>
       <pc:docMkLst>
         <pc:docMk/>
       </pc:docMkLst>
@@ -1681,13 +1680,13 @@
         </pc:inkChg>
       </pc:sldChg>
       <pc:sldChg chg="modSp mod ord">
-        <pc:chgData name="Philippe Baucour" userId="5102170ae7533958" providerId="LiveId" clId="{1601E6E7-CA79-4409-AD99-5386FB3F24AE}" dt="2024-08-24T09:38:59.057" v="743" actId="20577"/>
+        <pc:chgData name="Philippe Baucour" userId="5102170ae7533958" providerId="LiveId" clId="{1601E6E7-CA79-4409-AD99-5386FB3F24AE}" dt="2024-08-25T10:08:58.707" v="871" actId="20577"/>
         <pc:sldMkLst>
           <pc:docMk/>
           <pc:sldMk cId="312535264" sldId="263"/>
         </pc:sldMkLst>
         <pc:spChg chg="mod">
-          <ac:chgData name="Philippe Baucour" userId="5102170ae7533958" providerId="LiveId" clId="{1601E6E7-CA79-4409-AD99-5386FB3F24AE}" dt="2024-08-24T09:38:59.057" v="743" actId="20577"/>
+          <ac:chgData name="Philippe Baucour" userId="5102170ae7533958" providerId="LiveId" clId="{1601E6E7-CA79-4409-AD99-5386FB3F24AE}" dt="2024-08-25T10:08:58.707" v="871" actId="20577"/>
           <ac:spMkLst>
             <pc:docMk/>
             <pc:sldMk cId="312535264" sldId="263"/>
@@ -1980,7 +1979,7 @@
         </pc:sldMkLst>
       </pc:sldChg>
       <pc:sldChg chg="addSp delSp modSp add mod ord modNotesTx">
-        <pc:chgData name="Philippe Baucour" userId="5102170ae7533958" providerId="LiveId" clId="{1601E6E7-CA79-4409-AD99-5386FB3F24AE}" dt="2024-08-22T15:01:54.309" v="662" actId="20577"/>
+        <pc:chgData name="Philippe Baucour" userId="5102170ae7533958" providerId="LiveId" clId="{1601E6E7-CA79-4409-AD99-5386FB3F24AE}" dt="2024-08-25T10:02:57.329" v="822" actId="1037"/>
         <pc:sldMkLst>
           <pc:docMk/>
           <pc:sldMk cId="3231554383" sldId="266"/>
@@ -1991,6 +1990,14 @@
             <pc:docMk/>
             <pc:sldMk cId="3231554383" sldId="266"/>
             <ac:spMk id="2" creationId="{CA29B263-F466-620B-D79F-98E1228B9780}"/>
+          </ac:spMkLst>
+        </pc:spChg>
+        <pc:spChg chg="add mod">
+          <ac:chgData name="Philippe Baucour" userId="5102170ae7533958" providerId="LiveId" clId="{1601E6E7-CA79-4409-AD99-5386FB3F24AE}" dt="2024-08-25T10:02:57.329" v="822" actId="1037"/>
+          <ac:spMkLst>
+            <pc:docMk/>
+            <pc:sldMk cId="3231554383" sldId="266"/>
+            <ac:spMk id="5" creationId="{DABCC020-379D-DCB4-CD9D-F6FB97130E9E}"/>
           </ac:spMkLst>
         </pc:spChg>
         <pc:picChg chg="add mod">
@@ -2081,8 +2088,8 @@
           <pc:sldMk cId="3311186169" sldId="266"/>
         </pc:sldMkLst>
       </pc:sldChg>
-      <pc:sldChg chg="addSp modSp new mod">
-        <pc:chgData name="Philippe Baucour" userId="5102170ae7533958" providerId="LiveId" clId="{1601E6E7-CA79-4409-AD99-5386FB3F24AE}" dt="2024-08-23T07:22:06.028" v="724" actId="20577"/>
+      <pc:sldChg chg="addSp modSp new mod modNotesTx">
+        <pc:chgData name="Philippe Baucour" userId="5102170ae7533958" providerId="LiveId" clId="{1601E6E7-CA79-4409-AD99-5386FB3F24AE}" dt="2024-08-25T10:44:26.254" v="926" actId="20577"/>
         <pc:sldMkLst>
           <pc:docMk/>
           <pc:sldMk cId="2161612315" sldId="267"/>
@@ -2129,13 +2136,13 @@
         </pc:picChg>
       </pc:sldChg>
       <pc:sldChg chg="modSp new mod">
-        <pc:chgData name="Philippe Baucour" userId="5102170ae7533958" providerId="LiveId" clId="{1601E6E7-CA79-4409-AD99-5386FB3F24AE}" dt="2024-08-23T07:22:21.486" v="728" actId="20577"/>
+        <pc:chgData name="Philippe Baucour" userId="5102170ae7533958" providerId="LiveId" clId="{1601E6E7-CA79-4409-AD99-5386FB3F24AE}" dt="2024-08-25T12:36:39.235" v="1626" actId="20577"/>
         <pc:sldMkLst>
           <pc:docMk/>
           <pc:sldMk cId="1612286955" sldId="268"/>
         </pc:sldMkLst>
         <pc:spChg chg="mod">
-          <ac:chgData name="Philippe Baucour" userId="5102170ae7533958" providerId="LiveId" clId="{1601E6E7-CA79-4409-AD99-5386FB3F24AE}" dt="2024-08-23T07:22:21.486" v="728" actId="20577"/>
+          <ac:chgData name="Philippe Baucour" userId="5102170ae7533958" providerId="LiveId" clId="{1601E6E7-CA79-4409-AD99-5386FB3F24AE}" dt="2024-08-25T12:36:39.235" v="1626" actId="20577"/>
           <ac:spMkLst>
             <pc:docMk/>
             <pc:sldMk cId="1612286955" sldId="268"/>
@@ -2143,8 +2150,8 @@
           </ac:spMkLst>
         </pc:spChg>
       </pc:sldChg>
-      <pc:sldChg chg="delSp modSp add mod delAnim modAnim modShow">
-        <pc:chgData name="Philippe Baucour" userId="5102170ae7533958" providerId="LiveId" clId="{1601E6E7-CA79-4409-AD99-5386FB3F24AE}" dt="2024-08-22T15:06:16.192" v="670" actId="729"/>
+      <pc:sldChg chg="delSp modSp add mod ord delAnim modAnim modShow">
+        <pc:chgData name="Philippe Baucour" userId="5102170ae7533958" providerId="LiveId" clId="{1601E6E7-CA79-4409-AD99-5386FB3F24AE}" dt="2024-08-25T10:42:03.562" v="873"/>
         <pc:sldMkLst>
           <pc:docMk/>
           <pc:sldMk cId="4079956193" sldId="286"/>
@@ -2174,23 +2181,71 @@
           </ac:spMkLst>
         </pc:spChg>
       </pc:sldChg>
-      <pc:sldChg chg="modSp new mod">
-        <pc:chgData name="Philippe Baucour" userId="5102170ae7533958" providerId="LiveId" clId="{1601E6E7-CA79-4409-AD99-5386FB3F24AE}" dt="2024-08-23T07:22:00.116" v="720" actId="20577"/>
+      <pc:sldChg chg="addSp delSp modSp new mod modClrScheme chgLayout modNotesTx">
+        <pc:chgData name="Philippe Baucour" userId="5102170ae7533958" providerId="LiveId" clId="{1601E6E7-CA79-4409-AD99-5386FB3F24AE}" dt="2024-08-25T12:36:16.755" v="1624" actId="14100"/>
         <pc:sldMkLst>
           <pc:docMk/>
           <pc:sldMk cId="2275997330" sldId="287"/>
         </pc:sldMkLst>
-        <pc:spChg chg="mod">
-          <ac:chgData name="Philippe Baucour" userId="5102170ae7533958" providerId="LiveId" clId="{1601E6E7-CA79-4409-AD99-5386FB3F24AE}" dt="2024-08-23T07:22:00.116" v="720" actId="20577"/>
+        <pc:spChg chg="mod ord">
+          <ac:chgData name="Philippe Baucour" userId="5102170ae7533958" providerId="LiveId" clId="{1601E6E7-CA79-4409-AD99-5386FB3F24AE}" dt="2024-08-25T10:42:51.958" v="907" actId="700"/>
           <ac:spMkLst>
             <pc:docMk/>
             <pc:sldMk cId="2275997330" sldId="287"/>
             <ac:spMk id="2" creationId="{7EC6ADED-F7D6-006E-5E1A-43C369CF43C1}"/>
           </ac:spMkLst>
         </pc:spChg>
+        <pc:spChg chg="del">
+          <ac:chgData name="Philippe Baucour" userId="5102170ae7533958" providerId="LiveId" clId="{1601E6E7-CA79-4409-AD99-5386FB3F24AE}" dt="2024-08-25T10:42:51.958" v="907" actId="700"/>
+          <ac:spMkLst>
+            <pc:docMk/>
+            <pc:sldMk cId="2275997330" sldId="287"/>
+            <ac:spMk id="3" creationId="{30B415C2-EFD0-32B2-4D57-9DC18ABA9C40}"/>
+          </ac:spMkLst>
+        </pc:spChg>
+        <pc:picChg chg="add mod">
+          <ac:chgData name="Philippe Baucour" userId="5102170ae7533958" providerId="LiveId" clId="{1601E6E7-CA79-4409-AD99-5386FB3F24AE}" dt="2024-08-25T10:44:00.421" v="914" actId="14100"/>
+          <ac:picMkLst>
+            <pc:docMk/>
+            <pc:sldMk cId="2275997330" sldId="287"/>
+            <ac:picMk id="5" creationId="{D56DD871-CBF0-D271-96DF-46F6D9078743}"/>
+          </ac:picMkLst>
+        </pc:picChg>
+        <pc:picChg chg="add mod">
+          <ac:chgData name="Philippe Baucour" userId="5102170ae7533958" providerId="LiveId" clId="{1601E6E7-CA79-4409-AD99-5386FB3F24AE}" dt="2024-08-25T12:34:32.188" v="1591" actId="408"/>
+          <ac:picMkLst>
+            <pc:docMk/>
+            <pc:sldMk cId="2275997330" sldId="287"/>
+            <ac:picMk id="7" creationId="{CC852D71-26AB-6F66-97AE-D28506030CC7}"/>
+          </ac:picMkLst>
+        </pc:picChg>
+        <pc:picChg chg="add mod">
+          <ac:chgData name="Philippe Baucour" userId="5102170ae7533958" providerId="LiveId" clId="{1601E6E7-CA79-4409-AD99-5386FB3F24AE}" dt="2024-08-25T12:34:17.408" v="1571" actId="1037"/>
+          <ac:picMkLst>
+            <pc:docMk/>
+            <pc:sldMk cId="2275997330" sldId="287"/>
+            <ac:picMk id="9" creationId="{9E88AA2D-ECCB-5F44-7000-D26F7495D410}"/>
+          </ac:picMkLst>
+        </pc:picChg>
+        <pc:picChg chg="add mod">
+          <ac:chgData name="Philippe Baucour" userId="5102170ae7533958" providerId="LiveId" clId="{1601E6E7-CA79-4409-AD99-5386FB3F24AE}" dt="2024-08-25T12:34:52.017" v="1620" actId="1036"/>
+          <ac:picMkLst>
+            <pc:docMk/>
+            <pc:sldMk cId="2275997330" sldId="287"/>
+            <ac:picMk id="11" creationId="{0E8AC127-CAC1-4246-6705-B442DE6F4C8B}"/>
+          </ac:picMkLst>
+        </pc:picChg>
+        <pc:picChg chg="add mod">
+          <ac:chgData name="Philippe Baucour" userId="5102170ae7533958" providerId="LiveId" clId="{1601E6E7-CA79-4409-AD99-5386FB3F24AE}" dt="2024-08-25T12:36:16.755" v="1624" actId="14100"/>
+          <ac:picMkLst>
+            <pc:docMk/>
+            <pc:sldMk cId="2275997330" sldId="287"/>
+            <ac:picMk id="13" creationId="{277FD061-D902-CE25-6179-D9375CFB392C}"/>
+          </ac:picMkLst>
+        </pc:picChg>
       </pc:sldChg>
-      <pc:sldChg chg="modSp add mod">
-        <pc:chgData name="Philippe Baucour" userId="5102170ae7533958" providerId="LiveId" clId="{1601E6E7-CA79-4409-AD99-5386FB3F24AE}" dt="2024-08-23T07:22:29.340" v="731" actId="20577"/>
+      <pc:sldChg chg="modSp add del mod">
+        <pc:chgData name="Philippe Baucour" userId="5102170ae7533958" providerId="LiveId" clId="{1601E6E7-CA79-4409-AD99-5386FB3F24AE}" dt="2024-08-25T12:36:42.500" v="1627" actId="47"/>
         <pc:sldMkLst>
           <pc:docMk/>
           <pc:sldMk cId="1695937145" sldId="288"/>
@@ -2436,7 +2491,7 @@
           <a:p>
             <a:fld id="{FD1752CD-A7D2-4825-BC26-9DAEFBD0A5FF}" type="datetimeFigureOut">
               <a:rPr lang="fr-FR" smtClean="0"/>
-              <a:t>24/08/2024</a:t>
+              <a:t>25/08/2024</a:t>
             </a:fld>
             <a:endParaRPr lang="fr-FR"/>
           </a:p>
@@ -3290,1175 +3345,23 @@
           <a:lstStyle/>
           <a:p>
             <a:r>
-              <a:rPr lang="en-US" b="0" i="0" dirty="0">
-                <a:solidFill>
-                  <a:srgbClr val="0C0D0E"/>
-                </a:solidFill>
-                <a:effectLst/>
-                <a:latin typeface="-apple-system"/>
-              </a:rPr>
-              <a:t>Pour les </a:t>
-            </a:r>
-            <a:r>
-              <a:rPr lang="en-US" b="1" i="0" dirty="0">
-                <a:solidFill>
-                  <a:srgbClr val="0C0D0E"/>
-                </a:solidFill>
-                <a:effectLst/>
-                <a:latin typeface="-apple-system"/>
-              </a:rPr>
-              <a:t>classifications</a:t>
-            </a:r>
-          </a:p>
-          <a:p>
-            <a:endParaRPr lang="en-US" b="1" i="0" dirty="0">
-              <a:solidFill>
-                <a:srgbClr val="0C0D0E"/>
-              </a:solidFill>
-              <a:effectLst/>
-              <a:latin typeface="-apple-system"/>
-            </a:endParaRPr>
-          </a:p>
-          <a:p>
-            <a:r>
-              <a:rPr lang="en-US" b="0" i="0" dirty="0" err="1">
-                <a:solidFill>
-                  <a:srgbClr val="0C0D0E"/>
-                </a:solidFill>
-                <a:effectLst/>
-                <a:latin typeface="-apple-system"/>
-              </a:rPr>
-              <a:t>C'est</a:t>
-            </a:r>
-            <a:r>
-              <a:rPr lang="en-US" b="0" i="0" dirty="0">
-                <a:solidFill>
-                  <a:srgbClr val="0C0D0E"/>
-                </a:solidFill>
-                <a:effectLst/>
-                <a:latin typeface="-apple-system"/>
-              </a:rPr>
-              <a:t> important de </a:t>
-            </a:r>
-            <a:r>
-              <a:rPr lang="en-US" b="0" i="0" dirty="0" err="1">
-                <a:solidFill>
-                  <a:srgbClr val="0C0D0E"/>
-                </a:solidFill>
-                <a:effectLst/>
-                <a:latin typeface="-apple-system"/>
-              </a:rPr>
-              <a:t>choisir</a:t>
-            </a:r>
-            <a:r>
-              <a:rPr lang="en-US" b="0" i="0" dirty="0">
-                <a:solidFill>
-                  <a:srgbClr val="0C0D0E"/>
-                </a:solidFill>
-                <a:effectLst/>
-                <a:latin typeface="-apple-system"/>
-              </a:rPr>
-              <a:t> </a:t>
-            </a:r>
-            <a:r>
-              <a:rPr lang="en-US" b="0" i="0" dirty="0" err="1">
-                <a:solidFill>
-                  <a:srgbClr val="0C0D0E"/>
-                </a:solidFill>
-                <a:effectLst/>
-                <a:latin typeface="-apple-system"/>
-              </a:rPr>
-              <a:t>si</a:t>
-            </a:r>
-            <a:r>
-              <a:rPr lang="en-US" b="0" i="0" dirty="0">
-                <a:solidFill>
-                  <a:srgbClr val="0C0D0E"/>
-                </a:solidFill>
-                <a:effectLst/>
-                <a:latin typeface="-apple-system"/>
-              </a:rPr>
-              <a:t> on </a:t>
-            </a:r>
-            <a:r>
-              <a:rPr lang="en-US" b="0" i="0" dirty="0" err="1">
-                <a:solidFill>
-                  <a:srgbClr val="0C0D0E"/>
-                </a:solidFill>
-                <a:effectLst/>
-                <a:latin typeface="-apple-system"/>
-              </a:rPr>
-              <a:t>veut</a:t>
-            </a:r>
-            <a:r>
-              <a:rPr lang="en-US" b="0" i="0" dirty="0">
-                <a:solidFill>
-                  <a:srgbClr val="0C0D0E"/>
-                </a:solidFill>
-                <a:effectLst/>
-                <a:latin typeface="-apple-system"/>
-              </a:rPr>
-              <a:t> </a:t>
-            </a:r>
-            <a:r>
-              <a:rPr lang="en-US" b="0" i="0" dirty="0" err="1">
-                <a:solidFill>
-                  <a:srgbClr val="0C0D0E"/>
-                </a:solidFill>
-                <a:effectLst/>
-                <a:latin typeface="-apple-system"/>
-              </a:rPr>
-              <a:t>favoriser</a:t>
-            </a:r>
-            <a:r>
-              <a:rPr lang="en-US" b="0" i="0" dirty="0">
-                <a:solidFill>
-                  <a:srgbClr val="0C0D0E"/>
-                </a:solidFill>
-                <a:effectLst/>
-                <a:latin typeface="-apple-system"/>
-              </a:rPr>
-              <a:t> le Recall </a:t>
-            </a:r>
-            <a:r>
-              <a:rPr lang="en-US" b="0" i="0" dirty="0" err="1">
-                <a:solidFill>
-                  <a:srgbClr val="0C0D0E"/>
-                </a:solidFill>
-                <a:effectLst/>
-                <a:latin typeface="-apple-system"/>
-              </a:rPr>
-              <a:t>ou</a:t>
-            </a:r>
-            <a:r>
-              <a:rPr lang="en-US" b="0" i="0" dirty="0">
-                <a:solidFill>
-                  <a:srgbClr val="0C0D0E"/>
-                </a:solidFill>
-                <a:effectLst/>
-                <a:latin typeface="-apple-system"/>
-              </a:rPr>
-              <a:t> la Precision car </a:t>
-            </a:r>
-            <a:r>
-              <a:rPr lang="en-US" b="0" i="0" dirty="0" err="1">
-                <a:solidFill>
-                  <a:srgbClr val="0C0D0E"/>
-                </a:solidFill>
-                <a:effectLst/>
-                <a:latin typeface="-apple-system"/>
-              </a:rPr>
-              <a:t>c'est</a:t>
-            </a:r>
-            <a:r>
-              <a:rPr lang="en-US" b="0" i="0" dirty="0">
-                <a:solidFill>
-                  <a:srgbClr val="0C0D0E"/>
-                </a:solidFill>
-                <a:effectLst/>
-                <a:latin typeface="-apple-system"/>
-              </a:rPr>
-              <a:t> le </a:t>
-            </a:r>
-            <a:r>
-              <a:rPr lang="en-US" b="0" i="0" dirty="0" err="1">
-                <a:solidFill>
-                  <a:srgbClr val="0C0D0E"/>
-                </a:solidFill>
-                <a:effectLst/>
-                <a:latin typeface="-apple-system"/>
-              </a:rPr>
-              <a:t>métrique</a:t>
-            </a:r>
-            <a:r>
-              <a:rPr lang="en-US" b="0" i="0" dirty="0">
-                <a:solidFill>
-                  <a:srgbClr val="0C0D0E"/>
-                </a:solidFill>
-                <a:effectLst/>
-                <a:latin typeface="-apple-system"/>
-              </a:rPr>
-              <a:t> </a:t>
-            </a:r>
-            <a:r>
-              <a:rPr lang="en-US" b="0" i="0" dirty="0" err="1">
-                <a:solidFill>
-                  <a:srgbClr val="0C0D0E"/>
-                </a:solidFill>
-                <a:effectLst/>
-                <a:latin typeface="-apple-system"/>
-              </a:rPr>
-              <a:t>dont</a:t>
-            </a:r>
-            <a:r>
-              <a:rPr lang="en-US" b="0" i="0" dirty="0">
-                <a:solidFill>
-                  <a:srgbClr val="0C0D0E"/>
-                </a:solidFill>
-                <a:effectLst/>
-                <a:latin typeface="-apple-system"/>
-              </a:rPr>
-              <a:t> on </a:t>
-            </a:r>
-            <a:r>
-              <a:rPr lang="en-US" b="0" i="0" dirty="0" err="1">
-                <a:solidFill>
-                  <a:srgbClr val="0C0D0E"/>
-                </a:solidFill>
-                <a:effectLst/>
-                <a:latin typeface="-apple-system"/>
-              </a:rPr>
-              <a:t>va</a:t>
-            </a:r>
-            <a:r>
-              <a:rPr lang="en-US" b="0" i="0" dirty="0">
-                <a:solidFill>
-                  <a:srgbClr val="0C0D0E"/>
-                </a:solidFill>
-                <a:effectLst/>
-                <a:latin typeface="-apple-system"/>
-              </a:rPr>
-              <a:t> </a:t>
-            </a:r>
-            <a:r>
-              <a:rPr lang="en-US" b="0" i="0" dirty="0" err="1">
-                <a:solidFill>
-                  <a:srgbClr val="0C0D0E"/>
-                </a:solidFill>
-                <a:effectLst/>
-                <a:latin typeface="-apple-system"/>
-              </a:rPr>
-              <a:t>suivre</a:t>
-            </a:r>
-            <a:r>
-              <a:rPr lang="en-US" b="0" i="0" dirty="0">
-                <a:solidFill>
-                  <a:srgbClr val="0C0D0E"/>
-                </a:solidFill>
-                <a:effectLst/>
-                <a:latin typeface="-apple-system"/>
-              </a:rPr>
-              <a:t> </a:t>
-            </a:r>
-            <a:r>
-              <a:rPr lang="en-US" b="0" i="0" dirty="0" err="1">
-                <a:solidFill>
-                  <a:srgbClr val="0C0D0E"/>
-                </a:solidFill>
-                <a:effectLst/>
-                <a:latin typeface="-apple-system"/>
-              </a:rPr>
-              <a:t>l'évolue</a:t>
-            </a:r>
-            <a:r>
-              <a:rPr lang="en-US" b="0" i="0" dirty="0">
-                <a:solidFill>
-                  <a:srgbClr val="0C0D0E"/>
-                </a:solidFill>
-                <a:effectLst/>
-                <a:latin typeface="-apple-system"/>
-              </a:rPr>
-              <a:t> </a:t>
-            </a:r>
-            <a:r>
-              <a:rPr lang="en-US" b="0" i="0" dirty="0" err="1">
-                <a:solidFill>
-                  <a:srgbClr val="0C0D0E"/>
-                </a:solidFill>
-                <a:effectLst/>
-                <a:latin typeface="-apple-system"/>
-              </a:rPr>
-              <a:t>lors</a:t>
-            </a:r>
-            <a:r>
-              <a:rPr lang="en-US" b="0" i="0" dirty="0">
-                <a:solidFill>
-                  <a:srgbClr val="0C0D0E"/>
-                </a:solidFill>
-                <a:effectLst/>
-                <a:latin typeface="-apple-system"/>
-              </a:rPr>
-              <a:t> des runs </a:t>
-            </a:r>
-            <a:r>
-              <a:rPr lang="en-US" b="0" i="0" dirty="0" err="1">
-                <a:solidFill>
-                  <a:srgbClr val="0C0D0E"/>
-                </a:solidFill>
-                <a:effectLst/>
-                <a:latin typeface="-apple-system"/>
-              </a:rPr>
-              <a:t>successifs</a:t>
-            </a:r>
-            <a:endParaRPr lang="en-US" b="0" i="0" dirty="0">
-              <a:solidFill>
-                <a:srgbClr val="0C0D0E"/>
-              </a:solidFill>
-              <a:effectLst/>
-              <a:latin typeface="-apple-system"/>
-            </a:endParaRPr>
-          </a:p>
-          <a:p>
-            <a:r>
-              <a:rPr lang="en-US" b="0" i="0" dirty="0">
-                <a:solidFill>
-                  <a:srgbClr val="0C0D0E"/>
-                </a:solidFill>
-                <a:effectLst/>
-                <a:latin typeface="-apple-system"/>
-              </a:rPr>
-              <a:t>Si on </a:t>
-            </a:r>
-            <a:r>
-              <a:rPr lang="en-US" b="0" i="0" dirty="0" err="1">
-                <a:solidFill>
-                  <a:srgbClr val="0C0D0E"/>
-                </a:solidFill>
-                <a:effectLst/>
-                <a:latin typeface="-apple-system"/>
-              </a:rPr>
-              <a:t>veut</a:t>
-            </a:r>
-            <a:r>
-              <a:rPr lang="en-US" b="0" i="0" dirty="0">
-                <a:solidFill>
-                  <a:srgbClr val="0C0D0E"/>
-                </a:solidFill>
-                <a:effectLst/>
-                <a:latin typeface="-apple-system"/>
-              </a:rPr>
-              <a:t> pas </a:t>
-            </a:r>
-            <a:r>
-              <a:rPr lang="en-US" b="0" i="0" dirty="0" err="1">
-                <a:solidFill>
-                  <a:srgbClr val="0C0D0E"/>
-                </a:solidFill>
-                <a:effectLst/>
-                <a:latin typeface="-apple-system"/>
-              </a:rPr>
-              <a:t>choisir</a:t>
-            </a:r>
-            <a:r>
-              <a:rPr lang="en-US" b="0" i="0" dirty="0">
-                <a:solidFill>
-                  <a:srgbClr val="0C0D0E"/>
-                </a:solidFill>
-                <a:effectLst/>
-                <a:latin typeface="-apple-system"/>
-              </a:rPr>
-              <a:t> entre Precision et Recall, prendre F1 Score</a:t>
-            </a:r>
-          </a:p>
-          <a:p>
-            <a:endParaRPr lang="en-US" b="0" i="0" dirty="0">
-              <a:solidFill>
-                <a:srgbClr val="0C0D0E"/>
-              </a:solidFill>
-              <a:effectLst/>
-              <a:latin typeface="-apple-system"/>
-            </a:endParaRPr>
-          </a:p>
-          <a:p>
-            <a:r>
-              <a:rPr lang="en-US" b="1" i="0" dirty="0">
-                <a:solidFill>
-                  <a:srgbClr val="0C0D0E"/>
-                </a:solidFill>
-                <a:effectLst/>
-                <a:latin typeface="-apple-system"/>
-              </a:rPr>
-              <a:t>Recall</a:t>
-            </a:r>
-            <a:r>
-              <a:rPr lang="en-US" b="0" i="0" dirty="0">
-                <a:solidFill>
-                  <a:srgbClr val="0C0D0E"/>
-                </a:solidFill>
-                <a:effectLst/>
-                <a:latin typeface="-apple-system"/>
-              </a:rPr>
-              <a:t> means to bring back or remember. </a:t>
-            </a:r>
-          </a:p>
-          <a:p>
-            <a:r>
-              <a:rPr lang="en-US" b="0" i="0" dirty="0">
-                <a:solidFill>
-                  <a:srgbClr val="0C0D0E"/>
-                </a:solidFill>
-                <a:effectLst/>
-                <a:latin typeface="-apple-system"/>
-              </a:rPr>
-              <a:t>The terminology comes from information retrieval where it's usually being applied to a result set from a query. </a:t>
-            </a:r>
-          </a:p>
-          <a:p>
-            <a:r>
-              <a:rPr lang="en-US" b="0" i="0" dirty="0">
-                <a:solidFill>
-                  <a:srgbClr val="0C0D0E"/>
-                </a:solidFill>
-                <a:effectLst/>
-                <a:latin typeface="-apple-system"/>
-              </a:rPr>
-              <a:t>The sense of it is : how much of the set of right answers was retrieved by the query? How much of it was recalled?</a:t>
-            </a:r>
-          </a:p>
-          <a:p>
-            <a:endParaRPr lang="en-US" b="0" i="0" dirty="0">
-              <a:solidFill>
-                <a:srgbClr val="0C0D0E"/>
-              </a:solidFill>
-              <a:effectLst/>
-              <a:latin typeface="-apple-system"/>
-            </a:endParaRPr>
-          </a:p>
-          <a:p>
-            <a:r>
-              <a:rPr lang="en-US" b="0" i="0" dirty="0">
-                <a:solidFill>
-                  <a:srgbClr val="0C0D0E"/>
-                </a:solidFill>
-                <a:effectLst/>
-                <a:latin typeface="-apple-system"/>
-              </a:rPr>
-              <a:t>Pour les medicaments</a:t>
-            </a:r>
-          </a:p>
-          <a:p>
-            <a:r>
-              <a:rPr lang="fr-FR" b="0" dirty="0" err="1">
-                <a:solidFill>
-                  <a:srgbClr val="CCCCCC"/>
-                </a:solidFill>
-                <a:effectLst/>
-                <a:latin typeface="JetBrains Mono" panose="02000009000000000000" pitchFamily="49" charset="0"/>
-              </a:rPr>
-              <a:t>Precision</a:t>
-            </a:r>
-            <a:r>
-              <a:rPr lang="fr-FR" b="0" dirty="0">
-                <a:solidFill>
-                  <a:srgbClr val="CCCCCC"/>
-                </a:solidFill>
-                <a:effectLst/>
-                <a:latin typeface="JetBrains Mono" panose="02000009000000000000" pitchFamily="49" charset="0"/>
-              </a:rPr>
-              <a:t> :</a:t>
-            </a:r>
-          </a:p>
-          <a:p>
-            <a:r>
-              <a:rPr lang="fr-FR" b="0" dirty="0">
-                <a:solidFill>
-                  <a:srgbClr val="6796E6"/>
-                </a:solidFill>
-                <a:effectLst/>
-                <a:latin typeface="JetBrains Mono" panose="02000009000000000000" pitchFamily="49" charset="0"/>
-              </a:rPr>
-              <a:t>*</a:t>
-            </a:r>
-            <a:r>
-              <a:rPr lang="fr-FR" b="0" dirty="0">
-                <a:solidFill>
-                  <a:srgbClr val="CCCCCC"/>
-                </a:solidFill>
-                <a:effectLst/>
-                <a:latin typeface="JetBrains Mono" panose="02000009000000000000" pitchFamily="49" charset="0"/>
-              </a:rPr>
-              <a:t> colonne de </a:t>
-            </a:r>
-            <a:r>
-              <a:rPr lang="fr-FR" b="0" dirty="0" err="1">
-                <a:solidFill>
-                  <a:srgbClr val="CCCCCC"/>
-                </a:solidFill>
-                <a:effectLst/>
-                <a:latin typeface="JetBrains Mono" panose="02000009000000000000" pitchFamily="49" charset="0"/>
-              </a:rPr>
-              <a:t>dtorite</a:t>
-            </a:r>
-            <a:endParaRPr lang="fr-FR" b="0" dirty="0">
-              <a:solidFill>
-                <a:srgbClr val="CCCCCC"/>
-              </a:solidFill>
-              <a:effectLst/>
-              <a:latin typeface="JetBrains Mono" panose="02000009000000000000" pitchFamily="49" charset="0"/>
-            </a:endParaRPr>
-          </a:p>
-          <a:p>
-            <a:r>
-              <a:rPr lang="fr-FR" b="0" dirty="0">
-                <a:solidFill>
-                  <a:srgbClr val="6796E6"/>
-                </a:solidFill>
-                <a:effectLst/>
-                <a:latin typeface="JetBrains Mono" panose="02000009000000000000" pitchFamily="49" charset="0"/>
-              </a:rPr>
-              <a:t>*</a:t>
-            </a:r>
-            <a:r>
-              <a:rPr lang="fr-FR" b="0" dirty="0">
-                <a:solidFill>
-                  <a:srgbClr val="CCCCCC"/>
-                </a:solidFill>
-                <a:effectLst/>
-                <a:latin typeface="JetBrains Mono" panose="02000009000000000000" pitchFamily="49" charset="0"/>
-              </a:rPr>
-              <a:t> $</a:t>
-            </a:r>
-            <a:r>
-              <a:rPr lang="fr-FR" b="0" dirty="0">
-                <a:solidFill>
-                  <a:srgbClr val="D4D4D4"/>
-                </a:solidFill>
-                <a:effectLst/>
-                <a:latin typeface="JetBrains Mono" panose="02000009000000000000" pitchFamily="49" charset="0"/>
-              </a:rPr>
-              <a:t> </a:t>
-            </a:r>
-            <a:r>
-              <a:rPr lang="fr-FR" b="0" dirty="0">
-                <a:solidFill>
-                  <a:srgbClr val="569CD6"/>
-                </a:solidFill>
-                <a:effectLst/>
-                <a:latin typeface="JetBrains Mono" panose="02000009000000000000" pitchFamily="49" charset="0"/>
-              </a:rPr>
-              <a:t>\</a:t>
-            </a:r>
-            <a:r>
-              <a:rPr lang="fr-FR" b="0" dirty="0" err="1">
-                <a:solidFill>
-                  <a:srgbClr val="DCDCAA"/>
-                </a:solidFill>
-                <a:effectLst/>
-                <a:latin typeface="JetBrains Mono" panose="02000009000000000000" pitchFamily="49" charset="0"/>
-              </a:rPr>
-              <a:t>text</a:t>
-            </a:r>
-            <a:r>
-              <a:rPr lang="fr-FR" b="0" dirty="0">
-                <a:solidFill>
-                  <a:srgbClr val="D4D4D4"/>
-                </a:solidFill>
-                <a:effectLst/>
-                <a:latin typeface="JetBrains Mono" panose="02000009000000000000" pitchFamily="49" charset="0"/>
-              </a:rPr>
-              <a:t>{</a:t>
-            </a:r>
-            <a:r>
-              <a:rPr lang="fr-FR" b="0" dirty="0" err="1">
-                <a:solidFill>
-                  <a:srgbClr val="D4D4D4"/>
-                </a:solidFill>
-                <a:effectLst/>
-                <a:latin typeface="JetBrains Mono" panose="02000009000000000000" pitchFamily="49" charset="0"/>
-              </a:rPr>
-              <a:t>Precision</a:t>
-            </a:r>
-            <a:r>
-              <a:rPr lang="fr-FR" b="0" dirty="0">
-                <a:solidFill>
-                  <a:srgbClr val="D4D4D4"/>
-                </a:solidFill>
-                <a:effectLst/>
-                <a:latin typeface="JetBrains Mono" panose="02000009000000000000" pitchFamily="49" charset="0"/>
-              </a:rPr>
-              <a:t>}  = </a:t>
-            </a:r>
-            <a:r>
-              <a:rPr lang="fr-FR" b="0" dirty="0">
-                <a:solidFill>
-                  <a:srgbClr val="569CD6"/>
-                </a:solidFill>
-                <a:effectLst/>
-                <a:latin typeface="JetBrains Mono" panose="02000009000000000000" pitchFamily="49" charset="0"/>
-              </a:rPr>
-              <a:t>\</a:t>
-            </a:r>
-            <a:r>
-              <a:rPr lang="fr-FR" b="0" dirty="0">
-                <a:solidFill>
-                  <a:srgbClr val="DCDCAA"/>
-                </a:solidFill>
-                <a:effectLst/>
-                <a:latin typeface="JetBrains Mono" panose="02000009000000000000" pitchFamily="49" charset="0"/>
-              </a:rPr>
-              <a:t>frac</a:t>
-            </a:r>
-            <a:r>
-              <a:rPr lang="fr-FR" b="0" dirty="0">
-                <a:solidFill>
-                  <a:srgbClr val="D4D4D4"/>
-                </a:solidFill>
-                <a:effectLst/>
-                <a:latin typeface="JetBrains Mono" panose="02000009000000000000" pitchFamily="49" charset="0"/>
-              </a:rPr>
-              <a:t>{TP}{TP+FP}</a:t>
-            </a:r>
-            <a:r>
-              <a:rPr lang="fr-FR" b="0" dirty="0">
-                <a:solidFill>
-                  <a:srgbClr val="CCCCCC"/>
-                </a:solidFill>
-                <a:effectLst/>
-                <a:latin typeface="JetBrains Mono" panose="02000009000000000000" pitchFamily="49" charset="0"/>
-              </a:rPr>
-              <a:t>$</a:t>
-            </a:r>
-          </a:p>
-          <a:p>
-            <a:br>
-              <a:rPr lang="fr-FR" b="0" dirty="0">
-                <a:solidFill>
-                  <a:srgbClr val="CCCCCC"/>
-                </a:solidFill>
-                <a:effectLst/>
-                <a:latin typeface="JetBrains Mono" panose="02000009000000000000" pitchFamily="49" charset="0"/>
-              </a:rPr>
-            </a:br>
-            <a:r>
-              <a:rPr lang="fr-FR" b="0" dirty="0" err="1">
-                <a:solidFill>
-                  <a:srgbClr val="CCCCCC"/>
-                </a:solidFill>
-                <a:effectLst/>
-                <a:latin typeface="JetBrains Mono" panose="02000009000000000000" pitchFamily="49" charset="0"/>
-              </a:rPr>
-              <a:t>Recall</a:t>
-            </a:r>
-            <a:r>
-              <a:rPr lang="fr-FR" b="0" dirty="0">
-                <a:solidFill>
-                  <a:srgbClr val="CCCCCC"/>
-                </a:solidFill>
-                <a:effectLst/>
-                <a:latin typeface="JetBrains Mono" panose="02000009000000000000" pitchFamily="49" charset="0"/>
-              </a:rPr>
-              <a:t> : </a:t>
-            </a:r>
-          </a:p>
-          <a:p>
-            <a:r>
-              <a:rPr lang="fr-FR" b="0" dirty="0">
-                <a:solidFill>
-                  <a:srgbClr val="6796E6"/>
-                </a:solidFill>
-                <a:effectLst/>
-                <a:latin typeface="JetBrains Mono" panose="02000009000000000000" pitchFamily="49" charset="0"/>
-              </a:rPr>
-              <a:t>*</a:t>
-            </a:r>
-            <a:r>
-              <a:rPr lang="fr-FR" b="0" dirty="0">
-                <a:solidFill>
-                  <a:srgbClr val="CCCCCC"/>
-                </a:solidFill>
-                <a:effectLst/>
-                <a:latin typeface="JetBrains Mono" panose="02000009000000000000" pitchFamily="49" charset="0"/>
-              </a:rPr>
-              <a:t> ligne du bas</a:t>
-            </a:r>
-          </a:p>
-          <a:p>
-            <a:r>
-              <a:rPr lang="fr-FR" b="0" dirty="0">
-                <a:solidFill>
-                  <a:srgbClr val="6796E6"/>
-                </a:solidFill>
-                <a:effectLst/>
-                <a:latin typeface="JetBrains Mono" panose="02000009000000000000" pitchFamily="49" charset="0"/>
-              </a:rPr>
-              <a:t>*</a:t>
-            </a:r>
-            <a:r>
-              <a:rPr lang="fr-FR" b="0" dirty="0">
-                <a:solidFill>
-                  <a:srgbClr val="CCCCCC"/>
-                </a:solidFill>
-                <a:effectLst/>
-                <a:latin typeface="JetBrains Mono" panose="02000009000000000000" pitchFamily="49" charset="0"/>
-              </a:rPr>
-              <a:t> $</a:t>
-            </a:r>
-            <a:r>
-              <a:rPr lang="fr-FR" b="0" dirty="0">
-                <a:solidFill>
-                  <a:srgbClr val="D4D4D4"/>
-                </a:solidFill>
-                <a:effectLst/>
-                <a:latin typeface="JetBrains Mono" panose="02000009000000000000" pitchFamily="49" charset="0"/>
-              </a:rPr>
-              <a:t> </a:t>
-            </a:r>
-            <a:r>
-              <a:rPr lang="fr-FR" b="0" dirty="0">
-                <a:solidFill>
-                  <a:srgbClr val="569CD6"/>
-                </a:solidFill>
-                <a:effectLst/>
-                <a:latin typeface="JetBrains Mono" panose="02000009000000000000" pitchFamily="49" charset="0"/>
-              </a:rPr>
-              <a:t>\</a:t>
-            </a:r>
-            <a:r>
-              <a:rPr lang="fr-FR" b="0" dirty="0" err="1">
-                <a:solidFill>
-                  <a:srgbClr val="DCDCAA"/>
-                </a:solidFill>
-                <a:effectLst/>
-                <a:latin typeface="JetBrains Mono" panose="02000009000000000000" pitchFamily="49" charset="0"/>
-              </a:rPr>
-              <a:t>text</a:t>
-            </a:r>
-            <a:r>
-              <a:rPr lang="fr-FR" b="0" dirty="0">
-                <a:solidFill>
-                  <a:srgbClr val="D4D4D4"/>
-                </a:solidFill>
-                <a:effectLst/>
-                <a:latin typeface="JetBrains Mono" panose="02000009000000000000" pitchFamily="49" charset="0"/>
-              </a:rPr>
-              <a:t>{</a:t>
-            </a:r>
-            <a:r>
-              <a:rPr lang="fr-FR" b="0" dirty="0" err="1">
-                <a:solidFill>
-                  <a:srgbClr val="D4D4D4"/>
-                </a:solidFill>
-                <a:effectLst/>
-                <a:latin typeface="JetBrains Mono" panose="02000009000000000000" pitchFamily="49" charset="0"/>
-              </a:rPr>
-              <a:t>Recall</a:t>
-            </a:r>
-            <a:r>
-              <a:rPr lang="fr-FR" b="0" dirty="0">
-                <a:solidFill>
-                  <a:srgbClr val="D4D4D4"/>
-                </a:solidFill>
-                <a:effectLst/>
-                <a:latin typeface="JetBrains Mono" panose="02000009000000000000" pitchFamily="49" charset="0"/>
-              </a:rPr>
-              <a:t>} = </a:t>
-            </a:r>
-            <a:r>
-              <a:rPr lang="fr-FR" b="0" dirty="0">
-                <a:solidFill>
-                  <a:srgbClr val="569CD6"/>
-                </a:solidFill>
-                <a:effectLst/>
-                <a:latin typeface="JetBrains Mono" panose="02000009000000000000" pitchFamily="49" charset="0"/>
-              </a:rPr>
-              <a:t>\</a:t>
-            </a:r>
-            <a:r>
-              <a:rPr lang="fr-FR" b="0" dirty="0">
-                <a:solidFill>
-                  <a:srgbClr val="DCDCAA"/>
-                </a:solidFill>
-                <a:effectLst/>
-                <a:latin typeface="JetBrains Mono" panose="02000009000000000000" pitchFamily="49" charset="0"/>
-              </a:rPr>
-              <a:t>frac</a:t>
-            </a:r>
-            <a:r>
-              <a:rPr lang="fr-FR" b="0" dirty="0">
-                <a:solidFill>
-                  <a:srgbClr val="D4D4D4"/>
-                </a:solidFill>
-                <a:effectLst/>
-                <a:latin typeface="JetBrains Mono" panose="02000009000000000000" pitchFamily="49" charset="0"/>
-              </a:rPr>
-              <a:t>{TP}{TP+FN}</a:t>
-            </a:r>
-            <a:r>
-              <a:rPr lang="fr-FR" b="0" dirty="0">
-                <a:solidFill>
-                  <a:srgbClr val="CCCCCC"/>
-                </a:solidFill>
-                <a:effectLst/>
-                <a:latin typeface="JetBrains Mono" panose="02000009000000000000" pitchFamily="49" charset="0"/>
-              </a:rPr>
-              <a:t>$</a:t>
-            </a:r>
-          </a:p>
-          <a:p>
-            <a:br>
-              <a:rPr lang="fr-FR" b="0" dirty="0">
-                <a:solidFill>
-                  <a:srgbClr val="CCCCCC"/>
-                </a:solidFill>
-                <a:effectLst/>
-                <a:latin typeface="JetBrains Mono" panose="02000009000000000000" pitchFamily="49" charset="0"/>
-              </a:rPr>
-            </a:br>
-            <a:r>
-              <a:rPr lang="fr-FR" b="0" dirty="0" err="1">
-                <a:solidFill>
-                  <a:srgbClr val="CCCCCC"/>
-                </a:solidFill>
-                <a:effectLst/>
-                <a:latin typeface="JetBrains Mono" panose="02000009000000000000" pitchFamily="49" charset="0"/>
-              </a:rPr>
-              <a:t>Sensitivity</a:t>
-            </a:r>
-            <a:r>
-              <a:rPr lang="fr-FR" b="0" dirty="0">
-                <a:solidFill>
-                  <a:srgbClr val="CCCCCC"/>
-                </a:solidFill>
-                <a:effectLst/>
-                <a:latin typeface="JetBrains Mono" panose="02000009000000000000" pitchFamily="49" charset="0"/>
-              </a:rPr>
-              <a:t> = </a:t>
-            </a:r>
-            <a:r>
-              <a:rPr lang="fr-FR" b="0" dirty="0" err="1">
-                <a:solidFill>
-                  <a:srgbClr val="CCCCCC"/>
-                </a:solidFill>
-                <a:effectLst/>
-                <a:latin typeface="JetBrains Mono" panose="02000009000000000000" pitchFamily="49" charset="0"/>
-              </a:rPr>
-              <a:t>Recall</a:t>
-            </a:r>
-            <a:endParaRPr lang="fr-FR" b="0" dirty="0">
-              <a:solidFill>
-                <a:srgbClr val="CCCCCC"/>
-              </a:solidFill>
-              <a:effectLst/>
-              <a:latin typeface="JetBrains Mono" panose="02000009000000000000" pitchFamily="49" charset="0"/>
-            </a:endParaRPr>
-          </a:p>
-          <a:p>
-            <a:r>
-              <a:rPr lang="fr-FR" b="0" dirty="0">
-                <a:solidFill>
-                  <a:srgbClr val="6796E6"/>
-                </a:solidFill>
-                <a:effectLst/>
-                <a:latin typeface="JetBrains Mono" panose="02000009000000000000" pitchFamily="49" charset="0"/>
-              </a:rPr>
-              <a:t>*</a:t>
-            </a:r>
-            <a:r>
-              <a:rPr lang="fr-FR" b="0" dirty="0">
-                <a:solidFill>
-                  <a:srgbClr val="CCCCCC"/>
-                </a:solidFill>
-                <a:effectLst/>
-                <a:latin typeface="JetBrains Mono" panose="02000009000000000000" pitchFamily="49" charset="0"/>
-              </a:rPr>
-              <a:t> ligne du bas</a:t>
-            </a:r>
-          </a:p>
-          <a:p>
-            <a:r>
-              <a:rPr lang="fr-FR" b="0" dirty="0">
-                <a:solidFill>
-                  <a:srgbClr val="6796E6"/>
-                </a:solidFill>
-                <a:effectLst/>
-                <a:latin typeface="JetBrains Mono" panose="02000009000000000000" pitchFamily="49" charset="0"/>
-              </a:rPr>
-              <a:t>*</a:t>
-            </a:r>
-            <a:r>
-              <a:rPr lang="fr-FR" b="0" dirty="0">
-                <a:solidFill>
-                  <a:srgbClr val="CCCCCC"/>
-                </a:solidFill>
-                <a:effectLst/>
-                <a:latin typeface="JetBrains Mono" panose="02000009000000000000" pitchFamily="49" charset="0"/>
-              </a:rPr>
-              <a:t> $</a:t>
-            </a:r>
-            <a:r>
-              <a:rPr lang="fr-FR" b="0" dirty="0">
-                <a:solidFill>
-                  <a:srgbClr val="D4D4D4"/>
-                </a:solidFill>
-                <a:effectLst/>
-                <a:latin typeface="JetBrains Mono" panose="02000009000000000000" pitchFamily="49" charset="0"/>
-              </a:rPr>
-              <a:t> </a:t>
-            </a:r>
-            <a:r>
-              <a:rPr lang="fr-FR" b="0" dirty="0">
-                <a:solidFill>
-                  <a:srgbClr val="569CD6"/>
-                </a:solidFill>
-                <a:effectLst/>
-                <a:latin typeface="JetBrains Mono" panose="02000009000000000000" pitchFamily="49" charset="0"/>
-              </a:rPr>
-              <a:t>\</a:t>
-            </a:r>
-            <a:r>
-              <a:rPr lang="fr-FR" b="0" dirty="0" err="1">
-                <a:solidFill>
-                  <a:srgbClr val="DCDCAA"/>
-                </a:solidFill>
-                <a:effectLst/>
-                <a:latin typeface="JetBrains Mono" panose="02000009000000000000" pitchFamily="49" charset="0"/>
-              </a:rPr>
-              <a:t>text</a:t>
-            </a:r>
-            <a:r>
-              <a:rPr lang="fr-FR" b="0" dirty="0">
-                <a:solidFill>
-                  <a:srgbClr val="D4D4D4"/>
-                </a:solidFill>
-                <a:effectLst/>
-                <a:latin typeface="JetBrains Mono" panose="02000009000000000000" pitchFamily="49" charset="0"/>
-              </a:rPr>
-              <a:t>{</a:t>
-            </a:r>
-            <a:r>
-              <a:rPr lang="fr-FR" b="0" dirty="0" err="1">
-                <a:solidFill>
-                  <a:srgbClr val="D4D4D4"/>
-                </a:solidFill>
-                <a:effectLst/>
-                <a:latin typeface="JetBrains Mono" panose="02000009000000000000" pitchFamily="49" charset="0"/>
-              </a:rPr>
-              <a:t>Sensitivity</a:t>
-            </a:r>
-            <a:r>
-              <a:rPr lang="fr-FR" b="0" dirty="0">
-                <a:solidFill>
-                  <a:srgbClr val="D4D4D4"/>
-                </a:solidFill>
-                <a:effectLst/>
-                <a:latin typeface="JetBrains Mono" panose="02000009000000000000" pitchFamily="49" charset="0"/>
-              </a:rPr>
-              <a:t>} = </a:t>
-            </a:r>
-            <a:r>
-              <a:rPr lang="fr-FR" b="0" dirty="0">
-                <a:solidFill>
-                  <a:srgbClr val="569CD6"/>
-                </a:solidFill>
-                <a:effectLst/>
-                <a:latin typeface="JetBrains Mono" panose="02000009000000000000" pitchFamily="49" charset="0"/>
-              </a:rPr>
-              <a:t>\</a:t>
-            </a:r>
-            <a:r>
-              <a:rPr lang="fr-FR" b="0" dirty="0">
-                <a:solidFill>
-                  <a:srgbClr val="DCDCAA"/>
-                </a:solidFill>
-                <a:effectLst/>
-                <a:latin typeface="JetBrains Mono" panose="02000009000000000000" pitchFamily="49" charset="0"/>
-              </a:rPr>
-              <a:t>frac</a:t>
-            </a:r>
-            <a:r>
-              <a:rPr lang="fr-FR" b="0" dirty="0">
-                <a:solidFill>
-                  <a:srgbClr val="D4D4D4"/>
-                </a:solidFill>
-                <a:effectLst/>
-                <a:latin typeface="JetBrains Mono" panose="02000009000000000000" pitchFamily="49" charset="0"/>
-              </a:rPr>
-              <a:t>{TP}{TP+FN}</a:t>
-            </a:r>
-            <a:r>
-              <a:rPr lang="fr-FR" b="0" dirty="0">
-                <a:solidFill>
-                  <a:srgbClr val="CCCCCC"/>
-                </a:solidFill>
-                <a:effectLst/>
-                <a:latin typeface="JetBrains Mono" panose="02000009000000000000" pitchFamily="49" charset="0"/>
-              </a:rPr>
-              <a:t>$</a:t>
-            </a:r>
-          </a:p>
-          <a:p>
-            <a:br>
-              <a:rPr lang="fr-FR" b="0" dirty="0">
-                <a:solidFill>
-                  <a:srgbClr val="CCCCCC"/>
-                </a:solidFill>
-                <a:effectLst/>
-                <a:latin typeface="JetBrains Mono" panose="02000009000000000000" pitchFamily="49" charset="0"/>
-              </a:rPr>
-            </a:br>
-            <a:r>
-              <a:rPr lang="fr-FR" b="0" dirty="0" err="1">
-                <a:solidFill>
-                  <a:srgbClr val="CCCCCC"/>
-                </a:solidFill>
-                <a:effectLst/>
-                <a:latin typeface="JetBrains Mono" panose="02000009000000000000" pitchFamily="49" charset="0"/>
-              </a:rPr>
-              <a:t>Specificity</a:t>
-            </a:r>
-            <a:r>
-              <a:rPr lang="fr-FR" b="0" dirty="0">
-                <a:solidFill>
-                  <a:srgbClr val="CCCCCC"/>
-                </a:solidFill>
-                <a:effectLst/>
-                <a:latin typeface="JetBrains Mono" panose="02000009000000000000" pitchFamily="49" charset="0"/>
-              </a:rPr>
-              <a:t> :</a:t>
-            </a:r>
-          </a:p>
-          <a:p>
-            <a:r>
-              <a:rPr lang="fr-FR" b="0" dirty="0">
-                <a:solidFill>
-                  <a:srgbClr val="6796E6"/>
-                </a:solidFill>
-                <a:effectLst/>
-                <a:latin typeface="JetBrains Mono" panose="02000009000000000000" pitchFamily="49" charset="0"/>
-              </a:rPr>
-              <a:t>*</a:t>
-            </a:r>
-            <a:r>
-              <a:rPr lang="fr-FR" b="0" dirty="0">
-                <a:solidFill>
-                  <a:srgbClr val="CCCCCC"/>
-                </a:solidFill>
-                <a:effectLst/>
-                <a:latin typeface="JetBrains Mono" panose="02000009000000000000" pitchFamily="49" charset="0"/>
-              </a:rPr>
-              <a:t> ligne du haut</a:t>
-            </a:r>
-          </a:p>
-          <a:p>
-            <a:r>
-              <a:rPr lang="fr-FR" b="0" dirty="0">
-                <a:solidFill>
-                  <a:srgbClr val="6796E6"/>
-                </a:solidFill>
-                <a:effectLst/>
-                <a:latin typeface="JetBrains Mono" panose="02000009000000000000" pitchFamily="49" charset="0"/>
-              </a:rPr>
-              <a:t>*</a:t>
-            </a:r>
-            <a:r>
-              <a:rPr lang="fr-FR" b="0" dirty="0">
-                <a:solidFill>
-                  <a:srgbClr val="CCCCCC"/>
-                </a:solidFill>
-                <a:effectLst/>
-                <a:latin typeface="JetBrains Mono" panose="02000009000000000000" pitchFamily="49" charset="0"/>
-              </a:rPr>
-              <a:t> $</a:t>
-            </a:r>
-            <a:r>
-              <a:rPr lang="fr-FR" b="0" dirty="0">
-                <a:solidFill>
-                  <a:srgbClr val="D4D4D4"/>
-                </a:solidFill>
-                <a:effectLst/>
-                <a:latin typeface="JetBrains Mono" panose="02000009000000000000" pitchFamily="49" charset="0"/>
-              </a:rPr>
-              <a:t> </a:t>
-            </a:r>
-            <a:r>
-              <a:rPr lang="fr-FR" b="0" dirty="0">
-                <a:solidFill>
-                  <a:srgbClr val="569CD6"/>
-                </a:solidFill>
-                <a:effectLst/>
-                <a:latin typeface="JetBrains Mono" panose="02000009000000000000" pitchFamily="49" charset="0"/>
-              </a:rPr>
-              <a:t>\</a:t>
-            </a:r>
-            <a:r>
-              <a:rPr lang="fr-FR" b="0" dirty="0" err="1">
-                <a:solidFill>
-                  <a:srgbClr val="DCDCAA"/>
-                </a:solidFill>
-                <a:effectLst/>
-                <a:latin typeface="JetBrains Mono" panose="02000009000000000000" pitchFamily="49" charset="0"/>
-              </a:rPr>
-              <a:t>text</a:t>
-            </a:r>
-            <a:r>
-              <a:rPr lang="fr-FR" b="0" dirty="0">
-                <a:solidFill>
-                  <a:srgbClr val="D4D4D4"/>
-                </a:solidFill>
-                <a:effectLst/>
-                <a:latin typeface="JetBrains Mono" panose="02000009000000000000" pitchFamily="49" charset="0"/>
-              </a:rPr>
-              <a:t>{</a:t>
-            </a:r>
-            <a:r>
-              <a:rPr lang="fr-FR" b="0" dirty="0" err="1">
-                <a:solidFill>
-                  <a:srgbClr val="D4D4D4"/>
-                </a:solidFill>
-                <a:effectLst/>
-                <a:latin typeface="JetBrains Mono" panose="02000009000000000000" pitchFamily="49" charset="0"/>
-              </a:rPr>
-              <a:t>Specificity</a:t>
-            </a:r>
-            <a:r>
-              <a:rPr lang="fr-FR" b="0" dirty="0">
-                <a:solidFill>
-                  <a:srgbClr val="D4D4D4"/>
-                </a:solidFill>
-                <a:effectLst/>
-                <a:latin typeface="JetBrains Mono" panose="02000009000000000000" pitchFamily="49" charset="0"/>
-              </a:rPr>
-              <a:t>} = </a:t>
-            </a:r>
-            <a:r>
-              <a:rPr lang="fr-FR" b="0" dirty="0">
-                <a:solidFill>
-                  <a:srgbClr val="569CD6"/>
-                </a:solidFill>
-                <a:effectLst/>
-                <a:latin typeface="JetBrains Mono" panose="02000009000000000000" pitchFamily="49" charset="0"/>
-              </a:rPr>
-              <a:t>\</a:t>
-            </a:r>
-            <a:r>
-              <a:rPr lang="fr-FR" b="0" dirty="0">
-                <a:solidFill>
-                  <a:srgbClr val="DCDCAA"/>
-                </a:solidFill>
-                <a:effectLst/>
-                <a:latin typeface="JetBrains Mono" panose="02000009000000000000" pitchFamily="49" charset="0"/>
-              </a:rPr>
-              <a:t>frac</a:t>
-            </a:r>
-            <a:r>
-              <a:rPr lang="fr-FR" b="0" dirty="0">
-                <a:solidFill>
-                  <a:srgbClr val="D4D4D4"/>
-                </a:solidFill>
-                <a:effectLst/>
-                <a:latin typeface="JetBrains Mono" panose="02000009000000000000" pitchFamily="49" charset="0"/>
-              </a:rPr>
-              <a:t>{TN}{TN+FP}</a:t>
-            </a:r>
-            <a:r>
-              <a:rPr lang="fr-FR" b="0" dirty="0">
-                <a:solidFill>
-                  <a:srgbClr val="CCCCCC"/>
-                </a:solidFill>
-                <a:effectLst/>
-                <a:latin typeface="JetBrains Mono" panose="02000009000000000000" pitchFamily="49" charset="0"/>
-              </a:rPr>
-              <a:t>$</a:t>
-            </a:r>
-          </a:p>
-          <a:p>
-            <a:endParaRPr lang="fr-FR" b="0" dirty="0">
-              <a:solidFill>
-                <a:srgbClr val="CCCCCC"/>
-              </a:solidFill>
-              <a:effectLst/>
-              <a:latin typeface="JetBrains Mono" panose="02000009000000000000" pitchFamily="49" charset="0"/>
-            </a:endParaRPr>
+              <a:rPr lang="fr-FR" dirty="0"/>
+              <a:t>Parler de </a:t>
+            </a:r>
+            <a:r>
+              <a:rPr lang="fr-FR" dirty="0" err="1"/>
+              <a:t>precision</a:t>
+            </a:r>
+            <a:r>
+              <a:rPr lang="fr-FR" dirty="0"/>
+              <a:t>, recall, F1</a:t>
+            </a:r>
+          </a:p>
+          <a:p>
+            <a:r>
+              <a:rPr lang="fr-FR" dirty="0"/>
+              <a:t>Fau</a:t>
+            </a:r>
           </a:p>
         </p:txBody>
       </p:sp>
@@ -4477,9 +3380,1262 @@
           <a:bodyPr/>
           <a:lstStyle/>
           <a:p>
+            <a:fld id="{341AEC00-4977-4C47-A11B-52155DC12F54}" type="slidenum">
+              <a:rPr lang="fr-FR" smtClean="0"/>
+              <a:t>5</a:t>
+            </a:fld>
+            <a:endParaRPr lang="fr-FR"/>
+          </a:p>
+        </p:txBody>
+      </p:sp>
+    </p:spTree>
+    <p:extLst>
+      <p:ext uri="{BB962C8B-B14F-4D97-AF65-F5344CB8AC3E}">
+        <p14:creationId xmlns:p14="http://schemas.microsoft.com/office/powerpoint/2010/main" val="1819228331"/>
+      </p:ext>
+    </p:extLst>
+  </p:cSld>
+  <p:clrMapOvr>
+    <a:masterClrMapping/>
+  </p:clrMapOvr>
+</p:notes>
+</file>
+
+<file path=ppt/notesSlides/notesSlide4.xml><?xml version="1.0" encoding="utf-8"?>
+<p:notes xmlns:a="http://schemas.openxmlformats.org/drawingml/2006/main" xmlns:r="http://schemas.openxmlformats.org/officeDocument/2006/relationships" xmlns:p="http://schemas.openxmlformats.org/presentationml/2006/main">
+  <p:cSld>
+    <p:spTree>
+      <p:nvGrpSpPr>
+        <p:cNvPr id="1" name=""/>
+        <p:cNvGrpSpPr/>
+        <p:nvPr/>
+      </p:nvGrpSpPr>
+      <p:grpSpPr>
+        <a:xfrm>
+          <a:off x="0" y="0"/>
+          <a:ext cx="0" cy="0"/>
+          <a:chOff x="0" y="0"/>
+          <a:chExt cx="0" cy="0"/>
+        </a:xfrm>
+      </p:grpSpPr>
+      <p:sp>
+        <p:nvSpPr>
+          <p:cNvPr id="2" name="Espace réservé de l'image des diapositives 1"/>
+          <p:cNvSpPr>
+            <a:spLocks noGrp="1" noRot="1" noChangeAspect="1"/>
+          </p:cNvSpPr>
+          <p:nvPr>
+            <p:ph type="sldImg"/>
+          </p:nvPr>
+        </p:nvSpPr>
+        <p:spPr/>
+      </p:sp>
+      <p:sp>
+        <p:nvSpPr>
+          <p:cNvPr id="3" name="Espace réservé des notes 2"/>
+          <p:cNvSpPr>
+            <a:spLocks noGrp="1"/>
+          </p:cNvSpPr>
+          <p:nvPr>
+            <p:ph type="body" idx="1"/>
+          </p:nvPr>
+        </p:nvSpPr>
+        <p:spPr/>
+        <p:txBody>
+          <a:bodyPr/>
+          <a:lstStyle/>
+          <a:p>
+            <a:r>
+              <a:rPr lang="en-US" b="0" i="0" dirty="0">
+                <a:solidFill>
+                  <a:srgbClr val="0C0D0E"/>
+                </a:solidFill>
+                <a:effectLst/>
+                <a:latin typeface="-apple-system"/>
+              </a:rPr>
+              <a:t>Pour les </a:t>
+            </a:r>
+            <a:r>
+              <a:rPr lang="en-US" b="1" i="0" dirty="0">
+                <a:solidFill>
+                  <a:srgbClr val="0C0D0E"/>
+                </a:solidFill>
+                <a:effectLst/>
+                <a:latin typeface="-apple-system"/>
+              </a:rPr>
+              <a:t>classifications</a:t>
+            </a:r>
+          </a:p>
+          <a:p>
+            <a:endParaRPr lang="en-US" b="1" i="0" dirty="0">
+              <a:solidFill>
+                <a:srgbClr val="0C0D0E"/>
+              </a:solidFill>
+              <a:effectLst/>
+              <a:latin typeface="-apple-system"/>
+            </a:endParaRPr>
+          </a:p>
+          <a:p>
+            <a:r>
+              <a:rPr lang="en-US" b="0" i="0" dirty="0" err="1">
+                <a:solidFill>
+                  <a:srgbClr val="0C0D0E"/>
+                </a:solidFill>
+                <a:effectLst/>
+                <a:latin typeface="-apple-system"/>
+              </a:rPr>
+              <a:t>C'est</a:t>
+            </a:r>
+            <a:r>
+              <a:rPr lang="en-US" b="0" i="0" dirty="0">
+                <a:solidFill>
+                  <a:srgbClr val="0C0D0E"/>
+                </a:solidFill>
+                <a:effectLst/>
+                <a:latin typeface="-apple-system"/>
+              </a:rPr>
+              <a:t> important de </a:t>
+            </a:r>
+            <a:r>
+              <a:rPr lang="en-US" b="0" i="0" dirty="0" err="1">
+                <a:solidFill>
+                  <a:srgbClr val="0C0D0E"/>
+                </a:solidFill>
+                <a:effectLst/>
+                <a:latin typeface="-apple-system"/>
+              </a:rPr>
+              <a:t>choisir</a:t>
+            </a:r>
+            <a:r>
+              <a:rPr lang="en-US" b="0" i="0" dirty="0">
+                <a:solidFill>
+                  <a:srgbClr val="0C0D0E"/>
+                </a:solidFill>
+                <a:effectLst/>
+                <a:latin typeface="-apple-system"/>
+              </a:rPr>
+              <a:t> </a:t>
+            </a:r>
+            <a:r>
+              <a:rPr lang="en-US" b="0" i="0" dirty="0" err="1">
+                <a:solidFill>
+                  <a:srgbClr val="0C0D0E"/>
+                </a:solidFill>
+                <a:effectLst/>
+                <a:latin typeface="-apple-system"/>
+              </a:rPr>
+              <a:t>si</a:t>
+            </a:r>
+            <a:r>
+              <a:rPr lang="en-US" b="0" i="0" dirty="0">
+                <a:solidFill>
+                  <a:srgbClr val="0C0D0E"/>
+                </a:solidFill>
+                <a:effectLst/>
+                <a:latin typeface="-apple-system"/>
+              </a:rPr>
+              <a:t> on </a:t>
+            </a:r>
+            <a:r>
+              <a:rPr lang="en-US" b="0" i="0" dirty="0" err="1">
+                <a:solidFill>
+                  <a:srgbClr val="0C0D0E"/>
+                </a:solidFill>
+                <a:effectLst/>
+                <a:latin typeface="-apple-system"/>
+              </a:rPr>
+              <a:t>veut</a:t>
+            </a:r>
+            <a:r>
+              <a:rPr lang="en-US" b="0" i="0" dirty="0">
+                <a:solidFill>
+                  <a:srgbClr val="0C0D0E"/>
+                </a:solidFill>
+                <a:effectLst/>
+                <a:latin typeface="-apple-system"/>
+              </a:rPr>
+              <a:t> </a:t>
+            </a:r>
+            <a:r>
+              <a:rPr lang="en-US" b="0" i="0" dirty="0" err="1">
+                <a:solidFill>
+                  <a:srgbClr val="0C0D0E"/>
+                </a:solidFill>
+                <a:effectLst/>
+                <a:latin typeface="-apple-system"/>
+              </a:rPr>
+              <a:t>favoriser</a:t>
+            </a:r>
+            <a:r>
+              <a:rPr lang="en-US" b="0" i="0" dirty="0">
+                <a:solidFill>
+                  <a:srgbClr val="0C0D0E"/>
+                </a:solidFill>
+                <a:effectLst/>
+                <a:latin typeface="-apple-system"/>
+              </a:rPr>
+              <a:t> le Recall </a:t>
+            </a:r>
+            <a:r>
+              <a:rPr lang="en-US" b="0" i="0" dirty="0" err="1">
+                <a:solidFill>
+                  <a:srgbClr val="0C0D0E"/>
+                </a:solidFill>
+                <a:effectLst/>
+                <a:latin typeface="-apple-system"/>
+              </a:rPr>
+              <a:t>ou</a:t>
+            </a:r>
+            <a:r>
+              <a:rPr lang="en-US" b="0" i="0" dirty="0">
+                <a:solidFill>
+                  <a:srgbClr val="0C0D0E"/>
+                </a:solidFill>
+                <a:effectLst/>
+                <a:latin typeface="-apple-system"/>
+              </a:rPr>
+              <a:t> la Precision car </a:t>
+            </a:r>
+            <a:r>
+              <a:rPr lang="en-US" b="0" i="0" dirty="0" err="1">
+                <a:solidFill>
+                  <a:srgbClr val="0C0D0E"/>
+                </a:solidFill>
+                <a:effectLst/>
+                <a:latin typeface="-apple-system"/>
+              </a:rPr>
+              <a:t>c'est</a:t>
+            </a:r>
+            <a:r>
+              <a:rPr lang="en-US" b="0" i="0" dirty="0">
+                <a:solidFill>
+                  <a:srgbClr val="0C0D0E"/>
+                </a:solidFill>
+                <a:effectLst/>
+                <a:latin typeface="-apple-system"/>
+              </a:rPr>
+              <a:t> le </a:t>
+            </a:r>
+            <a:r>
+              <a:rPr lang="en-US" b="0" i="0" dirty="0" err="1">
+                <a:solidFill>
+                  <a:srgbClr val="0C0D0E"/>
+                </a:solidFill>
+                <a:effectLst/>
+                <a:latin typeface="-apple-system"/>
+              </a:rPr>
+              <a:t>métrique</a:t>
+            </a:r>
+            <a:r>
+              <a:rPr lang="en-US" b="0" i="0" dirty="0">
+                <a:solidFill>
+                  <a:srgbClr val="0C0D0E"/>
+                </a:solidFill>
+                <a:effectLst/>
+                <a:latin typeface="-apple-system"/>
+              </a:rPr>
+              <a:t> </a:t>
+            </a:r>
+            <a:r>
+              <a:rPr lang="en-US" b="0" i="0" dirty="0" err="1">
+                <a:solidFill>
+                  <a:srgbClr val="0C0D0E"/>
+                </a:solidFill>
+                <a:effectLst/>
+                <a:latin typeface="-apple-system"/>
+              </a:rPr>
+              <a:t>dont</a:t>
+            </a:r>
+            <a:r>
+              <a:rPr lang="en-US" b="0" i="0" dirty="0">
+                <a:solidFill>
+                  <a:srgbClr val="0C0D0E"/>
+                </a:solidFill>
+                <a:effectLst/>
+                <a:latin typeface="-apple-system"/>
+              </a:rPr>
+              <a:t> on </a:t>
+            </a:r>
+            <a:r>
+              <a:rPr lang="en-US" b="0" i="0" dirty="0" err="1">
+                <a:solidFill>
+                  <a:srgbClr val="0C0D0E"/>
+                </a:solidFill>
+                <a:effectLst/>
+                <a:latin typeface="-apple-system"/>
+              </a:rPr>
+              <a:t>va</a:t>
+            </a:r>
+            <a:r>
+              <a:rPr lang="en-US" b="0" i="0" dirty="0">
+                <a:solidFill>
+                  <a:srgbClr val="0C0D0E"/>
+                </a:solidFill>
+                <a:effectLst/>
+                <a:latin typeface="-apple-system"/>
+              </a:rPr>
+              <a:t> </a:t>
+            </a:r>
+            <a:r>
+              <a:rPr lang="en-US" b="0" i="0" dirty="0" err="1">
+                <a:solidFill>
+                  <a:srgbClr val="0C0D0E"/>
+                </a:solidFill>
+                <a:effectLst/>
+                <a:latin typeface="-apple-system"/>
+              </a:rPr>
+              <a:t>suivre</a:t>
+            </a:r>
+            <a:r>
+              <a:rPr lang="en-US" b="0" i="0" dirty="0">
+                <a:solidFill>
+                  <a:srgbClr val="0C0D0E"/>
+                </a:solidFill>
+                <a:effectLst/>
+                <a:latin typeface="-apple-system"/>
+              </a:rPr>
+              <a:t> </a:t>
+            </a:r>
+            <a:r>
+              <a:rPr lang="en-US" b="0" i="0" dirty="0" err="1">
+                <a:solidFill>
+                  <a:srgbClr val="0C0D0E"/>
+                </a:solidFill>
+                <a:effectLst/>
+                <a:latin typeface="-apple-system"/>
+              </a:rPr>
+              <a:t>l'évolue</a:t>
+            </a:r>
+            <a:r>
+              <a:rPr lang="en-US" b="0" i="0" dirty="0">
+                <a:solidFill>
+                  <a:srgbClr val="0C0D0E"/>
+                </a:solidFill>
+                <a:effectLst/>
+                <a:latin typeface="-apple-system"/>
+              </a:rPr>
+              <a:t> </a:t>
+            </a:r>
+            <a:r>
+              <a:rPr lang="en-US" b="0" i="0" dirty="0" err="1">
+                <a:solidFill>
+                  <a:srgbClr val="0C0D0E"/>
+                </a:solidFill>
+                <a:effectLst/>
+                <a:latin typeface="-apple-system"/>
+              </a:rPr>
+              <a:t>lors</a:t>
+            </a:r>
+            <a:r>
+              <a:rPr lang="en-US" b="0" i="0" dirty="0">
+                <a:solidFill>
+                  <a:srgbClr val="0C0D0E"/>
+                </a:solidFill>
+                <a:effectLst/>
+                <a:latin typeface="-apple-system"/>
+              </a:rPr>
+              <a:t> des runs </a:t>
+            </a:r>
+            <a:r>
+              <a:rPr lang="en-US" b="0" i="0" dirty="0" err="1">
+                <a:solidFill>
+                  <a:srgbClr val="0C0D0E"/>
+                </a:solidFill>
+                <a:effectLst/>
+                <a:latin typeface="-apple-system"/>
+              </a:rPr>
+              <a:t>successifs</a:t>
+            </a:r>
+            <a:endParaRPr lang="en-US" b="0" i="0" dirty="0">
+              <a:solidFill>
+                <a:srgbClr val="0C0D0E"/>
+              </a:solidFill>
+              <a:effectLst/>
+              <a:latin typeface="-apple-system"/>
+            </a:endParaRPr>
+          </a:p>
+          <a:p>
+            <a:r>
+              <a:rPr lang="en-US" b="0" i="0" dirty="0">
+                <a:solidFill>
+                  <a:srgbClr val="0C0D0E"/>
+                </a:solidFill>
+                <a:effectLst/>
+                <a:latin typeface="-apple-system"/>
+              </a:rPr>
+              <a:t>Si on </a:t>
+            </a:r>
+            <a:r>
+              <a:rPr lang="en-US" b="0" i="0" dirty="0" err="1">
+                <a:solidFill>
+                  <a:srgbClr val="0C0D0E"/>
+                </a:solidFill>
+                <a:effectLst/>
+                <a:latin typeface="-apple-system"/>
+              </a:rPr>
+              <a:t>veut</a:t>
+            </a:r>
+            <a:r>
+              <a:rPr lang="en-US" b="0" i="0" dirty="0">
+                <a:solidFill>
+                  <a:srgbClr val="0C0D0E"/>
+                </a:solidFill>
+                <a:effectLst/>
+                <a:latin typeface="-apple-system"/>
+              </a:rPr>
+              <a:t> pas </a:t>
+            </a:r>
+            <a:r>
+              <a:rPr lang="en-US" b="0" i="0" dirty="0" err="1">
+                <a:solidFill>
+                  <a:srgbClr val="0C0D0E"/>
+                </a:solidFill>
+                <a:effectLst/>
+                <a:latin typeface="-apple-system"/>
+              </a:rPr>
+              <a:t>choisir</a:t>
+            </a:r>
+            <a:r>
+              <a:rPr lang="en-US" b="0" i="0" dirty="0">
+                <a:solidFill>
+                  <a:srgbClr val="0C0D0E"/>
+                </a:solidFill>
+                <a:effectLst/>
+                <a:latin typeface="-apple-system"/>
+              </a:rPr>
+              <a:t> entre Precision et Recall, prendre F1 Score</a:t>
+            </a:r>
+          </a:p>
+          <a:p>
+            <a:endParaRPr lang="en-US" b="0" i="0" dirty="0">
+              <a:solidFill>
+                <a:srgbClr val="0C0D0E"/>
+              </a:solidFill>
+              <a:effectLst/>
+              <a:latin typeface="-apple-system"/>
+            </a:endParaRPr>
+          </a:p>
+          <a:p>
+            <a:r>
+              <a:rPr lang="en-US" b="1" i="0" dirty="0">
+                <a:solidFill>
+                  <a:srgbClr val="0C0D0E"/>
+                </a:solidFill>
+                <a:effectLst/>
+                <a:latin typeface="-apple-system"/>
+              </a:rPr>
+              <a:t>Recall</a:t>
+            </a:r>
+            <a:r>
+              <a:rPr lang="en-US" b="0" i="0" dirty="0">
+                <a:solidFill>
+                  <a:srgbClr val="0C0D0E"/>
+                </a:solidFill>
+                <a:effectLst/>
+                <a:latin typeface="-apple-system"/>
+              </a:rPr>
+              <a:t> means to bring back or remember. </a:t>
+            </a:r>
+          </a:p>
+          <a:p>
+            <a:r>
+              <a:rPr lang="en-US" b="0" i="0" dirty="0">
+                <a:solidFill>
+                  <a:srgbClr val="0C0D0E"/>
+                </a:solidFill>
+                <a:effectLst/>
+                <a:latin typeface="-apple-system"/>
+              </a:rPr>
+              <a:t>The terminology comes from information retrieval where it's usually being applied to a result set from a query. </a:t>
+            </a:r>
+          </a:p>
+          <a:p>
+            <a:r>
+              <a:rPr lang="en-US" b="0" i="0" dirty="0">
+                <a:solidFill>
+                  <a:srgbClr val="0C0D0E"/>
+                </a:solidFill>
+                <a:effectLst/>
+                <a:latin typeface="-apple-system"/>
+              </a:rPr>
+              <a:t>The sense of it is : how much of the set of right answers was retrieved by the query? How much of it was recalled?</a:t>
+            </a:r>
+          </a:p>
+          <a:p>
+            <a:endParaRPr lang="en-US" b="0" i="0" dirty="0">
+              <a:solidFill>
+                <a:srgbClr val="0C0D0E"/>
+              </a:solidFill>
+              <a:effectLst/>
+              <a:latin typeface="-apple-system"/>
+            </a:endParaRPr>
+          </a:p>
+          <a:p>
+            <a:r>
+              <a:rPr lang="en-US" b="0" i="0" dirty="0">
+                <a:solidFill>
+                  <a:srgbClr val="0C0D0E"/>
+                </a:solidFill>
+                <a:effectLst/>
+                <a:latin typeface="-apple-system"/>
+              </a:rPr>
+              <a:t>Pour les medicaments</a:t>
+            </a:r>
+          </a:p>
+          <a:p>
+            <a:r>
+              <a:rPr lang="fr-FR" b="0" dirty="0" err="1">
+                <a:solidFill>
+                  <a:srgbClr val="CCCCCC"/>
+                </a:solidFill>
+                <a:effectLst/>
+                <a:latin typeface="JetBrains Mono" panose="02000009000000000000" pitchFamily="49" charset="0"/>
+              </a:rPr>
+              <a:t>Precision</a:t>
+            </a:r>
+            <a:r>
+              <a:rPr lang="fr-FR" b="0" dirty="0">
+                <a:solidFill>
+                  <a:srgbClr val="CCCCCC"/>
+                </a:solidFill>
+                <a:effectLst/>
+                <a:latin typeface="JetBrains Mono" panose="02000009000000000000" pitchFamily="49" charset="0"/>
+              </a:rPr>
+              <a:t> :</a:t>
+            </a:r>
+          </a:p>
+          <a:p>
+            <a:r>
+              <a:rPr lang="fr-FR" b="0" dirty="0">
+                <a:solidFill>
+                  <a:srgbClr val="6796E6"/>
+                </a:solidFill>
+                <a:effectLst/>
+                <a:latin typeface="JetBrains Mono" panose="02000009000000000000" pitchFamily="49" charset="0"/>
+              </a:rPr>
+              <a:t>*</a:t>
+            </a:r>
+            <a:r>
+              <a:rPr lang="fr-FR" b="0" dirty="0">
+                <a:solidFill>
+                  <a:srgbClr val="CCCCCC"/>
+                </a:solidFill>
+                <a:effectLst/>
+                <a:latin typeface="JetBrains Mono" panose="02000009000000000000" pitchFamily="49" charset="0"/>
+              </a:rPr>
+              <a:t> colonne de </a:t>
+            </a:r>
+            <a:r>
+              <a:rPr lang="fr-FR" b="0" dirty="0" err="1">
+                <a:solidFill>
+                  <a:srgbClr val="CCCCCC"/>
+                </a:solidFill>
+                <a:effectLst/>
+                <a:latin typeface="JetBrains Mono" panose="02000009000000000000" pitchFamily="49" charset="0"/>
+              </a:rPr>
+              <a:t>dtorite</a:t>
+            </a:r>
+            <a:endParaRPr lang="fr-FR" b="0" dirty="0">
+              <a:solidFill>
+                <a:srgbClr val="CCCCCC"/>
+              </a:solidFill>
+              <a:effectLst/>
+              <a:latin typeface="JetBrains Mono" panose="02000009000000000000" pitchFamily="49" charset="0"/>
+            </a:endParaRPr>
+          </a:p>
+          <a:p>
+            <a:r>
+              <a:rPr lang="fr-FR" b="0" dirty="0">
+                <a:solidFill>
+                  <a:srgbClr val="6796E6"/>
+                </a:solidFill>
+                <a:effectLst/>
+                <a:latin typeface="JetBrains Mono" panose="02000009000000000000" pitchFamily="49" charset="0"/>
+              </a:rPr>
+              <a:t>*</a:t>
+            </a:r>
+            <a:r>
+              <a:rPr lang="fr-FR" b="0" dirty="0">
+                <a:solidFill>
+                  <a:srgbClr val="CCCCCC"/>
+                </a:solidFill>
+                <a:effectLst/>
+                <a:latin typeface="JetBrains Mono" panose="02000009000000000000" pitchFamily="49" charset="0"/>
+              </a:rPr>
+              <a:t> $</a:t>
+            </a:r>
+            <a:r>
+              <a:rPr lang="fr-FR" b="0" dirty="0">
+                <a:solidFill>
+                  <a:srgbClr val="D4D4D4"/>
+                </a:solidFill>
+                <a:effectLst/>
+                <a:latin typeface="JetBrains Mono" panose="02000009000000000000" pitchFamily="49" charset="0"/>
+              </a:rPr>
+              <a:t> </a:t>
+            </a:r>
+            <a:r>
+              <a:rPr lang="fr-FR" b="0" dirty="0">
+                <a:solidFill>
+                  <a:srgbClr val="569CD6"/>
+                </a:solidFill>
+                <a:effectLst/>
+                <a:latin typeface="JetBrains Mono" panose="02000009000000000000" pitchFamily="49" charset="0"/>
+              </a:rPr>
+              <a:t>\</a:t>
+            </a:r>
+            <a:r>
+              <a:rPr lang="fr-FR" b="0" dirty="0" err="1">
+                <a:solidFill>
+                  <a:srgbClr val="DCDCAA"/>
+                </a:solidFill>
+                <a:effectLst/>
+                <a:latin typeface="JetBrains Mono" panose="02000009000000000000" pitchFamily="49" charset="0"/>
+              </a:rPr>
+              <a:t>text</a:t>
+            </a:r>
+            <a:r>
+              <a:rPr lang="fr-FR" b="0" dirty="0">
+                <a:solidFill>
+                  <a:srgbClr val="D4D4D4"/>
+                </a:solidFill>
+                <a:effectLst/>
+                <a:latin typeface="JetBrains Mono" panose="02000009000000000000" pitchFamily="49" charset="0"/>
+              </a:rPr>
+              <a:t>{</a:t>
+            </a:r>
+            <a:r>
+              <a:rPr lang="fr-FR" b="0" dirty="0" err="1">
+                <a:solidFill>
+                  <a:srgbClr val="D4D4D4"/>
+                </a:solidFill>
+                <a:effectLst/>
+                <a:latin typeface="JetBrains Mono" panose="02000009000000000000" pitchFamily="49" charset="0"/>
+              </a:rPr>
+              <a:t>Precision</a:t>
+            </a:r>
+            <a:r>
+              <a:rPr lang="fr-FR" b="0" dirty="0">
+                <a:solidFill>
+                  <a:srgbClr val="D4D4D4"/>
+                </a:solidFill>
+                <a:effectLst/>
+                <a:latin typeface="JetBrains Mono" panose="02000009000000000000" pitchFamily="49" charset="0"/>
+              </a:rPr>
+              <a:t>}  = </a:t>
+            </a:r>
+            <a:r>
+              <a:rPr lang="fr-FR" b="0" dirty="0">
+                <a:solidFill>
+                  <a:srgbClr val="569CD6"/>
+                </a:solidFill>
+                <a:effectLst/>
+                <a:latin typeface="JetBrains Mono" panose="02000009000000000000" pitchFamily="49" charset="0"/>
+              </a:rPr>
+              <a:t>\</a:t>
+            </a:r>
+            <a:r>
+              <a:rPr lang="fr-FR" b="0" dirty="0">
+                <a:solidFill>
+                  <a:srgbClr val="DCDCAA"/>
+                </a:solidFill>
+                <a:effectLst/>
+                <a:latin typeface="JetBrains Mono" panose="02000009000000000000" pitchFamily="49" charset="0"/>
+              </a:rPr>
+              <a:t>frac</a:t>
+            </a:r>
+            <a:r>
+              <a:rPr lang="fr-FR" b="0" dirty="0">
+                <a:solidFill>
+                  <a:srgbClr val="D4D4D4"/>
+                </a:solidFill>
+                <a:effectLst/>
+                <a:latin typeface="JetBrains Mono" panose="02000009000000000000" pitchFamily="49" charset="0"/>
+              </a:rPr>
+              <a:t>{TP}{TP+FP}</a:t>
+            </a:r>
+            <a:r>
+              <a:rPr lang="fr-FR" b="0" dirty="0">
+                <a:solidFill>
+                  <a:srgbClr val="CCCCCC"/>
+                </a:solidFill>
+                <a:effectLst/>
+                <a:latin typeface="JetBrains Mono" panose="02000009000000000000" pitchFamily="49" charset="0"/>
+              </a:rPr>
+              <a:t>$</a:t>
+            </a:r>
+          </a:p>
+          <a:p>
+            <a:br>
+              <a:rPr lang="fr-FR" b="0" dirty="0">
+                <a:solidFill>
+                  <a:srgbClr val="CCCCCC"/>
+                </a:solidFill>
+                <a:effectLst/>
+                <a:latin typeface="JetBrains Mono" panose="02000009000000000000" pitchFamily="49" charset="0"/>
+              </a:rPr>
+            </a:br>
+            <a:r>
+              <a:rPr lang="fr-FR" b="0" dirty="0" err="1">
+                <a:solidFill>
+                  <a:srgbClr val="CCCCCC"/>
+                </a:solidFill>
+                <a:effectLst/>
+                <a:latin typeface="JetBrains Mono" panose="02000009000000000000" pitchFamily="49" charset="0"/>
+              </a:rPr>
+              <a:t>Recall</a:t>
+            </a:r>
+            <a:r>
+              <a:rPr lang="fr-FR" b="0" dirty="0">
+                <a:solidFill>
+                  <a:srgbClr val="CCCCCC"/>
+                </a:solidFill>
+                <a:effectLst/>
+                <a:latin typeface="JetBrains Mono" panose="02000009000000000000" pitchFamily="49" charset="0"/>
+              </a:rPr>
+              <a:t> : </a:t>
+            </a:r>
+          </a:p>
+          <a:p>
+            <a:r>
+              <a:rPr lang="fr-FR" b="0" dirty="0">
+                <a:solidFill>
+                  <a:srgbClr val="6796E6"/>
+                </a:solidFill>
+                <a:effectLst/>
+                <a:latin typeface="JetBrains Mono" panose="02000009000000000000" pitchFamily="49" charset="0"/>
+              </a:rPr>
+              <a:t>*</a:t>
+            </a:r>
+            <a:r>
+              <a:rPr lang="fr-FR" b="0" dirty="0">
+                <a:solidFill>
+                  <a:srgbClr val="CCCCCC"/>
+                </a:solidFill>
+                <a:effectLst/>
+                <a:latin typeface="JetBrains Mono" panose="02000009000000000000" pitchFamily="49" charset="0"/>
+              </a:rPr>
+              <a:t> ligne du bas</a:t>
+            </a:r>
+          </a:p>
+          <a:p>
+            <a:r>
+              <a:rPr lang="fr-FR" b="0" dirty="0">
+                <a:solidFill>
+                  <a:srgbClr val="6796E6"/>
+                </a:solidFill>
+                <a:effectLst/>
+                <a:latin typeface="JetBrains Mono" panose="02000009000000000000" pitchFamily="49" charset="0"/>
+              </a:rPr>
+              <a:t>*</a:t>
+            </a:r>
+            <a:r>
+              <a:rPr lang="fr-FR" b="0" dirty="0">
+                <a:solidFill>
+                  <a:srgbClr val="CCCCCC"/>
+                </a:solidFill>
+                <a:effectLst/>
+                <a:latin typeface="JetBrains Mono" panose="02000009000000000000" pitchFamily="49" charset="0"/>
+              </a:rPr>
+              <a:t> $</a:t>
+            </a:r>
+            <a:r>
+              <a:rPr lang="fr-FR" b="0" dirty="0">
+                <a:solidFill>
+                  <a:srgbClr val="D4D4D4"/>
+                </a:solidFill>
+                <a:effectLst/>
+                <a:latin typeface="JetBrains Mono" panose="02000009000000000000" pitchFamily="49" charset="0"/>
+              </a:rPr>
+              <a:t> </a:t>
+            </a:r>
+            <a:r>
+              <a:rPr lang="fr-FR" b="0" dirty="0">
+                <a:solidFill>
+                  <a:srgbClr val="569CD6"/>
+                </a:solidFill>
+                <a:effectLst/>
+                <a:latin typeface="JetBrains Mono" panose="02000009000000000000" pitchFamily="49" charset="0"/>
+              </a:rPr>
+              <a:t>\</a:t>
+            </a:r>
+            <a:r>
+              <a:rPr lang="fr-FR" b="0" dirty="0" err="1">
+                <a:solidFill>
+                  <a:srgbClr val="DCDCAA"/>
+                </a:solidFill>
+                <a:effectLst/>
+                <a:latin typeface="JetBrains Mono" panose="02000009000000000000" pitchFamily="49" charset="0"/>
+              </a:rPr>
+              <a:t>text</a:t>
+            </a:r>
+            <a:r>
+              <a:rPr lang="fr-FR" b="0" dirty="0">
+                <a:solidFill>
+                  <a:srgbClr val="D4D4D4"/>
+                </a:solidFill>
+                <a:effectLst/>
+                <a:latin typeface="JetBrains Mono" panose="02000009000000000000" pitchFamily="49" charset="0"/>
+              </a:rPr>
+              <a:t>{</a:t>
+            </a:r>
+            <a:r>
+              <a:rPr lang="fr-FR" b="0" dirty="0" err="1">
+                <a:solidFill>
+                  <a:srgbClr val="D4D4D4"/>
+                </a:solidFill>
+                <a:effectLst/>
+                <a:latin typeface="JetBrains Mono" panose="02000009000000000000" pitchFamily="49" charset="0"/>
+              </a:rPr>
+              <a:t>Recall</a:t>
+            </a:r>
+            <a:r>
+              <a:rPr lang="fr-FR" b="0" dirty="0">
+                <a:solidFill>
+                  <a:srgbClr val="D4D4D4"/>
+                </a:solidFill>
+                <a:effectLst/>
+                <a:latin typeface="JetBrains Mono" panose="02000009000000000000" pitchFamily="49" charset="0"/>
+              </a:rPr>
+              <a:t>} = </a:t>
+            </a:r>
+            <a:r>
+              <a:rPr lang="fr-FR" b="0" dirty="0">
+                <a:solidFill>
+                  <a:srgbClr val="569CD6"/>
+                </a:solidFill>
+                <a:effectLst/>
+                <a:latin typeface="JetBrains Mono" panose="02000009000000000000" pitchFamily="49" charset="0"/>
+              </a:rPr>
+              <a:t>\</a:t>
+            </a:r>
+            <a:r>
+              <a:rPr lang="fr-FR" b="0" dirty="0">
+                <a:solidFill>
+                  <a:srgbClr val="DCDCAA"/>
+                </a:solidFill>
+                <a:effectLst/>
+                <a:latin typeface="JetBrains Mono" panose="02000009000000000000" pitchFamily="49" charset="0"/>
+              </a:rPr>
+              <a:t>frac</a:t>
+            </a:r>
+            <a:r>
+              <a:rPr lang="fr-FR" b="0" dirty="0">
+                <a:solidFill>
+                  <a:srgbClr val="D4D4D4"/>
+                </a:solidFill>
+                <a:effectLst/>
+                <a:latin typeface="JetBrains Mono" panose="02000009000000000000" pitchFamily="49" charset="0"/>
+              </a:rPr>
+              <a:t>{TP}{TP+FN}</a:t>
+            </a:r>
+            <a:r>
+              <a:rPr lang="fr-FR" b="0" dirty="0">
+                <a:solidFill>
+                  <a:srgbClr val="CCCCCC"/>
+                </a:solidFill>
+                <a:effectLst/>
+                <a:latin typeface="JetBrains Mono" panose="02000009000000000000" pitchFamily="49" charset="0"/>
+              </a:rPr>
+              <a:t>$</a:t>
+            </a:r>
+          </a:p>
+          <a:p>
+            <a:br>
+              <a:rPr lang="fr-FR" b="0" dirty="0">
+                <a:solidFill>
+                  <a:srgbClr val="CCCCCC"/>
+                </a:solidFill>
+                <a:effectLst/>
+                <a:latin typeface="JetBrains Mono" panose="02000009000000000000" pitchFamily="49" charset="0"/>
+              </a:rPr>
+            </a:br>
+            <a:r>
+              <a:rPr lang="fr-FR" b="0" dirty="0" err="1">
+                <a:solidFill>
+                  <a:srgbClr val="CCCCCC"/>
+                </a:solidFill>
+                <a:effectLst/>
+                <a:latin typeface="JetBrains Mono" panose="02000009000000000000" pitchFamily="49" charset="0"/>
+              </a:rPr>
+              <a:t>Sensitivity</a:t>
+            </a:r>
+            <a:r>
+              <a:rPr lang="fr-FR" b="0" dirty="0">
+                <a:solidFill>
+                  <a:srgbClr val="CCCCCC"/>
+                </a:solidFill>
+                <a:effectLst/>
+                <a:latin typeface="JetBrains Mono" panose="02000009000000000000" pitchFamily="49" charset="0"/>
+              </a:rPr>
+              <a:t> = </a:t>
+            </a:r>
+            <a:r>
+              <a:rPr lang="fr-FR" b="0" dirty="0" err="1">
+                <a:solidFill>
+                  <a:srgbClr val="CCCCCC"/>
+                </a:solidFill>
+                <a:effectLst/>
+                <a:latin typeface="JetBrains Mono" panose="02000009000000000000" pitchFamily="49" charset="0"/>
+              </a:rPr>
+              <a:t>Recall</a:t>
+            </a:r>
+            <a:endParaRPr lang="fr-FR" b="0" dirty="0">
+              <a:solidFill>
+                <a:srgbClr val="CCCCCC"/>
+              </a:solidFill>
+              <a:effectLst/>
+              <a:latin typeface="JetBrains Mono" panose="02000009000000000000" pitchFamily="49" charset="0"/>
+            </a:endParaRPr>
+          </a:p>
+          <a:p>
+            <a:r>
+              <a:rPr lang="fr-FR" b="0" dirty="0">
+                <a:solidFill>
+                  <a:srgbClr val="6796E6"/>
+                </a:solidFill>
+                <a:effectLst/>
+                <a:latin typeface="JetBrains Mono" panose="02000009000000000000" pitchFamily="49" charset="0"/>
+              </a:rPr>
+              <a:t>*</a:t>
+            </a:r>
+            <a:r>
+              <a:rPr lang="fr-FR" b="0" dirty="0">
+                <a:solidFill>
+                  <a:srgbClr val="CCCCCC"/>
+                </a:solidFill>
+                <a:effectLst/>
+                <a:latin typeface="JetBrains Mono" panose="02000009000000000000" pitchFamily="49" charset="0"/>
+              </a:rPr>
+              <a:t> ligne du bas</a:t>
+            </a:r>
+          </a:p>
+          <a:p>
+            <a:r>
+              <a:rPr lang="fr-FR" b="0" dirty="0">
+                <a:solidFill>
+                  <a:srgbClr val="6796E6"/>
+                </a:solidFill>
+                <a:effectLst/>
+                <a:latin typeface="JetBrains Mono" panose="02000009000000000000" pitchFamily="49" charset="0"/>
+              </a:rPr>
+              <a:t>*</a:t>
+            </a:r>
+            <a:r>
+              <a:rPr lang="fr-FR" b="0" dirty="0">
+                <a:solidFill>
+                  <a:srgbClr val="CCCCCC"/>
+                </a:solidFill>
+                <a:effectLst/>
+                <a:latin typeface="JetBrains Mono" panose="02000009000000000000" pitchFamily="49" charset="0"/>
+              </a:rPr>
+              <a:t> $</a:t>
+            </a:r>
+            <a:r>
+              <a:rPr lang="fr-FR" b="0" dirty="0">
+                <a:solidFill>
+                  <a:srgbClr val="D4D4D4"/>
+                </a:solidFill>
+                <a:effectLst/>
+                <a:latin typeface="JetBrains Mono" panose="02000009000000000000" pitchFamily="49" charset="0"/>
+              </a:rPr>
+              <a:t> </a:t>
+            </a:r>
+            <a:r>
+              <a:rPr lang="fr-FR" b="0" dirty="0">
+                <a:solidFill>
+                  <a:srgbClr val="569CD6"/>
+                </a:solidFill>
+                <a:effectLst/>
+                <a:latin typeface="JetBrains Mono" panose="02000009000000000000" pitchFamily="49" charset="0"/>
+              </a:rPr>
+              <a:t>\</a:t>
+            </a:r>
+            <a:r>
+              <a:rPr lang="fr-FR" b="0" dirty="0" err="1">
+                <a:solidFill>
+                  <a:srgbClr val="DCDCAA"/>
+                </a:solidFill>
+                <a:effectLst/>
+                <a:latin typeface="JetBrains Mono" panose="02000009000000000000" pitchFamily="49" charset="0"/>
+              </a:rPr>
+              <a:t>text</a:t>
+            </a:r>
+            <a:r>
+              <a:rPr lang="fr-FR" b="0" dirty="0">
+                <a:solidFill>
+                  <a:srgbClr val="D4D4D4"/>
+                </a:solidFill>
+                <a:effectLst/>
+                <a:latin typeface="JetBrains Mono" panose="02000009000000000000" pitchFamily="49" charset="0"/>
+              </a:rPr>
+              <a:t>{</a:t>
+            </a:r>
+            <a:r>
+              <a:rPr lang="fr-FR" b="0" dirty="0" err="1">
+                <a:solidFill>
+                  <a:srgbClr val="D4D4D4"/>
+                </a:solidFill>
+                <a:effectLst/>
+                <a:latin typeface="JetBrains Mono" panose="02000009000000000000" pitchFamily="49" charset="0"/>
+              </a:rPr>
+              <a:t>Sensitivity</a:t>
+            </a:r>
+            <a:r>
+              <a:rPr lang="fr-FR" b="0" dirty="0">
+                <a:solidFill>
+                  <a:srgbClr val="D4D4D4"/>
+                </a:solidFill>
+                <a:effectLst/>
+                <a:latin typeface="JetBrains Mono" panose="02000009000000000000" pitchFamily="49" charset="0"/>
+              </a:rPr>
+              <a:t>} = </a:t>
+            </a:r>
+            <a:r>
+              <a:rPr lang="fr-FR" b="0" dirty="0">
+                <a:solidFill>
+                  <a:srgbClr val="569CD6"/>
+                </a:solidFill>
+                <a:effectLst/>
+                <a:latin typeface="JetBrains Mono" panose="02000009000000000000" pitchFamily="49" charset="0"/>
+              </a:rPr>
+              <a:t>\</a:t>
+            </a:r>
+            <a:r>
+              <a:rPr lang="fr-FR" b="0" dirty="0">
+                <a:solidFill>
+                  <a:srgbClr val="DCDCAA"/>
+                </a:solidFill>
+                <a:effectLst/>
+                <a:latin typeface="JetBrains Mono" panose="02000009000000000000" pitchFamily="49" charset="0"/>
+              </a:rPr>
+              <a:t>frac</a:t>
+            </a:r>
+            <a:r>
+              <a:rPr lang="fr-FR" b="0" dirty="0">
+                <a:solidFill>
+                  <a:srgbClr val="D4D4D4"/>
+                </a:solidFill>
+                <a:effectLst/>
+                <a:latin typeface="JetBrains Mono" panose="02000009000000000000" pitchFamily="49" charset="0"/>
+              </a:rPr>
+              <a:t>{TP}{TP+FN}</a:t>
+            </a:r>
+            <a:r>
+              <a:rPr lang="fr-FR" b="0" dirty="0">
+                <a:solidFill>
+                  <a:srgbClr val="CCCCCC"/>
+                </a:solidFill>
+                <a:effectLst/>
+                <a:latin typeface="JetBrains Mono" panose="02000009000000000000" pitchFamily="49" charset="0"/>
+              </a:rPr>
+              <a:t>$</a:t>
+            </a:r>
+          </a:p>
+          <a:p>
+            <a:br>
+              <a:rPr lang="fr-FR" b="0" dirty="0">
+                <a:solidFill>
+                  <a:srgbClr val="CCCCCC"/>
+                </a:solidFill>
+                <a:effectLst/>
+                <a:latin typeface="JetBrains Mono" panose="02000009000000000000" pitchFamily="49" charset="0"/>
+              </a:rPr>
+            </a:br>
+            <a:r>
+              <a:rPr lang="fr-FR" b="0" dirty="0" err="1">
+                <a:solidFill>
+                  <a:srgbClr val="CCCCCC"/>
+                </a:solidFill>
+                <a:effectLst/>
+                <a:latin typeface="JetBrains Mono" panose="02000009000000000000" pitchFamily="49" charset="0"/>
+              </a:rPr>
+              <a:t>Specificity</a:t>
+            </a:r>
+            <a:r>
+              <a:rPr lang="fr-FR" b="0" dirty="0">
+                <a:solidFill>
+                  <a:srgbClr val="CCCCCC"/>
+                </a:solidFill>
+                <a:effectLst/>
+                <a:latin typeface="JetBrains Mono" panose="02000009000000000000" pitchFamily="49" charset="0"/>
+              </a:rPr>
+              <a:t> :</a:t>
+            </a:r>
+          </a:p>
+          <a:p>
+            <a:r>
+              <a:rPr lang="fr-FR" b="0" dirty="0">
+                <a:solidFill>
+                  <a:srgbClr val="6796E6"/>
+                </a:solidFill>
+                <a:effectLst/>
+                <a:latin typeface="JetBrains Mono" panose="02000009000000000000" pitchFamily="49" charset="0"/>
+              </a:rPr>
+              <a:t>*</a:t>
+            </a:r>
+            <a:r>
+              <a:rPr lang="fr-FR" b="0" dirty="0">
+                <a:solidFill>
+                  <a:srgbClr val="CCCCCC"/>
+                </a:solidFill>
+                <a:effectLst/>
+                <a:latin typeface="JetBrains Mono" panose="02000009000000000000" pitchFamily="49" charset="0"/>
+              </a:rPr>
+              <a:t> ligne du haut</a:t>
+            </a:r>
+          </a:p>
+          <a:p>
+            <a:r>
+              <a:rPr lang="fr-FR" b="0" dirty="0">
+                <a:solidFill>
+                  <a:srgbClr val="6796E6"/>
+                </a:solidFill>
+                <a:effectLst/>
+                <a:latin typeface="JetBrains Mono" panose="02000009000000000000" pitchFamily="49" charset="0"/>
+              </a:rPr>
+              <a:t>*</a:t>
+            </a:r>
+            <a:r>
+              <a:rPr lang="fr-FR" b="0" dirty="0">
+                <a:solidFill>
+                  <a:srgbClr val="CCCCCC"/>
+                </a:solidFill>
+                <a:effectLst/>
+                <a:latin typeface="JetBrains Mono" panose="02000009000000000000" pitchFamily="49" charset="0"/>
+              </a:rPr>
+              <a:t> $</a:t>
+            </a:r>
+            <a:r>
+              <a:rPr lang="fr-FR" b="0" dirty="0">
+                <a:solidFill>
+                  <a:srgbClr val="D4D4D4"/>
+                </a:solidFill>
+                <a:effectLst/>
+                <a:latin typeface="JetBrains Mono" panose="02000009000000000000" pitchFamily="49" charset="0"/>
+              </a:rPr>
+              <a:t> </a:t>
+            </a:r>
+            <a:r>
+              <a:rPr lang="fr-FR" b="0" dirty="0">
+                <a:solidFill>
+                  <a:srgbClr val="569CD6"/>
+                </a:solidFill>
+                <a:effectLst/>
+                <a:latin typeface="JetBrains Mono" panose="02000009000000000000" pitchFamily="49" charset="0"/>
+              </a:rPr>
+              <a:t>\</a:t>
+            </a:r>
+            <a:r>
+              <a:rPr lang="fr-FR" b="0" dirty="0" err="1">
+                <a:solidFill>
+                  <a:srgbClr val="DCDCAA"/>
+                </a:solidFill>
+                <a:effectLst/>
+                <a:latin typeface="JetBrains Mono" panose="02000009000000000000" pitchFamily="49" charset="0"/>
+              </a:rPr>
+              <a:t>text</a:t>
+            </a:r>
+            <a:r>
+              <a:rPr lang="fr-FR" b="0" dirty="0">
+                <a:solidFill>
+                  <a:srgbClr val="D4D4D4"/>
+                </a:solidFill>
+                <a:effectLst/>
+                <a:latin typeface="JetBrains Mono" panose="02000009000000000000" pitchFamily="49" charset="0"/>
+              </a:rPr>
+              <a:t>{</a:t>
+            </a:r>
+            <a:r>
+              <a:rPr lang="fr-FR" b="0" dirty="0" err="1">
+                <a:solidFill>
+                  <a:srgbClr val="D4D4D4"/>
+                </a:solidFill>
+                <a:effectLst/>
+                <a:latin typeface="JetBrains Mono" panose="02000009000000000000" pitchFamily="49" charset="0"/>
+              </a:rPr>
+              <a:t>Specificity</a:t>
+            </a:r>
+            <a:r>
+              <a:rPr lang="fr-FR" b="0" dirty="0">
+                <a:solidFill>
+                  <a:srgbClr val="D4D4D4"/>
+                </a:solidFill>
+                <a:effectLst/>
+                <a:latin typeface="JetBrains Mono" panose="02000009000000000000" pitchFamily="49" charset="0"/>
+              </a:rPr>
+              <a:t>} = </a:t>
+            </a:r>
+            <a:r>
+              <a:rPr lang="fr-FR" b="0" dirty="0">
+                <a:solidFill>
+                  <a:srgbClr val="569CD6"/>
+                </a:solidFill>
+                <a:effectLst/>
+                <a:latin typeface="JetBrains Mono" panose="02000009000000000000" pitchFamily="49" charset="0"/>
+              </a:rPr>
+              <a:t>\</a:t>
+            </a:r>
+            <a:r>
+              <a:rPr lang="fr-FR" b="0" dirty="0">
+                <a:solidFill>
+                  <a:srgbClr val="DCDCAA"/>
+                </a:solidFill>
+                <a:effectLst/>
+                <a:latin typeface="JetBrains Mono" panose="02000009000000000000" pitchFamily="49" charset="0"/>
+              </a:rPr>
+              <a:t>frac</a:t>
+            </a:r>
+            <a:r>
+              <a:rPr lang="fr-FR" b="0" dirty="0">
+                <a:solidFill>
+                  <a:srgbClr val="D4D4D4"/>
+                </a:solidFill>
+                <a:effectLst/>
+                <a:latin typeface="JetBrains Mono" panose="02000009000000000000" pitchFamily="49" charset="0"/>
+              </a:rPr>
+              <a:t>{TN}{TN+FP}</a:t>
+            </a:r>
+            <a:r>
+              <a:rPr lang="fr-FR" b="0" dirty="0">
+                <a:solidFill>
+                  <a:srgbClr val="CCCCCC"/>
+                </a:solidFill>
+                <a:effectLst/>
+                <a:latin typeface="JetBrains Mono" panose="02000009000000000000" pitchFamily="49" charset="0"/>
+              </a:rPr>
+              <a:t>$</a:t>
+            </a:r>
+          </a:p>
+          <a:p>
+            <a:endParaRPr lang="fr-FR" b="0" dirty="0">
+              <a:solidFill>
+                <a:srgbClr val="CCCCCC"/>
+              </a:solidFill>
+              <a:effectLst/>
+              <a:latin typeface="JetBrains Mono" panose="02000009000000000000" pitchFamily="49" charset="0"/>
+            </a:endParaRPr>
+          </a:p>
+        </p:txBody>
+      </p:sp>
+      <p:sp>
+        <p:nvSpPr>
+          <p:cNvPr id="4" name="Espace réservé du numéro de diapositive 3"/>
+          <p:cNvSpPr>
+            <a:spLocks noGrp="1"/>
+          </p:cNvSpPr>
+          <p:nvPr>
+            <p:ph type="sldNum" sz="quarter" idx="5"/>
+          </p:nvPr>
+        </p:nvSpPr>
+        <p:spPr/>
+        <p:txBody>
+          <a:bodyPr/>
+          <a:lstStyle/>
+          <a:p>
             <a:fld id="{CA52ACDA-CAD7-4952-B2DF-2528E011DCB5}" type="slidenum">
               <a:rPr lang="fr-FR" smtClean="0"/>
-              <a:t>7</a:t>
+              <a:t>6</a:t>
             </a:fld>
             <a:endParaRPr lang="fr-FR"/>
           </a:p>
@@ -4489,6 +4645,259 @@
     <p:extLst>
       <p:ext uri="{BB962C8B-B14F-4D97-AF65-F5344CB8AC3E}">
         <p14:creationId xmlns:p14="http://schemas.microsoft.com/office/powerpoint/2010/main" val="583671224"/>
+      </p:ext>
+    </p:extLst>
+  </p:cSld>
+  <p:clrMapOvr>
+    <a:masterClrMapping/>
+  </p:clrMapOvr>
+</p:notes>
+</file>
+
+<file path=ppt/notesSlides/notesSlide5.xml><?xml version="1.0" encoding="utf-8"?>
+<p:notes xmlns:a="http://schemas.openxmlformats.org/drawingml/2006/main" xmlns:r="http://schemas.openxmlformats.org/officeDocument/2006/relationships" xmlns:p="http://schemas.openxmlformats.org/presentationml/2006/main">
+  <p:cSld>
+    <p:spTree>
+      <p:nvGrpSpPr>
+        <p:cNvPr id="1" name=""/>
+        <p:cNvGrpSpPr/>
+        <p:nvPr/>
+      </p:nvGrpSpPr>
+      <p:grpSpPr>
+        <a:xfrm>
+          <a:off x="0" y="0"/>
+          <a:ext cx="0" cy="0"/>
+          <a:chOff x="0" y="0"/>
+          <a:chExt cx="0" cy="0"/>
+        </a:xfrm>
+      </p:grpSpPr>
+      <p:sp>
+        <p:nvSpPr>
+          <p:cNvPr id="2" name="Espace réservé de l'image des diapositives 1"/>
+          <p:cNvSpPr>
+            <a:spLocks noGrp="1" noRot="1" noChangeAspect="1"/>
+          </p:cNvSpPr>
+          <p:nvPr>
+            <p:ph type="sldImg"/>
+          </p:nvPr>
+        </p:nvSpPr>
+        <p:spPr/>
+      </p:sp>
+      <p:sp>
+        <p:nvSpPr>
+          <p:cNvPr id="3" name="Espace réservé des notes 2"/>
+          <p:cNvSpPr>
+            <a:spLocks noGrp="1"/>
+          </p:cNvSpPr>
+          <p:nvPr>
+            <p:ph type="body" idx="1"/>
+          </p:nvPr>
+        </p:nvSpPr>
+        <p:spPr/>
+        <p:txBody>
+          <a:bodyPr/>
+          <a:lstStyle/>
+          <a:p>
+            <a:r>
+              <a:rPr lang="fr-FR" b="1" dirty="0"/>
+              <a:t>Courbe ROC</a:t>
+            </a:r>
+            <a:r>
+              <a:rPr lang="fr-FR" dirty="0"/>
+              <a:t> : Cette courbe montre le compromis entre le taux de vrais positifs (True Positive Rate) et le taux de faux positifs (False Positive Rate) pour différents seuils de décision</a:t>
+            </a:r>
+          </a:p>
+          <a:p>
+            <a:r>
+              <a:rPr lang="fr-FR" b="1" dirty="0"/>
+              <a:t>AUC</a:t>
+            </a:r>
+            <a:r>
+              <a:rPr lang="fr-FR" dirty="0"/>
+              <a:t> : L'AUC calculée est une seule valeur entre 0 et 1. Un AUC de 0.5 indique que le modèle n'est pas meilleur qu'un tirage au sort aléatoire. Un AUC de 1.0 indique une séparation parfaite entre les classes 0 et 1.</a:t>
+            </a:r>
+          </a:p>
+          <a:p>
+            <a:endParaRPr lang="fr-FR" dirty="0"/>
+          </a:p>
+          <a:p>
+            <a:r>
+              <a:rPr lang="fr-FR" dirty="0"/>
+              <a:t>On retrouve </a:t>
+            </a:r>
+          </a:p>
+          <a:p>
+            <a:pPr marL="171450" indent="-171450">
+              <a:buFont typeface="Arial" panose="020B0604020202020204" pitchFamily="34" charset="0"/>
+              <a:buChar char="•"/>
+            </a:pPr>
+            <a:r>
+              <a:rPr lang="fr-FR" dirty="0"/>
+              <a:t>le recall 63/(63+28) = 0,69</a:t>
+            </a:r>
+          </a:p>
+          <a:p>
+            <a:pPr marL="171450" indent="-171450">
+              <a:buFont typeface="Arial" panose="020B0604020202020204" pitchFamily="34" charset="0"/>
+              <a:buChar char="•"/>
+            </a:pPr>
+            <a:r>
+              <a:rPr lang="fr-FR" dirty="0"/>
+              <a:t>la </a:t>
+            </a:r>
+            <a:r>
+              <a:rPr lang="fr-FR" dirty="0" err="1"/>
+              <a:t>precision</a:t>
+            </a:r>
+            <a:r>
+              <a:rPr lang="fr-FR" dirty="0"/>
+              <a:t> 63/(63+10) = 0,86</a:t>
+            </a:r>
+          </a:p>
+          <a:p>
+            <a:endParaRPr lang="fr-FR" dirty="0"/>
+          </a:p>
+          <a:p>
+            <a:r>
+              <a:rPr lang="fr-FR" dirty="0"/>
+              <a:t>Dans des situations de données déséquilibrées, la précision n'est pas une métrique fiable pour évaluer la performance du modèle.</a:t>
+            </a:r>
+          </a:p>
+          <a:p>
+            <a:r>
+              <a:rPr lang="fr-FR" dirty="0"/>
+              <a:t>L'AUC, le rappel et le F1-score sont de meilleures métriques pour juger de la qualité du modèle, car ils montrent l'incapacité du "</a:t>
+            </a:r>
+            <a:r>
+              <a:rPr lang="fr-FR" dirty="0" err="1"/>
+              <a:t>dummy</a:t>
+            </a:r>
+            <a:r>
+              <a:rPr lang="fr-FR" dirty="0"/>
+              <a:t>" modèle à capturer la classe minoritaire</a:t>
+            </a:r>
+          </a:p>
+          <a:p>
+            <a:endParaRPr lang="fr-FR" dirty="0"/>
+          </a:p>
+          <a:p>
+            <a:r>
+              <a:rPr lang="fr-FR" dirty="0"/>
+              <a:t>Si on avait un modèle qui répondait 0 (not </a:t>
+            </a:r>
+            <a:r>
+              <a:rPr lang="fr-FR" dirty="0" err="1"/>
+              <a:t>converted</a:t>
+            </a:r>
+            <a:r>
+              <a:rPr lang="fr-FR" dirty="0"/>
+              <a:t>) dans 100% des cas, on aurait un truc du style</a:t>
+            </a:r>
+          </a:p>
+          <a:p>
+            <a:r>
+              <a:rPr lang="fr-FR" dirty="0"/>
+              <a:t>------------</a:t>
+            </a:r>
+          </a:p>
+          <a:p>
+            <a:r>
+              <a:rPr lang="fr-FR" dirty="0"/>
+              <a:t>97% | 0%  | 0</a:t>
+            </a:r>
+          </a:p>
+          <a:p>
+            <a:r>
+              <a:rPr lang="fr-FR" dirty="0"/>
+              <a:t>------------    true labels</a:t>
+            </a:r>
+          </a:p>
+          <a:p>
+            <a:r>
+              <a:rPr lang="fr-FR" dirty="0"/>
+              <a:t>3%   | 0%  | 1 </a:t>
+            </a:r>
+          </a:p>
+          <a:p>
+            <a:r>
+              <a:rPr lang="fr-FR" dirty="0"/>
+              <a:t>------------</a:t>
+            </a:r>
+          </a:p>
+          <a:p>
+            <a:r>
+              <a:rPr lang="fr-FR" dirty="0"/>
+              <a:t>   0      1</a:t>
+            </a:r>
+          </a:p>
+          <a:p>
+            <a:r>
+              <a:rPr lang="fr-FR" dirty="0" err="1"/>
+              <a:t>predicted</a:t>
+            </a:r>
+            <a:r>
+              <a:rPr lang="fr-FR" dirty="0"/>
+              <a:t> labels</a:t>
+            </a:r>
+          </a:p>
+          <a:p>
+            <a:endParaRPr lang="fr-FR" dirty="0"/>
+          </a:p>
+          <a:p>
+            <a:r>
+              <a:rPr lang="fr-FR" dirty="0"/>
+              <a:t>La courbe ROC serait la </a:t>
+            </a:r>
+            <a:r>
+              <a:rPr lang="fr-FR" dirty="0" err="1"/>
+              <a:t>diag</a:t>
+            </a:r>
+            <a:endParaRPr lang="fr-FR" dirty="0"/>
+          </a:p>
+          <a:p>
+            <a:r>
+              <a:rPr lang="fr-FR" dirty="0"/>
+              <a:t>L'AUC = 0.5</a:t>
+            </a:r>
+          </a:p>
+          <a:p>
+            <a:endParaRPr lang="fr-FR" dirty="0"/>
+          </a:p>
+          <a:p>
+            <a:r>
+              <a:rPr lang="fr-FR" dirty="0"/>
+              <a:t>Très bonne précision quand il faut détecter des 0 (97/97+3) mais incapable de détecter le moindre 1</a:t>
+            </a:r>
+          </a:p>
+        </p:txBody>
+      </p:sp>
+      <p:sp>
+        <p:nvSpPr>
+          <p:cNvPr id="4" name="Espace réservé du numéro de diapositive 3"/>
+          <p:cNvSpPr>
+            <a:spLocks noGrp="1"/>
+          </p:cNvSpPr>
+          <p:nvPr>
+            <p:ph type="sldNum" sz="quarter" idx="5"/>
+          </p:nvPr>
+        </p:nvSpPr>
+        <p:spPr/>
+        <p:txBody>
+          <a:bodyPr/>
+          <a:lstStyle/>
+          <a:p>
+            <a:fld id="{341AEC00-4977-4C47-A11B-52155DC12F54}" type="slidenum">
+              <a:rPr lang="fr-FR" smtClean="0"/>
+              <a:t>7</a:t>
+            </a:fld>
+            <a:endParaRPr lang="fr-FR"/>
+          </a:p>
+        </p:txBody>
+      </p:sp>
+    </p:spTree>
+    <p:extLst>
+      <p:ext uri="{BB962C8B-B14F-4D97-AF65-F5344CB8AC3E}">
+        <p14:creationId xmlns:p14="http://schemas.microsoft.com/office/powerpoint/2010/main" val="356246562"/>
       </p:ext>
     </p:extLst>
   </p:cSld>
@@ -4645,7 +5054,7 @@
           <a:p>
             <a:fld id="{7ECB9D5A-E5E4-41FE-AF39-634902D6D5D2}" type="datetimeFigureOut">
               <a:rPr lang="fr-FR" smtClean="0"/>
-              <a:t>24/08/2024</a:t>
+              <a:t>25/08/2024</a:t>
             </a:fld>
             <a:endParaRPr lang="fr-FR"/>
           </a:p>
@@ -4843,7 +5252,7 @@
           <a:p>
             <a:fld id="{7ECB9D5A-E5E4-41FE-AF39-634902D6D5D2}" type="datetimeFigureOut">
               <a:rPr lang="fr-FR" smtClean="0"/>
-              <a:t>24/08/2024</a:t>
+              <a:t>25/08/2024</a:t>
             </a:fld>
             <a:endParaRPr lang="fr-FR"/>
           </a:p>
@@ -5051,7 +5460,7 @@
           <a:p>
             <a:fld id="{7ECB9D5A-E5E4-41FE-AF39-634902D6D5D2}" type="datetimeFigureOut">
               <a:rPr lang="fr-FR" smtClean="0"/>
-              <a:t>24/08/2024</a:t>
+              <a:t>25/08/2024</a:t>
             </a:fld>
             <a:endParaRPr lang="fr-FR"/>
           </a:p>
@@ -5249,7 +5658,7 @@
           <a:p>
             <a:fld id="{7ECB9D5A-E5E4-41FE-AF39-634902D6D5D2}" type="datetimeFigureOut">
               <a:rPr lang="fr-FR" smtClean="0"/>
-              <a:t>24/08/2024</a:t>
+              <a:t>25/08/2024</a:t>
             </a:fld>
             <a:endParaRPr lang="fr-FR"/>
           </a:p>
@@ -5524,7 +5933,7 @@
           <a:p>
             <a:fld id="{7ECB9D5A-E5E4-41FE-AF39-634902D6D5D2}" type="datetimeFigureOut">
               <a:rPr lang="fr-FR" smtClean="0"/>
-              <a:t>24/08/2024</a:t>
+              <a:t>25/08/2024</a:t>
             </a:fld>
             <a:endParaRPr lang="fr-FR"/>
           </a:p>
@@ -5789,7 +6198,7 @@
           <a:p>
             <a:fld id="{7ECB9D5A-E5E4-41FE-AF39-634902D6D5D2}" type="datetimeFigureOut">
               <a:rPr lang="fr-FR" smtClean="0"/>
-              <a:t>24/08/2024</a:t>
+              <a:t>25/08/2024</a:t>
             </a:fld>
             <a:endParaRPr lang="fr-FR"/>
           </a:p>
@@ -6201,7 +6610,7 @@
           <a:p>
             <a:fld id="{7ECB9D5A-E5E4-41FE-AF39-634902D6D5D2}" type="datetimeFigureOut">
               <a:rPr lang="fr-FR" smtClean="0"/>
-              <a:t>24/08/2024</a:t>
+              <a:t>25/08/2024</a:t>
             </a:fld>
             <a:endParaRPr lang="fr-FR"/>
           </a:p>
@@ -6342,7 +6751,7 @@
           <a:p>
             <a:fld id="{7ECB9D5A-E5E4-41FE-AF39-634902D6D5D2}" type="datetimeFigureOut">
               <a:rPr lang="fr-FR" smtClean="0"/>
-              <a:t>24/08/2024</a:t>
+              <a:t>25/08/2024</a:t>
             </a:fld>
             <a:endParaRPr lang="fr-FR"/>
           </a:p>
@@ -6455,7 +6864,7 @@
           <a:p>
             <a:fld id="{7ECB9D5A-E5E4-41FE-AF39-634902D6D5D2}" type="datetimeFigureOut">
               <a:rPr lang="fr-FR" smtClean="0"/>
-              <a:t>24/08/2024</a:t>
+              <a:t>25/08/2024</a:t>
             </a:fld>
             <a:endParaRPr lang="fr-FR"/>
           </a:p>
@@ -6766,7 +7175,7 @@
           <a:p>
             <a:fld id="{7ECB9D5A-E5E4-41FE-AF39-634902D6D5D2}" type="datetimeFigureOut">
               <a:rPr lang="fr-FR" smtClean="0"/>
-              <a:t>24/08/2024</a:t>
+              <a:t>25/08/2024</a:t>
             </a:fld>
             <a:endParaRPr lang="fr-FR"/>
           </a:p>
@@ -7057,7 +7466,7 @@
           <a:p>
             <a:fld id="{7ECB9D5A-E5E4-41FE-AF39-634902D6D5D2}" type="datetimeFigureOut">
               <a:rPr lang="fr-FR" smtClean="0"/>
-              <a:t>24/08/2024</a:t>
+              <a:t>25/08/2024</a:t>
             </a:fld>
             <a:endParaRPr lang="fr-FR"/>
           </a:p>
@@ -7298,7 +7707,7 @@
           <a:p>
             <a:fld id="{7ECB9D5A-E5E4-41FE-AF39-634902D6D5D2}" type="datetimeFigureOut">
               <a:rPr lang="fr-FR" smtClean="0"/>
-              <a:t>24/08/2024</a:t>
+              <a:t>25/08/2024</a:t>
             </a:fld>
             <a:endParaRPr lang="fr-FR"/>
           </a:p>
@@ -7927,98 +8336,6 @@
       </p:grpSpPr>
       <p:sp>
         <p:nvSpPr>
-          <p:cNvPr id="2" name="Titre 1">
-            <a:extLst>
-              <a:ext uri="{FF2B5EF4-FFF2-40B4-BE49-F238E27FC236}">
-                <a16:creationId xmlns:a16="http://schemas.microsoft.com/office/drawing/2014/main" id="{F13D07B4-C7D9-46E1-38A0-A6EEF16B48EB}"/>
-              </a:ext>
-            </a:extLst>
-          </p:cNvPr>
-          <p:cNvSpPr>
-            <a:spLocks noGrp="1"/>
-          </p:cNvSpPr>
-          <p:nvPr>
-            <p:ph type="title"/>
-          </p:nvPr>
-        </p:nvSpPr>
-        <p:spPr/>
-        <p:txBody>
-          <a:bodyPr/>
-          <a:lstStyle/>
-          <a:p>
-            <a:r>
-              <a:rPr lang="fr-FR" dirty="0" err="1"/>
-              <a:t>Take</a:t>
-            </a:r>
-            <a:r>
-              <a:rPr lang="fr-FR" dirty="0"/>
-              <a:t> </a:t>
-            </a:r>
-            <a:r>
-              <a:rPr lang="fr-FR" dirty="0" err="1"/>
-              <a:t>away</a:t>
-            </a:r>
-            <a:endParaRPr lang="fr-FR" dirty="0"/>
-          </a:p>
-        </p:txBody>
-      </p:sp>
-      <p:sp>
-        <p:nvSpPr>
-          <p:cNvPr id="3" name="Espace réservé du contenu 2">
-            <a:extLst>
-              <a:ext uri="{FF2B5EF4-FFF2-40B4-BE49-F238E27FC236}">
-                <a16:creationId xmlns:a16="http://schemas.microsoft.com/office/drawing/2014/main" id="{1A803C62-BD0B-D0AC-2B41-C4F420891B06}"/>
-              </a:ext>
-            </a:extLst>
-          </p:cNvPr>
-          <p:cNvSpPr>
-            <a:spLocks noGrp="1"/>
-          </p:cNvSpPr>
-          <p:nvPr>
-            <p:ph idx="1"/>
-          </p:nvPr>
-        </p:nvSpPr>
-        <p:spPr/>
-        <p:txBody>
-          <a:bodyPr/>
-          <a:lstStyle/>
-          <a:p>
-            <a:endParaRPr lang="fr-FR" dirty="0"/>
-          </a:p>
-        </p:txBody>
-      </p:sp>
-    </p:spTree>
-    <p:extLst>
-      <p:ext uri="{BB962C8B-B14F-4D97-AF65-F5344CB8AC3E}">
-        <p14:creationId xmlns:p14="http://schemas.microsoft.com/office/powerpoint/2010/main" val="3201622378"/>
-      </p:ext>
-    </p:extLst>
-  </p:cSld>
-  <p:clrMapOvr>
-    <a:masterClrMapping/>
-  </p:clrMapOvr>
-</p:sld>
-</file>
-
-<file path=ppt/slides/slide11.xml><?xml version="1.0" encoding="utf-8"?>
-<p:sld xmlns:a="http://schemas.openxmlformats.org/drawingml/2006/main" xmlns:r="http://schemas.openxmlformats.org/officeDocument/2006/relationships" xmlns:p="http://schemas.openxmlformats.org/presentationml/2006/main">
-  <p:cSld>
-    <p:spTree>
-      <p:nvGrpSpPr>
-        <p:cNvPr id="1" name=""/>
-        <p:cNvGrpSpPr/>
-        <p:nvPr/>
-      </p:nvGrpSpPr>
-      <p:grpSpPr>
-        <a:xfrm>
-          <a:off x="0" y="0"/>
-          <a:ext cx="0" cy="0"/>
-          <a:chOff x="0" y="0"/>
-          <a:chExt cx="0" cy="0"/>
-        </a:xfrm>
-      </p:grpSpPr>
-      <p:sp>
-        <p:nvSpPr>
           <p:cNvPr id="4" name="Titre 3">
             <a:extLst>
               <a:ext uri="{FF2B5EF4-FFF2-40B4-BE49-F238E27FC236}">
@@ -8074,16 +8391,43 @@
         </p:nvSpPr>
         <p:spPr/>
         <p:txBody>
-          <a:bodyPr/>
+          <a:bodyPr>
+            <a:normAutofit/>
+          </a:bodyPr>
           <a:lstStyle/>
           <a:p>
             <a:r>
-              <a:rPr lang="fr-FR" dirty="0" err="1"/>
+              <a:rPr lang="fr-FR" sz="1600" dirty="0" err="1"/>
               <a:t>quick_view</a:t>
             </a:r>
             <a:r>
-              <a:rPr lang="fr-FR" dirty="0"/>
-              <a:t>()</a:t>
+              <a:rPr lang="fr-FR" sz="1600" dirty="0"/>
+              <a:t>() ?</a:t>
+            </a:r>
+          </a:p>
+          <a:p>
+            <a:r>
+              <a:rPr lang="fr-FR" sz="1600" dirty="0"/>
+              <a:t>the pipe of the </a:t>
+            </a:r>
+            <a:r>
+              <a:rPr lang="fr-FR" sz="1600" dirty="0" err="1"/>
+              <a:t>baseline</a:t>
+            </a:r>
+            <a:r>
+              <a:rPr lang="fr-FR" sz="1600"/>
+              <a:t> mode ?</a:t>
+            </a:r>
+            <a:endParaRPr lang="fr-FR" sz="1600" dirty="0"/>
+          </a:p>
+          <a:p>
+            <a:r>
+              <a:rPr lang="fr-FR" sz="1600" dirty="0" err="1"/>
+              <a:t>framework</a:t>
+            </a:r>
+            <a:r>
+              <a:rPr lang="fr-FR" sz="1600" dirty="0"/>
+              <a:t> ?</a:t>
             </a:r>
           </a:p>
         </p:txBody>
@@ -8867,6 +9211,52 @@
           </a:prstGeom>
         </p:spPr>
       </p:pic>
+      <p:sp>
+        <p:nvSpPr>
+          <p:cNvPr id="5" name="ZoneTexte 4">
+            <a:extLst>
+              <a:ext uri="{FF2B5EF4-FFF2-40B4-BE49-F238E27FC236}">
+                <a16:creationId xmlns:a16="http://schemas.microsoft.com/office/drawing/2014/main" id="{DABCC020-379D-DCB4-CD9D-F6FB97130E9E}"/>
+              </a:ext>
+            </a:extLst>
+          </p:cNvPr>
+          <p:cNvSpPr txBox="1"/>
+          <p:nvPr/>
+        </p:nvSpPr>
+        <p:spPr>
+          <a:xfrm>
+            <a:off x="5948139" y="2340125"/>
+            <a:ext cx="1300356" cy="276999"/>
+          </a:xfrm>
+          <a:prstGeom prst="rect">
+            <a:avLst/>
+          </a:prstGeom>
+          <a:noFill/>
+        </p:spPr>
+        <p:txBody>
+          <a:bodyPr wrap="none" rtlCol="0">
+            <a:spAutoFit/>
+          </a:bodyPr>
+          <a:lstStyle/>
+          <a:p>
+            <a:pPr algn="r"/>
+            <a:r>
+              <a:rPr lang="fr-FR" sz="1200" dirty="0" err="1">
+                <a:latin typeface="Courier New" panose="02070309020205020404" pitchFamily="49" charset="0"/>
+                <a:cs typeface="Courier New" panose="02070309020205020404" pitchFamily="49" charset="0"/>
+              </a:rPr>
+              <a:t>quick_view</a:t>
+            </a:r>
+            <a:r>
+              <a:rPr lang="fr-FR" sz="1200" dirty="0">
+                <a:latin typeface="Courier New" panose="02070309020205020404" pitchFamily="49" charset="0"/>
+                <a:cs typeface="Courier New" panose="02070309020205020404" pitchFamily="49" charset="0"/>
+              </a:rPr>
+              <a:t>()</a:t>
+            </a:r>
+          </a:p>
+        </p:txBody>
+      </p:sp>
     </p:spTree>
     <p:extLst>
       <p:ext uri="{BB962C8B-B14F-4D97-AF65-F5344CB8AC3E}">
@@ -9469,7 +9859,7 @@
           <p:nvPr/>
         </p:nvPicPr>
         <p:blipFill>
-          <a:blip r:embed="rId2"/>
+          <a:blip r:embed="rId3"/>
           <a:stretch>
             <a:fillRect/>
           </a:stretch>
@@ -9506,7 +9896,7 @@
           <p:nvPr/>
         </p:nvPicPr>
         <p:blipFill>
-          <a:blip r:embed="rId3"/>
+          <a:blip r:embed="rId4"/>
           <a:stretch>
             <a:fillRect/>
           </a:stretch>
@@ -9584,89 +9974,6 @@
 </file>
 
 <file path=ppt/slides/slide6.xml><?xml version="1.0" encoding="utf-8"?>
-<p:sld xmlns:a="http://schemas.openxmlformats.org/drawingml/2006/main" xmlns:r="http://schemas.openxmlformats.org/officeDocument/2006/relationships" xmlns:p="http://schemas.openxmlformats.org/presentationml/2006/main">
-  <p:cSld>
-    <p:spTree>
-      <p:nvGrpSpPr>
-        <p:cNvPr id="1" name=""/>
-        <p:cNvGrpSpPr/>
-        <p:nvPr/>
-      </p:nvGrpSpPr>
-      <p:grpSpPr>
-        <a:xfrm>
-          <a:off x="0" y="0"/>
-          <a:ext cx="0" cy="0"/>
-          <a:chOff x="0" y="0"/>
-          <a:chExt cx="0" cy="0"/>
-        </a:xfrm>
-      </p:grpSpPr>
-      <p:sp>
-        <p:nvSpPr>
-          <p:cNvPr id="2" name="Titre 1">
-            <a:extLst>
-              <a:ext uri="{FF2B5EF4-FFF2-40B4-BE49-F238E27FC236}">
-                <a16:creationId xmlns:a16="http://schemas.microsoft.com/office/drawing/2014/main" id="{7EC6ADED-F7D6-006E-5E1A-43C369CF43C1}"/>
-              </a:ext>
-            </a:extLst>
-          </p:cNvPr>
-          <p:cNvSpPr>
-            <a:spLocks noGrp="1"/>
-          </p:cNvSpPr>
-          <p:nvPr>
-            <p:ph type="title"/>
-          </p:nvPr>
-        </p:nvSpPr>
-        <p:spPr/>
-        <p:txBody>
-          <a:bodyPr/>
-          <a:lstStyle/>
-          <a:p>
-            <a:r>
-              <a:rPr lang="fr-FR" dirty="0"/>
-              <a:t>Baseline model 2/2</a:t>
-            </a:r>
-          </a:p>
-        </p:txBody>
-      </p:sp>
-      <p:sp>
-        <p:nvSpPr>
-          <p:cNvPr id="3" name="Espace réservé du contenu 2">
-            <a:extLst>
-              <a:ext uri="{FF2B5EF4-FFF2-40B4-BE49-F238E27FC236}">
-                <a16:creationId xmlns:a16="http://schemas.microsoft.com/office/drawing/2014/main" id="{30B415C2-EFD0-32B2-4D57-9DC18ABA9C40}"/>
-              </a:ext>
-            </a:extLst>
-          </p:cNvPr>
-          <p:cNvSpPr>
-            <a:spLocks noGrp="1"/>
-          </p:cNvSpPr>
-          <p:nvPr>
-            <p:ph idx="1"/>
-          </p:nvPr>
-        </p:nvSpPr>
-        <p:spPr/>
-        <p:txBody>
-          <a:bodyPr/>
-          <a:lstStyle/>
-          <a:p>
-            <a:endParaRPr lang="fr-FR"/>
-          </a:p>
-        </p:txBody>
-      </p:sp>
-    </p:spTree>
-    <p:extLst>
-      <p:ext uri="{BB962C8B-B14F-4D97-AF65-F5344CB8AC3E}">
-        <p14:creationId xmlns:p14="http://schemas.microsoft.com/office/powerpoint/2010/main" val="2275997330"/>
-      </p:ext>
-    </p:extLst>
-  </p:cSld>
-  <p:clrMapOvr>
-    <a:masterClrMapping/>
-  </p:clrMapOvr>
-</p:sld>
-</file>
-
-<file path=ppt/slides/slide7.xml><?xml version="1.0" encoding="utf-8"?>
 <p:sld xmlns:a="http://schemas.openxmlformats.org/drawingml/2006/main" xmlns:r="http://schemas.openxmlformats.org/officeDocument/2006/relationships" xmlns:p="http://schemas.openxmlformats.org/presentationml/2006/main" show="0">
   <p:cSld>
     <p:spTree>
@@ -10667,6 +10974,242 @@
 </p:sld>
 </file>
 
+<file path=ppt/slides/slide7.xml><?xml version="1.0" encoding="utf-8"?>
+<p:sld xmlns:a="http://schemas.openxmlformats.org/drawingml/2006/main" xmlns:r="http://schemas.openxmlformats.org/officeDocument/2006/relationships" xmlns:p="http://schemas.openxmlformats.org/presentationml/2006/main">
+  <p:cSld>
+    <p:spTree>
+      <p:nvGrpSpPr>
+        <p:cNvPr id="1" name=""/>
+        <p:cNvGrpSpPr/>
+        <p:nvPr/>
+      </p:nvGrpSpPr>
+      <p:grpSpPr>
+        <a:xfrm>
+          <a:off x="0" y="0"/>
+          <a:ext cx="0" cy="0"/>
+          <a:chOff x="0" y="0"/>
+          <a:chExt cx="0" cy="0"/>
+        </a:xfrm>
+      </p:grpSpPr>
+      <p:sp>
+        <p:nvSpPr>
+          <p:cNvPr id="2" name="Titre 1">
+            <a:extLst>
+              <a:ext uri="{FF2B5EF4-FFF2-40B4-BE49-F238E27FC236}">
+                <a16:creationId xmlns:a16="http://schemas.microsoft.com/office/drawing/2014/main" id="{7EC6ADED-F7D6-006E-5E1A-43C369CF43C1}"/>
+              </a:ext>
+            </a:extLst>
+          </p:cNvPr>
+          <p:cNvSpPr>
+            <a:spLocks noGrp="1"/>
+          </p:cNvSpPr>
+          <p:nvPr>
+            <p:ph type="title"/>
+          </p:nvPr>
+        </p:nvSpPr>
+        <p:spPr/>
+        <p:txBody>
+          <a:bodyPr/>
+          <a:lstStyle/>
+          <a:p>
+            <a:r>
+              <a:rPr lang="fr-FR" dirty="0"/>
+              <a:t>Baseline model 2/2</a:t>
+            </a:r>
+          </a:p>
+        </p:txBody>
+      </p:sp>
+      <p:pic>
+        <p:nvPicPr>
+          <p:cNvPr id="5" name="Image 4">
+            <a:extLst>
+              <a:ext uri="{FF2B5EF4-FFF2-40B4-BE49-F238E27FC236}">
+                <a16:creationId xmlns:a16="http://schemas.microsoft.com/office/drawing/2014/main" id="{D56DD871-CBF0-D271-96DF-46F6D9078743}"/>
+              </a:ext>
+            </a:extLst>
+          </p:cNvPr>
+          <p:cNvPicPr>
+            <a:picLocks noChangeAspect="1"/>
+          </p:cNvPicPr>
+          <p:nvPr/>
+        </p:nvPicPr>
+        <p:blipFill>
+          <a:blip r:embed="rId3"/>
+          <a:stretch>
+            <a:fillRect/>
+          </a:stretch>
+        </p:blipFill>
+        <p:spPr>
+          <a:xfrm>
+            <a:off x="213360" y="1014413"/>
+            <a:ext cx="2991277" cy="2537544"/>
+          </a:xfrm>
+          <a:prstGeom prst="rect">
+            <a:avLst/>
+          </a:prstGeom>
+          <a:effectLst>
+            <a:outerShdw blurRad="50800" dist="38100" dir="2700000" algn="tl" rotWithShape="0">
+              <a:prstClr val="black">
+                <a:alpha val="40000"/>
+              </a:prstClr>
+            </a:outerShdw>
+          </a:effectLst>
+        </p:spPr>
+      </p:pic>
+      <p:pic>
+        <p:nvPicPr>
+          <p:cNvPr id="7" name="Image 6">
+            <a:extLst>
+              <a:ext uri="{FF2B5EF4-FFF2-40B4-BE49-F238E27FC236}">
+                <a16:creationId xmlns:a16="http://schemas.microsoft.com/office/drawing/2014/main" id="{CC852D71-26AB-6F66-97AE-D28506030CC7}"/>
+              </a:ext>
+            </a:extLst>
+          </p:cNvPr>
+          <p:cNvPicPr>
+            <a:picLocks noChangeAspect="1"/>
+          </p:cNvPicPr>
+          <p:nvPr/>
+        </p:nvPicPr>
+        <p:blipFill>
+          <a:blip r:embed="rId4"/>
+          <a:stretch>
+            <a:fillRect/>
+          </a:stretch>
+        </p:blipFill>
+        <p:spPr>
+          <a:xfrm>
+            <a:off x="3741651" y="1014413"/>
+            <a:ext cx="3176131" cy="2537544"/>
+          </a:xfrm>
+          <a:prstGeom prst="rect">
+            <a:avLst/>
+          </a:prstGeom>
+          <a:effectLst>
+            <a:outerShdw blurRad="50800" dist="38100" dir="2700000" algn="tl" rotWithShape="0">
+              <a:prstClr val="black">
+                <a:alpha val="40000"/>
+              </a:prstClr>
+            </a:outerShdw>
+          </a:effectLst>
+        </p:spPr>
+      </p:pic>
+      <p:pic>
+        <p:nvPicPr>
+          <p:cNvPr id="9" name="Image 8">
+            <a:extLst>
+              <a:ext uri="{FF2B5EF4-FFF2-40B4-BE49-F238E27FC236}">
+                <a16:creationId xmlns:a16="http://schemas.microsoft.com/office/drawing/2014/main" id="{9E88AA2D-ECCB-5F44-7000-D26F7495D410}"/>
+              </a:ext>
+            </a:extLst>
+          </p:cNvPr>
+          <p:cNvPicPr>
+            <a:picLocks noChangeAspect="1"/>
+          </p:cNvPicPr>
+          <p:nvPr/>
+        </p:nvPicPr>
+        <p:blipFill>
+          <a:blip r:embed="rId5"/>
+          <a:stretch>
+            <a:fillRect/>
+          </a:stretch>
+        </p:blipFill>
+        <p:spPr>
+          <a:xfrm>
+            <a:off x="7454796" y="1014413"/>
+            <a:ext cx="4460490" cy="2537544"/>
+          </a:xfrm>
+          <a:prstGeom prst="rect">
+            <a:avLst/>
+          </a:prstGeom>
+          <a:effectLst>
+            <a:outerShdw blurRad="50800" dist="38100" dir="2700000" algn="tl" rotWithShape="0">
+              <a:prstClr val="black">
+                <a:alpha val="40000"/>
+              </a:prstClr>
+            </a:outerShdw>
+          </a:effectLst>
+        </p:spPr>
+      </p:pic>
+      <p:pic>
+        <p:nvPicPr>
+          <p:cNvPr id="11" name="Image 10">
+            <a:extLst>
+              <a:ext uri="{FF2B5EF4-FFF2-40B4-BE49-F238E27FC236}">
+                <a16:creationId xmlns:a16="http://schemas.microsoft.com/office/drawing/2014/main" id="{0E8AC127-CAC1-4246-6705-B442DE6F4C8B}"/>
+              </a:ext>
+            </a:extLst>
+          </p:cNvPr>
+          <p:cNvPicPr>
+            <a:picLocks noChangeAspect="1"/>
+          </p:cNvPicPr>
+          <p:nvPr/>
+        </p:nvPicPr>
+        <p:blipFill>
+          <a:blip r:embed="rId6"/>
+          <a:stretch>
+            <a:fillRect/>
+          </a:stretch>
+        </p:blipFill>
+        <p:spPr>
+          <a:xfrm>
+            <a:off x="213360" y="4151397"/>
+            <a:ext cx="2991277" cy="2389856"/>
+          </a:xfrm>
+          <a:prstGeom prst="rect">
+            <a:avLst/>
+          </a:prstGeom>
+          <a:effectLst>
+            <a:outerShdw blurRad="50800" dist="38100" dir="2700000" algn="tl" rotWithShape="0">
+              <a:prstClr val="black">
+                <a:alpha val="40000"/>
+              </a:prstClr>
+            </a:outerShdw>
+          </a:effectLst>
+        </p:spPr>
+      </p:pic>
+      <p:pic>
+        <p:nvPicPr>
+          <p:cNvPr id="13" name="Image 12">
+            <a:extLst>
+              <a:ext uri="{FF2B5EF4-FFF2-40B4-BE49-F238E27FC236}">
+                <a16:creationId xmlns:a16="http://schemas.microsoft.com/office/drawing/2014/main" id="{277FD061-D902-CE25-6179-D9375CFB392C}"/>
+              </a:ext>
+            </a:extLst>
+          </p:cNvPr>
+          <p:cNvPicPr>
+            <a:picLocks noChangeAspect="1"/>
+          </p:cNvPicPr>
+          <p:nvPr/>
+        </p:nvPicPr>
+        <p:blipFill>
+          <a:blip r:embed="rId7"/>
+          <a:stretch>
+            <a:fillRect/>
+          </a:stretch>
+        </p:blipFill>
+        <p:spPr>
+          <a:xfrm>
+            <a:off x="3741652" y="4151398"/>
+            <a:ext cx="4410622" cy="2389856"/>
+          </a:xfrm>
+          <a:prstGeom prst="rect">
+            <a:avLst/>
+          </a:prstGeom>
+        </p:spPr>
+      </p:pic>
+    </p:spTree>
+    <p:extLst>
+      <p:ext uri="{BB962C8B-B14F-4D97-AF65-F5344CB8AC3E}">
+        <p14:creationId xmlns:p14="http://schemas.microsoft.com/office/powerpoint/2010/main" val="2275997330"/>
+      </p:ext>
+    </p:extLst>
+  </p:cSld>
+  <p:clrMapOvr>
+    <a:masterClrMapping/>
+  </p:clrMapOvr>
+</p:sld>
+</file>
+
 <file path=ppt/slides/slide8.xml><?xml version="1.0" encoding="utf-8"?>
 <p:sld xmlns:a="http://schemas.openxmlformats.org/drawingml/2006/main" xmlns:r="http://schemas.openxmlformats.org/officeDocument/2006/relationships" xmlns:p="http://schemas.openxmlformats.org/presentationml/2006/main">
   <p:cSld>
@@ -10707,7 +11250,7 @@
           <a:p>
             <a:r>
               <a:rPr lang="fr-FR" dirty="0"/>
-              <a:t>Framework 1/2</a:t>
+              <a:t>Framework 1</a:t>
             </a:r>
           </a:p>
         </p:txBody>
@@ -10772,7 +11315,7 @@
           <p:cNvPr id="2" name="Titre 1">
             <a:extLst>
               <a:ext uri="{FF2B5EF4-FFF2-40B4-BE49-F238E27FC236}">
-                <a16:creationId xmlns:a16="http://schemas.microsoft.com/office/drawing/2014/main" id="{99380B92-D1BD-920D-9DDD-DE700497E6B3}"/>
+                <a16:creationId xmlns:a16="http://schemas.microsoft.com/office/drawing/2014/main" id="{F13D07B4-C7D9-46E1-38A0-A6EEF16B48EB}"/>
               </a:ext>
             </a:extLst>
           </p:cNvPr>
@@ -10789,8 +11332,16 @@
           <a:lstStyle/>
           <a:p>
             <a:r>
-              <a:rPr lang="fr-FR"/>
-              <a:t>Framework 2/2</a:t>
+              <a:rPr lang="fr-FR" dirty="0" err="1"/>
+              <a:t>Take</a:t>
+            </a:r>
+            <a:r>
+              <a:rPr lang="fr-FR" dirty="0"/>
+              <a:t> </a:t>
+            </a:r>
+            <a:r>
+              <a:rPr lang="fr-FR" dirty="0" err="1"/>
+              <a:t>away</a:t>
             </a:r>
             <a:endParaRPr lang="fr-FR" dirty="0"/>
           </a:p>
@@ -10801,7 +11352,7 @@
           <p:cNvPr id="3" name="Espace réservé du contenu 2">
             <a:extLst>
               <a:ext uri="{FF2B5EF4-FFF2-40B4-BE49-F238E27FC236}">
-                <a16:creationId xmlns:a16="http://schemas.microsoft.com/office/drawing/2014/main" id="{804F1FBD-A313-E83F-F536-A12A2E838AC3}"/>
+                <a16:creationId xmlns:a16="http://schemas.microsoft.com/office/drawing/2014/main" id="{1A803C62-BD0B-D0AC-2B41-C4F420891B06}"/>
               </a:ext>
             </a:extLst>
           </p:cNvPr>
@@ -10817,14 +11368,14 @@
           <a:bodyPr/>
           <a:lstStyle/>
           <a:p>
-            <a:endParaRPr lang="fr-FR"/>
+            <a:endParaRPr lang="fr-FR" dirty="0"/>
           </a:p>
         </p:txBody>
       </p:sp>
     </p:spTree>
     <p:extLst>
       <p:ext uri="{BB962C8B-B14F-4D97-AF65-F5344CB8AC3E}">
-        <p14:creationId xmlns:p14="http://schemas.microsoft.com/office/powerpoint/2010/main" val="1695937145"/>
+        <p14:creationId xmlns:p14="http://schemas.microsoft.com/office/powerpoint/2010/main" val="3201622378"/>
       </p:ext>
     </p:extLst>
   </p:cSld>

</xml_diff>

<commit_message>
J'ai enfin terminé conv rate challenge... Enfin j'espère...
</commit_message>
<xml_diff>
--- a/05_supervised_ML/99_Project_Conversion_rate_challenge/01_conversion_rate_challenge.pptx
+++ b/05_supervised_ML/99_Project_Conversion_rate_challenge/01_conversion_rate_challenge.pptx
@@ -127,7 +127,7 @@
 <file path=ppt/revisionInfo.xml><?xml version="1.0" encoding="utf-8"?>
 <p1510:revInfo xmlns:a="http://schemas.openxmlformats.org/drawingml/2006/main" xmlns:r="http://schemas.openxmlformats.org/officeDocument/2006/relationships" xmlns:p1510="http://schemas.microsoft.com/office/powerpoint/2015/10/main">
   <p1510:revLst>
-    <p1510:client id="{1601E6E7-CA79-4409-AD99-5386FB3F24AE}" v="28" dt="2024-08-25T10:59:34.210"/>
+    <p1510:client id="{1601E6E7-CA79-4409-AD99-5386FB3F24AE}" v="42" dt="2024-08-25T13:40:56.603"/>
   </p1510:revLst>
 </p1510:revInfo>
 </file>
@@ -1566,7 +1566,7 @@
   <pc:docChgLst>
     <pc:chgData name="Philippe Baucour" userId="5102170ae7533958" providerId="LiveId" clId="{1601E6E7-CA79-4409-AD99-5386FB3F24AE}"/>
     <pc:docChg chg="undo custSel addSld delSld modSld sldOrd">
-      <pc:chgData name="Philippe Baucour" userId="5102170ae7533958" providerId="LiveId" clId="{1601E6E7-CA79-4409-AD99-5386FB3F24AE}" dt="2024-08-25T12:36:42.500" v="1627" actId="47"/>
+      <pc:chgData name="Philippe Baucour" userId="5102170ae7533958" providerId="LiveId" clId="{1601E6E7-CA79-4409-AD99-5386FB3F24AE}" dt="2024-08-25T13:44:05.432" v="2500" actId="20577"/>
       <pc:docMkLst>
         <pc:docMk/>
       </pc:docMkLst>
@@ -1602,17 +1602,33 @@
         </pc:picChg>
       </pc:sldChg>
       <pc:sldChg chg="addSp delSp modSp mod">
-        <pc:chgData name="Philippe Baucour" userId="5102170ae7533958" providerId="LiveId" clId="{1601E6E7-CA79-4409-AD99-5386FB3F24AE}" dt="2024-08-22T14:19:42.487" v="237" actId="21"/>
+        <pc:chgData name="Philippe Baucour" userId="5102170ae7533958" providerId="LiveId" clId="{1601E6E7-CA79-4409-AD99-5386FB3F24AE}" dt="2024-08-25T13:44:05.432" v="2500" actId="20577"/>
         <pc:sldMkLst>
           <pc:docMk/>
           <pc:sldMk cId="3201622378" sldId="257"/>
         </pc:sldMkLst>
+        <pc:spChg chg="mod">
+          <ac:chgData name="Philippe Baucour" userId="5102170ae7533958" providerId="LiveId" clId="{1601E6E7-CA79-4409-AD99-5386FB3F24AE}" dt="2024-08-25T13:44:05.432" v="2500" actId="20577"/>
+          <ac:spMkLst>
+            <pc:docMk/>
+            <pc:sldMk cId="3201622378" sldId="257"/>
+            <ac:spMk id="3" creationId="{1A803C62-BD0B-D0AC-2B41-C4F420891B06}"/>
+          </ac:spMkLst>
+        </pc:spChg>
         <pc:picChg chg="add del mod">
           <ac:chgData name="Philippe Baucour" userId="5102170ae7533958" providerId="LiveId" clId="{1601E6E7-CA79-4409-AD99-5386FB3F24AE}" dt="2024-08-22T14:19:42.487" v="237" actId="21"/>
           <ac:picMkLst>
             <pc:docMk/>
             <pc:sldMk cId="3201622378" sldId="257"/>
             <ac:picMk id="5" creationId="{D0C443D2-D44B-2CF1-CB78-C08A25DDC951}"/>
+          </ac:picMkLst>
+        </pc:picChg>
+        <pc:picChg chg="add mod">
+          <ac:chgData name="Philippe Baucour" userId="5102170ae7533958" providerId="LiveId" clId="{1601E6E7-CA79-4409-AD99-5386FB3F24AE}" dt="2024-08-25T13:40:56.603" v="2470" actId="1076"/>
+          <ac:picMkLst>
+            <pc:docMk/>
+            <pc:sldMk cId="3201622378" sldId="257"/>
+            <ac:picMk id="1026" creationId="{2D552CAB-37E3-9567-3277-906A21F1EF47}"/>
           </ac:picMkLst>
         </pc:picChg>
       </pc:sldChg>
@@ -2135,20 +2151,100 @@
           </ac:picMkLst>
         </pc:picChg>
       </pc:sldChg>
-      <pc:sldChg chg="modSp new mod">
-        <pc:chgData name="Philippe Baucour" userId="5102170ae7533958" providerId="LiveId" clId="{1601E6E7-CA79-4409-AD99-5386FB3F24AE}" dt="2024-08-25T12:36:39.235" v="1626" actId="20577"/>
+      <pc:sldChg chg="addSp delSp modSp new mod chgLayout">
+        <pc:chgData name="Philippe Baucour" userId="5102170ae7533958" providerId="LiveId" clId="{1601E6E7-CA79-4409-AD99-5386FB3F24AE}" dt="2024-08-25T13:35:34.421" v="2328" actId="14100"/>
         <pc:sldMkLst>
           <pc:docMk/>
           <pc:sldMk cId="1612286955" sldId="268"/>
         </pc:sldMkLst>
-        <pc:spChg chg="mod">
-          <ac:chgData name="Philippe Baucour" userId="5102170ae7533958" providerId="LiveId" clId="{1601E6E7-CA79-4409-AD99-5386FB3F24AE}" dt="2024-08-25T12:36:39.235" v="1626" actId="20577"/>
+        <pc:spChg chg="mod ord">
+          <ac:chgData name="Philippe Baucour" userId="5102170ae7533958" providerId="LiveId" clId="{1601E6E7-CA79-4409-AD99-5386FB3F24AE}" dt="2024-08-25T13:10:07.447" v="1687" actId="700"/>
           <ac:spMkLst>
             <pc:docMk/>
             <pc:sldMk cId="1612286955" sldId="268"/>
             <ac:spMk id="2" creationId="{99380B92-D1BD-920D-9DDD-DE700497E6B3}"/>
           </ac:spMkLst>
         </pc:spChg>
+        <pc:spChg chg="del">
+          <ac:chgData name="Philippe Baucour" userId="5102170ae7533958" providerId="LiveId" clId="{1601E6E7-CA79-4409-AD99-5386FB3F24AE}" dt="2024-08-25T13:08:53.460" v="1628" actId="931"/>
+          <ac:spMkLst>
+            <pc:docMk/>
+            <pc:sldMk cId="1612286955" sldId="268"/>
+            <ac:spMk id="3" creationId="{804F1FBD-A313-E83F-F536-A12A2E838AC3}"/>
+          </ac:spMkLst>
+        </pc:spChg>
+        <pc:spChg chg="add del mod">
+          <ac:chgData name="Philippe Baucour" userId="5102170ae7533958" providerId="LiveId" clId="{1601E6E7-CA79-4409-AD99-5386FB3F24AE}" dt="2024-08-25T13:10:15.663" v="1688" actId="478"/>
+          <ac:spMkLst>
+            <pc:docMk/>
+            <pc:sldMk cId="1612286955" sldId="268"/>
+            <ac:spMk id="6" creationId="{D72F0470-6162-6B88-A36B-9BA438CC5278}"/>
+          </ac:spMkLst>
+        </pc:spChg>
+        <pc:spChg chg="add mod">
+          <ac:chgData name="Philippe Baucour" userId="5102170ae7533958" providerId="LiveId" clId="{1601E6E7-CA79-4409-AD99-5386FB3F24AE}" dt="2024-08-25T13:34:38.261" v="2323" actId="20577"/>
+          <ac:spMkLst>
+            <pc:docMk/>
+            <pc:sldMk cId="1612286955" sldId="268"/>
+            <ac:spMk id="8" creationId="{24152AC8-9019-030C-B543-E5CD8E282E72}"/>
+          </ac:spMkLst>
+        </pc:spChg>
+        <pc:picChg chg="add del mod ord">
+          <ac:chgData name="Philippe Baucour" userId="5102170ae7533958" providerId="LiveId" clId="{1601E6E7-CA79-4409-AD99-5386FB3F24AE}" dt="2024-08-25T13:10:21.051" v="1689" actId="21"/>
+          <ac:picMkLst>
+            <pc:docMk/>
+            <pc:sldMk cId="1612286955" sldId="268"/>
+            <ac:picMk id="5" creationId="{F9FB78CE-91DD-40A8-182C-E25A9108A6F9}"/>
+          </ac:picMkLst>
+        </pc:picChg>
+        <pc:picChg chg="add mod">
+          <ac:chgData name="Philippe Baucour" userId="5102170ae7533958" providerId="LiveId" clId="{1601E6E7-CA79-4409-AD99-5386FB3F24AE}" dt="2024-08-25T13:10:51.479" v="1746" actId="1076"/>
+          <ac:picMkLst>
+            <pc:docMk/>
+            <pc:sldMk cId="1612286955" sldId="268"/>
+            <ac:picMk id="9" creationId="{F9FB78CE-91DD-40A8-182C-E25A9108A6F9}"/>
+          </ac:picMkLst>
+        </pc:picChg>
+        <pc:picChg chg="add mod">
+          <ac:chgData name="Philippe Baucour" userId="5102170ae7533958" providerId="LiveId" clId="{1601E6E7-CA79-4409-AD99-5386FB3F24AE}" dt="2024-08-25T13:32:21.458" v="2312" actId="465"/>
+          <ac:picMkLst>
+            <pc:docMk/>
+            <pc:sldMk cId="1612286955" sldId="268"/>
+            <ac:picMk id="11" creationId="{780D1B08-8FC0-B150-FFA4-146441FCA0E0}"/>
+          </ac:picMkLst>
+        </pc:picChg>
+        <pc:picChg chg="add mod">
+          <ac:chgData name="Philippe Baucour" userId="5102170ae7533958" providerId="LiveId" clId="{1601E6E7-CA79-4409-AD99-5386FB3F24AE}" dt="2024-08-25T13:32:08.282" v="2311" actId="1035"/>
+          <ac:picMkLst>
+            <pc:docMk/>
+            <pc:sldMk cId="1612286955" sldId="268"/>
+            <ac:picMk id="13" creationId="{1B066F4F-5C59-F532-E732-D4A3BBFDFDC9}"/>
+          </ac:picMkLst>
+        </pc:picChg>
+        <pc:picChg chg="add mod">
+          <ac:chgData name="Philippe Baucour" userId="5102170ae7533958" providerId="LiveId" clId="{1601E6E7-CA79-4409-AD99-5386FB3F24AE}" dt="2024-08-25T13:32:21.458" v="2312" actId="465"/>
+          <ac:picMkLst>
+            <pc:docMk/>
+            <pc:sldMk cId="1612286955" sldId="268"/>
+            <ac:picMk id="15" creationId="{D14D8A29-CF57-D12C-715A-891F21A57F37}"/>
+          </ac:picMkLst>
+        </pc:picChg>
+        <pc:cxnChg chg="add mod">
+          <ac:chgData name="Philippe Baucour" userId="5102170ae7533958" providerId="LiveId" clId="{1601E6E7-CA79-4409-AD99-5386FB3F24AE}" dt="2024-08-25T13:35:19.942" v="2325" actId="14100"/>
+          <ac:cxnSpMkLst>
+            <pc:docMk/>
+            <pc:sldMk cId="1612286955" sldId="268"/>
+            <ac:cxnSpMk id="17" creationId="{045BABB2-3EF1-61BA-328A-2DC1B6212357}"/>
+          </ac:cxnSpMkLst>
+        </pc:cxnChg>
+        <pc:cxnChg chg="add mod">
+          <ac:chgData name="Philippe Baucour" userId="5102170ae7533958" providerId="LiveId" clId="{1601E6E7-CA79-4409-AD99-5386FB3F24AE}" dt="2024-08-25T13:35:34.421" v="2328" actId="14100"/>
+          <ac:cxnSpMkLst>
+            <pc:docMk/>
+            <pc:sldMk cId="1612286955" sldId="268"/>
+            <ac:cxnSpMk id="21" creationId="{2FCD1322-158F-94B0-6A94-F038F9107155}"/>
+          </ac:cxnSpMkLst>
+        </pc:cxnChg>
       </pc:sldChg>
       <pc:sldChg chg="delSp modSp add mod ord delAnim modAnim modShow">
         <pc:chgData name="Philippe Baucour" userId="5102170ae7533958" providerId="LiveId" clId="{1601E6E7-CA79-4409-AD99-5386FB3F24AE}" dt="2024-08-25T10:42:03.562" v="873"/>
@@ -11257,10 +11353,10 @@
       </p:sp>
       <p:sp>
         <p:nvSpPr>
-          <p:cNvPr id="3" name="Espace réservé du contenu 2">
-            <a:extLst>
-              <a:ext uri="{FF2B5EF4-FFF2-40B4-BE49-F238E27FC236}">
-                <a16:creationId xmlns:a16="http://schemas.microsoft.com/office/drawing/2014/main" id="{804F1FBD-A313-E83F-F536-A12A2E838AC3}"/>
+          <p:cNvPr id="8" name="Espace réservé du contenu 7">
+            <a:extLst>
+              <a:ext uri="{FF2B5EF4-FFF2-40B4-BE49-F238E27FC236}">
+                <a16:creationId xmlns:a16="http://schemas.microsoft.com/office/drawing/2014/main" id="{24152AC8-9019-030C-B543-E5CD8E282E72}"/>
               </a:ext>
             </a:extLst>
           </p:cNvPr>
@@ -11273,13 +11369,413 @@
         </p:nvSpPr>
         <p:spPr/>
         <p:txBody>
-          <a:bodyPr/>
+          <a:bodyPr>
+            <a:normAutofit fontScale="40000" lnSpcReduction="20000"/>
+          </a:bodyPr>
           <a:lstStyle/>
           <a:p>
-            <a:endParaRPr lang="fr-FR"/>
+            <a:pPr marL="0" indent="0">
+              <a:buNone/>
+            </a:pPr>
+            <a:r>
+              <a:rPr lang="en-US" dirty="0"/>
+              <a:t>Ability to :</a:t>
+            </a:r>
+          </a:p>
+          <a:p>
+            <a:r>
+              <a:rPr lang="en-US" dirty="0"/>
+              <a:t>compare results from different models on the same dataset</a:t>
+            </a:r>
+          </a:p>
+          <a:p>
+            <a:r>
+              <a:rPr lang="en-US" dirty="0"/>
+              <a:t>test the same model but with different set of parameters</a:t>
+            </a:r>
+          </a:p>
+          <a:p>
+            <a:r>
+              <a:rPr lang="en-US" dirty="0"/>
+              <a:t>act as a host for more sophisticated code</a:t>
+            </a:r>
+          </a:p>
+          <a:p>
+            <a:pPr lvl="1"/>
+            <a:r>
+              <a:rPr lang="en-US" dirty="0"/>
+              <a:t>Some template code are already in place but commented</a:t>
+            </a:r>
+          </a:p>
+          <a:p>
+            <a:r>
+              <a:rPr lang="en-US" dirty="0"/>
+              <a:t>provide ranges of values for parameters and find the best configuration for each model</a:t>
+            </a:r>
+          </a:p>
+          <a:p>
+            <a:pPr lvl="1"/>
+            <a:r>
+              <a:rPr lang="en-US" dirty="0"/>
+              <a:t>It's supposed to be </a:t>
+            </a:r>
+            <a:r>
+              <a:rPr lang="en-US" b="1" dirty="0"/>
+              <a:t>declarative</a:t>
+            </a:r>
+            <a:r>
+              <a:rPr lang="en-US" dirty="0"/>
+              <a:t>, so you can quickly run a wide range of tests</a:t>
+            </a:r>
+          </a:p>
+          <a:p>
+            <a:pPr lvl="1"/>
+            <a:r>
+              <a:rPr lang="en-US" dirty="0"/>
+              <a:t>No coding requested (if needed, coding can be done in an external file)</a:t>
+            </a:r>
+          </a:p>
+          <a:p>
+            <a:r>
+              <a:rPr lang="en-US" dirty="0"/>
+              <a:t>Being able to use, not only a model but a pipe of Transformers, Predictors</a:t>
+            </a:r>
+          </a:p>
+          <a:p>
+            <a:pPr lvl="1"/>
+            <a:r>
+              <a:rPr lang="en-US" dirty="0"/>
+              <a:t>Again, this should be </a:t>
+            </a:r>
+            <a:r>
+              <a:rPr lang="en-US" b="1" dirty="0"/>
+              <a:t>declarative</a:t>
+            </a:r>
+            <a:r>
+              <a:rPr lang="en-US" dirty="0"/>
+              <a:t> with no coding </a:t>
+            </a:r>
+          </a:p>
+          <a:p>
+            <a:pPr lvl="1"/>
+            <a:r>
+              <a:rPr lang="en-US" dirty="0"/>
+              <a:t>Allow some sort of preprocessing "per model"  </a:t>
+            </a:r>
+          </a:p>
+          <a:p>
+            <a:r>
+              <a:rPr lang="en-US" dirty="0"/>
+              <a:t>add some preprocessing for all models under test</a:t>
+            </a:r>
+          </a:p>
+          <a:p>
+            <a:pPr lvl="1"/>
+            <a:r>
+              <a:rPr lang="en-US" dirty="0"/>
+              <a:t>Specific code is needed but template of code is already in place</a:t>
+            </a:r>
+          </a:p>
+          <a:p>
+            <a:pPr lvl="1"/>
+            <a:r>
+              <a:rPr lang="en-US" dirty="0"/>
+              <a:t>2 types of pre-processing exist, depending on the data on which they act (raw data,</a:t>
+            </a:r>
+            <a:br>
+              <a:rPr lang="en-US" dirty="0"/>
+            </a:br>
+            <a:r>
+              <a:rPr lang="en-US" dirty="0"/>
+              <a:t>X and y </a:t>
+            </a:r>
+            <a:r>
+              <a:rPr lang="en-US" dirty="0" err="1"/>
+              <a:t>dataframes</a:t>
+            </a:r>
+            <a:r>
+              <a:rPr lang="en-US" dirty="0"/>
+              <a:t>)</a:t>
+            </a:r>
+          </a:p>
+          <a:p>
+            <a:r>
+              <a:rPr lang="en-US" dirty="0"/>
+              <a:t>add some features selection for all models under test</a:t>
+            </a:r>
+          </a:p>
+          <a:p>
+            <a:pPr lvl="1"/>
+            <a:r>
+              <a:rPr lang="en-US" dirty="0"/>
+              <a:t>Specific code is needed but template of code is already in place</a:t>
+            </a:r>
+          </a:p>
+          <a:p>
+            <a:r>
+              <a:rPr lang="en-US" dirty="0"/>
+              <a:t>add some feature engineering for all models under test</a:t>
+            </a:r>
+          </a:p>
+          <a:p>
+            <a:pPr lvl="1"/>
+            <a:r>
+              <a:rPr lang="en-US" dirty="0"/>
+              <a:t>Specific code is needed but template of code is already in place</a:t>
+            </a:r>
+          </a:p>
+          <a:p>
+            <a:r>
+              <a:rPr lang="en-US" dirty="0"/>
+              <a:t>Define train, test and validation sets in order to make sure we can test the best model on "unseen" observations</a:t>
+            </a:r>
+          </a:p>
+          <a:p>
+            <a:r>
+              <a:rPr lang="en-US" dirty="0"/>
+              <a:t>Save the benchmarks results into csv files</a:t>
+            </a:r>
+          </a:p>
+          <a:p>
+            <a:r>
+              <a:rPr lang="en-US" dirty="0"/>
+              <a:t>Save the predictions of the best model in order to send them to the leaderboard</a:t>
+            </a:r>
+          </a:p>
+          <a:p>
+            <a:r>
+              <a:rPr lang="en-US" dirty="0"/>
+              <a:t>...</a:t>
+            </a:r>
           </a:p>
         </p:txBody>
       </p:sp>
+      <p:pic>
+        <p:nvPicPr>
+          <p:cNvPr id="9" name="Espace réservé du contenu 4">
+            <a:extLst>
+              <a:ext uri="{FF2B5EF4-FFF2-40B4-BE49-F238E27FC236}">
+                <a16:creationId xmlns:a16="http://schemas.microsoft.com/office/drawing/2014/main" id="{F9FB78CE-91DD-40A8-182C-E25A9108A6F9}"/>
+              </a:ext>
+            </a:extLst>
+          </p:cNvPr>
+          <p:cNvPicPr>
+            <a:picLocks noChangeAspect="1"/>
+          </p:cNvPicPr>
+          <p:nvPr/>
+        </p:nvPicPr>
+        <p:blipFill>
+          <a:blip r:embed="rId2">
+            <a:extLst>
+              <a:ext uri="{28A0092B-C50C-407E-A947-70E740481C1C}">
+                <a14:useLocalDpi xmlns:a14="http://schemas.microsoft.com/office/drawing/2010/main" val="0"/>
+              </a:ext>
+            </a:extLst>
+          </a:blip>
+          <a:stretch>
+            <a:fillRect/>
+          </a:stretch>
+        </p:blipFill>
+        <p:spPr>
+          <a:xfrm>
+            <a:off x="3422158" y="152315"/>
+            <a:ext cx="8611346" cy="983065"/>
+          </a:xfrm>
+          <a:prstGeom prst="rect">
+            <a:avLst/>
+          </a:prstGeom>
+        </p:spPr>
+      </p:pic>
+      <p:pic>
+        <p:nvPicPr>
+          <p:cNvPr id="11" name="Image 10" descr="Une image contenant texte, capture d’écran, Police, ligne&#10;&#10;Description générée automatiquement">
+            <a:extLst>
+              <a:ext uri="{FF2B5EF4-FFF2-40B4-BE49-F238E27FC236}">
+                <a16:creationId xmlns:a16="http://schemas.microsoft.com/office/drawing/2014/main" id="{780D1B08-8FC0-B150-FFA4-146441FCA0E0}"/>
+              </a:ext>
+            </a:extLst>
+          </p:cNvPr>
+          <p:cNvPicPr>
+            <a:picLocks noChangeAspect="1"/>
+          </p:cNvPicPr>
+          <p:nvPr/>
+        </p:nvPicPr>
+        <p:blipFill>
+          <a:blip r:embed="rId3">
+            <a:extLst>
+              <a:ext uri="{28A0092B-C50C-407E-A947-70E740481C1C}">
+                <a14:useLocalDpi xmlns:a14="http://schemas.microsoft.com/office/drawing/2010/main" val="0"/>
+              </a:ext>
+            </a:extLst>
+          </a:blip>
+          <a:stretch>
+            <a:fillRect/>
+          </a:stretch>
+        </p:blipFill>
+        <p:spPr>
+          <a:xfrm>
+            <a:off x="8390999" y="1490030"/>
+            <a:ext cx="3642505" cy="700482"/>
+          </a:xfrm>
+          <a:prstGeom prst="rect">
+            <a:avLst/>
+          </a:prstGeom>
+        </p:spPr>
+      </p:pic>
+      <p:pic>
+        <p:nvPicPr>
+          <p:cNvPr id="13" name="Image 12" descr="Une image contenant capture d’écran, texte, Police&#10;&#10;Description générée automatiquement">
+            <a:extLst>
+              <a:ext uri="{FF2B5EF4-FFF2-40B4-BE49-F238E27FC236}">
+                <a16:creationId xmlns:a16="http://schemas.microsoft.com/office/drawing/2014/main" id="{1B066F4F-5C59-F532-E732-D4A3BBFDFDC9}"/>
+              </a:ext>
+            </a:extLst>
+          </p:cNvPr>
+          <p:cNvPicPr>
+            <a:picLocks noChangeAspect="1"/>
+          </p:cNvPicPr>
+          <p:nvPr/>
+        </p:nvPicPr>
+        <p:blipFill>
+          <a:blip r:embed="rId4">
+            <a:extLst>
+              <a:ext uri="{28A0092B-C50C-407E-A947-70E740481C1C}">
+                <a14:useLocalDpi xmlns:a14="http://schemas.microsoft.com/office/drawing/2010/main" val="0"/>
+              </a:ext>
+            </a:extLst>
+          </a:blip>
+          <a:stretch>
+            <a:fillRect/>
+          </a:stretch>
+        </p:blipFill>
+        <p:spPr>
+          <a:xfrm>
+            <a:off x="6340473" y="5832927"/>
+            <a:ext cx="5693031" cy="791649"/>
+          </a:xfrm>
+          <a:prstGeom prst="rect">
+            <a:avLst/>
+          </a:prstGeom>
+        </p:spPr>
+      </p:pic>
+      <p:pic>
+        <p:nvPicPr>
+          <p:cNvPr id="15" name="Image 14">
+            <a:extLst>
+              <a:ext uri="{FF2B5EF4-FFF2-40B4-BE49-F238E27FC236}">
+                <a16:creationId xmlns:a16="http://schemas.microsoft.com/office/drawing/2014/main" id="{D14D8A29-CF57-D12C-715A-891F21A57F37}"/>
+              </a:ext>
+            </a:extLst>
+          </p:cNvPr>
+          <p:cNvPicPr>
+            <a:picLocks noChangeAspect="1"/>
+          </p:cNvPicPr>
+          <p:nvPr/>
+        </p:nvPicPr>
+        <p:blipFill>
+          <a:blip r:embed="rId5"/>
+          <a:stretch>
+            <a:fillRect/>
+          </a:stretch>
+        </p:blipFill>
+        <p:spPr>
+          <a:xfrm>
+            <a:off x="7425077" y="2545162"/>
+            <a:ext cx="4608427" cy="2933116"/>
+          </a:xfrm>
+          <a:prstGeom prst="rect">
+            <a:avLst/>
+          </a:prstGeom>
+        </p:spPr>
+      </p:pic>
+      <p:cxnSp>
+        <p:nvCxnSpPr>
+          <p:cNvPr id="17" name="Connecteur droit avec flèche 16">
+            <a:extLst>
+              <a:ext uri="{FF2B5EF4-FFF2-40B4-BE49-F238E27FC236}">
+                <a16:creationId xmlns:a16="http://schemas.microsoft.com/office/drawing/2014/main" id="{045BABB2-3EF1-61BA-328A-2DC1B6212357}"/>
+              </a:ext>
+            </a:extLst>
+          </p:cNvPr>
+          <p:cNvCxnSpPr>
+            <a:cxnSpLocks/>
+          </p:cNvCxnSpPr>
+          <p:nvPr/>
+        </p:nvCxnSpPr>
+        <p:spPr>
+          <a:xfrm>
+            <a:off x="6918960" y="2670048"/>
+            <a:ext cx="463296" cy="3162879"/>
+          </a:xfrm>
+          <a:prstGeom prst="straightConnector1">
+            <a:avLst/>
+          </a:prstGeom>
+          <a:ln w="38100">
+            <a:solidFill>
+              <a:srgbClr val="C00000"/>
+            </a:solidFill>
+            <a:tailEnd type="triangle"/>
+          </a:ln>
+        </p:spPr>
+        <p:style>
+          <a:lnRef idx="1">
+            <a:schemeClr val="accent1"/>
+          </a:lnRef>
+          <a:fillRef idx="0">
+            <a:schemeClr val="accent1"/>
+          </a:fillRef>
+          <a:effectRef idx="0">
+            <a:schemeClr val="accent1"/>
+          </a:effectRef>
+          <a:fontRef idx="minor">
+            <a:schemeClr val="tx1"/>
+          </a:fontRef>
+        </p:style>
+      </p:cxnSp>
+      <p:cxnSp>
+        <p:nvCxnSpPr>
+          <p:cNvPr id="21" name="Connecteur droit avec flèche 20">
+            <a:extLst>
+              <a:ext uri="{FF2B5EF4-FFF2-40B4-BE49-F238E27FC236}">
+                <a16:creationId xmlns:a16="http://schemas.microsoft.com/office/drawing/2014/main" id="{2FCD1322-158F-94B0-6A94-F038F9107155}"/>
+              </a:ext>
+            </a:extLst>
+          </p:cNvPr>
+          <p:cNvCxnSpPr>
+            <a:cxnSpLocks/>
+          </p:cNvCxnSpPr>
+          <p:nvPr/>
+        </p:nvCxnSpPr>
+        <p:spPr>
+          <a:xfrm>
+            <a:off x="5522976" y="1572768"/>
+            <a:ext cx="2813159" cy="267503"/>
+          </a:xfrm>
+          <a:prstGeom prst="straightConnector1">
+            <a:avLst/>
+          </a:prstGeom>
+          <a:ln w="38100">
+            <a:solidFill>
+              <a:srgbClr val="C00000"/>
+            </a:solidFill>
+            <a:tailEnd type="triangle"/>
+          </a:ln>
+        </p:spPr>
+        <p:style>
+          <a:lnRef idx="1">
+            <a:schemeClr val="accent1"/>
+          </a:lnRef>
+          <a:fillRef idx="0">
+            <a:schemeClr val="accent1"/>
+          </a:fillRef>
+          <a:effectRef idx="0">
+            <a:schemeClr val="accent1"/>
+          </a:effectRef>
+          <a:fontRef idx="minor">
+            <a:schemeClr val="tx1"/>
+          </a:fontRef>
+        </p:style>
+      </p:cxnSp>
     </p:spTree>
     <p:extLst>
       <p:ext uri="{BB962C8B-B14F-4D97-AF65-F5344CB8AC3E}">
@@ -11368,10 +11864,161 @@
           <a:bodyPr/>
           <a:lstStyle/>
           <a:p>
+            <a:r>
+              <a:rPr lang="fr-FR" dirty="0"/>
+              <a:t>Don't mess </a:t>
+            </a:r>
+            <a:r>
+              <a:rPr lang="fr-FR" dirty="0" err="1"/>
+              <a:t>with</a:t>
+            </a:r>
+            <a:r>
+              <a:rPr lang="fr-FR" dirty="0"/>
+              <a:t> EDA (and Texas)</a:t>
+            </a:r>
+          </a:p>
+          <a:p>
+            <a:r>
+              <a:rPr lang="fr-FR" dirty="0" err="1"/>
+              <a:t>Getting</a:t>
+            </a:r>
+            <a:r>
+              <a:rPr lang="fr-FR" dirty="0"/>
+              <a:t> a </a:t>
+            </a:r>
+            <a:r>
+              <a:rPr lang="fr-FR" dirty="0" err="1"/>
+              <a:t>baseline</a:t>
+            </a:r>
+            <a:r>
+              <a:rPr lang="fr-FR" dirty="0"/>
+              <a:t> model </a:t>
+            </a:r>
+            <a:r>
+              <a:rPr lang="fr-FR" dirty="0" err="1"/>
+              <a:t>quickly</a:t>
+            </a:r>
+            <a:r>
+              <a:rPr lang="fr-FR" dirty="0"/>
+              <a:t> </a:t>
+            </a:r>
+            <a:r>
+              <a:rPr lang="fr-FR" dirty="0" err="1"/>
+              <a:t>is</a:t>
+            </a:r>
+            <a:r>
+              <a:rPr lang="fr-FR" dirty="0"/>
+              <a:t> </a:t>
+            </a:r>
+            <a:r>
+              <a:rPr lang="fr-FR" dirty="0" err="1"/>
+              <a:t>critical</a:t>
+            </a:r>
             <a:endParaRPr lang="fr-FR" dirty="0"/>
+          </a:p>
+          <a:p>
+            <a:r>
+              <a:rPr lang="en-US" dirty="0"/>
+              <a:t>Setting up metrics and </a:t>
+            </a:r>
+            <a:r>
+              <a:rPr lang="en-US" dirty="0" err="1"/>
+              <a:t>analysing</a:t>
+            </a:r>
+            <a:r>
+              <a:rPr lang="en-US" dirty="0"/>
+              <a:t> &amp; monitoring them from the outset is essential</a:t>
+            </a:r>
+            <a:r>
+              <a:rPr lang="fr-FR" dirty="0"/>
+              <a:t> </a:t>
+            </a:r>
+          </a:p>
+          <a:p>
+            <a:endParaRPr lang="fr-FR"/>
+          </a:p>
+          <a:p>
+            <a:r>
+              <a:rPr lang="fr-FR"/>
+              <a:t>Working</a:t>
+            </a:r>
+            <a:r>
+              <a:rPr lang="fr-FR" dirty="0"/>
+              <a:t> on the </a:t>
+            </a:r>
+            <a:r>
+              <a:rPr lang="fr-FR" dirty="0" err="1"/>
+              <a:t>framework</a:t>
+            </a:r>
+            <a:r>
+              <a:rPr lang="fr-FR" dirty="0"/>
+              <a:t> </a:t>
+            </a:r>
+            <a:r>
+              <a:rPr lang="fr-FR" dirty="0" err="1"/>
+              <a:t>was</a:t>
+            </a:r>
+            <a:r>
+              <a:rPr lang="fr-FR" dirty="0"/>
+              <a:t> fun</a:t>
+            </a:r>
           </a:p>
         </p:txBody>
       </p:sp>
+      <p:pic>
+        <p:nvPicPr>
+          <p:cNvPr id="1026" name="Picture 2" descr="Don't Mess With Texas T-Shirt | Texas Star Trading">
+            <a:extLst>
+              <a:ext uri="{FF2B5EF4-FFF2-40B4-BE49-F238E27FC236}">
+                <a16:creationId xmlns:a16="http://schemas.microsoft.com/office/drawing/2014/main" id="{2D552CAB-37E3-9567-3277-906A21F1EF47}"/>
+              </a:ext>
+            </a:extLst>
+          </p:cNvPr>
+          <p:cNvPicPr>
+            <a:picLocks noChangeAspect="1" noChangeArrowheads="1"/>
+          </p:cNvPicPr>
+          <p:nvPr/>
+        </p:nvPicPr>
+        <p:blipFill>
+          <a:blip r:embed="rId2">
+            <a:extLst>
+              <a:ext uri="{28A0092B-C50C-407E-A947-70E740481C1C}">
+                <a14:useLocalDpi xmlns:a14="http://schemas.microsoft.com/office/drawing/2010/main" val="0"/>
+              </a:ext>
+            </a:extLst>
+          </a:blip>
+          <a:srcRect/>
+          <a:stretch>
+            <a:fillRect/>
+          </a:stretch>
+        </p:blipFill>
+        <p:spPr bwMode="auto">
+          <a:xfrm>
+            <a:off x="10546080" y="809055"/>
+            <a:ext cx="1079754" cy="1415800"/>
+          </a:xfrm>
+          <a:prstGeom prst="rect">
+            <a:avLst/>
+          </a:prstGeom>
+          <a:noFill/>
+          <a:effectLst>
+            <a:outerShdw blurRad="50800" dist="38100" dir="2700000" algn="tl" rotWithShape="0">
+              <a:prstClr val="black">
+                <a:alpha val="40000"/>
+              </a:prstClr>
+            </a:outerShdw>
+          </a:effectLst>
+          <a:extLst>
+            <a:ext uri="{909E8E84-426E-40DD-AFC4-6F175D3DCCD1}">
+              <a14:hiddenFill xmlns:a14="http://schemas.microsoft.com/office/drawing/2010/main">
+                <a:solidFill>
+                  <a:srgbClr val="FFFFFF"/>
+                </a:solidFill>
+              </a14:hiddenFill>
+            </a:ext>
+          </a:extLst>
+        </p:spPr>
+      </p:pic>
     </p:spTree>
     <p:extLst>
       <p:ext uri="{BB962C8B-B14F-4D97-AF65-F5344CB8AC3E}">

</xml_diff>

<commit_message>
Review Uber + add Colab picture in conv rate slides
</commit_message>
<xml_diff>
--- a/05_supervised_ML/99_Project_Conversion_rate_challenge/01_conversion_rate_challenge.pptx
+++ b/05_supervised_ML/99_Project_Conversion_rate_challenge/01_conversion_rate_challenge.pptx
@@ -127,7 +127,7 @@
 <file path=ppt/revisionInfo.xml><?xml version="1.0" encoding="utf-8"?>
 <p1510:revInfo xmlns:a="http://schemas.openxmlformats.org/drawingml/2006/main" xmlns:r="http://schemas.openxmlformats.org/officeDocument/2006/relationships" xmlns:p1510="http://schemas.microsoft.com/office/powerpoint/2015/10/main">
   <p1510:revLst>
-    <p1510:client id="{1601E6E7-CA79-4409-AD99-5386FB3F24AE}" v="42" dt="2024-08-25T13:40:56.603"/>
+    <p1510:client id="{1601E6E7-CA79-4409-AD99-5386FB3F24AE}" v="51" dt="2024-08-26T15:03:26.690"/>
   </p1510:revLst>
 </p1510:revInfo>
 </file>
@@ -1566,7 +1566,7 @@
   <pc:docChgLst>
     <pc:chgData name="Philippe Baucour" userId="5102170ae7533958" providerId="LiveId" clId="{1601E6E7-CA79-4409-AD99-5386FB3F24AE}"/>
     <pc:docChg chg="undo custSel addSld delSld modSld sldOrd">
-      <pc:chgData name="Philippe Baucour" userId="5102170ae7533958" providerId="LiveId" clId="{1601E6E7-CA79-4409-AD99-5386FB3F24AE}" dt="2024-08-26T08:47:04.162" v="2503"/>
+      <pc:chgData name="Philippe Baucour" userId="5102170ae7533958" providerId="LiveId" clId="{1601E6E7-CA79-4409-AD99-5386FB3F24AE}" dt="2024-08-26T15:03:33.471" v="2647" actId="6549"/>
       <pc:docMkLst>
         <pc:docMk/>
       </pc:docMkLst>
@@ -1601,20 +1601,28 @@
           </ac:picMkLst>
         </pc:picChg>
       </pc:sldChg>
-      <pc:sldChg chg="addSp delSp modSp mod">
-        <pc:chgData name="Philippe Baucour" userId="5102170ae7533958" providerId="LiveId" clId="{1601E6E7-CA79-4409-AD99-5386FB3F24AE}" dt="2024-08-25T13:44:05.432" v="2500" actId="20577"/>
+      <pc:sldChg chg="addSp delSp modSp mod modNotesTx">
+        <pc:chgData name="Philippe Baucour" userId="5102170ae7533958" providerId="LiveId" clId="{1601E6E7-CA79-4409-AD99-5386FB3F24AE}" dt="2024-08-26T15:03:33.471" v="2647" actId="6549"/>
         <pc:sldMkLst>
           <pc:docMk/>
           <pc:sldMk cId="3201622378" sldId="257"/>
         </pc:sldMkLst>
         <pc:spChg chg="mod">
-          <ac:chgData name="Philippe Baucour" userId="5102170ae7533958" providerId="LiveId" clId="{1601E6E7-CA79-4409-AD99-5386FB3F24AE}" dt="2024-08-25T13:44:05.432" v="2500" actId="20577"/>
+          <ac:chgData name="Philippe Baucour" userId="5102170ae7533958" providerId="LiveId" clId="{1601E6E7-CA79-4409-AD99-5386FB3F24AE}" dt="2024-08-26T14:54:08.987" v="2576" actId="20577"/>
           <ac:spMkLst>
             <pc:docMk/>
             <pc:sldMk cId="3201622378" sldId="257"/>
             <ac:spMk id="3" creationId="{1A803C62-BD0B-D0AC-2B41-C4F420891B06}"/>
           </ac:spMkLst>
         </pc:spChg>
+        <pc:picChg chg="add mod">
+          <ac:chgData name="Philippe Baucour" userId="5102170ae7533958" providerId="LiveId" clId="{1601E6E7-CA79-4409-AD99-5386FB3F24AE}" dt="2024-08-26T14:54:58.700" v="2596" actId="1038"/>
+          <ac:picMkLst>
+            <pc:docMk/>
+            <pc:sldMk cId="3201622378" sldId="257"/>
+            <ac:picMk id="5" creationId="{B59A4E24-2010-FDC1-C76A-063B1B0EB2A3}"/>
+          </ac:picMkLst>
+        </pc:picChg>
         <pc:picChg chg="add del mod">
           <ac:chgData name="Philippe Baucour" userId="5102170ae7533958" providerId="LiveId" clId="{1601E6E7-CA79-4409-AD99-5386FB3F24AE}" dt="2024-08-22T14:19:42.487" v="237" actId="21"/>
           <ac:picMkLst>
@@ -1624,7 +1632,7 @@
           </ac:picMkLst>
         </pc:picChg>
         <pc:picChg chg="add mod">
-          <ac:chgData name="Philippe Baucour" userId="5102170ae7533958" providerId="LiveId" clId="{1601E6E7-CA79-4409-AD99-5386FB3F24AE}" dt="2024-08-25T13:40:56.603" v="2470" actId="1076"/>
+          <ac:chgData name="Philippe Baucour" userId="5102170ae7533958" providerId="LiveId" clId="{1601E6E7-CA79-4409-AD99-5386FB3F24AE}" dt="2024-08-26T15:03:02.501" v="2643" actId="14100"/>
           <ac:picMkLst>
             <pc:docMk/>
             <pc:sldMk cId="3201622378" sldId="257"/>
@@ -2152,13 +2160,13 @@
         </pc:picChg>
       </pc:sldChg>
       <pc:sldChg chg="addSp delSp modSp new mod chgLayout">
-        <pc:chgData name="Philippe Baucour" userId="5102170ae7533958" providerId="LiveId" clId="{1601E6E7-CA79-4409-AD99-5386FB3F24AE}" dt="2024-08-25T13:35:34.421" v="2328" actId="14100"/>
+        <pc:chgData name="Philippe Baucour" userId="5102170ae7533958" providerId="LiveId" clId="{1601E6E7-CA79-4409-AD99-5386FB3F24AE}" dt="2024-08-26T14:56:09.289" v="2600" actId="1076"/>
         <pc:sldMkLst>
           <pc:docMk/>
           <pc:sldMk cId="1612286955" sldId="268"/>
         </pc:sldMkLst>
         <pc:spChg chg="mod ord">
-          <ac:chgData name="Philippe Baucour" userId="5102170ae7533958" providerId="LiveId" clId="{1601E6E7-CA79-4409-AD99-5386FB3F24AE}" dt="2024-08-25T13:10:07.447" v="1687" actId="700"/>
+          <ac:chgData name="Philippe Baucour" userId="5102170ae7533958" providerId="LiveId" clId="{1601E6E7-CA79-4409-AD99-5386FB3F24AE}" dt="2024-08-26T14:56:05.134" v="2599" actId="20577"/>
           <ac:spMkLst>
             <pc:docMk/>
             <pc:sldMk cId="1612286955" sldId="268"/>
@@ -2198,7 +2206,7 @@
           </ac:picMkLst>
         </pc:picChg>
         <pc:picChg chg="add mod">
-          <ac:chgData name="Philippe Baucour" userId="5102170ae7533958" providerId="LiveId" clId="{1601E6E7-CA79-4409-AD99-5386FB3F24AE}" dt="2024-08-25T13:10:51.479" v="1746" actId="1076"/>
+          <ac:chgData name="Philippe Baucour" userId="5102170ae7533958" providerId="LiveId" clId="{1601E6E7-CA79-4409-AD99-5386FB3F24AE}" dt="2024-08-26T14:56:09.289" v="2600" actId="1076"/>
           <ac:picMkLst>
             <pc:docMk/>
             <pc:sldMk cId="1612286955" sldId="268"/>
@@ -5407,6 +5415,137 @@
     <p:extLst>
       <p:ext uri="{BB962C8B-B14F-4D97-AF65-F5344CB8AC3E}">
         <p14:creationId xmlns:p14="http://schemas.microsoft.com/office/powerpoint/2010/main" val="356246562"/>
+      </p:ext>
+    </p:extLst>
+  </p:cSld>
+  <p:clrMapOvr>
+    <a:masterClrMapping/>
+  </p:clrMapOvr>
+</p:notes>
+</file>
+
+<file path=ppt/notesSlides/notesSlide7.xml><?xml version="1.0" encoding="utf-8"?>
+<p:notes xmlns:a="http://schemas.openxmlformats.org/drawingml/2006/main" xmlns:r="http://schemas.openxmlformats.org/officeDocument/2006/relationships" xmlns:p="http://schemas.openxmlformats.org/presentationml/2006/main">
+  <p:cSld>
+    <p:spTree>
+      <p:nvGrpSpPr>
+        <p:cNvPr id="1" name=""/>
+        <p:cNvGrpSpPr/>
+        <p:nvPr/>
+      </p:nvGrpSpPr>
+      <p:grpSpPr>
+        <a:xfrm>
+          <a:off x="0" y="0"/>
+          <a:ext cx="0" cy="0"/>
+          <a:chOff x="0" y="0"/>
+          <a:chExt cx="0" cy="0"/>
+        </a:xfrm>
+      </p:grpSpPr>
+      <p:sp>
+        <p:nvSpPr>
+          <p:cNvPr id="2" name="Espace réservé de l'image des diapositives 1"/>
+          <p:cNvSpPr>
+            <a:spLocks noGrp="1" noRot="1" noChangeAspect="1"/>
+          </p:cNvSpPr>
+          <p:nvPr>
+            <p:ph type="sldImg"/>
+          </p:nvPr>
+        </p:nvSpPr>
+        <p:spPr/>
+      </p:sp>
+      <p:sp>
+        <p:nvSpPr>
+          <p:cNvPr id="3" name="Espace réservé des notes 2"/>
+          <p:cNvSpPr>
+            <a:spLocks noGrp="1"/>
+          </p:cNvSpPr>
+          <p:nvPr>
+            <p:ph type="body" idx="1"/>
+          </p:nvPr>
+        </p:nvSpPr>
+        <p:spPr/>
+        <p:txBody>
+          <a:bodyPr/>
+          <a:lstStyle/>
+          <a:p>
+            <a:r>
+              <a:rPr lang="fr-FR" dirty="0"/>
+              <a:t>Test sous </a:t>
+            </a:r>
+            <a:r>
+              <a:rPr lang="fr-FR" dirty="0" err="1"/>
+              <a:t>Colab</a:t>
+            </a:r>
+            <a:r>
+              <a:rPr lang="fr-FR" dirty="0"/>
+              <a:t> avec </a:t>
+            </a:r>
+            <a:r>
+              <a:rPr lang="fr-FR" dirty="0" err="1"/>
+              <a:t>pycaret</a:t>
+            </a:r>
+            <a:r>
+              <a:rPr lang="fr-FR" dirty="0"/>
+              <a:t> : </a:t>
+            </a:r>
+          </a:p>
+          <a:p>
+            <a:r>
+              <a:rPr lang="fr-FR" dirty="0"/>
+              <a:t>https://colab.research.google.com/drive/1nR0YZLl1J8JNjm_Toky2HNsVDBkTdiXZ?hl=fr</a:t>
+            </a:r>
+          </a:p>
+          <a:p>
+            <a:endParaRPr lang="fr-FR" dirty="0"/>
+          </a:p>
+          <a:p>
+            <a:r>
+              <a:rPr lang="fr-FR" dirty="0" err="1"/>
+              <a:t>Hyperparameter</a:t>
+            </a:r>
+            <a:r>
+              <a:rPr lang="fr-FR" dirty="0"/>
+              <a:t> Tuning in Python</a:t>
+            </a:r>
+          </a:p>
+          <a:p>
+            <a:r>
+              <a:rPr lang="fr-FR" dirty="0"/>
+              <a:t>https://neptune.ai/blog/hyperparameter-tuning-in-python-complete-guide</a:t>
+            </a:r>
+          </a:p>
+          <a:p>
+            <a:endParaRPr lang="fr-FR" dirty="0"/>
+          </a:p>
+        </p:txBody>
+      </p:sp>
+      <p:sp>
+        <p:nvSpPr>
+          <p:cNvPr id="4" name="Espace réservé du numéro de diapositive 3"/>
+          <p:cNvSpPr>
+            <a:spLocks noGrp="1"/>
+          </p:cNvSpPr>
+          <p:nvPr>
+            <p:ph type="sldNum" sz="quarter" idx="5"/>
+          </p:nvPr>
+        </p:nvSpPr>
+        <p:spPr/>
+        <p:txBody>
+          <a:bodyPr/>
+          <a:lstStyle/>
+          <a:p>
+            <a:fld id="{341AEC00-4977-4C47-A11B-52155DC12F54}" type="slidenum">
+              <a:rPr lang="fr-FR" smtClean="0"/>
+              <a:t>9</a:t>
+            </a:fld>
+            <a:endParaRPr lang="fr-FR"/>
+          </a:p>
+        </p:txBody>
+      </p:sp>
+    </p:spTree>
+    <p:extLst>
+      <p:ext uri="{BB962C8B-B14F-4D97-AF65-F5344CB8AC3E}">
+        <p14:creationId xmlns:p14="http://schemas.microsoft.com/office/powerpoint/2010/main" val="3208090345"/>
       </p:ext>
     </p:extLst>
   </p:cSld>
@@ -11759,7 +11898,7 @@
           <a:p>
             <a:r>
               <a:rPr lang="fr-FR" dirty="0"/>
-              <a:t>Framework 1</a:t>
+              <a:t>Framework</a:t>
             </a:r>
           </a:p>
         </p:txBody>
@@ -11991,7 +12130,7 @@
         </p:blipFill>
         <p:spPr>
           <a:xfrm>
-            <a:off x="3422158" y="152315"/>
+            <a:off x="3367294" y="134933"/>
             <a:ext cx="8611346" cy="983065"/>
           </a:xfrm>
           <a:prstGeom prst="rect">
@@ -12332,7 +12471,7 @@
           <a:p>
             <a:r>
               <a:rPr lang="en-US" dirty="0"/>
-              <a:t>Setting up metrics and </a:t>
+              <a:t>Setting up metrics, </a:t>
             </a:r>
             <a:r>
               <a:rPr lang="en-US" dirty="0" err="1"/>
@@ -12340,7 +12479,7 @@
             </a:r>
             <a:r>
               <a:rPr lang="en-US" dirty="0"/>
-              <a:t> &amp; monitoring them from the outset is essential</a:t>
+              <a:t> and monitoring them from the outset is essential</a:t>
             </a:r>
             <a:r>
               <a:rPr lang="fr-FR" dirty="0"/>
@@ -12348,11 +12487,71 @@
             </a:r>
           </a:p>
           <a:p>
-            <a:endParaRPr lang="fr-FR"/>
-          </a:p>
-          <a:p>
-            <a:r>
-              <a:rPr lang="fr-FR"/>
+            <a:r>
+              <a:rPr lang="fr-FR" dirty="0" err="1"/>
+              <a:t>Using</a:t>
+            </a:r>
+            <a:r>
+              <a:rPr lang="fr-FR" dirty="0"/>
+              <a:t> </a:t>
+            </a:r>
+            <a:r>
+              <a:rPr lang="fr-FR" dirty="0" err="1"/>
+              <a:t>pycaret</a:t>
+            </a:r>
+            <a:r>
+              <a:rPr lang="fr-FR" dirty="0"/>
+              <a:t> (on </a:t>
+            </a:r>
+            <a:r>
+              <a:rPr lang="fr-FR" dirty="0" err="1"/>
+              <a:t>colab</a:t>
+            </a:r>
+            <a:r>
+              <a:rPr lang="fr-FR" dirty="0"/>
+              <a:t>) =&gt; </a:t>
+            </a:r>
+            <a:r>
+              <a:rPr lang="fr-FR" dirty="0" err="1"/>
+              <a:t>similar</a:t>
+            </a:r>
+            <a:r>
+              <a:rPr lang="fr-FR" dirty="0"/>
+              <a:t> </a:t>
+            </a:r>
+            <a:r>
+              <a:rPr lang="fr-FR" dirty="0" err="1"/>
+              <a:t>results</a:t>
+            </a:r>
+            <a:endParaRPr lang="fr-FR" dirty="0"/>
+          </a:p>
+          <a:p>
+            <a:pPr lvl="1"/>
+            <a:r>
+              <a:rPr lang="fr-FR" dirty="0"/>
+              <a:t> </a:t>
+            </a:r>
+            <a:r>
+              <a:rPr lang="fr-FR" dirty="0" err="1"/>
+              <a:t>Hyperparameter</a:t>
+            </a:r>
+            <a:r>
+              <a:rPr lang="fr-FR" dirty="0"/>
+              <a:t> Tuning in Python</a:t>
+            </a:r>
+          </a:p>
+          <a:p>
+            <a:endParaRPr lang="fr-FR" dirty="0"/>
+          </a:p>
+          <a:p>
+            <a:endParaRPr lang="fr-FR" dirty="0"/>
+          </a:p>
+          <a:p>
+            <a:endParaRPr lang="fr-FR" dirty="0"/>
+          </a:p>
+          <a:p>
+            <a:r>
+              <a:rPr lang="fr-FR" dirty="0" err="1"/>
               <a:t>Working</a:t>
             </a:r>
             <a:r>
@@ -12393,7 +12592,7 @@
           <p:nvPr/>
         </p:nvPicPr>
         <p:blipFill>
-          <a:blip r:embed="rId2">
+          <a:blip r:embed="rId3">
             <a:extLst>
               <a:ext uri="{28A0092B-C50C-407E-A947-70E740481C1C}">
                 <a14:useLocalDpi xmlns:a14="http://schemas.microsoft.com/office/drawing/2010/main" val="0"/>
@@ -12430,6 +12629,44 @@
               </a14:hiddenFill>
             </a:ext>
           </a:extLst>
+        </p:spPr>
+      </p:pic>
+      <p:pic>
+        <p:nvPicPr>
+          <p:cNvPr id="5" name="Image 4">
+            <a:extLst>
+              <a:ext uri="{FF2B5EF4-FFF2-40B4-BE49-F238E27FC236}">
+                <a16:creationId xmlns:a16="http://schemas.microsoft.com/office/drawing/2014/main" id="{B59A4E24-2010-FDC1-C76A-063B1B0EB2A3}"/>
+              </a:ext>
+            </a:extLst>
+          </p:cNvPr>
+          <p:cNvPicPr>
+            <a:picLocks noChangeAspect="1"/>
+          </p:cNvPicPr>
+          <p:nvPr/>
+        </p:nvPicPr>
+        <p:blipFill>
+          <a:blip r:embed="rId4"/>
+          <a:stretch>
+            <a:fillRect/>
+          </a:stretch>
+        </p:blipFill>
+        <p:spPr>
+          <a:xfrm>
+            <a:off x="7599294" y="3713321"/>
+            <a:ext cx="3171070" cy="2049557"/>
+          </a:xfrm>
+          <a:prstGeom prst="rect">
+            <a:avLst/>
+          </a:prstGeom>
+          <a:noFill/>
+          <a:effectLst>
+            <a:outerShdw blurRad="50800" dist="38100" dir="2700000" algn="tl" rotWithShape="0">
+              <a:prstClr val="black">
+                <a:alpha val="40000"/>
+              </a:prstClr>
+            </a:outerShdw>
+          </a:effectLst>
         </p:spPr>
       </p:pic>
     </p:spTree>

</xml_diff>